<commit_message>
edits part 1 072621
</commit_message>
<xml_diff>
--- a/docs/images/SIOS DataKeeper architecture.pptx
+++ b/docs/images/SIOS DataKeeper architecture.pptx
@@ -6,6 +6,8 @@
   </p:sldMasterIdLst>
   <p:sldIdLst>
     <p:sldId id="256" r:id="rId2"/>
+    <p:sldId id="257" r:id="rId3"/>
+    <p:sldId id="258" r:id="rId4"/>
   </p:sldIdLst>
   <p:sldSz cx="12192000" cy="6858000"/>
   <p:notesSz cx="6858000" cy="9144000"/>
@@ -104,6 +106,11 @@
       </a:defRPr>
     </a:lvl9pPr>
   </p:defaultTextStyle>
+  <p:extLst>
+    <p:ext uri="{EFAFB233-063F-42B5-8137-9DF3F51BA10A}">
+      <p15:sldGuideLst xmlns:p15="http://schemas.microsoft.com/office/powerpoint/2012/main"/>
+    </p:ext>
+  </p:extLst>
 </p:presentation>
 </file>
 
@@ -238,7 +245,7 @@
           <a:p>
             <a:fld id="{B1E5028E-09A8-4225-BF6F-265C8079DC33}" type="datetimeFigureOut">
               <a:rPr lang="en-US" smtClean="0"/>
-              <a:t>7/20/2021</a:t>
+              <a:t>7/26/2021</a:t>
             </a:fld>
             <a:endParaRPr lang="en-US"/>
           </a:p>
@@ -408,7 +415,7 @@
           <a:p>
             <a:fld id="{B1E5028E-09A8-4225-BF6F-265C8079DC33}" type="datetimeFigureOut">
               <a:rPr lang="en-US" smtClean="0"/>
-              <a:t>7/20/2021</a:t>
+              <a:t>7/26/2021</a:t>
             </a:fld>
             <a:endParaRPr lang="en-US"/>
           </a:p>
@@ -588,7 +595,7 @@
           <a:p>
             <a:fld id="{B1E5028E-09A8-4225-BF6F-265C8079DC33}" type="datetimeFigureOut">
               <a:rPr lang="en-US" smtClean="0"/>
-              <a:t>7/20/2021</a:t>
+              <a:t>7/26/2021</a:t>
             </a:fld>
             <a:endParaRPr lang="en-US"/>
           </a:p>
@@ -758,7 +765,7 @@
           <a:p>
             <a:fld id="{B1E5028E-09A8-4225-BF6F-265C8079DC33}" type="datetimeFigureOut">
               <a:rPr lang="en-US" smtClean="0"/>
-              <a:t>7/20/2021</a:t>
+              <a:t>7/26/2021</a:t>
             </a:fld>
             <a:endParaRPr lang="en-US"/>
           </a:p>
@@ -1004,7 +1011,7 @@
           <a:p>
             <a:fld id="{B1E5028E-09A8-4225-BF6F-265C8079DC33}" type="datetimeFigureOut">
               <a:rPr lang="en-US" smtClean="0"/>
-              <a:t>7/20/2021</a:t>
+              <a:t>7/26/2021</a:t>
             </a:fld>
             <a:endParaRPr lang="en-US"/>
           </a:p>
@@ -1236,7 +1243,7 @@
           <a:p>
             <a:fld id="{B1E5028E-09A8-4225-BF6F-265C8079DC33}" type="datetimeFigureOut">
               <a:rPr lang="en-US" smtClean="0"/>
-              <a:t>7/20/2021</a:t>
+              <a:t>7/26/2021</a:t>
             </a:fld>
             <a:endParaRPr lang="en-US"/>
           </a:p>
@@ -1603,7 +1610,7 @@
           <a:p>
             <a:fld id="{B1E5028E-09A8-4225-BF6F-265C8079DC33}" type="datetimeFigureOut">
               <a:rPr lang="en-US" smtClean="0"/>
-              <a:t>7/20/2021</a:t>
+              <a:t>7/26/2021</a:t>
             </a:fld>
             <a:endParaRPr lang="en-US"/>
           </a:p>
@@ -1721,7 +1728,7 @@
           <a:p>
             <a:fld id="{B1E5028E-09A8-4225-BF6F-265C8079DC33}" type="datetimeFigureOut">
               <a:rPr lang="en-US" smtClean="0"/>
-              <a:t>7/20/2021</a:t>
+              <a:t>7/26/2021</a:t>
             </a:fld>
             <a:endParaRPr lang="en-US"/>
           </a:p>
@@ -1816,7 +1823,7 @@
           <a:p>
             <a:fld id="{B1E5028E-09A8-4225-BF6F-265C8079DC33}" type="datetimeFigureOut">
               <a:rPr lang="en-US" smtClean="0"/>
-              <a:t>7/20/2021</a:t>
+              <a:t>7/26/2021</a:t>
             </a:fld>
             <a:endParaRPr lang="en-US"/>
           </a:p>
@@ -2093,7 +2100,7 @@
           <a:p>
             <a:fld id="{B1E5028E-09A8-4225-BF6F-265C8079DC33}" type="datetimeFigureOut">
               <a:rPr lang="en-US" smtClean="0"/>
-              <a:t>7/20/2021</a:t>
+              <a:t>7/26/2021</a:t>
             </a:fld>
             <a:endParaRPr lang="en-US"/>
           </a:p>
@@ -2346,7 +2353,7 @@
           <a:p>
             <a:fld id="{B1E5028E-09A8-4225-BF6F-265C8079DC33}" type="datetimeFigureOut">
               <a:rPr lang="en-US" smtClean="0"/>
-              <a:t>7/20/2021</a:t>
+              <a:t>7/26/2021</a:t>
             </a:fld>
             <a:endParaRPr lang="en-US"/>
           </a:p>
@@ -2559,7 +2566,7 @@
           <a:p>
             <a:fld id="{B1E5028E-09A8-4225-BF6F-265C8079DC33}" type="datetimeFigureOut">
               <a:rPr lang="en-US" smtClean="0"/>
-              <a:t>7/20/2021</a:t>
+              <a:t>7/26/2021</a:t>
             </a:fld>
             <a:endParaRPr lang="en-US"/>
           </a:p>
@@ -3049,7 +3056,7 @@
           <a:blip r:embed="rId2">
             <a:extLst>
               <a:ext uri="{96DAC541-7B7A-43D3-8B79-37D633B846F1}">
-                <asvg:svgBlip xmlns:asvg="http://schemas.microsoft.com/office/drawing/2016/SVG/main" xmlns="" r:embed="rId3"/>
+                <asvg:svgBlip xmlns="" xmlns:asvg="http://schemas.microsoft.com/office/drawing/2016/SVG/main" r:embed="rId3"/>
               </a:ext>
             </a:extLst>
           </a:blip>
@@ -3166,7 +3173,7 @@
           <a:blip r:embed="rId4">
             <a:extLst>
               <a:ext uri="{96DAC541-7B7A-43D3-8B79-37D633B846F1}">
-                <asvg:svgBlip xmlns:asvg="http://schemas.microsoft.com/office/drawing/2016/SVG/main" xmlns="" r:embed="rId7"/>
+                <asvg:svgBlip xmlns="" xmlns:asvg="http://schemas.microsoft.com/office/drawing/2016/SVG/main" r:embed="rId7"/>
               </a:ext>
             </a:extLst>
           </a:blip>
@@ -3283,7 +3290,7 @@
           <a:blip r:embed="rId8">
             <a:extLst>
               <a:ext uri="{96DAC541-7B7A-43D3-8B79-37D633B846F1}">
-                <asvg:svgBlip xmlns:asvg="http://schemas.microsoft.com/office/drawing/2016/SVG/main" xmlns="" r:embed="rId9"/>
+                <asvg:svgBlip xmlns="" xmlns:asvg="http://schemas.microsoft.com/office/drawing/2016/SVG/main" r:embed="rId9"/>
               </a:ext>
             </a:extLst>
           </a:blip>
@@ -3442,7 +3449,7 @@
           <a:blip r:embed="rId10">
             <a:extLst>
               <a:ext uri="{96DAC541-7B7A-43D3-8B79-37D633B846F1}">
-                <asvg:svgBlip xmlns:asvg="http://schemas.microsoft.com/office/drawing/2016/SVG/main" xmlns="" r:embed="rId11"/>
+                <asvg:svgBlip xmlns="" xmlns:asvg="http://schemas.microsoft.com/office/drawing/2016/SVG/main" r:embed="rId11"/>
               </a:ext>
             </a:extLst>
           </a:blip>
@@ -3478,7 +3485,7 @@
           <a:blip r:embed="rId12">
             <a:extLst>
               <a:ext uri="{96DAC541-7B7A-43D3-8B79-37D633B846F1}">
-                <asvg:svgBlip xmlns:asvg="http://schemas.microsoft.com/office/drawing/2016/SVG/main" xmlns="" r:embed="rId13"/>
+                <asvg:svgBlip xmlns="" xmlns:asvg="http://schemas.microsoft.com/office/drawing/2016/SVG/main" r:embed="rId13"/>
               </a:ext>
             </a:extLst>
           </a:blip>
@@ -3594,7 +3601,7 @@
           <a:blip r:embed="rId14">
             <a:extLst>
               <a:ext uri="{96DAC541-7B7A-43D3-8B79-37D633B846F1}">
-                <asvg:svgBlip xmlns:asvg="http://schemas.microsoft.com/office/drawing/2016/SVG/main" xmlns="" r:embed="rId17"/>
+                <asvg:svgBlip xmlns="" xmlns:asvg="http://schemas.microsoft.com/office/drawing/2016/SVG/main" r:embed="rId17"/>
               </a:ext>
             </a:extLst>
           </a:blip>
@@ -3630,7 +3637,7 @@
           <a:blip r:embed="rId12">
             <a:extLst>
               <a:ext uri="{96DAC541-7B7A-43D3-8B79-37D633B846F1}">
-                <asvg:svgBlip xmlns:asvg="http://schemas.microsoft.com/office/drawing/2016/SVG/main" xmlns="" r:embed="rId13"/>
+                <asvg:svgBlip xmlns="" xmlns:asvg="http://schemas.microsoft.com/office/drawing/2016/SVG/main" r:embed="rId13"/>
               </a:ext>
             </a:extLst>
           </a:blip>
@@ -3792,7 +3799,7 @@
           <a:blip r:embed="rId4">
             <a:extLst>
               <a:ext uri="{96DAC541-7B7A-43D3-8B79-37D633B846F1}">
-                <asvg:svgBlip xmlns:asvg="http://schemas.microsoft.com/office/drawing/2016/SVG/main" xmlns="" r:embed="rId7"/>
+                <asvg:svgBlip xmlns="" xmlns:asvg="http://schemas.microsoft.com/office/drawing/2016/SVG/main" r:embed="rId7"/>
               </a:ext>
             </a:extLst>
           </a:blip>
@@ -3909,7 +3916,7 @@
           <a:blip r:embed="rId8">
             <a:extLst>
               <a:ext uri="{96DAC541-7B7A-43D3-8B79-37D633B846F1}">
-                <asvg:svgBlip xmlns:asvg="http://schemas.microsoft.com/office/drawing/2016/SVG/main" xmlns="" r:embed="rId9"/>
+                <asvg:svgBlip xmlns="" xmlns:asvg="http://schemas.microsoft.com/office/drawing/2016/SVG/main" r:embed="rId9"/>
               </a:ext>
             </a:extLst>
           </a:blip>
@@ -4028,7 +4035,7 @@
           <a:blip r:embed="rId14">
             <a:extLst>
               <a:ext uri="{96DAC541-7B7A-43D3-8B79-37D633B846F1}">
-                <asvg:svgBlip xmlns:asvg="http://schemas.microsoft.com/office/drawing/2016/SVG/main" xmlns="" r:embed="rId17"/>
+                <asvg:svgBlip xmlns="" xmlns:asvg="http://schemas.microsoft.com/office/drawing/2016/SVG/main" r:embed="rId17"/>
               </a:ext>
             </a:extLst>
           </a:blip>
@@ -4064,7 +4071,7 @@
           <a:blip r:embed="rId12">
             <a:extLst>
               <a:ext uri="{96DAC541-7B7A-43D3-8B79-37D633B846F1}">
-                <asvg:svgBlip xmlns:asvg="http://schemas.microsoft.com/office/drawing/2016/SVG/main" xmlns="" r:embed="rId13"/>
+                <asvg:svgBlip xmlns="" xmlns:asvg="http://schemas.microsoft.com/office/drawing/2016/SVG/main" r:embed="rId13"/>
               </a:ext>
             </a:extLst>
           </a:blip>
@@ -4154,7 +4161,7 @@
                 </a14:imgProps>
               </a:ext>
               <a:ext uri="{96DAC541-7B7A-43D3-8B79-37D633B846F1}">
-                <asvg:svgBlip xmlns:asvg="http://schemas.microsoft.com/office/drawing/2016/SVG/main" xmlns="" r:embed="rId32"/>
+                <asvg:svgBlip xmlns="" xmlns:asvg="http://schemas.microsoft.com/office/drawing/2016/SVG/main" r:embed="rId32"/>
               </a:ext>
             </a:extLst>
           </a:blip>
@@ -4936,7 +4943,7 @@
           <a:blip r:embed="rId12">
             <a:extLst>
               <a:ext uri="{96DAC541-7B7A-43D3-8B79-37D633B846F1}">
-                <asvg:svgBlip xmlns:asvg="http://schemas.microsoft.com/office/drawing/2016/SVG/main" xmlns="" r:embed="rId13"/>
+                <asvg:svgBlip xmlns="" xmlns:asvg="http://schemas.microsoft.com/office/drawing/2016/SVG/main" r:embed="rId13"/>
               </a:ext>
             </a:extLst>
           </a:blip>
@@ -5017,7 +5024,7 @@
           <a:blip r:embed="rId12">
             <a:extLst>
               <a:ext uri="{96DAC541-7B7A-43D3-8B79-37D633B846F1}">
-                <asvg:svgBlip xmlns:asvg="http://schemas.microsoft.com/office/drawing/2016/SVG/main" xmlns="" r:embed="rId13"/>
+                <asvg:svgBlip xmlns="" xmlns:asvg="http://schemas.microsoft.com/office/drawing/2016/SVG/main" r:embed="rId13"/>
               </a:ext>
             </a:extLst>
           </a:blip>
@@ -5070,15 +5077,7 @@
                 <a:ea typeface="Amazon Ember" panose="020B0603020204020204" pitchFamily="34" charset="0"/>
                 <a:cs typeface="Arial" panose="020B0604020202020204" pitchFamily="34" charset="0"/>
               </a:rPr>
-              <a:t>SQL </a:t>
-            </a:r>
-            <a:r>
-              <a:rPr lang="en-US" sz="1200" smtClean="0">
-                <a:latin typeface="Arial" panose="020B0604020202020204" pitchFamily="34" charset="0"/>
-                <a:ea typeface="Amazon Ember" panose="020B0603020204020204" pitchFamily="34" charset="0"/>
-                <a:cs typeface="Arial" panose="020B0604020202020204" pitchFamily="34" charset="0"/>
-              </a:rPr>
-              <a:t>node</a:t>
+              <a:t>SQL node</a:t>
             </a:r>
             <a:endParaRPr lang="en-US" sz="1200" dirty="0">
               <a:latin typeface="Arial" panose="020B0604020202020204" pitchFamily="34" charset="0"/>
@@ -5133,7 +5132,7 @@
           </a:fontRef>
         </p:style>
         <p:txBody>
-          <a:bodyPr tIns="91440"/>
+          <a:bodyPr lIns="91440" tIns="91440" rIns="91440"/>
           <a:lstStyle/>
           <a:p>
             <a:pPr algn="ctr" eaLnBrk="1" fontAlgn="auto" hangingPunct="1">
@@ -5146,24 +5145,34 @@
               <a:defRPr/>
             </a:pPr>
             <a:r>
-              <a:rPr lang="en-US" sz="1200" smtClean="0">
+              <a:rPr lang="en-US" sz="1200" dirty="0" smtClean="0">
                 <a:solidFill>
                   <a:srgbClr val="5A6B86"/>
                 </a:solidFill>
                 <a:latin typeface="Arial" panose="020B0604020202020204" pitchFamily="34" charset="0"/>
                 <a:cs typeface="Arial" panose="020B0604020202020204" pitchFamily="34" charset="0"/>
               </a:rPr>
-              <a:t>Failover cluser </a:t>
-            </a:r>
-            <a:r>
-              <a:rPr lang="en-US" sz="1200" smtClean="0">
+              <a:t>Failover </a:t>
+            </a:r>
+            <a:r>
+              <a:rPr lang="en-US" sz="1200" dirty="0" err="1" smtClean="0">
                 <a:solidFill>
                   <a:srgbClr val="5A6B86"/>
                 </a:solidFill>
                 <a:latin typeface="Arial" panose="020B0604020202020204" pitchFamily="34" charset="0"/>
                 <a:cs typeface="Arial" panose="020B0604020202020204" pitchFamily="34" charset="0"/>
               </a:rPr>
-              <a:t>and</a:t>
+              <a:t>cluser</a:t>
+            </a:r>
+            <a:r>
+              <a:rPr lang="en-US" sz="1200" dirty="0" smtClean="0">
+                <a:solidFill>
+                  <a:srgbClr val="5A6B86"/>
+                </a:solidFill>
+                <a:latin typeface="Arial" panose="020B0604020202020204" pitchFamily="34" charset="0"/>
+                <a:cs typeface="Arial" panose="020B0604020202020204" pitchFamily="34" charset="0"/>
+              </a:rPr>
+              <a:t> and</a:t>
             </a:r>
           </a:p>
           <a:p>
@@ -5177,7 +5186,7 @@
               <a:defRPr/>
             </a:pPr>
             <a:r>
-              <a:rPr lang="en-US" sz="1200" smtClean="0">
+              <a:rPr lang="en-US" sz="1200" dirty="0" smtClean="0">
                 <a:solidFill>
                   <a:srgbClr val="5A6B86"/>
                 </a:solidFill>
@@ -5198,7 +5207,7 @@
               <a:defRPr/>
             </a:pPr>
             <a:r>
-              <a:rPr lang="en-US" sz="1200" smtClean="0">
+              <a:rPr lang="en-US" sz="1200" dirty="0" smtClean="0">
                 <a:solidFill>
                   <a:srgbClr val="5A6B86"/>
                 </a:solidFill>
@@ -5221,6 +5230,4353 @@
     <p:extLst>
       <p:ext uri="{BB962C8B-B14F-4D97-AF65-F5344CB8AC3E}">
         <p14:creationId xmlns:p14="http://schemas.microsoft.com/office/powerpoint/2010/main" val="1591469941"/>
+      </p:ext>
+    </p:extLst>
+  </p:cSld>
+  <p:clrMapOvr>
+    <a:masterClrMapping/>
+  </p:clrMapOvr>
+</p:sld>
+</file>
+
+<file path=ppt/slides/slide2.xml><?xml version="1.0" encoding="utf-8"?>
+<p:sld xmlns:a="http://schemas.openxmlformats.org/drawingml/2006/main" xmlns:r="http://schemas.openxmlformats.org/officeDocument/2006/relationships" xmlns:p="http://schemas.openxmlformats.org/presentationml/2006/main">
+  <p:cSld>
+    <p:spTree>
+      <p:nvGrpSpPr>
+        <p:cNvPr id="1" name=""/>
+        <p:cNvGrpSpPr/>
+        <p:nvPr/>
+      </p:nvGrpSpPr>
+      <p:grpSpPr>
+        <a:xfrm>
+          <a:off x="0" y="0"/>
+          <a:ext cx="0" cy="0"/>
+          <a:chOff x="0" y="0"/>
+          <a:chExt cx="0" cy="0"/>
+        </a:xfrm>
+      </p:grpSpPr>
+      <p:sp>
+        <p:nvSpPr>
+          <p:cNvPr id="4" name="Rectangle 3">
+            <a:extLst>
+              <a:ext uri="{FF2B5EF4-FFF2-40B4-BE49-F238E27FC236}">
+                <a16:creationId xmlns:a16="http://schemas.microsoft.com/office/drawing/2014/main" id="{CE7F7081-419C-2E4F-A999-2923C4338FC0}"/>
+              </a:ext>
+            </a:extLst>
+          </p:cNvPr>
+          <p:cNvSpPr/>
+          <p:nvPr/>
+        </p:nvSpPr>
+        <p:spPr>
+          <a:xfrm>
+            <a:off x="588108" y="609600"/>
+            <a:ext cx="9617662" cy="5029200"/>
+          </a:xfrm>
+          <a:prstGeom prst="rect">
+            <a:avLst/>
+          </a:prstGeom>
+          <a:noFill/>
+          <a:ln w="12700">
+            <a:solidFill>
+              <a:schemeClr val="tx1"/>
+            </a:solidFill>
+          </a:ln>
+        </p:spPr>
+        <p:style>
+          <a:lnRef idx="2">
+            <a:schemeClr val="accent1">
+              <a:shade val="50000"/>
+            </a:schemeClr>
+          </a:lnRef>
+          <a:fillRef idx="1">
+            <a:schemeClr val="accent1"/>
+          </a:fillRef>
+          <a:effectRef idx="0">
+            <a:schemeClr val="accent1"/>
+          </a:effectRef>
+          <a:fontRef idx="minor">
+            <a:schemeClr val="lt1"/>
+          </a:fontRef>
+        </p:style>
+        <p:txBody>
+          <a:bodyPr rot="0" spcFirstLastPara="0" vertOverflow="overflow" horzOverflow="overflow" vert="horz" wrap="square" lIns="457200" tIns="91440" rIns="91440" bIns="45720" numCol="1" spcCol="0" rtlCol="0" fromWordArt="0" anchor="t" anchorCtr="0" forceAA="0" compatLnSpc="1">
+            <a:prstTxWarp prst="textNoShape">
+              <a:avLst/>
+            </a:prstTxWarp>
+            <a:noAutofit/>
+          </a:bodyPr>
+          <a:lstStyle/>
+          <a:p>
+            <a:pPr algn="l"/>
+            <a:r>
+              <a:rPr lang="en-US" sz="1200" dirty="0">
+                <a:solidFill>
+                  <a:sysClr val="windowText" lastClr="000000"/>
+                </a:solidFill>
+                <a:latin typeface="Arial" panose="020B0604020202020204" pitchFamily="34" charset="0"/>
+                <a:ea typeface="Amazon Ember" panose="020B0603020204020204" pitchFamily="34" charset="0"/>
+                <a:cs typeface="Arial" panose="020B0604020202020204" pitchFamily="34" charset="0"/>
+              </a:rPr>
+              <a:t>AWS Cloud</a:t>
+            </a:r>
+          </a:p>
+        </p:txBody>
+      </p:sp>
+      <p:pic>
+        <p:nvPicPr>
+          <p:cNvPr id="5" name="Graphic 11">
+            <a:extLst>
+              <a:ext uri="{FF2B5EF4-FFF2-40B4-BE49-F238E27FC236}">
+                <a16:creationId xmlns:a16="http://schemas.microsoft.com/office/drawing/2014/main" id="{CE52C9D7-11B0-9E41-AB16-2C9849C3ECBE}"/>
+              </a:ext>
+            </a:extLst>
+          </p:cNvPr>
+          <p:cNvPicPr>
+            <a:picLocks noChangeAspect="1"/>
+          </p:cNvPicPr>
+          <p:nvPr/>
+        </p:nvPicPr>
+        <p:blipFill>
+          <a:blip r:embed="rId2">
+            <a:extLst>
+              <a:ext uri="{96DAC541-7B7A-43D3-8B79-37D633B846F1}">
+                <asvg:svgBlip xmlns="" xmlns:asvg="http://schemas.microsoft.com/office/drawing/2016/SVG/main" r:embed="rId3"/>
+              </a:ext>
+            </a:extLst>
+          </a:blip>
+          <a:stretch>
+            <a:fillRect/>
+          </a:stretch>
+        </p:blipFill>
+        <p:spPr>
+          <a:xfrm>
+            <a:off x="588108" y="609600"/>
+            <a:ext cx="330200" cy="330200"/>
+          </a:xfrm>
+          <a:prstGeom prst="rect">
+            <a:avLst/>
+          </a:prstGeom>
+        </p:spPr>
+      </p:pic>
+      <p:sp>
+        <p:nvSpPr>
+          <p:cNvPr id="6" name="Rectangle 5">
+            <a:extLst>
+              <a:ext uri="{FF2B5EF4-FFF2-40B4-BE49-F238E27FC236}">
+                <a16:creationId xmlns:a16="http://schemas.microsoft.com/office/drawing/2014/main" id="{E25F190B-F12E-614B-827A-566AC09E9D97}"/>
+              </a:ext>
+            </a:extLst>
+          </p:cNvPr>
+          <p:cNvSpPr/>
+          <p:nvPr/>
+        </p:nvSpPr>
+        <p:spPr>
+          <a:xfrm>
+            <a:off x="1795389" y="1600200"/>
+            <a:ext cx="2471811" cy="1447800"/>
+          </a:xfrm>
+          <a:prstGeom prst="rect">
+            <a:avLst/>
+          </a:prstGeom>
+          <a:solidFill>
+            <a:srgbClr val="1D8900">
+              <a:alpha val="9804"/>
+            </a:srgbClr>
+          </a:solidFill>
+          <a:ln w="12700">
+            <a:noFill/>
+            <a:prstDash val="dash"/>
+          </a:ln>
+        </p:spPr>
+        <p:style>
+          <a:lnRef idx="2">
+            <a:schemeClr val="accent1">
+              <a:shade val="50000"/>
+            </a:schemeClr>
+          </a:lnRef>
+          <a:fillRef idx="1">
+            <a:schemeClr val="accent1"/>
+          </a:fillRef>
+          <a:effectRef idx="0">
+            <a:schemeClr val="accent1"/>
+          </a:effectRef>
+          <a:fontRef idx="minor">
+            <a:schemeClr val="lt1"/>
+          </a:fontRef>
+        </p:style>
+        <p:txBody>
+          <a:bodyPr rot="0" spcFirstLastPara="0" vertOverflow="overflow" horzOverflow="overflow" vert="horz" wrap="square" lIns="338328" tIns="45720" rIns="91440" bIns="45720" numCol="1" spcCol="0" rtlCol="0" fromWordArt="0" anchor="t" anchorCtr="0" forceAA="0" compatLnSpc="1">
+            <a:prstTxWarp prst="textNoShape">
+              <a:avLst/>
+            </a:prstTxWarp>
+            <a:noAutofit/>
+          </a:bodyPr>
+          <a:lstStyle/>
+          <a:p>
+            <a:pPr algn="l"/>
+            <a:r>
+              <a:rPr lang="en-US" sz="1200" dirty="0">
+                <a:solidFill>
+                  <a:schemeClr val="accent6"/>
+                </a:solidFill>
+                <a:latin typeface="Arial" panose="020B0604020202020204" pitchFamily="34" charset="0"/>
+                <a:ea typeface="Amazon Ember" panose="020B0603020204020204" pitchFamily="34" charset="0"/>
+                <a:cs typeface="Arial" panose="020B0604020202020204" pitchFamily="34" charset="0"/>
+              </a:rPr>
+              <a:t>Public subnet</a:t>
+            </a:r>
+          </a:p>
+          <a:p>
+            <a:pPr algn="l"/>
+            <a:endParaRPr lang="en-US" sz="1200" dirty="0">
+              <a:solidFill>
+                <a:schemeClr val="accent5"/>
+              </a:solidFill>
+              <a:latin typeface="Arial" panose="020B0604020202020204" pitchFamily="34" charset="0"/>
+              <a:ea typeface="Amazon Ember" panose="020B0603020204020204" pitchFamily="34" charset="0"/>
+              <a:cs typeface="Arial" panose="020B0604020202020204" pitchFamily="34" charset="0"/>
+            </a:endParaRPr>
+          </a:p>
+        </p:txBody>
+      </p:sp>
+      <p:pic>
+        <p:nvPicPr>
+          <p:cNvPr id="7" name="Graphic 10">
+            <a:extLst>
+              <a:ext uri="{FF2B5EF4-FFF2-40B4-BE49-F238E27FC236}">
+                <a16:creationId xmlns:a16="http://schemas.microsoft.com/office/drawing/2014/main" id="{89B99B74-19F0-0B4B-85E3-A09DF2519E46}"/>
+              </a:ext>
+            </a:extLst>
+          </p:cNvPr>
+          <p:cNvPicPr>
+            <a:picLocks noChangeAspect="1"/>
+          </p:cNvPicPr>
+          <p:nvPr/>
+        </p:nvPicPr>
+        <p:blipFill>
+          <a:blip r:embed="rId4">
+            <a:extLst>
+              <a:ext uri="{96DAC541-7B7A-43D3-8B79-37D633B846F1}">
+                <asvg:svgBlip xmlns="" xmlns:asvg="http://schemas.microsoft.com/office/drawing/2016/SVG/main" r:embed="rId7"/>
+              </a:ext>
+            </a:extLst>
+          </a:blip>
+          <a:stretch>
+            <a:fillRect/>
+          </a:stretch>
+        </p:blipFill>
+        <p:spPr>
+          <a:xfrm>
+            <a:off x="1793530" y="1601002"/>
+            <a:ext cx="274320" cy="274320"/>
+          </a:xfrm>
+          <a:prstGeom prst="rect">
+            <a:avLst/>
+          </a:prstGeom>
+        </p:spPr>
+      </p:pic>
+      <p:sp>
+        <p:nvSpPr>
+          <p:cNvPr id="8" name="Rectangle 7">
+            <a:extLst>
+              <a:ext uri="{FF2B5EF4-FFF2-40B4-BE49-F238E27FC236}">
+                <a16:creationId xmlns:a16="http://schemas.microsoft.com/office/drawing/2014/main" id="{A85485B4-AA18-C048-B92A-A9A0F4372B98}"/>
+              </a:ext>
+            </a:extLst>
+          </p:cNvPr>
+          <p:cNvSpPr/>
+          <p:nvPr/>
+        </p:nvSpPr>
+        <p:spPr>
+          <a:xfrm>
+            <a:off x="1793530" y="3124200"/>
+            <a:ext cx="2473670" cy="2179104"/>
+          </a:xfrm>
+          <a:prstGeom prst="rect">
+            <a:avLst/>
+          </a:prstGeom>
+          <a:solidFill>
+            <a:srgbClr val="007CBC">
+              <a:alpha val="9804"/>
+            </a:srgbClr>
+          </a:solidFill>
+          <a:ln w="12700">
+            <a:noFill/>
+            <a:prstDash val="dash"/>
+          </a:ln>
+        </p:spPr>
+        <p:style>
+          <a:lnRef idx="2">
+            <a:schemeClr val="accent1">
+              <a:shade val="50000"/>
+            </a:schemeClr>
+          </a:lnRef>
+          <a:fillRef idx="1">
+            <a:schemeClr val="accent1"/>
+          </a:fillRef>
+          <a:effectRef idx="0">
+            <a:schemeClr val="accent1"/>
+          </a:effectRef>
+          <a:fontRef idx="minor">
+            <a:schemeClr val="lt1"/>
+          </a:fontRef>
+        </p:style>
+        <p:txBody>
+          <a:bodyPr rot="0" spcFirstLastPara="0" vertOverflow="overflow" horzOverflow="overflow" vert="horz" wrap="square" lIns="338328" tIns="45720" rIns="91440" bIns="45720" numCol="1" spcCol="0" rtlCol="0" fromWordArt="0" anchor="t" anchorCtr="0" forceAA="0" compatLnSpc="1">
+            <a:prstTxWarp prst="textNoShape">
+              <a:avLst/>
+            </a:prstTxWarp>
+            <a:noAutofit/>
+          </a:bodyPr>
+          <a:lstStyle/>
+          <a:p>
+            <a:pPr algn="l"/>
+            <a:r>
+              <a:rPr lang="en-US" sz="1200" dirty="0">
+                <a:solidFill>
+                  <a:schemeClr val="accent1"/>
+                </a:solidFill>
+                <a:latin typeface="Arial" panose="020B0604020202020204" pitchFamily="34" charset="0"/>
+                <a:ea typeface="Amazon Ember" panose="020B0603020204020204" pitchFamily="34" charset="0"/>
+                <a:cs typeface="Arial" panose="020B0604020202020204" pitchFamily="34" charset="0"/>
+              </a:rPr>
+              <a:t>Private subnet</a:t>
+            </a:r>
+          </a:p>
+          <a:p>
+            <a:pPr algn="l"/>
+            <a:endParaRPr lang="en-US" sz="1200" dirty="0">
+              <a:solidFill>
+                <a:schemeClr val="accent3"/>
+              </a:solidFill>
+              <a:latin typeface="Arial" panose="020B0604020202020204" pitchFamily="34" charset="0"/>
+              <a:ea typeface="Amazon Ember" panose="020B0603020204020204" pitchFamily="34" charset="0"/>
+              <a:cs typeface="Arial" panose="020B0604020202020204" pitchFamily="34" charset="0"/>
+            </a:endParaRPr>
+          </a:p>
+        </p:txBody>
+      </p:sp>
+      <p:pic>
+        <p:nvPicPr>
+          <p:cNvPr id="9" name="Graphic 13">
+            <a:extLst>
+              <a:ext uri="{FF2B5EF4-FFF2-40B4-BE49-F238E27FC236}">
+                <a16:creationId xmlns:a16="http://schemas.microsoft.com/office/drawing/2014/main" id="{3BD31095-C7B2-C24A-9990-6F9E14956A7B}"/>
+              </a:ext>
+            </a:extLst>
+          </p:cNvPr>
+          <p:cNvPicPr>
+            <a:picLocks noChangeAspect="1"/>
+          </p:cNvPicPr>
+          <p:nvPr/>
+        </p:nvPicPr>
+        <p:blipFill>
+          <a:blip r:embed="rId8">
+            <a:extLst>
+              <a:ext uri="{96DAC541-7B7A-43D3-8B79-37D633B846F1}">
+                <asvg:svgBlip xmlns="" xmlns:asvg="http://schemas.microsoft.com/office/drawing/2016/SVG/main" r:embed="rId9"/>
+              </a:ext>
+            </a:extLst>
+          </a:blip>
+          <a:stretch>
+            <a:fillRect/>
+          </a:stretch>
+        </p:blipFill>
+        <p:spPr>
+          <a:xfrm>
+            <a:off x="1793529" y="3158998"/>
+            <a:ext cx="274320" cy="274320"/>
+          </a:xfrm>
+          <a:prstGeom prst="rect">
+            <a:avLst/>
+          </a:prstGeom>
+        </p:spPr>
+      </p:pic>
+      <p:sp>
+        <p:nvSpPr>
+          <p:cNvPr id="10" name="Rectangle 9">
+            <a:extLst>
+              <a:ext uri="{FF2B5EF4-FFF2-40B4-BE49-F238E27FC236}">
+                <a16:creationId xmlns:a16="http://schemas.microsoft.com/office/drawing/2014/main" id="{25B2706C-95D8-A94F-9EC8-6497FA7FB136}"/>
+              </a:ext>
+            </a:extLst>
+          </p:cNvPr>
+          <p:cNvSpPr/>
+          <p:nvPr/>
+        </p:nvSpPr>
+        <p:spPr>
+          <a:xfrm>
+            <a:off x="3038910" y="1942075"/>
+            <a:ext cx="3846346" cy="978466"/>
+          </a:xfrm>
+          <a:prstGeom prst="rect">
+            <a:avLst/>
+          </a:prstGeom>
+          <a:noFill/>
+          <a:ln w="12700">
+            <a:solidFill>
+              <a:srgbClr val="D86613"/>
+            </a:solidFill>
+            <a:prstDash val="dash"/>
+          </a:ln>
+        </p:spPr>
+        <p:style>
+          <a:lnRef idx="2">
+            <a:schemeClr val="accent1">
+              <a:shade val="50000"/>
+            </a:schemeClr>
+          </a:lnRef>
+          <a:fillRef idx="1">
+            <a:schemeClr val="accent1"/>
+          </a:fillRef>
+          <a:effectRef idx="0">
+            <a:schemeClr val="accent1"/>
+          </a:effectRef>
+          <a:fontRef idx="minor">
+            <a:schemeClr val="lt1"/>
+          </a:fontRef>
+        </p:style>
+        <p:txBody>
+          <a:bodyPr rot="0" spcFirstLastPara="0" vertOverflow="overflow" horzOverflow="overflow" vert="horz" wrap="square" lIns="91440" tIns="91440" rIns="91440" bIns="45720" numCol="1" spcCol="0" rtlCol="0" fromWordArt="0" anchor="t" anchorCtr="0" forceAA="0" compatLnSpc="1">
+            <a:prstTxWarp prst="textNoShape">
+              <a:avLst/>
+            </a:prstTxWarp>
+            <a:noAutofit/>
+          </a:bodyPr>
+          <a:lstStyle/>
+          <a:p>
+            <a:pPr algn="ctr"/>
+            <a:endParaRPr lang="en-US" sz="1200" dirty="0">
+              <a:solidFill>
+                <a:srgbClr val="D86613"/>
+              </a:solidFill>
+              <a:latin typeface="Arial" panose="020B0604020202020204" pitchFamily="34" charset="0"/>
+              <a:ea typeface="Amazon Ember" panose="020B0603020204020204" pitchFamily="34" charset="0"/>
+              <a:cs typeface="Arial" panose="020B0604020202020204" pitchFamily="34" charset="0"/>
+            </a:endParaRPr>
+          </a:p>
+          <a:p>
+            <a:pPr algn="ctr"/>
+            <a:endParaRPr lang="en-US" sz="1200" dirty="0">
+              <a:solidFill>
+                <a:srgbClr val="D86613"/>
+              </a:solidFill>
+              <a:latin typeface="Arial" panose="020B0604020202020204" pitchFamily="34" charset="0"/>
+              <a:ea typeface="Amazon Ember" panose="020B0603020204020204" pitchFamily="34" charset="0"/>
+              <a:cs typeface="Arial" panose="020B0604020202020204" pitchFamily="34" charset="0"/>
+            </a:endParaRPr>
+          </a:p>
+          <a:p>
+            <a:pPr algn="ctr"/>
+            <a:r>
+              <a:rPr lang="en-US" sz="1200" dirty="0">
+                <a:solidFill>
+                  <a:srgbClr val="D86613"/>
+                </a:solidFill>
+                <a:latin typeface="Arial" panose="020B0604020202020204" pitchFamily="34" charset="0"/>
+                <a:ea typeface="Amazon Ember" panose="020B0603020204020204" pitchFamily="34" charset="0"/>
+                <a:cs typeface="Arial" panose="020B0604020202020204" pitchFamily="34" charset="0"/>
+              </a:rPr>
+              <a:t>Auto </a:t>
+            </a:r>
+            <a:r>
+              <a:rPr lang="en-US" sz="1200" dirty="0" smtClean="0">
+                <a:solidFill>
+                  <a:srgbClr val="D86613"/>
+                </a:solidFill>
+                <a:latin typeface="Arial" panose="020B0604020202020204" pitchFamily="34" charset="0"/>
+                <a:ea typeface="Amazon Ember" panose="020B0603020204020204" pitchFamily="34" charset="0"/>
+                <a:cs typeface="Arial" panose="020B0604020202020204" pitchFamily="34" charset="0"/>
+              </a:rPr>
+              <a:t>Scaling</a:t>
+            </a:r>
+          </a:p>
+          <a:p>
+            <a:pPr algn="ctr"/>
+            <a:r>
+              <a:rPr lang="en-US" sz="1200" dirty="0" smtClean="0">
+                <a:solidFill>
+                  <a:srgbClr val="D86613"/>
+                </a:solidFill>
+                <a:latin typeface="Arial" panose="020B0604020202020204" pitchFamily="34" charset="0"/>
+                <a:ea typeface="Amazon Ember" panose="020B0603020204020204" pitchFamily="34" charset="0"/>
+                <a:cs typeface="Arial" panose="020B0604020202020204" pitchFamily="34" charset="0"/>
+              </a:rPr>
+              <a:t>group</a:t>
+            </a:r>
+            <a:endParaRPr lang="en-US" sz="1200" dirty="0">
+              <a:solidFill>
+                <a:srgbClr val="D86613"/>
+              </a:solidFill>
+              <a:latin typeface="Arial" panose="020B0604020202020204" pitchFamily="34" charset="0"/>
+              <a:ea typeface="Amazon Ember" panose="020B0603020204020204" pitchFamily="34" charset="0"/>
+              <a:cs typeface="Arial" panose="020B0604020202020204" pitchFamily="34" charset="0"/>
+            </a:endParaRPr>
+          </a:p>
+        </p:txBody>
+      </p:sp>
+      <p:pic>
+        <p:nvPicPr>
+          <p:cNvPr id="11" name="Graphic 3">
+            <a:extLst>
+              <a:ext uri="{FF2B5EF4-FFF2-40B4-BE49-F238E27FC236}">
+                <a16:creationId xmlns:a16="http://schemas.microsoft.com/office/drawing/2014/main" id="{D7A7873E-A1CC-804E-816C-DC0FF152D82D}"/>
+              </a:ext>
+            </a:extLst>
+          </p:cNvPr>
+          <p:cNvPicPr>
+            <a:picLocks noChangeAspect="1"/>
+          </p:cNvPicPr>
+          <p:nvPr/>
+        </p:nvPicPr>
+        <p:blipFill>
+          <a:blip r:embed="rId10">
+            <a:extLst>
+              <a:ext uri="{96DAC541-7B7A-43D3-8B79-37D633B846F1}">
+                <asvg:svgBlip xmlns="" xmlns:asvg="http://schemas.microsoft.com/office/drawing/2016/SVG/main" r:embed="rId11"/>
+              </a:ext>
+            </a:extLst>
+          </a:blip>
+          <a:stretch>
+            <a:fillRect/>
+          </a:stretch>
+        </p:blipFill>
+        <p:spPr>
+          <a:xfrm>
+            <a:off x="4800571" y="1939667"/>
+            <a:ext cx="330200" cy="330200"/>
+          </a:xfrm>
+          <a:prstGeom prst="rect">
+            <a:avLst/>
+          </a:prstGeom>
+        </p:spPr>
+      </p:pic>
+      <p:pic>
+        <p:nvPicPr>
+          <p:cNvPr id="12" name="Graphic 135">
+            <a:extLst>
+              <a:ext uri="{FF2B5EF4-FFF2-40B4-BE49-F238E27FC236}">
+                <a16:creationId xmlns:a16="http://schemas.microsoft.com/office/drawing/2014/main" id="{C19987B1-DB3A-1640-994D-BCB81FCC1AE4}"/>
+              </a:ext>
+            </a:extLst>
+          </p:cNvPr>
+          <p:cNvPicPr>
+            <a:picLocks noChangeAspect="1"/>
+          </p:cNvPicPr>
+          <p:nvPr/>
+        </p:nvPicPr>
+        <p:blipFill>
+          <a:blip r:embed="rId12">
+            <a:extLst>
+              <a:ext uri="{96DAC541-7B7A-43D3-8B79-37D633B846F1}">
+                <asvg:svgBlip xmlns="" xmlns:asvg="http://schemas.microsoft.com/office/drawing/2016/SVG/main" r:embed="rId13"/>
+              </a:ext>
+            </a:extLst>
+          </a:blip>
+          <a:stretch>
+            <a:fillRect/>
+          </a:stretch>
+        </p:blipFill>
+        <p:spPr>
+          <a:xfrm>
+            <a:off x="3351797" y="2064381"/>
+            <a:ext cx="469900" cy="469900"/>
+          </a:xfrm>
+          <a:prstGeom prst="rect">
+            <a:avLst/>
+          </a:prstGeom>
+        </p:spPr>
+      </p:pic>
+      <p:sp>
+        <p:nvSpPr>
+          <p:cNvPr id="13" name="TextBox 12">
+            <a:extLst>
+              <a:ext uri="{FF2B5EF4-FFF2-40B4-BE49-F238E27FC236}">
+                <a16:creationId xmlns:a16="http://schemas.microsoft.com/office/drawing/2014/main" id="{F90C1CC4-DFE6-0445-BD1C-DB610E1A07F5}"/>
+              </a:ext>
+            </a:extLst>
+          </p:cNvPr>
+          <p:cNvSpPr txBox="1"/>
+          <p:nvPr/>
+        </p:nvSpPr>
+        <p:spPr>
+          <a:xfrm>
+            <a:off x="2830095" y="2540217"/>
+            <a:ext cx="1513305" cy="276999"/>
+          </a:xfrm>
+          <a:prstGeom prst="rect">
+            <a:avLst/>
+          </a:prstGeom>
+          <a:noFill/>
+        </p:spPr>
+        <p:txBody>
+          <a:bodyPr wrap="square" rtlCol="0">
+            <a:spAutoFit/>
+          </a:bodyPr>
+          <a:lstStyle/>
+          <a:p>
+            <a:pPr algn="ctr"/>
+            <a:r>
+              <a:rPr lang="en-US" sz="1200" dirty="0">
+                <a:latin typeface="Arial" panose="020B0604020202020204" pitchFamily="34" charset="0"/>
+                <a:ea typeface="Amazon Ember" panose="020B0603020204020204" pitchFamily="34" charset="0"/>
+                <a:cs typeface="Arial" panose="020B0604020202020204" pitchFamily="34" charset="0"/>
+              </a:rPr>
+              <a:t>RD Gateway</a:t>
+            </a:r>
+          </a:p>
+        </p:txBody>
+      </p:sp>
+      <p:sp>
+        <p:nvSpPr>
+          <p:cNvPr id="14" name="TextBox 13">
+            <a:extLst>
+              <a:ext uri="{FF2B5EF4-FFF2-40B4-BE49-F238E27FC236}">
+                <a16:creationId xmlns:a16="http://schemas.microsoft.com/office/drawing/2014/main" id="{517096B6-EF64-C245-A3E7-BEEF81BDCB9C}"/>
+              </a:ext>
+            </a:extLst>
+          </p:cNvPr>
+          <p:cNvSpPr txBox="1"/>
+          <p:nvPr/>
+        </p:nvSpPr>
+        <p:spPr>
+          <a:xfrm>
+            <a:off x="1893620" y="2542641"/>
+            <a:ext cx="1236442" cy="276999"/>
+          </a:xfrm>
+          <a:prstGeom prst="rect">
+            <a:avLst/>
+          </a:prstGeom>
+          <a:noFill/>
+        </p:spPr>
+        <p:txBody>
+          <a:bodyPr wrap="square" rtlCol="0">
+            <a:spAutoFit/>
+          </a:bodyPr>
+          <a:lstStyle/>
+          <a:p>
+            <a:pPr algn="ctr"/>
+            <a:r>
+              <a:rPr lang="en-US" sz="1200" dirty="0">
+                <a:latin typeface="Arial" panose="020B0604020202020204" pitchFamily="34" charset="0"/>
+                <a:ea typeface="Amazon Ember" panose="020B0603020204020204" pitchFamily="34" charset="0"/>
+                <a:cs typeface="Arial" panose="020B0604020202020204" pitchFamily="34" charset="0"/>
+              </a:rPr>
+              <a:t>NAT gateway</a:t>
+            </a:r>
+          </a:p>
+        </p:txBody>
+      </p:sp>
+      <p:pic>
+        <p:nvPicPr>
+          <p:cNvPr id="15" name="Graphic 40">
+            <a:extLst>
+              <a:ext uri="{FF2B5EF4-FFF2-40B4-BE49-F238E27FC236}">
+                <a16:creationId xmlns:a16="http://schemas.microsoft.com/office/drawing/2014/main" id="{C322592C-EAB9-0640-95A5-D8FF5B8E5FE6}"/>
+              </a:ext>
+            </a:extLst>
+          </p:cNvPr>
+          <p:cNvPicPr>
+            <a:picLocks noChangeAspect="1"/>
+          </p:cNvPicPr>
+          <p:nvPr/>
+        </p:nvPicPr>
+        <p:blipFill>
+          <a:blip r:embed="rId14">
+            <a:extLst>
+              <a:ext uri="{96DAC541-7B7A-43D3-8B79-37D633B846F1}">
+                <asvg:svgBlip xmlns="" xmlns:asvg="http://schemas.microsoft.com/office/drawing/2016/SVG/main" r:embed="rId17"/>
+              </a:ext>
+            </a:extLst>
+          </a:blip>
+          <a:stretch>
+            <a:fillRect/>
+          </a:stretch>
+        </p:blipFill>
+        <p:spPr>
+          <a:xfrm>
+            <a:off x="2276891" y="2064381"/>
+            <a:ext cx="469900" cy="469900"/>
+          </a:xfrm>
+          <a:prstGeom prst="rect">
+            <a:avLst/>
+          </a:prstGeom>
+        </p:spPr>
+      </p:pic>
+      <p:pic>
+        <p:nvPicPr>
+          <p:cNvPr id="16" name="Graphic 135">
+            <a:extLst>
+              <a:ext uri="{FF2B5EF4-FFF2-40B4-BE49-F238E27FC236}">
+                <a16:creationId xmlns:a16="http://schemas.microsoft.com/office/drawing/2014/main" id="{C19987B1-DB3A-1640-994D-BCB81FCC1AE4}"/>
+              </a:ext>
+            </a:extLst>
+          </p:cNvPr>
+          <p:cNvPicPr>
+            <a:picLocks noChangeAspect="1"/>
+          </p:cNvPicPr>
+          <p:nvPr/>
+        </p:nvPicPr>
+        <p:blipFill>
+          <a:blip r:embed="rId12">
+            <a:extLst>
+              <a:ext uri="{96DAC541-7B7A-43D3-8B79-37D633B846F1}">
+                <asvg:svgBlip xmlns="" xmlns:asvg="http://schemas.microsoft.com/office/drawing/2016/SVG/main" r:embed="rId13"/>
+              </a:ext>
+            </a:extLst>
+          </a:blip>
+          <a:stretch>
+            <a:fillRect/>
+          </a:stretch>
+        </p:blipFill>
+        <p:spPr>
+          <a:xfrm>
+            <a:off x="3341102" y="3352800"/>
+            <a:ext cx="469900" cy="469900"/>
+          </a:xfrm>
+          <a:prstGeom prst="rect">
+            <a:avLst/>
+          </a:prstGeom>
+        </p:spPr>
+      </p:pic>
+      <p:sp>
+        <p:nvSpPr>
+          <p:cNvPr id="17" name="TextBox 16">
+            <a:extLst>
+              <a:ext uri="{FF2B5EF4-FFF2-40B4-BE49-F238E27FC236}">
+                <a16:creationId xmlns:a16="http://schemas.microsoft.com/office/drawing/2014/main" id="{F90C1CC4-DFE6-0445-BD1C-DB610E1A07F5}"/>
+              </a:ext>
+            </a:extLst>
+          </p:cNvPr>
+          <p:cNvSpPr txBox="1"/>
+          <p:nvPr/>
+        </p:nvSpPr>
+        <p:spPr>
+          <a:xfrm>
+            <a:off x="2819400" y="3798209"/>
+            <a:ext cx="1513305" cy="276999"/>
+          </a:xfrm>
+          <a:prstGeom prst="rect">
+            <a:avLst/>
+          </a:prstGeom>
+          <a:noFill/>
+        </p:spPr>
+        <p:txBody>
+          <a:bodyPr wrap="square" rtlCol="0">
+            <a:spAutoFit/>
+          </a:bodyPr>
+          <a:lstStyle/>
+          <a:p>
+            <a:pPr algn="ctr"/>
+            <a:r>
+              <a:rPr lang="en-US" sz="1200" smtClean="0">
+                <a:latin typeface="Arial" panose="020B0604020202020204" pitchFamily="34" charset="0"/>
+                <a:ea typeface="Amazon Ember" panose="020B0603020204020204" pitchFamily="34" charset="0"/>
+                <a:cs typeface="Arial" panose="020B0604020202020204" pitchFamily="34" charset="0"/>
+              </a:rPr>
+              <a:t>Domain controller</a:t>
+            </a:r>
+            <a:endParaRPr lang="en-US" sz="1200" dirty="0">
+              <a:latin typeface="Arial" panose="020B0604020202020204" pitchFamily="34" charset="0"/>
+              <a:ea typeface="Amazon Ember" panose="020B0603020204020204" pitchFamily="34" charset="0"/>
+              <a:cs typeface="Arial" panose="020B0604020202020204" pitchFamily="34" charset="0"/>
+            </a:endParaRPr>
+          </a:p>
+        </p:txBody>
+      </p:sp>
+      <p:sp>
+        <p:nvSpPr>
+          <p:cNvPr id="18" name="Rectangle 17">
+            <a:extLst>
+              <a:ext uri="{FF2B5EF4-FFF2-40B4-BE49-F238E27FC236}">
+                <a16:creationId xmlns:a16="http://schemas.microsoft.com/office/drawing/2014/main" id="{E25F190B-F12E-614B-827A-566AC09E9D97}"/>
+              </a:ext>
+            </a:extLst>
+          </p:cNvPr>
+          <p:cNvSpPr/>
+          <p:nvPr/>
+        </p:nvSpPr>
+        <p:spPr>
+          <a:xfrm>
+            <a:off x="5639875" y="1576754"/>
+            <a:ext cx="2468880" cy="1447800"/>
+          </a:xfrm>
+          <a:prstGeom prst="rect">
+            <a:avLst/>
+          </a:prstGeom>
+          <a:solidFill>
+            <a:srgbClr val="1D8900">
+              <a:alpha val="9804"/>
+            </a:srgbClr>
+          </a:solidFill>
+          <a:ln w="12700">
+            <a:noFill/>
+            <a:prstDash val="dash"/>
+          </a:ln>
+        </p:spPr>
+        <p:style>
+          <a:lnRef idx="2">
+            <a:schemeClr val="accent1">
+              <a:shade val="50000"/>
+            </a:schemeClr>
+          </a:lnRef>
+          <a:fillRef idx="1">
+            <a:schemeClr val="accent1"/>
+          </a:fillRef>
+          <a:effectRef idx="0">
+            <a:schemeClr val="accent1"/>
+          </a:effectRef>
+          <a:fontRef idx="minor">
+            <a:schemeClr val="lt1"/>
+          </a:fontRef>
+        </p:style>
+        <p:txBody>
+          <a:bodyPr rot="0" spcFirstLastPara="0" vertOverflow="overflow" horzOverflow="overflow" vert="horz" wrap="square" lIns="338328" tIns="45720" rIns="91440" bIns="45720" numCol="1" spcCol="0" rtlCol="0" fromWordArt="0" anchor="t" anchorCtr="0" forceAA="0" compatLnSpc="1">
+            <a:prstTxWarp prst="textNoShape">
+              <a:avLst/>
+            </a:prstTxWarp>
+            <a:noAutofit/>
+          </a:bodyPr>
+          <a:lstStyle/>
+          <a:p>
+            <a:pPr algn="l"/>
+            <a:r>
+              <a:rPr lang="en-US" sz="1200" dirty="0">
+                <a:solidFill>
+                  <a:schemeClr val="accent6"/>
+                </a:solidFill>
+                <a:latin typeface="Arial" panose="020B0604020202020204" pitchFamily="34" charset="0"/>
+                <a:ea typeface="Amazon Ember" panose="020B0603020204020204" pitchFamily="34" charset="0"/>
+                <a:cs typeface="Arial" panose="020B0604020202020204" pitchFamily="34" charset="0"/>
+              </a:rPr>
+              <a:t>Public subnet</a:t>
+            </a:r>
+          </a:p>
+          <a:p>
+            <a:pPr algn="l"/>
+            <a:endParaRPr lang="en-US" sz="1200" dirty="0">
+              <a:solidFill>
+                <a:schemeClr val="accent5"/>
+              </a:solidFill>
+              <a:latin typeface="Arial" panose="020B0604020202020204" pitchFamily="34" charset="0"/>
+              <a:ea typeface="Amazon Ember" panose="020B0603020204020204" pitchFamily="34" charset="0"/>
+              <a:cs typeface="Arial" panose="020B0604020202020204" pitchFamily="34" charset="0"/>
+            </a:endParaRPr>
+          </a:p>
+        </p:txBody>
+      </p:sp>
+      <p:pic>
+        <p:nvPicPr>
+          <p:cNvPr id="19" name="Graphic 10">
+            <a:extLst>
+              <a:ext uri="{FF2B5EF4-FFF2-40B4-BE49-F238E27FC236}">
+                <a16:creationId xmlns:a16="http://schemas.microsoft.com/office/drawing/2014/main" id="{89B99B74-19F0-0B4B-85E3-A09DF2519E46}"/>
+              </a:ext>
+            </a:extLst>
+          </p:cNvPr>
+          <p:cNvPicPr>
+            <a:picLocks noChangeAspect="1"/>
+          </p:cNvPicPr>
+          <p:nvPr/>
+        </p:nvPicPr>
+        <p:blipFill>
+          <a:blip r:embed="rId4">
+            <a:extLst>
+              <a:ext uri="{96DAC541-7B7A-43D3-8B79-37D633B846F1}">
+                <asvg:svgBlip xmlns="" xmlns:asvg="http://schemas.microsoft.com/office/drawing/2016/SVG/main" r:embed="rId7"/>
+              </a:ext>
+            </a:extLst>
+          </a:blip>
+          <a:stretch>
+            <a:fillRect/>
+          </a:stretch>
+        </p:blipFill>
+        <p:spPr>
+          <a:xfrm>
+            <a:off x="5639876" y="1574395"/>
+            <a:ext cx="274320" cy="274320"/>
+          </a:xfrm>
+          <a:prstGeom prst="rect">
+            <a:avLst/>
+          </a:prstGeom>
+        </p:spPr>
+      </p:pic>
+      <p:sp>
+        <p:nvSpPr>
+          <p:cNvPr id="20" name="Rectangle 19">
+            <a:extLst>
+              <a:ext uri="{FF2B5EF4-FFF2-40B4-BE49-F238E27FC236}">
+                <a16:creationId xmlns:a16="http://schemas.microsoft.com/office/drawing/2014/main" id="{A85485B4-AA18-C048-B92A-A9A0F4372B98}"/>
+              </a:ext>
+            </a:extLst>
+          </p:cNvPr>
+          <p:cNvSpPr/>
+          <p:nvPr/>
+        </p:nvSpPr>
+        <p:spPr>
+          <a:xfrm>
+            <a:off x="5636944" y="3124200"/>
+            <a:ext cx="2457498" cy="2158540"/>
+          </a:xfrm>
+          <a:prstGeom prst="rect">
+            <a:avLst/>
+          </a:prstGeom>
+          <a:solidFill>
+            <a:srgbClr val="007CBC">
+              <a:alpha val="9804"/>
+            </a:srgbClr>
+          </a:solidFill>
+          <a:ln w="12700">
+            <a:noFill/>
+            <a:prstDash val="dash"/>
+          </a:ln>
+        </p:spPr>
+        <p:style>
+          <a:lnRef idx="2">
+            <a:schemeClr val="accent1">
+              <a:shade val="50000"/>
+            </a:schemeClr>
+          </a:lnRef>
+          <a:fillRef idx="1">
+            <a:schemeClr val="accent1"/>
+          </a:fillRef>
+          <a:effectRef idx="0">
+            <a:schemeClr val="accent1"/>
+          </a:effectRef>
+          <a:fontRef idx="minor">
+            <a:schemeClr val="lt1"/>
+          </a:fontRef>
+        </p:style>
+        <p:txBody>
+          <a:bodyPr rot="0" spcFirstLastPara="0" vertOverflow="overflow" horzOverflow="overflow" vert="horz" wrap="square" lIns="338328" tIns="45720" rIns="91440" bIns="45720" numCol="1" spcCol="0" rtlCol="0" fromWordArt="0" anchor="t" anchorCtr="0" forceAA="0" compatLnSpc="1">
+            <a:prstTxWarp prst="textNoShape">
+              <a:avLst/>
+            </a:prstTxWarp>
+            <a:noAutofit/>
+          </a:bodyPr>
+          <a:lstStyle/>
+          <a:p>
+            <a:pPr algn="l"/>
+            <a:r>
+              <a:rPr lang="en-US" sz="1200" dirty="0">
+                <a:solidFill>
+                  <a:schemeClr val="accent1"/>
+                </a:solidFill>
+                <a:latin typeface="Arial" panose="020B0604020202020204" pitchFamily="34" charset="0"/>
+                <a:ea typeface="Amazon Ember" panose="020B0603020204020204" pitchFamily="34" charset="0"/>
+                <a:cs typeface="Arial" panose="020B0604020202020204" pitchFamily="34" charset="0"/>
+              </a:rPr>
+              <a:t>Private subnet</a:t>
+            </a:r>
+          </a:p>
+          <a:p>
+            <a:pPr algn="l"/>
+            <a:endParaRPr lang="en-US" sz="1200" dirty="0">
+              <a:solidFill>
+                <a:schemeClr val="accent3"/>
+              </a:solidFill>
+              <a:latin typeface="Arial" panose="020B0604020202020204" pitchFamily="34" charset="0"/>
+              <a:ea typeface="Amazon Ember" panose="020B0603020204020204" pitchFamily="34" charset="0"/>
+              <a:cs typeface="Arial" panose="020B0604020202020204" pitchFamily="34" charset="0"/>
+            </a:endParaRPr>
+          </a:p>
+        </p:txBody>
+      </p:sp>
+      <p:pic>
+        <p:nvPicPr>
+          <p:cNvPr id="21" name="Graphic 13">
+            <a:extLst>
+              <a:ext uri="{FF2B5EF4-FFF2-40B4-BE49-F238E27FC236}">
+                <a16:creationId xmlns:a16="http://schemas.microsoft.com/office/drawing/2014/main" id="{3BD31095-C7B2-C24A-9990-6F9E14956A7B}"/>
+              </a:ext>
+            </a:extLst>
+          </p:cNvPr>
+          <p:cNvPicPr>
+            <a:picLocks noChangeAspect="1"/>
+          </p:cNvPicPr>
+          <p:nvPr/>
+        </p:nvPicPr>
+        <p:blipFill>
+          <a:blip r:embed="rId8">
+            <a:extLst>
+              <a:ext uri="{96DAC541-7B7A-43D3-8B79-37D633B846F1}">
+                <asvg:svgBlip xmlns="" xmlns:asvg="http://schemas.microsoft.com/office/drawing/2016/SVG/main" r:embed="rId9"/>
+              </a:ext>
+            </a:extLst>
+          </a:blip>
+          <a:stretch>
+            <a:fillRect/>
+          </a:stretch>
+        </p:blipFill>
+        <p:spPr>
+          <a:xfrm>
+            <a:off x="5636945" y="3124200"/>
+            <a:ext cx="274320" cy="274320"/>
+          </a:xfrm>
+          <a:prstGeom prst="rect">
+            <a:avLst/>
+          </a:prstGeom>
+        </p:spPr>
+      </p:pic>
+      <p:sp>
+        <p:nvSpPr>
+          <p:cNvPr id="22" name="TextBox 21">
+            <a:extLst>
+              <a:ext uri="{FF2B5EF4-FFF2-40B4-BE49-F238E27FC236}">
+                <a16:creationId xmlns:a16="http://schemas.microsoft.com/office/drawing/2014/main" id="{F90C1CC4-DFE6-0445-BD1C-DB610E1A07F5}"/>
+              </a:ext>
+            </a:extLst>
+          </p:cNvPr>
+          <p:cNvSpPr txBox="1"/>
+          <p:nvPr/>
+        </p:nvSpPr>
+        <p:spPr>
+          <a:xfrm>
+            <a:off x="5562600" y="2516771"/>
+            <a:ext cx="1513305" cy="276999"/>
+          </a:xfrm>
+          <a:prstGeom prst="rect">
+            <a:avLst/>
+          </a:prstGeom>
+          <a:noFill/>
+          <a:effectLst>
+            <a:softEdge rad="0"/>
+          </a:effectLst>
+        </p:spPr>
+        <p:txBody>
+          <a:bodyPr wrap="square" rtlCol="0">
+            <a:spAutoFit/>
+          </a:bodyPr>
+          <a:lstStyle/>
+          <a:p>
+            <a:pPr algn="ctr"/>
+            <a:r>
+              <a:rPr lang="en-US" sz="1200" dirty="0">
+                <a:latin typeface="Arial" panose="020B0604020202020204" pitchFamily="34" charset="0"/>
+                <a:ea typeface="Amazon Ember" panose="020B0603020204020204" pitchFamily="34" charset="0"/>
+                <a:cs typeface="Arial" panose="020B0604020202020204" pitchFamily="34" charset="0"/>
+              </a:rPr>
+              <a:t>RD Gateway</a:t>
+            </a:r>
+          </a:p>
+        </p:txBody>
+      </p:sp>
+      <p:sp>
+        <p:nvSpPr>
+          <p:cNvPr id="23" name="TextBox 22">
+            <a:extLst>
+              <a:ext uri="{FF2B5EF4-FFF2-40B4-BE49-F238E27FC236}">
+                <a16:creationId xmlns:a16="http://schemas.microsoft.com/office/drawing/2014/main" id="{517096B6-EF64-C245-A3E7-BEEF81BDCB9C}"/>
+              </a:ext>
+            </a:extLst>
+          </p:cNvPr>
+          <p:cNvSpPr txBox="1"/>
+          <p:nvPr/>
+        </p:nvSpPr>
+        <p:spPr>
+          <a:xfrm>
+            <a:off x="6858000" y="2519195"/>
+            <a:ext cx="1236442" cy="276999"/>
+          </a:xfrm>
+          <a:prstGeom prst="rect">
+            <a:avLst/>
+          </a:prstGeom>
+          <a:noFill/>
+        </p:spPr>
+        <p:txBody>
+          <a:bodyPr wrap="square" rtlCol="0">
+            <a:spAutoFit/>
+          </a:bodyPr>
+          <a:lstStyle/>
+          <a:p>
+            <a:pPr algn="ctr"/>
+            <a:r>
+              <a:rPr lang="en-US" sz="1200" dirty="0">
+                <a:latin typeface="Arial" panose="020B0604020202020204" pitchFamily="34" charset="0"/>
+                <a:ea typeface="Amazon Ember" panose="020B0603020204020204" pitchFamily="34" charset="0"/>
+                <a:cs typeface="Arial" panose="020B0604020202020204" pitchFamily="34" charset="0"/>
+              </a:rPr>
+              <a:t>NAT gateway</a:t>
+            </a:r>
+          </a:p>
+        </p:txBody>
+      </p:sp>
+      <p:pic>
+        <p:nvPicPr>
+          <p:cNvPr id="24" name="Graphic 40">
+            <a:extLst>
+              <a:ext uri="{FF2B5EF4-FFF2-40B4-BE49-F238E27FC236}">
+                <a16:creationId xmlns:a16="http://schemas.microsoft.com/office/drawing/2014/main" id="{C322592C-EAB9-0640-95A5-D8FF5B8E5FE6}"/>
+              </a:ext>
+            </a:extLst>
+          </p:cNvPr>
+          <p:cNvPicPr>
+            <a:picLocks noChangeAspect="1"/>
+          </p:cNvPicPr>
+          <p:nvPr/>
+        </p:nvPicPr>
+        <p:blipFill>
+          <a:blip r:embed="rId14">
+            <a:extLst>
+              <a:ext uri="{96DAC541-7B7A-43D3-8B79-37D633B846F1}">
+                <asvg:svgBlip xmlns="" xmlns:asvg="http://schemas.microsoft.com/office/drawing/2016/SVG/main" r:embed="rId17"/>
+              </a:ext>
+            </a:extLst>
+          </a:blip>
+          <a:stretch>
+            <a:fillRect/>
+          </a:stretch>
+        </p:blipFill>
+        <p:spPr>
+          <a:xfrm>
+            <a:off x="7241271" y="2064381"/>
+            <a:ext cx="469900" cy="469900"/>
+          </a:xfrm>
+          <a:prstGeom prst="rect">
+            <a:avLst/>
+          </a:prstGeom>
+        </p:spPr>
+      </p:pic>
+      <p:pic>
+        <p:nvPicPr>
+          <p:cNvPr id="25" name="Graphic 135">
+            <a:extLst>
+              <a:ext uri="{FF2B5EF4-FFF2-40B4-BE49-F238E27FC236}">
+                <a16:creationId xmlns:a16="http://schemas.microsoft.com/office/drawing/2014/main" id="{C19987B1-DB3A-1640-994D-BCB81FCC1AE4}"/>
+              </a:ext>
+            </a:extLst>
+          </p:cNvPr>
+          <p:cNvPicPr>
+            <a:picLocks noChangeAspect="1"/>
+          </p:cNvPicPr>
+          <p:nvPr/>
+        </p:nvPicPr>
+        <p:blipFill>
+          <a:blip r:embed="rId12">
+            <a:extLst>
+              <a:ext uri="{96DAC541-7B7A-43D3-8B79-37D633B846F1}">
+                <asvg:svgBlip xmlns="" xmlns:asvg="http://schemas.microsoft.com/office/drawing/2016/SVG/main" r:embed="rId13"/>
+              </a:ext>
+            </a:extLst>
+          </a:blip>
+          <a:stretch>
+            <a:fillRect/>
+          </a:stretch>
+        </p:blipFill>
+        <p:spPr>
+          <a:xfrm>
+            <a:off x="6084302" y="3352800"/>
+            <a:ext cx="469900" cy="469900"/>
+          </a:xfrm>
+          <a:prstGeom prst="rect">
+            <a:avLst/>
+          </a:prstGeom>
+        </p:spPr>
+      </p:pic>
+      <p:sp>
+        <p:nvSpPr>
+          <p:cNvPr id="26" name="TextBox 25">
+            <a:extLst>
+              <a:ext uri="{FF2B5EF4-FFF2-40B4-BE49-F238E27FC236}">
+                <a16:creationId xmlns:a16="http://schemas.microsoft.com/office/drawing/2014/main" id="{F90C1CC4-DFE6-0445-BD1C-DB610E1A07F5}"/>
+              </a:ext>
+            </a:extLst>
+          </p:cNvPr>
+          <p:cNvSpPr txBox="1"/>
+          <p:nvPr/>
+        </p:nvSpPr>
+        <p:spPr>
+          <a:xfrm>
+            <a:off x="5562600" y="3798209"/>
+            <a:ext cx="1513305" cy="276999"/>
+          </a:xfrm>
+          <a:prstGeom prst="rect">
+            <a:avLst/>
+          </a:prstGeom>
+          <a:noFill/>
+        </p:spPr>
+        <p:txBody>
+          <a:bodyPr wrap="square" rtlCol="0">
+            <a:spAutoFit/>
+          </a:bodyPr>
+          <a:lstStyle/>
+          <a:p>
+            <a:pPr algn="ctr"/>
+            <a:r>
+              <a:rPr lang="en-US" sz="1200" smtClean="0">
+                <a:latin typeface="Arial" panose="020B0604020202020204" pitchFamily="34" charset="0"/>
+                <a:ea typeface="Amazon Ember" panose="020B0603020204020204" pitchFamily="34" charset="0"/>
+                <a:cs typeface="Arial" panose="020B0604020202020204" pitchFamily="34" charset="0"/>
+              </a:rPr>
+              <a:t>Domain controller</a:t>
+            </a:r>
+            <a:endParaRPr lang="en-US" sz="1200" dirty="0">
+              <a:latin typeface="Arial" panose="020B0604020202020204" pitchFamily="34" charset="0"/>
+              <a:ea typeface="Amazon Ember" panose="020B0603020204020204" pitchFamily="34" charset="0"/>
+              <a:cs typeface="Arial" panose="020B0604020202020204" pitchFamily="34" charset="0"/>
+            </a:endParaRPr>
+          </a:p>
+        </p:txBody>
+      </p:sp>
+      <p:pic>
+        <p:nvPicPr>
+          <p:cNvPr id="27" name="Graphic 43">
+            <a:extLst>
+              <a:ext uri="{FF2B5EF4-FFF2-40B4-BE49-F238E27FC236}">
+                <a16:creationId xmlns:a16="http://schemas.microsoft.com/office/drawing/2014/main" id="{AA07898E-3D66-5446-8B50-9BAB110FEFDB}"/>
+              </a:ext>
+            </a:extLst>
+          </p:cNvPr>
+          <p:cNvPicPr>
+            <a:picLocks noChangeAspect="1"/>
+          </p:cNvPicPr>
+          <p:nvPr/>
+        </p:nvPicPr>
+        <p:blipFill>
+          <a:blip r:embed="rId18">
+            <a:extLst>
+              <a:ext uri="{BEBA8EAE-BF5A-486C-A8C5-ECC9F3942E4B}">
+                <a14:imgProps xmlns:a14="http://schemas.microsoft.com/office/drawing/2010/main">
+                  <a14:imgLayer r:embed="rId19">
+                    <a14:imgEffect>
+                      <a14:artisticBlur/>
+                    </a14:imgEffect>
+                  </a14:imgLayer>
+                </a14:imgProps>
+              </a:ext>
+              <a:ext uri="{96DAC541-7B7A-43D3-8B79-37D633B846F1}">
+                <asvg:svgBlip xmlns="" xmlns:asvg="http://schemas.microsoft.com/office/drawing/2016/SVG/main" r:embed="rId32"/>
+              </a:ext>
+            </a:extLst>
+          </a:blip>
+          <a:stretch>
+            <a:fillRect/>
+          </a:stretch>
+        </p:blipFill>
+        <p:spPr>
+          <a:xfrm>
+            <a:off x="6083300" y="2064381"/>
+            <a:ext cx="469900" cy="469900"/>
+          </a:xfrm>
+          <a:prstGeom prst="rect">
+            <a:avLst/>
+          </a:prstGeom>
+        </p:spPr>
+      </p:pic>
+      <p:pic>
+        <p:nvPicPr>
+          <p:cNvPr id="28" name="Graphic 17">
+            <a:extLst>
+              <a:ext uri="{FF2B5EF4-FFF2-40B4-BE49-F238E27FC236}">
+                <a16:creationId xmlns:a16="http://schemas.microsoft.com/office/drawing/2014/main" id="{633BC3DF-5160-6843-B872-94C5C92E5BF4}"/>
+              </a:ext>
+            </a:extLst>
+          </p:cNvPr>
+          <p:cNvPicPr>
+            <a:picLocks noChangeAspect="1" noChangeArrowheads="1"/>
+          </p:cNvPicPr>
+          <p:nvPr/>
+        </p:nvPicPr>
+        <p:blipFill>
+          <a:blip r:embed="rId33" cstate="print">
+            <a:extLst>
+              <a:ext uri="{28A0092B-C50C-407E-A947-70E740481C1C}">
+                <a14:useLocalDpi xmlns:a14="http://schemas.microsoft.com/office/drawing/2010/main" val="0"/>
+              </a:ext>
+            </a:extLst>
+          </a:blip>
+          <a:srcRect/>
+          <a:stretch>
+            <a:fillRect/>
+          </a:stretch>
+        </p:blipFill>
+        <p:spPr bwMode="auto">
+          <a:xfrm>
+            <a:off x="8975457" y="1991841"/>
+            <a:ext cx="762000" cy="762000"/>
+          </a:xfrm>
+          <a:prstGeom prst="rect">
+            <a:avLst/>
+          </a:prstGeom>
+          <a:noFill/>
+          <a:ln>
+            <a:noFill/>
+          </a:ln>
+          <a:extLst>
+            <a:ext uri="{909E8E84-426E-40DD-AFC4-6F175D3DCCD1}">
+              <a14:hiddenFill xmlns:a14="http://schemas.microsoft.com/office/drawing/2010/main">
+                <a:solidFill>
+                  <a:srgbClr val="FFFFFF"/>
+                </a:solidFill>
+              </a14:hiddenFill>
+            </a:ext>
+            <a:ext uri="{91240B29-F687-4F45-9708-019B960494DF}">
+              <a14:hiddenLine xmlns:a14="http://schemas.microsoft.com/office/drawing/2010/main" w="9525">
+                <a:solidFill>
+                  <a:srgbClr val="000000"/>
+                </a:solidFill>
+                <a:miter lim="800000"/>
+                <a:headEnd/>
+                <a:tailEnd/>
+              </a14:hiddenLine>
+            </a:ext>
+          </a:extLst>
+        </p:spPr>
+      </p:pic>
+      <p:sp>
+        <p:nvSpPr>
+          <p:cNvPr id="29" name="TextBox 11">
+            <a:extLst>
+              <a:ext uri="{FF2B5EF4-FFF2-40B4-BE49-F238E27FC236}">
+                <a16:creationId xmlns:a16="http://schemas.microsoft.com/office/drawing/2014/main" id="{BBEC601B-D650-7947-9D7F-6579E2990B06}"/>
+              </a:ext>
+            </a:extLst>
+          </p:cNvPr>
+          <p:cNvSpPr txBox="1">
+            <a:spLocks noChangeArrowheads="1"/>
+          </p:cNvSpPr>
+          <p:nvPr/>
+        </p:nvSpPr>
+        <p:spPr bwMode="auto">
+          <a:xfrm>
+            <a:off x="8218220" y="2753841"/>
+            <a:ext cx="2292350" cy="276999"/>
+          </a:xfrm>
+          <a:prstGeom prst="rect">
+            <a:avLst/>
+          </a:prstGeom>
+          <a:noFill/>
+          <a:ln>
+            <a:noFill/>
+          </a:ln>
+          <a:extLst>
+            <a:ext uri="{909E8E84-426E-40DD-AFC4-6F175D3DCCD1}">
+              <a14:hiddenFill xmlns:a14="http://schemas.microsoft.com/office/drawing/2010/main">
+                <a:solidFill>
+                  <a:srgbClr val="FFFFFF"/>
+                </a:solidFill>
+              </a14:hiddenFill>
+            </a:ext>
+            <a:ext uri="{91240B29-F687-4F45-9708-019B960494DF}">
+              <a14:hiddenLine xmlns:a14="http://schemas.microsoft.com/office/drawing/2010/main" w="9525">
+                <a:solidFill>
+                  <a:srgbClr val="000000"/>
+                </a:solidFill>
+                <a:miter lim="800000"/>
+                <a:headEnd/>
+                <a:tailEnd/>
+              </a14:hiddenLine>
+            </a:ext>
+          </a:extLst>
+        </p:spPr>
+        <p:txBody>
+          <a:bodyPr>
+            <a:spAutoFit/>
+          </a:bodyPr>
+          <a:lstStyle>
+            <a:lvl1pPr>
+              <a:defRPr>
+                <a:solidFill>
+                  <a:schemeClr val="tx1"/>
+                </a:solidFill>
+                <a:latin typeface="Calibri" panose="020F0502020204030204" pitchFamily="34" charset="0"/>
+              </a:defRPr>
+            </a:lvl1pPr>
+            <a:lvl2pPr marL="742950" indent="-285750">
+              <a:defRPr>
+                <a:solidFill>
+                  <a:schemeClr val="tx1"/>
+                </a:solidFill>
+                <a:latin typeface="Calibri" panose="020F0502020204030204" pitchFamily="34" charset="0"/>
+              </a:defRPr>
+            </a:lvl2pPr>
+            <a:lvl3pPr marL="1143000" indent="-228600">
+              <a:defRPr>
+                <a:solidFill>
+                  <a:schemeClr val="tx1"/>
+                </a:solidFill>
+                <a:latin typeface="Calibri" panose="020F0502020204030204" pitchFamily="34" charset="0"/>
+              </a:defRPr>
+            </a:lvl3pPr>
+            <a:lvl4pPr marL="1600200" indent="-228600">
+              <a:defRPr>
+                <a:solidFill>
+                  <a:schemeClr val="tx1"/>
+                </a:solidFill>
+                <a:latin typeface="Calibri" panose="020F0502020204030204" pitchFamily="34" charset="0"/>
+              </a:defRPr>
+            </a:lvl4pPr>
+            <a:lvl5pPr marL="2057400" indent="-228600">
+              <a:defRPr>
+                <a:solidFill>
+                  <a:schemeClr val="tx1"/>
+                </a:solidFill>
+                <a:latin typeface="Calibri" panose="020F0502020204030204" pitchFamily="34" charset="0"/>
+              </a:defRPr>
+            </a:lvl5pPr>
+            <a:lvl6pPr marL="2514600" indent="-228600" eaLnBrk="0" fontAlgn="base" hangingPunct="0">
+              <a:spcBef>
+                <a:spcPct val="0"/>
+              </a:spcBef>
+              <a:spcAft>
+                <a:spcPct val="0"/>
+              </a:spcAft>
+              <a:defRPr>
+                <a:solidFill>
+                  <a:schemeClr val="tx1"/>
+                </a:solidFill>
+                <a:latin typeface="Calibri" panose="020F0502020204030204" pitchFamily="34" charset="0"/>
+              </a:defRPr>
+            </a:lvl6pPr>
+            <a:lvl7pPr marL="2971800" indent="-228600" eaLnBrk="0" fontAlgn="base" hangingPunct="0">
+              <a:spcBef>
+                <a:spcPct val="0"/>
+              </a:spcBef>
+              <a:spcAft>
+                <a:spcPct val="0"/>
+              </a:spcAft>
+              <a:defRPr>
+                <a:solidFill>
+                  <a:schemeClr val="tx1"/>
+                </a:solidFill>
+                <a:latin typeface="Calibri" panose="020F0502020204030204" pitchFamily="34" charset="0"/>
+              </a:defRPr>
+            </a:lvl7pPr>
+            <a:lvl8pPr marL="3429000" indent="-228600" eaLnBrk="0" fontAlgn="base" hangingPunct="0">
+              <a:spcBef>
+                <a:spcPct val="0"/>
+              </a:spcBef>
+              <a:spcAft>
+                <a:spcPct val="0"/>
+              </a:spcAft>
+              <a:defRPr>
+                <a:solidFill>
+                  <a:schemeClr val="tx1"/>
+                </a:solidFill>
+                <a:latin typeface="Calibri" panose="020F0502020204030204" pitchFamily="34" charset="0"/>
+              </a:defRPr>
+            </a:lvl8pPr>
+            <a:lvl9pPr marL="3886200" indent="-228600" eaLnBrk="0" fontAlgn="base" hangingPunct="0">
+              <a:spcBef>
+                <a:spcPct val="0"/>
+              </a:spcBef>
+              <a:spcAft>
+                <a:spcPct val="0"/>
+              </a:spcAft>
+              <a:defRPr>
+                <a:solidFill>
+                  <a:schemeClr val="tx1"/>
+                </a:solidFill>
+                <a:latin typeface="Calibri" panose="020F0502020204030204" pitchFamily="34" charset="0"/>
+              </a:defRPr>
+            </a:lvl9pPr>
+          </a:lstStyle>
+          <a:p>
+            <a:pPr algn="ctr" eaLnBrk="1" hangingPunct="1"/>
+            <a:r>
+              <a:rPr lang="en-US" altLang="en-US" sz="1200" dirty="0">
+                <a:latin typeface="Arial" panose="020B0604020202020204" pitchFamily="34" charset="0"/>
+                <a:ea typeface="Amazon Ember" panose="020B0603020204020204" pitchFamily="34" charset="0"/>
+                <a:cs typeface="Arial" panose="020B0604020202020204" pitchFamily="34" charset="0"/>
+              </a:rPr>
+              <a:t>AWS Secrets Manager</a:t>
+            </a:r>
+          </a:p>
+        </p:txBody>
+      </p:sp>
+      <p:pic>
+        <p:nvPicPr>
+          <p:cNvPr id="30" name="Graphic 15">
+            <a:extLst>
+              <a:ext uri="{FF2B5EF4-FFF2-40B4-BE49-F238E27FC236}">
+                <a16:creationId xmlns:a16="http://schemas.microsoft.com/office/drawing/2014/main" id="{3A010F8A-DF9B-CA43-8D41-3A122544E272}"/>
+              </a:ext>
+            </a:extLst>
+          </p:cNvPr>
+          <p:cNvPicPr>
+            <a:picLocks noChangeAspect="1" noChangeArrowheads="1"/>
+          </p:cNvPicPr>
+          <p:nvPr/>
+        </p:nvPicPr>
+        <p:blipFill>
+          <a:blip r:embed="rId34" cstate="print">
+            <a:extLst>
+              <a:ext uri="{28A0092B-C50C-407E-A947-70E740481C1C}">
+                <a14:useLocalDpi xmlns:a14="http://schemas.microsoft.com/office/drawing/2010/main" val="0"/>
+              </a:ext>
+            </a:extLst>
+          </a:blip>
+          <a:srcRect/>
+          <a:stretch>
+            <a:fillRect/>
+          </a:stretch>
+        </p:blipFill>
+        <p:spPr bwMode="auto">
+          <a:xfrm>
+            <a:off x="8982075" y="3313208"/>
+            <a:ext cx="762000" cy="762000"/>
+          </a:xfrm>
+          <a:prstGeom prst="rect">
+            <a:avLst/>
+          </a:prstGeom>
+          <a:noFill/>
+          <a:ln>
+            <a:noFill/>
+          </a:ln>
+          <a:extLst>
+            <a:ext uri="{909E8E84-426E-40DD-AFC4-6F175D3DCCD1}">
+              <a14:hiddenFill xmlns:a14="http://schemas.microsoft.com/office/drawing/2010/main">
+                <a:solidFill>
+                  <a:srgbClr val="FFFFFF"/>
+                </a:solidFill>
+              </a14:hiddenFill>
+            </a:ext>
+            <a:ext uri="{91240B29-F687-4F45-9708-019B960494DF}">
+              <a14:hiddenLine xmlns:a14="http://schemas.microsoft.com/office/drawing/2010/main" w="9525">
+                <a:solidFill>
+                  <a:srgbClr val="000000"/>
+                </a:solidFill>
+                <a:miter lim="800000"/>
+                <a:headEnd/>
+                <a:tailEnd/>
+              </a14:hiddenLine>
+            </a:ext>
+          </a:extLst>
+        </p:spPr>
+      </p:pic>
+      <p:sp>
+        <p:nvSpPr>
+          <p:cNvPr id="31" name="TextBox 11">
+            <a:extLst>
+              <a:ext uri="{FF2B5EF4-FFF2-40B4-BE49-F238E27FC236}">
+                <a16:creationId xmlns:a16="http://schemas.microsoft.com/office/drawing/2014/main" id="{EE7EF599-CC93-1843-94CE-F010641A8D23}"/>
+              </a:ext>
+            </a:extLst>
+          </p:cNvPr>
+          <p:cNvSpPr txBox="1">
+            <a:spLocks noChangeArrowheads="1"/>
+          </p:cNvSpPr>
+          <p:nvPr/>
+        </p:nvSpPr>
+        <p:spPr bwMode="auto">
+          <a:xfrm>
+            <a:off x="8223250" y="4066401"/>
+            <a:ext cx="2292350" cy="276999"/>
+          </a:xfrm>
+          <a:prstGeom prst="rect">
+            <a:avLst/>
+          </a:prstGeom>
+          <a:noFill/>
+          <a:ln>
+            <a:noFill/>
+          </a:ln>
+          <a:extLst>
+            <a:ext uri="{909E8E84-426E-40DD-AFC4-6F175D3DCCD1}">
+              <a14:hiddenFill xmlns:a14="http://schemas.microsoft.com/office/drawing/2010/main">
+                <a:solidFill>
+                  <a:srgbClr val="FFFFFF"/>
+                </a:solidFill>
+              </a14:hiddenFill>
+            </a:ext>
+            <a:ext uri="{91240B29-F687-4F45-9708-019B960494DF}">
+              <a14:hiddenLine xmlns:a14="http://schemas.microsoft.com/office/drawing/2010/main" w="9525">
+                <a:solidFill>
+                  <a:srgbClr val="000000"/>
+                </a:solidFill>
+                <a:miter lim="800000"/>
+                <a:headEnd/>
+                <a:tailEnd/>
+              </a14:hiddenLine>
+            </a:ext>
+          </a:extLst>
+        </p:spPr>
+        <p:txBody>
+          <a:bodyPr>
+            <a:spAutoFit/>
+          </a:bodyPr>
+          <a:lstStyle>
+            <a:lvl1pPr>
+              <a:defRPr>
+                <a:solidFill>
+                  <a:schemeClr val="tx1"/>
+                </a:solidFill>
+                <a:latin typeface="Calibri" panose="020F0502020204030204" pitchFamily="34" charset="0"/>
+              </a:defRPr>
+            </a:lvl1pPr>
+            <a:lvl2pPr marL="742950" indent="-285750">
+              <a:defRPr>
+                <a:solidFill>
+                  <a:schemeClr val="tx1"/>
+                </a:solidFill>
+                <a:latin typeface="Calibri" panose="020F0502020204030204" pitchFamily="34" charset="0"/>
+              </a:defRPr>
+            </a:lvl2pPr>
+            <a:lvl3pPr marL="1143000" indent="-228600">
+              <a:defRPr>
+                <a:solidFill>
+                  <a:schemeClr val="tx1"/>
+                </a:solidFill>
+                <a:latin typeface="Calibri" panose="020F0502020204030204" pitchFamily="34" charset="0"/>
+              </a:defRPr>
+            </a:lvl3pPr>
+            <a:lvl4pPr marL="1600200" indent="-228600">
+              <a:defRPr>
+                <a:solidFill>
+                  <a:schemeClr val="tx1"/>
+                </a:solidFill>
+                <a:latin typeface="Calibri" panose="020F0502020204030204" pitchFamily="34" charset="0"/>
+              </a:defRPr>
+            </a:lvl4pPr>
+            <a:lvl5pPr marL="2057400" indent="-228600">
+              <a:defRPr>
+                <a:solidFill>
+                  <a:schemeClr val="tx1"/>
+                </a:solidFill>
+                <a:latin typeface="Calibri" panose="020F0502020204030204" pitchFamily="34" charset="0"/>
+              </a:defRPr>
+            </a:lvl5pPr>
+            <a:lvl6pPr marL="2514600" indent="-228600" eaLnBrk="0" fontAlgn="base" hangingPunct="0">
+              <a:spcBef>
+                <a:spcPct val="0"/>
+              </a:spcBef>
+              <a:spcAft>
+                <a:spcPct val="0"/>
+              </a:spcAft>
+              <a:defRPr>
+                <a:solidFill>
+                  <a:schemeClr val="tx1"/>
+                </a:solidFill>
+                <a:latin typeface="Calibri" panose="020F0502020204030204" pitchFamily="34" charset="0"/>
+              </a:defRPr>
+            </a:lvl6pPr>
+            <a:lvl7pPr marL="2971800" indent="-228600" eaLnBrk="0" fontAlgn="base" hangingPunct="0">
+              <a:spcBef>
+                <a:spcPct val="0"/>
+              </a:spcBef>
+              <a:spcAft>
+                <a:spcPct val="0"/>
+              </a:spcAft>
+              <a:defRPr>
+                <a:solidFill>
+                  <a:schemeClr val="tx1"/>
+                </a:solidFill>
+                <a:latin typeface="Calibri" panose="020F0502020204030204" pitchFamily="34" charset="0"/>
+              </a:defRPr>
+            </a:lvl7pPr>
+            <a:lvl8pPr marL="3429000" indent="-228600" eaLnBrk="0" fontAlgn="base" hangingPunct="0">
+              <a:spcBef>
+                <a:spcPct val="0"/>
+              </a:spcBef>
+              <a:spcAft>
+                <a:spcPct val="0"/>
+              </a:spcAft>
+              <a:defRPr>
+                <a:solidFill>
+                  <a:schemeClr val="tx1"/>
+                </a:solidFill>
+                <a:latin typeface="Calibri" panose="020F0502020204030204" pitchFamily="34" charset="0"/>
+              </a:defRPr>
+            </a:lvl8pPr>
+            <a:lvl9pPr marL="3886200" indent="-228600" eaLnBrk="0" fontAlgn="base" hangingPunct="0">
+              <a:spcBef>
+                <a:spcPct val="0"/>
+              </a:spcBef>
+              <a:spcAft>
+                <a:spcPct val="0"/>
+              </a:spcAft>
+              <a:defRPr>
+                <a:solidFill>
+                  <a:schemeClr val="tx1"/>
+                </a:solidFill>
+                <a:latin typeface="Calibri" panose="020F0502020204030204" pitchFamily="34" charset="0"/>
+              </a:defRPr>
+            </a:lvl9pPr>
+          </a:lstStyle>
+          <a:p>
+            <a:pPr algn="ctr" eaLnBrk="1" hangingPunct="1"/>
+            <a:r>
+              <a:rPr lang="en-US" altLang="en-US" sz="1200" dirty="0">
+                <a:latin typeface="Arial" panose="020B0604020202020204" pitchFamily="34" charset="0"/>
+                <a:ea typeface="Amazon Ember" panose="020B0603020204020204" pitchFamily="34" charset="0"/>
+                <a:cs typeface="Arial" panose="020B0604020202020204" pitchFamily="34" charset="0"/>
+              </a:rPr>
+              <a:t>AWS Systems Manager</a:t>
+            </a:r>
+          </a:p>
+        </p:txBody>
+      </p:sp>
+      <p:sp>
+        <p:nvSpPr>
+          <p:cNvPr id="39" name="Rectangle 38">
+            <a:extLst>
+              <a:ext uri="{FF2B5EF4-FFF2-40B4-BE49-F238E27FC236}">
+                <a16:creationId xmlns:a16="http://schemas.microsoft.com/office/drawing/2014/main" id="{34D72B91-09F3-9A42-B66A-106F01CCE8B4}"/>
+              </a:ext>
+            </a:extLst>
+          </p:cNvPr>
+          <p:cNvSpPr/>
+          <p:nvPr/>
+        </p:nvSpPr>
+        <p:spPr>
+          <a:xfrm>
+            <a:off x="1044620" y="1214882"/>
+            <a:ext cx="7462524" cy="4195318"/>
+          </a:xfrm>
+          <a:prstGeom prst="rect">
+            <a:avLst/>
+          </a:prstGeom>
+          <a:noFill/>
+          <a:ln w="12700">
+            <a:solidFill>
+              <a:srgbClr val="1E8900"/>
+            </a:solidFill>
+          </a:ln>
+        </p:spPr>
+        <p:style>
+          <a:lnRef idx="2">
+            <a:schemeClr val="accent1">
+              <a:shade val="50000"/>
+            </a:schemeClr>
+          </a:lnRef>
+          <a:fillRef idx="1">
+            <a:schemeClr val="accent1"/>
+          </a:fillRef>
+          <a:effectRef idx="0">
+            <a:schemeClr val="accent1"/>
+          </a:effectRef>
+          <a:fontRef idx="minor">
+            <a:schemeClr val="lt1"/>
+          </a:fontRef>
+        </p:style>
+        <p:txBody>
+          <a:bodyPr lIns="457200" tIns="91440"/>
+          <a:lstStyle/>
+          <a:p>
+            <a:pPr eaLnBrk="1" fontAlgn="auto" hangingPunct="1">
+              <a:spcBef>
+                <a:spcPts val="0"/>
+              </a:spcBef>
+              <a:spcAft>
+                <a:spcPts val="0"/>
+              </a:spcAft>
+              <a:defRPr/>
+            </a:pPr>
+            <a:r>
+              <a:rPr lang="en-US" sz="1200" dirty="0">
+                <a:ln w="0"/>
+                <a:solidFill>
+                  <a:srgbClr val="1E8900"/>
+                </a:solidFill>
+                <a:latin typeface="Arial" panose="020B0604020202020204" pitchFamily="34" charset="0"/>
+                <a:cs typeface="Arial" panose="020B0604020202020204" pitchFamily="34" charset="0"/>
+              </a:rPr>
+              <a:t>VPC</a:t>
+            </a:r>
+          </a:p>
+        </p:txBody>
+      </p:sp>
+      <p:pic>
+        <p:nvPicPr>
+          <p:cNvPr id="40" name="Graphic 28">
+            <a:extLst>
+              <a:ext uri="{FF2B5EF4-FFF2-40B4-BE49-F238E27FC236}">
+                <a16:creationId xmlns:a16="http://schemas.microsoft.com/office/drawing/2014/main" id="{88C69878-A4A8-CE45-B624-0223CB16619E}"/>
+              </a:ext>
+            </a:extLst>
+          </p:cNvPr>
+          <p:cNvPicPr>
+            <a:picLocks noChangeAspect="1" noChangeArrowheads="1"/>
+          </p:cNvPicPr>
+          <p:nvPr/>
+        </p:nvPicPr>
+        <p:blipFill>
+          <a:blip r:embed="rId35" cstate="print">
+            <a:extLst>
+              <a:ext uri="{28A0092B-C50C-407E-A947-70E740481C1C}">
+                <a14:useLocalDpi xmlns:a14="http://schemas.microsoft.com/office/drawing/2010/main" val="0"/>
+              </a:ext>
+            </a:extLst>
+          </a:blip>
+          <a:srcRect/>
+          <a:stretch>
+            <a:fillRect/>
+          </a:stretch>
+        </p:blipFill>
+        <p:spPr bwMode="auto">
+          <a:xfrm>
+            <a:off x="1044620" y="1214882"/>
+            <a:ext cx="330200" cy="330200"/>
+          </a:xfrm>
+          <a:prstGeom prst="rect">
+            <a:avLst/>
+          </a:prstGeom>
+          <a:noFill/>
+          <a:ln>
+            <a:noFill/>
+          </a:ln>
+          <a:extLst>
+            <a:ext uri="{909E8E84-426E-40DD-AFC4-6F175D3DCCD1}">
+              <a14:hiddenFill xmlns:a14="http://schemas.microsoft.com/office/drawing/2010/main">
+                <a:solidFill>
+                  <a:srgbClr val="FFFFFF"/>
+                </a:solidFill>
+              </a14:hiddenFill>
+            </a:ext>
+            <a:ext uri="{91240B29-F687-4F45-9708-019B960494DF}">
+              <a14:hiddenLine xmlns:a14="http://schemas.microsoft.com/office/drawing/2010/main" w="9525">
+                <a:solidFill>
+                  <a:srgbClr val="000000"/>
+                </a:solidFill>
+                <a:miter lim="800000"/>
+                <a:headEnd/>
+                <a:tailEnd/>
+              </a14:hiddenLine>
+            </a:ext>
+          </a:extLst>
+        </p:spPr>
+      </p:pic>
+      <p:sp>
+        <p:nvSpPr>
+          <p:cNvPr id="41" name="Rectangle 40">
+            <a:extLst>
+              <a:ext uri="{FF2B5EF4-FFF2-40B4-BE49-F238E27FC236}">
+                <a16:creationId xmlns:a16="http://schemas.microsoft.com/office/drawing/2014/main" id="{D246DAA1-0260-E449-8CA2-92FF0101149D}"/>
+              </a:ext>
+            </a:extLst>
+          </p:cNvPr>
+          <p:cNvSpPr/>
+          <p:nvPr/>
+        </p:nvSpPr>
+        <p:spPr>
+          <a:xfrm>
+            <a:off x="1447800" y="932962"/>
+            <a:ext cx="2884905" cy="4553438"/>
+          </a:xfrm>
+          <a:prstGeom prst="rect">
+            <a:avLst/>
+          </a:prstGeom>
+          <a:noFill/>
+          <a:ln w="12700">
+            <a:solidFill>
+              <a:srgbClr val="5B9CD5"/>
+            </a:solidFill>
+            <a:prstDash val="dash"/>
+          </a:ln>
+        </p:spPr>
+        <p:style>
+          <a:lnRef idx="2">
+            <a:schemeClr val="accent1">
+              <a:shade val="50000"/>
+            </a:schemeClr>
+          </a:lnRef>
+          <a:fillRef idx="1">
+            <a:schemeClr val="accent1"/>
+          </a:fillRef>
+          <a:effectRef idx="0">
+            <a:schemeClr val="accent1"/>
+          </a:effectRef>
+          <a:fontRef idx="minor">
+            <a:schemeClr val="lt1"/>
+          </a:fontRef>
+        </p:style>
+        <p:txBody>
+          <a:bodyPr tIns="91440"/>
+          <a:lstStyle/>
+          <a:p>
+            <a:pPr algn="ctr" eaLnBrk="1" fontAlgn="auto" hangingPunct="1">
+              <a:spcBef>
+                <a:spcPts val="0"/>
+              </a:spcBef>
+              <a:spcAft>
+                <a:spcPts val="0"/>
+              </a:spcAft>
+              <a:defRPr/>
+            </a:pPr>
+            <a:r>
+              <a:rPr lang="en-US" sz="1200">
+                <a:solidFill>
+                  <a:srgbClr val="5B9CD5"/>
+                </a:solidFill>
+                <a:latin typeface="Arial" panose="020B0604020202020204" pitchFamily="34" charset="0"/>
+                <a:cs typeface="Arial" panose="020B0604020202020204" pitchFamily="34" charset="0"/>
+              </a:rPr>
+              <a:t>Availability </a:t>
+            </a:r>
+            <a:r>
+              <a:rPr lang="en-US" sz="1200" smtClean="0">
+                <a:solidFill>
+                  <a:srgbClr val="5B9CD5"/>
+                </a:solidFill>
+                <a:latin typeface="Arial" panose="020B0604020202020204" pitchFamily="34" charset="0"/>
+                <a:cs typeface="Arial" panose="020B0604020202020204" pitchFamily="34" charset="0"/>
+              </a:rPr>
+              <a:t>Zone 1</a:t>
+            </a:r>
+            <a:endParaRPr lang="en-US" sz="1200" dirty="0">
+              <a:solidFill>
+                <a:srgbClr val="5B9CD5"/>
+              </a:solidFill>
+              <a:latin typeface="Arial" panose="020B0604020202020204" pitchFamily="34" charset="0"/>
+              <a:cs typeface="Arial" panose="020B0604020202020204" pitchFamily="34" charset="0"/>
+            </a:endParaRPr>
+          </a:p>
+        </p:txBody>
+      </p:sp>
+      <p:sp>
+        <p:nvSpPr>
+          <p:cNvPr id="42" name="Rectangle 41">
+            <a:extLst>
+              <a:ext uri="{FF2B5EF4-FFF2-40B4-BE49-F238E27FC236}">
+                <a16:creationId xmlns:a16="http://schemas.microsoft.com/office/drawing/2014/main" id="{D246DAA1-0260-E449-8CA2-92FF0101149D}"/>
+              </a:ext>
+            </a:extLst>
+          </p:cNvPr>
+          <p:cNvSpPr/>
+          <p:nvPr/>
+        </p:nvSpPr>
+        <p:spPr>
+          <a:xfrm>
+            <a:off x="5573295" y="932962"/>
+            <a:ext cx="2884905" cy="4553438"/>
+          </a:xfrm>
+          <a:prstGeom prst="rect">
+            <a:avLst/>
+          </a:prstGeom>
+          <a:noFill/>
+          <a:ln w="12700">
+            <a:solidFill>
+              <a:srgbClr val="5B9CD5"/>
+            </a:solidFill>
+            <a:prstDash val="dash"/>
+          </a:ln>
+        </p:spPr>
+        <p:style>
+          <a:lnRef idx="2">
+            <a:schemeClr val="accent1">
+              <a:shade val="50000"/>
+            </a:schemeClr>
+          </a:lnRef>
+          <a:fillRef idx="1">
+            <a:schemeClr val="accent1"/>
+          </a:fillRef>
+          <a:effectRef idx="0">
+            <a:schemeClr val="accent1"/>
+          </a:effectRef>
+          <a:fontRef idx="minor">
+            <a:schemeClr val="lt1"/>
+          </a:fontRef>
+        </p:style>
+        <p:txBody>
+          <a:bodyPr tIns="91440"/>
+          <a:lstStyle/>
+          <a:p>
+            <a:pPr algn="ctr" eaLnBrk="1" fontAlgn="auto" hangingPunct="1">
+              <a:spcBef>
+                <a:spcPts val="0"/>
+              </a:spcBef>
+              <a:spcAft>
+                <a:spcPts val="0"/>
+              </a:spcAft>
+              <a:defRPr/>
+            </a:pPr>
+            <a:r>
+              <a:rPr lang="en-US" sz="1200">
+                <a:solidFill>
+                  <a:srgbClr val="5B9CD5"/>
+                </a:solidFill>
+                <a:latin typeface="Arial" panose="020B0604020202020204" pitchFamily="34" charset="0"/>
+                <a:cs typeface="Arial" panose="020B0604020202020204" pitchFamily="34" charset="0"/>
+              </a:rPr>
+              <a:t>Availability </a:t>
+            </a:r>
+            <a:r>
+              <a:rPr lang="en-US" sz="1200" smtClean="0">
+                <a:solidFill>
+                  <a:srgbClr val="5B9CD5"/>
+                </a:solidFill>
+                <a:latin typeface="Arial" panose="020B0604020202020204" pitchFamily="34" charset="0"/>
+                <a:cs typeface="Arial" panose="020B0604020202020204" pitchFamily="34" charset="0"/>
+              </a:rPr>
+              <a:t>Zone 2</a:t>
+            </a:r>
+            <a:endParaRPr lang="en-US" sz="1200" dirty="0">
+              <a:solidFill>
+                <a:srgbClr val="5B9CD5"/>
+              </a:solidFill>
+              <a:latin typeface="Arial" panose="020B0604020202020204" pitchFamily="34" charset="0"/>
+              <a:cs typeface="Arial" panose="020B0604020202020204" pitchFamily="34" charset="0"/>
+            </a:endParaRPr>
+          </a:p>
+        </p:txBody>
+      </p:sp>
+      <p:pic>
+        <p:nvPicPr>
+          <p:cNvPr id="43" name="Graphic 135">
+            <a:extLst>
+              <a:ext uri="{FF2B5EF4-FFF2-40B4-BE49-F238E27FC236}">
+                <a16:creationId xmlns:a16="http://schemas.microsoft.com/office/drawing/2014/main" id="{C19987B1-DB3A-1640-994D-BCB81FCC1AE4}"/>
+              </a:ext>
+            </a:extLst>
+          </p:cNvPr>
+          <p:cNvPicPr>
+            <a:picLocks noChangeAspect="1"/>
+          </p:cNvPicPr>
+          <p:nvPr/>
+        </p:nvPicPr>
+        <p:blipFill>
+          <a:blip r:embed="rId12">
+            <a:extLst>
+              <a:ext uri="{96DAC541-7B7A-43D3-8B79-37D633B846F1}">
+                <asvg:svgBlip xmlns="" xmlns:asvg="http://schemas.microsoft.com/office/drawing/2016/SVG/main" r:embed="rId13"/>
+              </a:ext>
+            </a:extLst>
+          </a:blip>
+          <a:stretch>
+            <a:fillRect/>
+          </a:stretch>
+        </p:blipFill>
+        <p:spPr>
+          <a:xfrm>
+            <a:off x="3341102" y="4114800"/>
+            <a:ext cx="469900" cy="469900"/>
+          </a:xfrm>
+          <a:prstGeom prst="rect">
+            <a:avLst/>
+          </a:prstGeom>
+        </p:spPr>
+      </p:pic>
+      <p:sp>
+        <p:nvSpPr>
+          <p:cNvPr id="44" name="TextBox 43">
+            <a:extLst>
+              <a:ext uri="{FF2B5EF4-FFF2-40B4-BE49-F238E27FC236}">
+                <a16:creationId xmlns:a16="http://schemas.microsoft.com/office/drawing/2014/main" id="{F90C1CC4-DFE6-0445-BD1C-DB610E1A07F5}"/>
+              </a:ext>
+            </a:extLst>
+          </p:cNvPr>
+          <p:cNvSpPr txBox="1"/>
+          <p:nvPr/>
+        </p:nvSpPr>
+        <p:spPr>
+          <a:xfrm>
+            <a:off x="2819400" y="4560209"/>
+            <a:ext cx="1513305" cy="646331"/>
+          </a:xfrm>
+          <a:prstGeom prst="rect">
+            <a:avLst/>
+          </a:prstGeom>
+          <a:noFill/>
+        </p:spPr>
+        <p:txBody>
+          <a:bodyPr wrap="square" rtlCol="0">
+            <a:spAutoFit/>
+          </a:bodyPr>
+          <a:lstStyle/>
+          <a:p>
+            <a:pPr algn="ctr"/>
+            <a:r>
+              <a:rPr lang="en-US" sz="1200" dirty="0" smtClean="0">
+                <a:latin typeface="Arial" panose="020B0604020202020204" pitchFamily="34" charset="0"/>
+                <a:ea typeface="Amazon Ember" panose="020B0603020204020204" pitchFamily="34" charset="0"/>
+                <a:cs typeface="Arial" panose="020B0604020202020204" pitchFamily="34" charset="0"/>
+              </a:rPr>
+              <a:t>SQL </a:t>
+            </a:r>
+            <a:r>
+              <a:rPr lang="en-US" sz="1200" dirty="0" smtClean="0">
+                <a:latin typeface="Arial" panose="020B0604020202020204" pitchFamily="34" charset="0"/>
+                <a:ea typeface="Amazon Ember" panose="020B0603020204020204" pitchFamily="34" charset="0"/>
+                <a:cs typeface="Arial" panose="020B0604020202020204" pitchFamily="34" charset="0"/>
+              </a:rPr>
+              <a:t>Server node with SIOS DataKeeper</a:t>
+            </a:r>
+            <a:endParaRPr lang="en-US" sz="1200" dirty="0">
+              <a:latin typeface="Arial" panose="020B0604020202020204" pitchFamily="34" charset="0"/>
+              <a:ea typeface="Amazon Ember" panose="020B0603020204020204" pitchFamily="34" charset="0"/>
+              <a:cs typeface="Arial" panose="020B0604020202020204" pitchFamily="34" charset="0"/>
+            </a:endParaRPr>
+          </a:p>
+        </p:txBody>
+      </p:sp>
+      <p:pic>
+        <p:nvPicPr>
+          <p:cNvPr id="45" name="Graphic 135">
+            <a:extLst>
+              <a:ext uri="{FF2B5EF4-FFF2-40B4-BE49-F238E27FC236}">
+                <a16:creationId xmlns:a16="http://schemas.microsoft.com/office/drawing/2014/main" id="{C19987B1-DB3A-1640-994D-BCB81FCC1AE4}"/>
+              </a:ext>
+            </a:extLst>
+          </p:cNvPr>
+          <p:cNvPicPr>
+            <a:picLocks noChangeAspect="1"/>
+          </p:cNvPicPr>
+          <p:nvPr/>
+        </p:nvPicPr>
+        <p:blipFill>
+          <a:blip r:embed="rId12">
+            <a:extLst>
+              <a:ext uri="{96DAC541-7B7A-43D3-8B79-37D633B846F1}">
+                <asvg:svgBlip xmlns="" xmlns:asvg="http://schemas.microsoft.com/office/drawing/2016/SVG/main" r:embed="rId13"/>
+              </a:ext>
+            </a:extLst>
+          </a:blip>
+          <a:stretch>
+            <a:fillRect/>
+          </a:stretch>
+        </p:blipFill>
+        <p:spPr>
+          <a:xfrm>
+            <a:off x="6084302" y="4114800"/>
+            <a:ext cx="469900" cy="469900"/>
+          </a:xfrm>
+          <a:prstGeom prst="rect">
+            <a:avLst/>
+          </a:prstGeom>
+        </p:spPr>
+      </p:pic>
+      <p:sp>
+        <p:nvSpPr>
+          <p:cNvPr id="48" name="TextBox 47">
+            <a:extLst>
+              <a:ext uri="{FF2B5EF4-FFF2-40B4-BE49-F238E27FC236}">
+                <a16:creationId xmlns:a16="http://schemas.microsoft.com/office/drawing/2014/main" id="{F90C1CC4-DFE6-0445-BD1C-DB610E1A07F5}"/>
+              </a:ext>
+            </a:extLst>
+          </p:cNvPr>
+          <p:cNvSpPr txBox="1"/>
+          <p:nvPr/>
+        </p:nvSpPr>
+        <p:spPr>
+          <a:xfrm>
+            <a:off x="5573295" y="4580773"/>
+            <a:ext cx="1513305" cy="646331"/>
+          </a:xfrm>
+          <a:prstGeom prst="rect">
+            <a:avLst/>
+          </a:prstGeom>
+          <a:noFill/>
+        </p:spPr>
+        <p:txBody>
+          <a:bodyPr wrap="square" rtlCol="0">
+            <a:spAutoFit/>
+          </a:bodyPr>
+          <a:lstStyle/>
+          <a:p>
+            <a:pPr algn="ctr"/>
+            <a:r>
+              <a:rPr lang="en-US" sz="1200" dirty="0" smtClean="0">
+                <a:latin typeface="Arial" panose="020B0604020202020204" pitchFamily="34" charset="0"/>
+                <a:ea typeface="Amazon Ember" panose="020B0603020204020204" pitchFamily="34" charset="0"/>
+                <a:cs typeface="Arial" panose="020B0604020202020204" pitchFamily="34" charset="0"/>
+              </a:rPr>
+              <a:t>SQL </a:t>
+            </a:r>
+            <a:r>
+              <a:rPr lang="en-US" sz="1200" dirty="0" smtClean="0">
+                <a:latin typeface="Arial" panose="020B0604020202020204" pitchFamily="34" charset="0"/>
+                <a:ea typeface="Amazon Ember" panose="020B0603020204020204" pitchFamily="34" charset="0"/>
+                <a:cs typeface="Arial" panose="020B0604020202020204" pitchFamily="34" charset="0"/>
+              </a:rPr>
+              <a:t>Server node with SIOS DataKeeper</a:t>
+            </a:r>
+            <a:endParaRPr lang="en-US" sz="1200" dirty="0">
+              <a:latin typeface="Arial" panose="020B0604020202020204" pitchFamily="34" charset="0"/>
+              <a:ea typeface="Amazon Ember" panose="020B0603020204020204" pitchFamily="34" charset="0"/>
+              <a:cs typeface="Arial" panose="020B0604020202020204" pitchFamily="34" charset="0"/>
+            </a:endParaRPr>
+          </a:p>
+        </p:txBody>
+      </p:sp>
+    </p:spTree>
+    <p:extLst>
+      <p:ext uri="{BB962C8B-B14F-4D97-AF65-F5344CB8AC3E}">
+        <p14:creationId xmlns:p14="http://schemas.microsoft.com/office/powerpoint/2010/main" val="477280031"/>
+      </p:ext>
+    </p:extLst>
+  </p:cSld>
+  <p:clrMapOvr>
+    <a:masterClrMapping/>
+  </p:clrMapOvr>
+</p:sld>
+</file>
+
+<file path=ppt/slides/slide3.xml><?xml version="1.0" encoding="utf-8"?>
+<p:sld xmlns:a="http://schemas.openxmlformats.org/drawingml/2006/main" xmlns:r="http://schemas.openxmlformats.org/officeDocument/2006/relationships" xmlns:p="http://schemas.openxmlformats.org/presentationml/2006/main">
+  <p:cSld>
+    <p:spTree>
+      <p:nvGrpSpPr>
+        <p:cNvPr id="1" name=""/>
+        <p:cNvGrpSpPr/>
+        <p:nvPr/>
+      </p:nvGrpSpPr>
+      <p:grpSpPr>
+        <a:xfrm>
+          <a:off x="0" y="0"/>
+          <a:ext cx="0" cy="0"/>
+          <a:chOff x="0" y="0"/>
+          <a:chExt cx="0" cy="0"/>
+        </a:xfrm>
+      </p:grpSpPr>
+      <p:sp>
+        <p:nvSpPr>
+          <p:cNvPr id="4" name="Rectangle 3">
+            <a:extLst>
+              <a:ext uri="{FF2B5EF4-FFF2-40B4-BE49-F238E27FC236}">
+                <a16:creationId xmlns:a16="http://schemas.microsoft.com/office/drawing/2014/main" id="{CE7F7081-419C-2E4F-A999-2923C4338FC0}"/>
+              </a:ext>
+            </a:extLst>
+          </p:cNvPr>
+          <p:cNvSpPr/>
+          <p:nvPr/>
+        </p:nvSpPr>
+        <p:spPr>
+          <a:xfrm>
+            <a:off x="588108" y="609600"/>
+            <a:ext cx="9241692" cy="5029200"/>
+          </a:xfrm>
+          <a:prstGeom prst="rect">
+            <a:avLst/>
+          </a:prstGeom>
+          <a:noFill/>
+          <a:ln w="12700">
+            <a:solidFill>
+              <a:schemeClr val="tx1"/>
+            </a:solidFill>
+          </a:ln>
+        </p:spPr>
+        <p:style>
+          <a:lnRef idx="2">
+            <a:schemeClr val="accent1">
+              <a:shade val="50000"/>
+            </a:schemeClr>
+          </a:lnRef>
+          <a:fillRef idx="1">
+            <a:schemeClr val="accent1"/>
+          </a:fillRef>
+          <a:effectRef idx="0">
+            <a:schemeClr val="accent1"/>
+          </a:effectRef>
+          <a:fontRef idx="minor">
+            <a:schemeClr val="lt1"/>
+          </a:fontRef>
+        </p:style>
+        <p:txBody>
+          <a:bodyPr rot="0" spcFirstLastPara="0" vertOverflow="overflow" horzOverflow="overflow" vert="horz" wrap="square" lIns="457200" tIns="91440" rIns="91440" bIns="45720" numCol="1" spcCol="0" rtlCol="0" fromWordArt="0" anchor="t" anchorCtr="0" forceAA="0" compatLnSpc="1">
+            <a:prstTxWarp prst="textNoShape">
+              <a:avLst/>
+            </a:prstTxWarp>
+            <a:noAutofit/>
+          </a:bodyPr>
+          <a:lstStyle/>
+          <a:p>
+            <a:pPr algn="l"/>
+            <a:r>
+              <a:rPr lang="en-US" sz="1200" dirty="0">
+                <a:solidFill>
+                  <a:sysClr val="windowText" lastClr="000000"/>
+                </a:solidFill>
+                <a:latin typeface="Arial" panose="020B0604020202020204" pitchFamily="34" charset="0"/>
+                <a:ea typeface="Amazon Ember" panose="020B0603020204020204" pitchFamily="34" charset="0"/>
+                <a:cs typeface="Arial" panose="020B0604020202020204" pitchFamily="34" charset="0"/>
+              </a:rPr>
+              <a:t>AWS Cloud</a:t>
+            </a:r>
+          </a:p>
+        </p:txBody>
+      </p:sp>
+      <p:pic>
+        <p:nvPicPr>
+          <p:cNvPr id="5" name="Graphic 11">
+            <a:extLst>
+              <a:ext uri="{FF2B5EF4-FFF2-40B4-BE49-F238E27FC236}">
+                <a16:creationId xmlns:a16="http://schemas.microsoft.com/office/drawing/2014/main" id="{CE52C9D7-11B0-9E41-AB16-2C9849C3ECBE}"/>
+              </a:ext>
+            </a:extLst>
+          </p:cNvPr>
+          <p:cNvPicPr>
+            <a:picLocks noChangeAspect="1"/>
+          </p:cNvPicPr>
+          <p:nvPr/>
+        </p:nvPicPr>
+        <p:blipFill>
+          <a:blip r:embed="rId2">
+            <a:extLst>
+              <a:ext uri="{96DAC541-7B7A-43D3-8B79-37D633B846F1}">
+                <asvg:svgBlip xmlns="" xmlns:asvg="http://schemas.microsoft.com/office/drawing/2016/SVG/main" r:embed="rId3"/>
+              </a:ext>
+            </a:extLst>
+          </a:blip>
+          <a:stretch>
+            <a:fillRect/>
+          </a:stretch>
+        </p:blipFill>
+        <p:spPr>
+          <a:xfrm>
+            <a:off x="588108" y="609600"/>
+            <a:ext cx="330200" cy="330200"/>
+          </a:xfrm>
+          <a:prstGeom prst="rect">
+            <a:avLst/>
+          </a:prstGeom>
+        </p:spPr>
+      </p:pic>
+      <p:sp>
+        <p:nvSpPr>
+          <p:cNvPr id="6" name="Rectangle 5">
+            <a:extLst>
+              <a:ext uri="{FF2B5EF4-FFF2-40B4-BE49-F238E27FC236}">
+                <a16:creationId xmlns:a16="http://schemas.microsoft.com/office/drawing/2014/main" id="{E25F190B-F12E-614B-827A-566AC09E9D97}"/>
+              </a:ext>
+            </a:extLst>
+          </p:cNvPr>
+          <p:cNvSpPr/>
+          <p:nvPr/>
+        </p:nvSpPr>
+        <p:spPr>
+          <a:xfrm>
+            <a:off x="1583496" y="1600200"/>
+            <a:ext cx="2471811" cy="1447800"/>
+          </a:xfrm>
+          <a:prstGeom prst="rect">
+            <a:avLst/>
+          </a:prstGeom>
+          <a:solidFill>
+            <a:srgbClr val="1D8900">
+              <a:alpha val="9804"/>
+            </a:srgbClr>
+          </a:solidFill>
+          <a:ln w="12700">
+            <a:noFill/>
+            <a:prstDash val="dash"/>
+          </a:ln>
+        </p:spPr>
+        <p:style>
+          <a:lnRef idx="2">
+            <a:schemeClr val="accent1">
+              <a:shade val="50000"/>
+            </a:schemeClr>
+          </a:lnRef>
+          <a:fillRef idx="1">
+            <a:schemeClr val="accent1"/>
+          </a:fillRef>
+          <a:effectRef idx="0">
+            <a:schemeClr val="accent1"/>
+          </a:effectRef>
+          <a:fontRef idx="minor">
+            <a:schemeClr val="lt1"/>
+          </a:fontRef>
+        </p:style>
+        <p:txBody>
+          <a:bodyPr rot="0" spcFirstLastPara="0" vertOverflow="overflow" horzOverflow="overflow" vert="horz" wrap="square" lIns="338328" tIns="45720" rIns="91440" bIns="45720" numCol="1" spcCol="0" rtlCol="0" fromWordArt="0" anchor="t" anchorCtr="0" forceAA="0" compatLnSpc="1">
+            <a:prstTxWarp prst="textNoShape">
+              <a:avLst/>
+            </a:prstTxWarp>
+            <a:noAutofit/>
+          </a:bodyPr>
+          <a:lstStyle/>
+          <a:p>
+            <a:pPr algn="l"/>
+            <a:r>
+              <a:rPr lang="en-US" sz="1200" dirty="0">
+                <a:solidFill>
+                  <a:schemeClr val="accent6"/>
+                </a:solidFill>
+                <a:latin typeface="Arial" panose="020B0604020202020204" pitchFamily="34" charset="0"/>
+                <a:ea typeface="Amazon Ember" panose="020B0603020204020204" pitchFamily="34" charset="0"/>
+                <a:cs typeface="Arial" panose="020B0604020202020204" pitchFamily="34" charset="0"/>
+              </a:rPr>
+              <a:t>Public subnet</a:t>
+            </a:r>
+          </a:p>
+          <a:p>
+            <a:pPr algn="l"/>
+            <a:endParaRPr lang="en-US" sz="1200" dirty="0">
+              <a:solidFill>
+                <a:schemeClr val="accent5"/>
+              </a:solidFill>
+              <a:latin typeface="Arial" panose="020B0604020202020204" pitchFamily="34" charset="0"/>
+              <a:ea typeface="Amazon Ember" panose="020B0603020204020204" pitchFamily="34" charset="0"/>
+              <a:cs typeface="Arial" panose="020B0604020202020204" pitchFamily="34" charset="0"/>
+            </a:endParaRPr>
+          </a:p>
+        </p:txBody>
+      </p:sp>
+      <p:pic>
+        <p:nvPicPr>
+          <p:cNvPr id="7" name="Graphic 10">
+            <a:extLst>
+              <a:ext uri="{FF2B5EF4-FFF2-40B4-BE49-F238E27FC236}">
+                <a16:creationId xmlns:a16="http://schemas.microsoft.com/office/drawing/2014/main" id="{89B99B74-19F0-0B4B-85E3-A09DF2519E46}"/>
+              </a:ext>
+            </a:extLst>
+          </p:cNvPr>
+          <p:cNvPicPr>
+            <a:picLocks noChangeAspect="1"/>
+          </p:cNvPicPr>
+          <p:nvPr/>
+        </p:nvPicPr>
+        <p:blipFill>
+          <a:blip r:embed="rId4">
+            <a:extLst>
+              <a:ext uri="{96DAC541-7B7A-43D3-8B79-37D633B846F1}">
+                <asvg:svgBlip xmlns="" xmlns:asvg="http://schemas.microsoft.com/office/drawing/2016/SVG/main" r:embed="rId7"/>
+              </a:ext>
+            </a:extLst>
+          </a:blip>
+          <a:stretch>
+            <a:fillRect/>
+          </a:stretch>
+        </p:blipFill>
+        <p:spPr>
+          <a:xfrm>
+            <a:off x="1584816" y="1600200"/>
+            <a:ext cx="274320" cy="274320"/>
+          </a:xfrm>
+          <a:prstGeom prst="rect">
+            <a:avLst/>
+          </a:prstGeom>
+        </p:spPr>
+      </p:pic>
+      <p:sp>
+        <p:nvSpPr>
+          <p:cNvPr id="8" name="Rectangle 7">
+            <a:extLst>
+              <a:ext uri="{FF2B5EF4-FFF2-40B4-BE49-F238E27FC236}">
+                <a16:creationId xmlns:a16="http://schemas.microsoft.com/office/drawing/2014/main" id="{A85485B4-AA18-C048-B92A-A9A0F4372B98}"/>
+              </a:ext>
+            </a:extLst>
+          </p:cNvPr>
+          <p:cNvSpPr/>
+          <p:nvPr/>
+        </p:nvSpPr>
+        <p:spPr>
+          <a:xfrm>
+            <a:off x="1584961" y="3124200"/>
+            <a:ext cx="2468880" cy="2179104"/>
+          </a:xfrm>
+          <a:prstGeom prst="rect">
+            <a:avLst/>
+          </a:prstGeom>
+          <a:solidFill>
+            <a:srgbClr val="007CBC">
+              <a:alpha val="9804"/>
+            </a:srgbClr>
+          </a:solidFill>
+          <a:ln w="12700">
+            <a:noFill/>
+            <a:prstDash val="dash"/>
+          </a:ln>
+        </p:spPr>
+        <p:style>
+          <a:lnRef idx="2">
+            <a:schemeClr val="accent1">
+              <a:shade val="50000"/>
+            </a:schemeClr>
+          </a:lnRef>
+          <a:fillRef idx="1">
+            <a:schemeClr val="accent1"/>
+          </a:fillRef>
+          <a:effectRef idx="0">
+            <a:schemeClr val="accent1"/>
+          </a:effectRef>
+          <a:fontRef idx="minor">
+            <a:schemeClr val="lt1"/>
+          </a:fontRef>
+        </p:style>
+        <p:txBody>
+          <a:bodyPr rot="0" spcFirstLastPara="0" vertOverflow="overflow" horzOverflow="overflow" vert="horz" wrap="square" lIns="338328" tIns="45720" rIns="91440" bIns="45720" numCol="1" spcCol="0" rtlCol="0" fromWordArt="0" anchor="t" anchorCtr="0" forceAA="0" compatLnSpc="1">
+            <a:prstTxWarp prst="textNoShape">
+              <a:avLst/>
+            </a:prstTxWarp>
+            <a:noAutofit/>
+          </a:bodyPr>
+          <a:lstStyle/>
+          <a:p>
+            <a:pPr algn="l"/>
+            <a:r>
+              <a:rPr lang="en-US" sz="1200" dirty="0">
+                <a:solidFill>
+                  <a:schemeClr val="accent1"/>
+                </a:solidFill>
+                <a:latin typeface="Arial" panose="020B0604020202020204" pitchFamily="34" charset="0"/>
+                <a:ea typeface="Amazon Ember" panose="020B0603020204020204" pitchFamily="34" charset="0"/>
+                <a:cs typeface="Arial" panose="020B0604020202020204" pitchFamily="34" charset="0"/>
+              </a:rPr>
+              <a:t>Private subnet</a:t>
+            </a:r>
+          </a:p>
+          <a:p>
+            <a:pPr algn="l"/>
+            <a:endParaRPr lang="en-US" sz="1200" dirty="0">
+              <a:solidFill>
+                <a:schemeClr val="accent3"/>
+              </a:solidFill>
+              <a:latin typeface="Arial" panose="020B0604020202020204" pitchFamily="34" charset="0"/>
+              <a:ea typeface="Amazon Ember" panose="020B0603020204020204" pitchFamily="34" charset="0"/>
+              <a:cs typeface="Arial" panose="020B0604020202020204" pitchFamily="34" charset="0"/>
+            </a:endParaRPr>
+          </a:p>
+        </p:txBody>
+      </p:sp>
+      <p:pic>
+        <p:nvPicPr>
+          <p:cNvPr id="9" name="Graphic 13">
+            <a:extLst>
+              <a:ext uri="{FF2B5EF4-FFF2-40B4-BE49-F238E27FC236}">
+                <a16:creationId xmlns:a16="http://schemas.microsoft.com/office/drawing/2014/main" id="{3BD31095-C7B2-C24A-9990-6F9E14956A7B}"/>
+              </a:ext>
+            </a:extLst>
+          </p:cNvPr>
+          <p:cNvPicPr>
+            <a:picLocks noChangeAspect="1"/>
+          </p:cNvPicPr>
+          <p:nvPr/>
+        </p:nvPicPr>
+        <p:blipFill>
+          <a:blip r:embed="rId8">
+            <a:extLst>
+              <a:ext uri="{96DAC541-7B7A-43D3-8B79-37D633B846F1}">
+                <asvg:svgBlip xmlns="" xmlns:asvg="http://schemas.microsoft.com/office/drawing/2016/SVG/main" r:embed="rId9"/>
+              </a:ext>
+            </a:extLst>
+          </a:blip>
+          <a:stretch>
+            <a:fillRect/>
+          </a:stretch>
+        </p:blipFill>
+        <p:spPr>
+          <a:xfrm>
+            <a:off x="1584816" y="3129760"/>
+            <a:ext cx="274320" cy="274320"/>
+          </a:xfrm>
+          <a:prstGeom prst="rect">
+            <a:avLst/>
+          </a:prstGeom>
+        </p:spPr>
+      </p:pic>
+      <p:sp>
+        <p:nvSpPr>
+          <p:cNvPr id="10" name="Rectangle 9">
+            <a:extLst>
+              <a:ext uri="{FF2B5EF4-FFF2-40B4-BE49-F238E27FC236}">
+                <a16:creationId xmlns:a16="http://schemas.microsoft.com/office/drawing/2014/main" id="{25B2706C-95D8-A94F-9EC8-6497FA7FB136}"/>
+              </a:ext>
+            </a:extLst>
+          </p:cNvPr>
+          <p:cNvSpPr/>
+          <p:nvPr/>
+        </p:nvSpPr>
+        <p:spPr>
+          <a:xfrm>
+            <a:off x="2822991" y="1942075"/>
+            <a:ext cx="3696603" cy="978466"/>
+          </a:xfrm>
+          <a:prstGeom prst="rect">
+            <a:avLst/>
+          </a:prstGeom>
+          <a:noFill/>
+          <a:ln w="12700">
+            <a:solidFill>
+              <a:srgbClr val="D86613"/>
+            </a:solidFill>
+            <a:prstDash val="dash"/>
+          </a:ln>
+        </p:spPr>
+        <p:style>
+          <a:lnRef idx="2">
+            <a:schemeClr val="accent1">
+              <a:shade val="50000"/>
+            </a:schemeClr>
+          </a:lnRef>
+          <a:fillRef idx="1">
+            <a:schemeClr val="accent1"/>
+          </a:fillRef>
+          <a:effectRef idx="0">
+            <a:schemeClr val="accent1"/>
+          </a:effectRef>
+          <a:fontRef idx="minor">
+            <a:schemeClr val="lt1"/>
+          </a:fontRef>
+        </p:style>
+        <p:txBody>
+          <a:bodyPr rot="0" spcFirstLastPara="0" vertOverflow="overflow" horzOverflow="overflow" vert="horz" wrap="square" lIns="91440" tIns="91440" rIns="91440" bIns="45720" numCol="1" spcCol="0" rtlCol="0" fromWordArt="0" anchor="t" anchorCtr="0" forceAA="0" compatLnSpc="1">
+            <a:prstTxWarp prst="textNoShape">
+              <a:avLst/>
+            </a:prstTxWarp>
+            <a:noAutofit/>
+          </a:bodyPr>
+          <a:lstStyle/>
+          <a:p>
+            <a:pPr algn="ctr"/>
+            <a:endParaRPr lang="en-US" sz="1200" dirty="0">
+              <a:solidFill>
+                <a:srgbClr val="D86613"/>
+              </a:solidFill>
+              <a:latin typeface="Arial" panose="020B0604020202020204" pitchFamily="34" charset="0"/>
+              <a:ea typeface="Amazon Ember" panose="020B0603020204020204" pitchFamily="34" charset="0"/>
+              <a:cs typeface="Arial" panose="020B0604020202020204" pitchFamily="34" charset="0"/>
+            </a:endParaRPr>
+          </a:p>
+          <a:p>
+            <a:pPr algn="ctr"/>
+            <a:endParaRPr lang="en-US" sz="1200" dirty="0">
+              <a:solidFill>
+                <a:srgbClr val="D86613"/>
+              </a:solidFill>
+              <a:latin typeface="Arial" panose="020B0604020202020204" pitchFamily="34" charset="0"/>
+              <a:ea typeface="Amazon Ember" panose="020B0603020204020204" pitchFamily="34" charset="0"/>
+              <a:cs typeface="Arial" panose="020B0604020202020204" pitchFamily="34" charset="0"/>
+            </a:endParaRPr>
+          </a:p>
+          <a:p>
+            <a:pPr algn="ctr"/>
+            <a:r>
+              <a:rPr lang="en-US" sz="1200" dirty="0">
+                <a:solidFill>
+                  <a:srgbClr val="D86613"/>
+                </a:solidFill>
+                <a:latin typeface="Arial" panose="020B0604020202020204" pitchFamily="34" charset="0"/>
+                <a:ea typeface="Amazon Ember" panose="020B0603020204020204" pitchFamily="34" charset="0"/>
+                <a:cs typeface="Arial" panose="020B0604020202020204" pitchFamily="34" charset="0"/>
+              </a:rPr>
+              <a:t>Auto </a:t>
+            </a:r>
+            <a:r>
+              <a:rPr lang="en-US" sz="1200" dirty="0" smtClean="0">
+                <a:solidFill>
+                  <a:srgbClr val="D86613"/>
+                </a:solidFill>
+                <a:latin typeface="Arial" panose="020B0604020202020204" pitchFamily="34" charset="0"/>
+                <a:ea typeface="Amazon Ember" panose="020B0603020204020204" pitchFamily="34" charset="0"/>
+                <a:cs typeface="Arial" panose="020B0604020202020204" pitchFamily="34" charset="0"/>
+              </a:rPr>
+              <a:t>Scaling</a:t>
+            </a:r>
+          </a:p>
+          <a:p>
+            <a:pPr algn="ctr"/>
+            <a:r>
+              <a:rPr lang="en-US" sz="1200" dirty="0" smtClean="0">
+                <a:solidFill>
+                  <a:srgbClr val="D86613"/>
+                </a:solidFill>
+                <a:latin typeface="Arial" panose="020B0604020202020204" pitchFamily="34" charset="0"/>
+                <a:ea typeface="Amazon Ember" panose="020B0603020204020204" pitchFamily="34" charset="0"/>
+                <a:cs typeface="Arial" panose="020B0604020202020204" pitchFamily="34" charset="0"/>
+              </a:rPr>
+              <a:t>group</a:t>
+            </a:r>
+            <a:endParaRPr lang="en-US" sz="1200" dirty="0">
+              <a:solidFill>
+                <a:srgbClr val="D86613"/>
+              </a:solidFill>
+              <a:latin typeface="Arial" panose="020B0604020202020204" pitchFamily="34" charset="0"/>
+              <a:ea typeface="Amazon Ember" panose="020B0603020204020204" pitchFamily="34" charset="0"/>
+              <a:cs typeface="Arial" panose="020B0604020202020204" pitchFamily="34" charset="0"/>
+            </a:endParaRPr>
+          </a:p>
+        </p:txBody>
+      </p:sp>
+      <p:pic>
+        <p:nvPicPr>
+          <p:cNvPr id="11" name="Graphic 3">
+            <a:extLst>
+              <a:ext uri="{FF2B5EF4-FFF2-40B4-BE49-F238E27FC236}">
+                <a16:creationId xmlns:a16="http://schemas.microsoft.com/office/drawing/2014/main" id="{D7A7873E-A1CC-804E-816C-DC0FF152D82D}"/>
+              </a:ext>
+            </a:extLst>
+          </p:cNvPr>
+          <p:cNvPicPr>
+            <a:picLocks noChangeAspect="1"/>
+          </p:cNvPicPr>
+          <p:nvPr/>
+        </p:nvPicPr>
+        <p:blipFill>
+          <a:blip r:embed="rId10">
+            <a:extLst>
+              <a:ext uri="{96DAC541-7B7A-43D3-8B79-37D633B846F1}">
+                <asvg:svgBlip xmlns="" xmlns:asvg="http://schemas.microsoft.com/office/drawing/2016/SVG/main" r:embed="rId11"/>
+              </a:ext>
+            </a:extLst>
+          </a:blip>
+          <a:stretch>
+            <a:fillRect/>
+          </a:stretch>
+        </p:blipFill>
+        <p:spPr>
+          <a:xfrm>
+            <a:off x="4504503" y="1935264"/>
+            <a:ext cx="330200" cy="330200"/>
+          </a:xfrm>
+          <a:prstGeom prst="rect">
+            <a:avLst/>
+          </a:prstGeom>
+        </p:spPr>
+      </p:pic>
+      <p:pic>
+        <p:nvPicPr>
+          <p:cNvPr id="12" name="Graphic 135">
+            <a:extLst>
+              <a:ext uri="{FF2B5EF4-FFF2-40B4-BE49-F238E27FC236}">
+                <a16:creationId xmlns:a16="http://schemas.microsoft.com/office/drawing/2014/main" id="{C19987B1-DB3A-1640-994D-BCB81FCC1AE4}"/>
+              </a:ext>
+            </a:extLst>
+          </p:cNvPr>
+          <p:cNvPicPr>
+            <a:picLocks noChangeAspect="1"/>
+          </p:cNvPicPr>
+          <p:nvPr/>
+        </p:nvPicPr>
+        <p:blipFill>
+          <a:blip r:embed="rId12">
+            <a:extLst>
+              <a:ext uri="{96DAC541-7B7A-43D3-8B79-37D633B846F1}">
+                <asvg:svgBlip xmlns="" xmlns:asvg="http://schemas.microsoft.com/office/drawing/2016/SVG/main" r:embed="rId13"/>
+              </a:ext>
+            </a:extLst>
+          </a:blip>
+          <a:stretch>
+            <a:fillRect/>
+          </a:stretch>
+        </p:blipFill>
+        <p:spPr>
+          <a:xfrm>
+            <a:off x="3123197" y="2064381"/>
+            <a:ext cx="469900" cy="469900"/>
+          </a:xfrm>
+          <a:prstGeom prst="rect">
+            <a:avLst/>
+          </a:prstGeom>
+        </p:spPr>
+      </p:pic>
+      <p:sp>
+        <p:nvSpPr>
+          <p:cNvPr id="13" name="TextBox 12">
+            <a:extLst>
+              <a:ext uri="{FF2B5EF4-FFF2-40B4-BE49-F238E27FC236}">
+                <a16:creationId xmlns:a16="http://schemas.microsoft.com/office/drawing/2014/main" id="{F90C1CC4-DFE6-0445-BD1C-DB610E1A07F5}"/>
+              </a:ext>
+            </a:extLst>
+          </p:cNvPr>
+          <p:cNvSpPr txBox="1"/>
+          <p:nvPr/>
+        </p:nvSpPr>
+        <p:spPr>
+          <a:xfrm>
+            <a:off x="2601495" y="2540217"/>
+            <a:ext cx="1513305" cy="276999"/>
+          </a:xfrm>
+          <a:prstGeom prst="rect">
+            <a:avLst/>
+          </a:prstGeom>
+          <a:noFill/>
+        </p:spPr>
+        <p:txBody>
+          <a:bodyPr wrap="square" rtlCol="0">
+            <a:spAutoFit/>
+          </a:bodyPr>
+          <a:lstStyle/>
+          <a:p>
+            <a:pPr algn="ctr"/>
+            <a:r>
+              <a:rPr lang="en-US" sz="1200" dirty="0">
+                <a:latin typeface="Arial" panose="020B0604020202020204" pitchFamily="34" charset="0"/>
+                <a:ea typeface="Amazon Ember" panose="020B0603020204020204" pitchFamily="34" charset="0"/>
+                <a:cs typeface="Arial" panose="020B0604020202020204" pitchFamily="34" charset="0"/>
+              </a:rPr>
+              <a:t>RD Gateway</a:t>
+            </a:r>
+          </a:p>
+        </p:txBody>
+      </p:sp>
+      <p:sp>
+        <p:nvSpPr>
+          <p:cNvPr id="14" name="TextBox 13">
+            <a:extLst>
+              <a:ext uri="{FF2B5EF4-FFF2-40B4-BE49-F238E27FC236}">
+                <a16:creationId xmlns:a16="http://schemas.microsoft.com/office/drawing/2014/main" id="{517096B6-EF64-C245-A3E7-BEEF81BDCB9C}"/>
+              </a:ext>
+            </a:extLst>
+          </p:cNvPr>
+          <p:cNvSpPr txBox="1"/>
+          <p:nvPr/>
+        </p:nvSpPr>
+        <p:spPr>
+          <a:xfrm>
+            <a:off x="1665020" y="2542641"/>
+            <a:ext cx="1236442" cy="276999"/>
+          </a:xfrm>
+          <a:prstGeom prst="rect">
+            <a:avLst/>
+          </a:prstGeom>
+          <a:noFill/>
+        </p:spPr>
+        <p:txBody>
+          <a:bodyPr wrap="square" rtlCol="0">
+            <a:spAutoFit/>
+          </a:bodyPr>
+          <a:lstStyle/>
+          <a:p>
+            <a:pPr algn="ctr"/>
+            <a:r>
+              <a:rPr lang="en-US" sz="1200" dirty="0">
+                <a:latin typeface="Arial" panose="020B0604020202020204" pitchFamily="34" charset="0"/>
+                <a:ea typeface="Amazon Ember" panose="020B0603020204020204" pitchFamily="34" charset="0"/>
+                <a:cs typeface="Arial" panose="020B0604020202020204" pitchFamily="34" charset="0"/>
+              </a:rPr>
+              <a:t>NAT gateway</a:t>
+            </a:r>
+          </a:p>
+        </p:txBody>
+      </p:sp>
+      <p:pic>
+        <p:nvPicPr>
+          <p:cNvPr id="15" name="Graphic 40">
+            <a:extLst>
+              <a:ext uri="{FF2B5EF4-FFF2-40B4-BE49-F238E27FC236}">
+                <a16:creationId xmlns:a16="http://schemas.microsoft.com/office/drawing/2014/main" id="{C322592C-EAB9-0640-95A5-D8FF5B8E5FE6}"/>
+              </a:ext>
+            </a:extLst>
+          </p:cNvPr>
+          <p:cNvPicPr>
+            <a:picLocks noChangeAspect="1"/>
+          </p:cNvPicPr>
+          <p:nvPr/>
+        </p:nvPicPr>
+        <p:blipFill>
+          <a:blip r:embed="rId14">
+            <a:extLst>
+              <a:ext uri="{96DAC541-7B7A-43D3-8B79-37D633B846F1}">
+                <asvg:svgBlip xmlns="" xmlns:asvg="http://schemas.microsoft.com/office/drawing/2016/SVG/main" r:embed="rId17"/>
+              </a:ext>
+            </a:extLst>
+          </a:blip>
+          <a:stretch>
+            <a:fillRect/>
+          </a:stretch>
+        </p:blipFill>
+        <p:spPr>
+          <a:xfrm>
+            <a:off x="2048291" y="2064381"/>
+            <a:ext cx="469900" cy="469900"/>
+          </a:xfrm>
+          <a:prstGeom prst="rect">
+            <a:avLst/>
+          </a:prstGeom>
+        </p:spPr>
+      </p:pic>
+      <p:pic>
+        <p:nvPicPr>
+          <p:cNvPr id="16" name="Graphic 135">
+            <a:extLst>
+              <a:ext uri="{FF2B5EF4-FFF2-40B4-BE49-F238E27FC236}">
+                <a16:creationId xmlns:a16="http://schemas.microsoft.com/office/drawing/2014/main" id="{C19987B1-DB3A-1640-994D-BCB81FCC1AE4}"/>
+              </a:ext>
+            </a:extLst>
+          </p:cNvPr>
+          <p:cNvPicPr>
+            <a:picLocks noChangeAspect="1"/>
+          </p:cNvPicPr>
+          <p:nvPr/>
+        </p:nvPicPr>
+        <p:blipFill>
+          <a:blip r:embed="rId12">
+            <a:extLst>
+              <a:ext uri="{96DAC541-7B7A-43D3-8B79-37D633B846F1}">
+                <asvg:svgBlip xmlns="" xmlns:asvg="http://schemas.microsoft.com/office/drawing/2016/SVG/main" r:embed="rId13"/>
+              </a:ext>
+            </a:extLst>
+          </a:blip>
+          <a:stretch>
+            <a:fillRect/>
+          </a:stretch>
+        </p:blipFill>
+        <p:spPr>
+          <a:xfrm>
+            <a:off x="3112502" y="3446793"/>
+            <a:ext cx="469900" cy="469900"/>
+          </a:xfrm>
+          <a:prstGeom prst="rect">
+            <a:avLst/>
+          </a:prstGeom>
+        </p:spPr>
+      </p:pic>
+      <p:sp>
+        <p:nvSpPr>
+          <p:cNvPr id="17" name="TextBox 16">
+            <a:extLst>
+              <a:ext uri="{FF2B5EF4-FFF2-40B4-BE49-F238E27FC236}">
+                <a16:creationId xmlns:a16="http://schemas.microsoft.com/office/drawing/2014/main" id="{F90C1CC4-DFE6-0445-BD1C-DB610E1A07F5}"/>
+              </a:ext>
+            </a:extLst>
+          </p:cNvPr>
+          <p:cNvSpPr txBox="1"/>
+          <p:nvPr/>
+        </p:nvSpPr>
+        <p:spPr>
+          <a:xfrm>
+            <a:off x="2590800" y="3879300"/>
+            <a:ext cx="1513305" cy="276999"/>
+          </a:xfrm>
+          <a:prstGeom prst="rect">
+            <a:avLst/>
+          </a:prstGeom>
+          <a:noFill/>
+        </p:spPr>
+        <p:txBody>
+          <a:bodyPr wrap="square" rtlCol="0">
+            <a:spAutoFit/>
+          </a:bodyPr>
+          <a:lstStyle/>
+          <a:p>
+            <a:pPr algn="ctr"/>
+            <a:r>
+              <a:rPr lang="en-US" sz="1200" dirty="0" smtClean="0">
+                <a:latin typeface="Arial" panose="020B0604020202020204" pitchFamily="34" charset="0"/>
+                <a:ea typeface="Amazon Ember" panose="020B0603020204020204" pitchFamily="34" charset="0"/>
+                <a:cs typeface="Arial" panose="020B0604020202020204" pitchFamily="34" charset="0"/>
+              </a:rPr>
+              <a:t>Domain controller</a:t>
+            </a:r>
+            <a:endParaRPr lang="en-US" sz="1200" dirty="0">
+              <a:latin typeface="Arial" panose="020B0604020202020204" pitchFamily="34" charset="0"/>
+              <a:ea typeface="Amazon Ember" panose="020B0603020204020204" pitchFamily="34" charset="0"/>
+              <a:cs typeface="Arial" panose="020B0604020202020204" pitchFamily="34" charset="0"/>
+            </a:endParaRPr>
+          </a:p>
+        </p:txBody>
+      </p:sp>
+      <p:pic>
+        <p:nvPicPr>
+          <p:cNvPr id="28" name="Graphic 17">
+            <a:extLst>
+              <a:ext uri="{FF2B5EF4-FFF2-40B4-BE49-F238E27FC236}">
+                <a16:creationId xmlns:a16="http://schemas.microsoft.com/office/drawing/2014/main" id="{633BC3DF-5160-6843-B872-94C5C92E5BF4}"/>
+              </a:ext>
+            </a:extLst>
+          </p:cNvPr>
+          <p:cNvPicPr>
+            <a:picLocks noChangeAspect="1" noChangeArrowheads="1"/>
+          </p:cNvPicPr>
+          <p:nvPr/>
+        </p:nvPicPr>
+        <p:blipFill>
+          <a:blip r:embed="rId18" cstate="print">
+            <a:extLst>
+              <a:ext uri="{28A0092B-C50C-407E-A947-70E740481C1C}">
+                <a14:useLocalDpi xmlns:a14="http://schemas.microsoft.com/office/drawing/2010/main" val="0"/>
+              </a:ext>
+            </a:extLst>
+          </a:blip>
+          <a:srcRect/>
+          <a:stretch>
+            <a:fillRect/>
+          </a:stretch>
+        </p:blipFill>
+        <p:spPr bwMode="auto">
+          <a:xfrm>
+            <a:off x="8546202" y="1975995"/>
+            <a:ext cx="762000" cy="762000"/>
+          </a:xfrm>
+          <a:prstGeom prst="rect">
+            <a:avLst/>
+          </a:prstGeom>
+          <a:noFill/>
+          <a:ln>
+            <a:noFill/>
+          </a:ln>
+          <a:extLst>
+            <a:ext uri="{909E8E84-426E-40DD-AFC4-6F175D3DCCD1}">
+              <a14:hiddenFill xmlns:a14="http://schemas.microsoft.com/office/drawing/2010/main">
+                <a:solidFill>
+                  <a:srgbClr val="FFFFFF"/>
+                </a:solidFill>
+              </a14:hiddenFill>
+            </a:ext>
+            <a:ext uri="{91240B29-F687-4F45-9708-019B960494DF}">
+              <a14:hiddenLine xmlns:a14="http://schemas.microsoft.com/office/drawing/2010/main" w="9525">
+                <a:solidFill>
+                  <a:srgbClr val="000000"/>
+                </a:solidFill>
+                <a:miter lim="800000"/>
+                <a:headEnd/>
+                <a:tailEnd/>
+              </a14:hiddenLine>
+            </a:ext>
+          </a:extLst>
+        </p:spPr>
+      </p:pic>
+      <p:sp>
+        <p:nvSpPr>
+          <p:cNvPr id="29" name="TextBox 11">
+            <a:extLst>
+              <a:ext uri="{FF2B5EF4-FFF2-40B4-BE49-F238E27FC236}">
+                <a16:creationId xmlns:a16="http://schemas.microsoft.com/office/drawing/2014/main" id="{BBEC601B-D650-7947-9D7F-6579E2990B06}"/>
+              </a:ext>
+            </a:extLst>
+          </p:cNvPr>
+          <p:cNvSpPr txBox="1">
+            <a:spLocks noChangeArrowheads="1"/>
+          </p:cNvSpPr>
+          <p:nvPr/>
+        </p:nvSpPr>
+        <p:spPr bwMode="auto">
+          <a:xfrm>
+            <a:off x="7788965" y="2737995"/>
+            <a:ext cx="2292350" cy="276999"/>
+          </a:xfrm>
+          <a:prstGeom prst="rect">
+            <a:avLst/>
+          </a:prstGeom>
+          <a:noFill/>
+          <a:ln>
+            <a:noFill/>
+          </a:ln>
+          <a:extLst>
+            <a:ext uri="{909E8E84-426E-40DD-AFC4-6F175D3DCCD1}">
+              <a14:hiddenFill xmlns:a14="http://schemas.microsoft.com/office/drawing/2010/main">
+                <a:solidFill>
+                  <a:srgbClr val="FFFFFF"/>
+                </a:solidFill>
+              </a14:hiddenFill>
+            </a:ext>
+            <a:ext uri="{91240B29-F687-4F45-9708-019B960494DF}">
+              <a14:hiddenLine xmlns:a14="http://schemas.microsoft.com/office/drawing/2010/main" w="9525">
+                <a:solidFill>
+                  <a:srgbClr val="000000"/>
+                </a:solidFill>
+                <a:miter lim="800000"/>
+                <a:headEnd/>
+                <a:tailEnd/>
+              </a14:hiddenLine>
+            </a:ext>
+          </a:extLst>
+        </p:spPr>
+        <p:txBody>
+          <a:bodyPr>
+            <a:spAutoFit/>
+          </a:bodyPr>
+          <a:lstStyle>
+            <a:lvl1pPr>
+              <a:defRPr>
+                <a:solidFill>
+                  <a:schemeClr val="tx1"/>
+                </a:solidFill>
+                <a:latin typeface="Calibri" panose="020F0502020204030204" pitchFamily="34" charset="0"/>
+              </a:defRPr>
+            </a:lvl1pPr>
+            <a:lvl2pPr marL="742950" indent="-285750">
+              <a:defRPr>
+                <a:solidFill>
+                  <a:schemeClr val="tx1"/>
+                </a:solidFill>
+                <a:latin typeface="Calibri" panose="020F0502020204030204" pitchFamily="34" charset="0"/>
+              </a:defRPr>
+            </a:lvl2pPr>
+            <a:lvl3pPr marL="1143000" indent="-228600">
+              <a:defRPr>
+                <a:solidFill>
+                  <a:schemeClr val="tx1"/>
+                </a:solidFill>
+                <a:latin typeface="Calibri" panose="020F0502020204030204" pitchFamily="34" charset="0"/>
+              </a:defRPr>
+            </a:lvl3pPr>
+            <a:lvl4pPr marL="1600200" indent="-228600">
+              <a:defRPr>
+                <a:solidFill>
+                  <a:schemeClr val="tx1"/>
+                </a:solidFill>
+                <a:latin typeface="Calibri" panose="020F0502020204030204" pitchFamily="34" charset="0"/>
+              </a:defRPr>
+            </a:lvl4pPr>
+            <a:lvl5pPr marL="2057400" indent="-228600">
+              <a:defRPr>
+                <a:solidFill>
+                  <a:schemeClr val="tx1"/>
+                </a:solidFill>
+                <a:latin typeface="Calibri" panose="020F0502020204030204" pitchFamily="34" charset="0"/>
+              </a:defRPr>
+            </a:lvl5pPr>
+            <a:lvl6pPr marL="2514600" indent="-228600" eaLnBrk="0" fontAlgn="base" hangingPunct="0">
+              <a:spcBef>
+                <a:spcPct val="0"/>
+              </a:spcBef>
+              <a:spcAft>
+                <a:spcPct val="0"/>
+              </a:spcAft>
+              <a:defRPr>
+                <a:solidFill>
+                  <a:schemeClr val="tx1"/>
+                </a:solidFill>
+                <a:latin typeface="Calibri" panose="020F0502020204030204" pitchFamily="34" charset="0"/>
+              </a:defRPr>
+            </a:lvl6pPr>
+            <a:lvl7pPr marL="2971800" indent="-228600" eaLnBrk="0" fontAlgn="base" hangingPunct="0">
+              <a:spcBef>
+                <a:spcPct val="0"/>
+              </a:spcBef>
+              <a:spcAft>
+                <a:spcPct val="0"/>
+              </a:spcAft>
+              <a:defRPr>
+                <a:solidFill>
+                  <a:schemeClr val="tx1"/>
+                </a:solidFill>
+                <a:latin typeface="Calibri" panose="020F0502020204030204" pitchFamily="34" charset="0"/>
+              </a:defRPr>
+            </a:lvl7pPr>
+            <a:lvl8pPr marL="3429000" indent="-228600" eaLnBrk="0" fontAlgn="base" hangingPunct="0">
+              <a:spcBef>
+                <a:spcPct val="0"/>
+              </a:spcBef>
+              <a:spcAft>
+                <a:spcPct val="0"/>
+              </a:spcAft>
+              <a:defRPr>
+                <a:solidFill>
+                  <a:schemeClr val="tx1"/>
+                </a:solidFill>
+                <a:latin typeface="Calibri" panose="020F0502020204030204" pitchFamily="34" charset="0"/>
+              </a:defRPr>
+            </a:lvl8pPr>
+            <a:lvl9pPr marL="3886200" indent="-228600" eaLnBrk="0" fontAlgn="base" hangingPunct="0">
+              <a:spcBef>
+                <a:spcPct val="0"/>
+              </a:spcBef>
+              <a:spcAft>
+                <a:spcPct val="0"/>
+              </a:spcAft>
+              <a:defRPr>
+                <a:solidFill>
+                  <a:schemeClr val="tx1"/>
+                </a:solidFill>
+                <a:latin typeface="Calibri" panose="020F0502020204030204" pitchFamily="34" charset="0"/>
+              </a:defRPr>
+            </a:lvl9pPr>
+          </a:lstStyle>
+          <a:p>
+            <a:pPr algn="ctr" eaLnBrk="1" hangingPunct="1"/>
+            <a:r>
+              <a:rPr lang="en-US" altLang="en-US" sz="1200" dirty="0">
+                <a:latin typeface="Arial" panose="020B0604020202020204" pitchFamily="34" charset="0"/>
+                <a:ea typeface="Amazon Ember" panose="020B0603020204020204" pitchFamily="34" charset="0"/>
+                <a:cs typeface="Arial" panose="020B0604020202020204" pitchFamily="34" charset="0"/>
+              </a:rPr>
+              <a:t>AWS Secrets Manager</a:t>
+            </a:r>
+          </a:p>
+        </p:txBody>
+      </p:sp>
+      <p:pic>
+        <p:nvPicPr>
+          <p:cNvPr id="30" name="Graphic 15">
+            <a:extLst>
+              <a:ext uri="{FF2B5EF4-FFF2-40B4-BE49-F238E27FC236}">
+                <a16:creationId xmlns:a16="http://schemas.microsoft.com/office/drawing/2014/main" id="{3A010F8A-DF9B-CA43-8D41-3A122544E272}"/>
+              </a:ext>
+            </a:extLst>
+          </p:cNvPr>
+          <p:cNvPicPr>
+            <a:picLocks noChangeAspect="1" noChangeArrowheads="1"/>
+          </p:cNvPicPr>
+          <p:nvPr/>
+        </p:nvPicPr>
+        <p:blipFill>
+          <a:blip r:embed="rId19" cstate="print">
+            <a:extLst>
+              <a:ext uri="{28A0092B-C50C-407E-A947-70E740481C1C}">
+                <a14:useLocalDpi xmlns:a14="http://schemas.microsoft.com/office/drawing/2010/main" val="0"/>
+              </a:ext>
+            </a:extLst>
+          </a:blip>
+          <a:srcRect/>
+          <a:stretch>
+            <a:fillRect/>
+          </a:stretch>
+        </p:blipFill>
+        <p:spPr bwMode="auto">
+          <a:xfrm>
+            <a:off x="8552820" y="3297362"/>
+            <a:ext cx="762000" cy="762000"/>
+          </a:xfrm>
+          <a:prstGeom prst="rect">
+            <a:avLst/>
+          </a:prstGeom>
+          <a:noFill/>
+          <a:ln>
+            <a:noFill/>
+          </a:ln>
+          <a:extLst>
+            <a:ext uri="{909E8E84-426E-40DD-AFC4-6F175D3DCCD1}">
+              <a14:hiddenFill xmlns:a14="http://schemas.microsoft.com/office/drawing/2010/main">
+                <a:solidFill>
+                  <a:srgbClr val="FFFFFF"/>
+                </a:solidFill>
+              </a14:hiddenFill>
+            </a:ext>
+            <a:ext uri="{91240B29-F687-4F45-9708-019B960494DF}">
+              <a14:hiddenLine xmlns:a14="http://schemas.microsoft.com/office/drawing/2010/main" w="9525">
+                <a:solidFill>
+                  <a:srgbClr val="000000"/>
+                </a:solidFill>
+                <a:miter lim="800000"/>
+                <a:headEnd/>
+                <a:tailEnd/>
+              </a14:hiddenLine>
+            </a:ext>
+          </a:extLst>
+        </p:spPr>
+      </p:pic>
+      <p:sp>
+        <p:nvSpPr>
+          <p:cNvPr id="31" name="TextBox 11">
+            <a:extLst>
+              <a:ext uri="{FF2B5EF4-FFF2-40B4-BE49-F238E27FC236}">
+                <a16:creationId xmlns:a16="http://schemas.microsoft.com/office/drawing/2014/main" id="{EE7EF599-CC93-1843-94CE-F010641A8D23}"/>
+              </a:ext>
+            </a:extLst>
+          </p:cNvPr>
+          <p:cNvSpPr txBox="1">
+            <a:spLocks noChangeArrowheads="1"/>
+          </p:cNvSpPr>
+          <p:nvPr/>
+        </p:nvSpPr>
+        <p:spPr bwMode="auto">
+          <a:xfrm>
+            <a:off x="7793995" y="4050555"/>
+            <a:ext cx="2292350" cy="276999"/>
+          </a:xfrm>
+          <a:prstGeom prst="rect">
+            <a:avLst/>
+          </a:prstGeom>
+          <a:noFill/>
+          <a:ln>
+            <a:noFill/>
+          </a:ln>
+          <a:extLst>
+            <a:ext uri="{909E8E84-426E-40DD-AFC4-6F175D3DCCD1}">
+              <a14:hiddenFill xmlns:a14="http://schemas.microsoft.com/office/drawing/2010/main">
+                <a:solidFill>
+                  <a:srgbClr val="FFFFFF"/>
+                </a:solidFill>
+              </a14:hiddenFill>
+            </a:ext>
+            <a:ext uri="{91240B29-F687-4F45-9708-019B960494DF}">
+              <a14:hiddenLine xmlns:a14="http://schemas.microsoft.com/office/drawing/2010/main" w="9525">
+                <a:solidFill>
+                  <a:srgbClr val="000000"/>
+                </a:solidFill>
+                <a:miter lim="800000"/>
+                <a:headEnd/>
+                <a:tailEnd/>
+              </a14:hiddenLine>
+            </a:ext>
+          </a:extLst>
+        </p:spPr>
+        <p:txBody>
+          <a:bodyPr>
+            <a:spAutoFit/>
+          </a:bodyPr>
+          <a:lstStyle>
+            <a:lvl1pPr>
+              <a:defRPr>
+                <a:solidFill>
+                  <a:schemeClr val="tx1"/>
+                </a:solidFill>
+                <a:latin typeface="Calibri" panose="020F0502020204030204" pitchFamily="34" charset="0"/>
+              </a:defRPr>
+            </a:lvl1pPr>
+            <a:lvl2pPr marL="742950" indent="-285750">
+              <a:defRPr>
+                <a:solidFill>
+                  <a:schemeClr val="tx1"/>
+                </a:solidFill>
+                <a:latin typeface="Calibri" panose="020F0502020204030204" pitchFamily="34" charset="0"/>
+              </a:defRPr>
+            </a:lvl2pPr>
+            <a:lvl3pPr marL="1143000" indent="-228600">
+              <a:defRPr>
+                <a:solidFill>
+                  <a:schemeClr val="tx1"/>
+                </a:solidFill>
+                <a:latin typeface="Calibri" panose="020F0502020204030204" pitchFamily="34" charset="0"/>
+              </a:defRPr>
+            </a:lvl3pPr>
+            <a:lvl4pPr marL="1600200" indent="-228600">
+              <a:defRPr>
+                <a:solidFill>
+                  <a:schemeClr val="tx1"/>
+                </a:solidFill>
+                <a:latin typeface="Calibri" panose="020F0502020204030204" pitchFamily="34" charset="0"/>
+              </a:defRPr>
+            </a:lvl4pPr>
+            <a:lvl5pPr marL="2057400" indent="-228600">
+              <a:defRPr>
+                <a:solidFill>
+                  <a:schemeClr val="tx1"/>
+                </a:solidFill>
+                <a:latin typeface="Calibri" panose="020F0502020204030204" pitchFamily="34" charset="0"/>
+              </a:defRPr>
+            </a:lvl5pPr>
+            <a:lvl6pPr marL="2514600" indent="-228600" eaLnBrk="0" fontAlgn="base" hangingPunct="0">
+              <a:spcBef>
+                <a:spcPct val="0"/>
+              </a:spcBef>
+              <a:spcAft>
+                <a:spcPct val="0"/>
+              </a:spcAft>
+              <a:defRPr>
+                <a:solidFill>
+                  <a:schemeClr val="tx1"/>
+                </a:solidFill>
+                <a:latin typeface="Calibri" panose="020F0502020204030204" pitchFamily="34" charset="0"/>
+              </a:defRPr>
+            </a:lvl6pPr>
+            <a:lvl7pPr marL="2971800" indent="-228600" eaLnBrk="0" fontAlgn="base" hangingPunct="0">
+              <a:spcBef>
+                <a:spcPct val="0"/>
+              </a:spcBef>
+              <a:spcAft>
+                <a:spcPct val="0"/>
+              </a:spcAft>
+              <a:defRPr>
+                <a:solidFill>
+                  <a:schemeClr val="tx1"/>
+                </a:solidFill>
+                <a:latin typeface="Calibri" panose="020F0502020204030204" pitchFamily="34" charset="0"/>
+              </a:defRPr>
+            </a:lvl7pPr>
+            <a:lvl8pPr marL="3429000" indent="-228600" eaLnBrk="0" fontAlgn="base" hangingPunct="0">
+              <a:spcBef>
+                <a:spcPct val="0"/>
+              </a:spcBef>
+              <a:spcAft>
+                <a:spcPct val="0"/>
+              </a:spcAft>
+              <a:defRPr>
+                <a:solidFill>
+                  <a:schemeClr val="tx1"/>
+                </a:solidFill>
+                <a:latin typeface="Calibri" panose="020F0502020204030204" pitchFamily="34" charset="0"/>
+              </a:defRPr>
+            </a:lvl8pPr>
+            <a:lvl9pPr marL="3886200" indent="-228600" eaLnBrk="0" fontAlgn="base" hangingPunct="0">
+              <a:spcBef>
+                <a:spcPct val="0"/>
+              </a:spcBef>
+              <a:spcAft>
+                <a:spcPct val="0"/>
+              </a:spcAft>
+              <a:defRPr>
+                <a:solidFill>
+                  <a:schemeClr val="tx1"/>
+                </a:solidFill>
+                <a:latin typeface="Calibri" panose="020F0502020204030204" pitchFamily="34" charset="0"/>
+              </a:defRPr>
+            </a:lvl9pPr>
+          </a:lstStyle>
+          <a:p>
+            <a:pPr algn="ctr" eaLnBrk="1" hangingPunct="1"/>
+            <a:r>
+              <a:rPr lang="en-US" altLang="en-US" sz="1200" dirty="0">
+                <a:latin typeface="Arial" panose="020B0604020202020204" pitchFamily="34" charset="0"/>
+                <a:ea typeface="Amazon Ember" panose="020B0603020204020204" pitchFamily="34" charset="0"/>
+                <a:cs typeface="Arial" panose="020B0604020202020204" pitchFamily="34" charset="0"/>
+              </a:rPr>
+              <a:t>AWS Systems Manager</a:t>
+            </a:r>
+          </a:p>
+        </p:txBody>
+      </p:sp>
+      <p:sp>
+        <p:nvSpPr>
+          <p:cNvPr id="39" name="Rectangle 38">
+            <a:extLst>
+              <a:ext uri="{FF2B5EF4-FFF2-40B4-BE49-F238E27FC236}">
+                <a16:creationId xmlns:a16="http://schemas.microsoft.com/office/drawing/2014/main" id="{34D72B91-09F3-9A42-B66A-106F01CCE8B4}"/>
+              </a:ext>
+            </a:extLst>
+          </p:cNvPr>
+          <p:cNvSpPr/>
+          <p:nvPr/>
+        </p:nvSpPr>
+        <p:spPr>
+          <a:xfrm>
+            <a:off x="1044620" y="1214882"/>
+            <a:ext cx="7032580" cy="4195318"/>
+          </a:xfrm>
+          <a:prstGeom prst="rect">
+            <a:avLst/>
+          </a:prstGeom>
+          <a:noFill/>
+          <a:ln w="12700">
+            <a:solidFill>
+              <a:srgbClr val="1E8900"/>
+            </a:solidFill>
+          </a:ln>
+        </p:spPr>
+        <p:style>
+          <a:lnRef idx="2">
+            <a:schemeClr val="accent1">
+              <a:shade val="50000"/>
+            </a:schemeClr>
+          </a:lnRef>
+          <a:fillRef idx="1">
+            <a:schemeClr val="accent1"/>
+          </a:fillRef>
+          <a:effectRef idx="0">
+            <a:schemeClr val="accent1"/>
+          </a:effectRef>
+          <a:fontRef idx="minor">
+            <a:schemeClr val="lt1"/>
+          </a:fontRef>
+        </p:style>
+        <p:txBody>
+          <a:bodyPr lIns="457200" tIns="91440"/>
+          <a:lstStyle/>
+          <a:p>
+            <a:pPr eaLnBrk="1" fontAlgn="auto" hangingPunct="1">
+              <a:spcBef>
+                <a:spcPts val="0"/>
+              </a:spcBef>
+              <a:spcAft>
+                <a:spcPts val="0"/>
+              </a:spcAft>
+              <a:defRPr/>
+            </a:pPr>
+            <a:r>
+              <a:rPr lang="en-US" sz="1200" dirty="0">
+                <a:ln w="0"/>
+                <a:solidFill>
+                  <a:srgbClr val="1E8900"/>
+                </a:solidFill>
+                <a:latin typeface="Arial" panose="020B0604020202020204" pitchFamily="34" charset="0"/>
+                <a:cs typeface="Arial" panose="020B0604020202020204" pitchFamily="34" charset="0"/>
+              </a:rPr>
+              <a:t>VPC</a:t>
+            </a:r>
+          </a:p>
+        </p:txBody>
+      </p:sp>
+      <p:pic>
+        <p:nvPicPr>
+          <p:cNvPr id="40" name="Graphic 28">
+            <a:extLst>
+              <a:ext uri="{FF2B5EF4-FFF2-40B4-BE49-F238E27FC236}">
+                <a16:creationId xmlns:a16="http://schemas.microsoft.com/office/drawing/2014/main" id="{88C69878-A4A8-CE45-B624-0223CB16619E}"/>
+              </a:ext>
+            </a:extLst>
+          </p:cNvPr>
+          <p:cNvPicPr>
+            <a:picLocks noChangeAspect="1" noChangeArrowheads="1"/>
+          </p:cNvPicPr>
+          <p:nvPr/>
+        </p:nvPicPr>
+        <p:blipFill>
+          <a:blip r:embed="rId20" cstate="print">
+            <a:extLst>
+              <a:ext uri="{28A0092B-C50C-407E-A947-70E740481C1C}">
+                <a14:useLocalDpi xmlns:a14="http://schemas.microsoft.com/office/drawing/2010/main" val="0"/>
+              </a:ext>
+            </a:extLst>
+          </a:blip>
+          <a:srcRect/>
+          <a:stretch>
+            <a:fillRect/>
+          </a:stretch>
+        </p:blipFill>
+        <p:spPr bwMode="auto">
+          <a:xfrm>
+            <a:off x="1044620" y="1214882"/>
+            <a:ext cx="330200" cy="330200"/>
+          </a:xfrm>
+          <a:prstGeom prst="rect">
+            <a:avLst/>
+          </a:prstGeom>
+          <a:noFill/>
+          <a:ln>
+            <a:noFill/>
+          </a:ln>
+          <a:extLst>
+            <a:ext uri="{909E8E84-426E-40DD-AFC4-6F175D3DCCD1}">
+              <a14:hiddenFill xmlns:a14="http://schemas.microsoft.com/office/drawing/2010/main">
+                <a:solidFill>
+                  <a:srgbClr val="FFFFFF"/>
+                </a:solidFill>
+              </a14:hiddenFill>
+            </a:ext>
+            <a:ext uri="{91240B29-F687-4F45-9708-019B960494DF}">
+              <a14:hiddenLine xmlns:a14="http://schemas.microsoft.com/office/drawing/2010/main" w="9525">
+                <a:solidFill>
+                  <a:srgbClr val="000000"/>
+                </a:solidFill>
+                <a:miter lim="800000"/>
+                <a:headEnd/>
+                <a:tailEnd/>
+              </a14:hiddenLine>
+            </a:ext>
+          </a:extLst>
+        </p:spPr>
+      </p:pic>
+      <p:sp>
+        <p:nvSpPr>
+          <p:cNvPr id="41" name="Rectangle 40">
+            <a:extLst>
+              <a:ext uri="{FF2B5EF4-FFF2-40B4-BE49-F238E27FC236}">
+                <a16:creationId xmlns:a16="http://schemas.microsoft.com/office/drawing/2014/main" id="{D246DAA1-0260-E449-8CA2-92FF0101149D}"/>
+              </a:ext>
+            </a:extLst>
+          </p:cNvPr>
+          <p:cNvSpPr/>
+          <p:nvPr/>
+        </p:nvSpPr>
+        <p:spPr>
+          <a:xfrm>
+            <a:off x="1447801" y="932962"/>
+            <a:ext cx="2743200" cy="4553438"/>
+          </a:xfrm>
+          <a:prstGeom prst="rect">
+            <a:avLst/>
+          </a:prstGeom>
+          <a:noFill/>
+          <a:ln w="12700">
+            <a:solidFill>
+              <a:srgbClr val="5B9CD5"/>
+            </a:solidFill>
+            <a:prstDash val="dash"/>
+          </a:ln>
+        </p:spPr>
+        <p:style>
+          <a:lnRef idx="2">
+            <a:schemeClr val="accent1">
+              <a:shade val="50000"/>
+            </a:schemeClr>
+          </a:lnRef>
+          <a:fillRef idx="1">
+            <a:schemeClr val="accent1"/>
+          </a:fillRef>
+          <a:effectRef idx="0">
+            <a:schemeClr val="accent1"/>
+          </a:effectRef>
+          <a:fontRef idx="minor">
+            <a:schemeClr val="lt1"/>
+          </a:fontRef>
+        </p:style>
+        <p:txBody>
+          <a:bodyPr tIns="91440"/>
+          <a:lstStyle/>
+          <a:p>
+            <a:pPr algn="ctr" eaLnBrk="1" fontAlgn="auto" hangingPunct="1">
+              <a:spcBef>
+                <a:spcPts val="0"/>
+              </a:spcBef>
+              <a:spcAft>
+                <a:spcPts val="0"/>
+              </a:spcAft>
+              <a:defRPr/>
+            </a:pPr>
+            <a:r>
+              <a:rPr lang="en-US" sz="1200">
+                <a:solidFill>
+                  <a:srgbClr val="5B9CD5"/>
+                </a:solidFill>
+                <a:latin typeface="Arial" panose="020B0604020202020204" pitchFamily="34" charset="0"/>
+                <a:cs typeface="Arial" panose="020B0604020202020204" pitchFamily="34" charset="0"/>
+              </a:rPr>
+              <a:t>Availability </a:t>
+            </a:r>
+            <a:r>
+              <a:rPr lang="en-US" sz="1200" smtClean="0">
+                <a:solidFill>
+                  <a:srgbClr val="5B9CD5"/>
+                </a:solidFill>
+                <a:latin typeface="Arial" panose="020B0604020202020204" pitchFamily="34" charset="0"/>
+                <a:cs typeface="Arial" panose="020B0604020202020204" pitchFamily="34" charset="0"/>
+              </a:rPr>
+              <a:t>Zone 1</a:t>
+            </a:r>
+            <a:endParaRPr lang="en-US" sz="1200" dirty="0">
+              <a:solidFill>
+                <a:srgbClr val="5B9CD5"/>
+              </a:solidFill>
+              <a:latin typeface="Arial" panose="020B0604020202020204" pitchFamily="34" charset="0"/>
+              <a:cs typeface="Arial" panose="020B0604020202020204" pitchFamily="34" charset="0"/>
+            </a:endParaRPr>
+          </a:p>
+        </p:txBody>
+      </p:sp>
+      <p:pic>
+        <p:nvPicPr>
+          <p:cNvPr id="43" name="Graphic 135">
+            <a:extLst>
+              <a:ext uri="{FF2B5EF4-FFF2-40B4-BE49-F238E27FC236}">
+                <a16:creationId xmlns:a16="http://schemas.microsoft.com/office/drawing/2014/main" id="{C19987B1-DB3A-1640-994D-BCB81FCC1AE4}"/>
+              </a:ext>
+            </a:extLst>
+          </p:cNvPr>
+          <p:cNvPicPr>
+            <a:picLocks noChangeAspect="1"/>
+          </p:cNvPicPr>
+          <p:nvPr/>
+        </p:nvPicPr>
+        <p:blipFill>
+          <a:blip r:embed="rId12">
+            <a:extLst>
+              <a:ext uri="{96DAC541-7B7A-43D3-8B79-37D633B846F1}">
+                <asvg:svgBlip xmlns="" xmlns:asvg="http://schemas.microsoft.com/office/drawing/2016/SVG/main" r:embed="rId13"/>
+              </a:ext>
+            </a:extLst>
+          </a:blip>
+          <a:stretch>
+            <a:fillRect/>
+          </a:stretch>
+        </p:blipFill>
+        <p:spPr>
+          <a:xfrm>
+            <a:off x="3112502" y="4208793"/>
+            <a:ext cx="469900" cy="469900"/>
+          </a:xfrm>
+          <a:prstGeom prst="rect">
+            <a:avLst/>
+          </a:prstGeom>
+        </p:spPr>
+      </p:pic>
+      <p:sp>
+        <p:nvSpPr>
+          <p:cNvPr id="44" name="TextBox 43">
+            <a:extLst>
+              <a:ext uri="{FF2B5EF4-FFF2-40B4-BE49-F238E27FC236}">
+                <a16:creationId xmlns:a16="http://schemas.microsoft.com/office/drawing/2014/main" id="{F90C1CC4-DFE6-0445-BD1C-DB610E1A07F5}"/>
+              </a:ext>
+            </a:extLst>
+          </p:cNvPr>
+          <p:cNvSpPr txBox="1"/>
+          <p:nvPr/>
+        </p:nvSpPr>
+        <p:spPr>
+          <a:xfrm>
+            <a:off x="2590800" y="4641300"/>
+            <a:ext cx="1513305" cy="646331"/>
+          </a:xfrm>
+          <a:prstGeom prst="rect">
+            <a:avLst/>
+          </a:prstGeom>
+          <a:noFill/>
+        </p:spPr>
+        <p:txBody>
+          <a:bodyPr wrap="square" rtlCol="0">
+            <a:spAutoFit/>
+          </a:bodyPr>
+          <a:lstStyle/>
+          <a:p>
+            <a:pPr algn="ctr"/>
+            <a:r>
+              <a:rPr lang="en-US" sz="1200" dirty="0" smtClean="0">
+                <a:latin typeface="Arial" panose="020B0604020202020204" pitchFamily="34" charset="0"/>
+                <a:ea typeface="Amazon Ember" panose="020B0603020204020204" pitchFamily="34" charset="0"/>
+                <a:cs typeface="Arial" panose="020B0604020202020204" pitchFamily="34" charset="0"/>
+              </a:rPr>
+              <a:t>SQL </a:t>
+            </a:r>
+            <a:r>
+              <a:rPr lang="en-US" sz="1200" dirty="0" smtClean="0">
+                <a:latin typeface="Arial" panose="020B0604020202020204" pitchFamily="34" charset="0"/>
+                <a:ea typeface="Amazon Ember" panose="020B0603020204020204" pitchFamily="34" charset="0"/>
+                <a:cs typeface="Arial" panose="020B0604020202020204" pitchFamily="34" charset="0"/>
+              </a:rPr>
+              <a:t>Server node with </a:t>
+            </a:r>
+          </a:p>
+          <a:p>
+            <a:pPr algn="ctr"/>
+            <a:r>
+              <a:rPr lang="en-US" sz="1200" dirty="0" smtClean="0">
+                <a:latin typeface="Arial" panose="020B0604020202020204" pitchFamily="34" charset="0"/>
+                <a:ea typeface="Amazon Ember" panose="020B0603020204020204" pitchFamily="34" charset="0"/>
+                <a:cs typeface="Arial" panose="020B0604020202020204" pitchFamily="34" charset="0"/>
+              </a:rPr>
+              <a:t>SIOS DataKeeper</a:t>
+            </a:r>
+            <a:endParaRPr lang="en-US" sz="1200" dirty="0">
+              <a:latin typeface="Arial" panose="020B0604020202020204" pitchFamily="34" charset="0"/>
+              <a:ea typeface="Amazon Ember" panose="020B0603020204020204" pitchFamily="34" charset="0"/>
+              <a:cs typeface="Arial" panose="020B0604020202020204" pitchFamily="34" charset="0"/>
+            </a:endParaRPr>
+          </a:p>
+        </p:txBody>
+      </p:sp>
+      <p:sp>
+        <p:nvSpPr>
+          <p:cNvPr id="18" name="Rectangle 17">
+            <a:extLst>
+              <a:ext uri="{FF2B5EF4-FFF2-40B4-BE49-F238E27FC236}">
+                <a16:creationId xmlns:a16="http://schemas.microsoft.com/office/drawing/2014/main" id="{E25F190B-F12E-614B-827A-566AC09E9D97}"/>
+              </a:ext>
+            </a:extLst>
+          </p:cNvPr>
+          <p:cNvSpPr/>
+          <p:nvPr/>
+        </p:nvSpPr>
+        <p:spPr>
+          <a:xfrm>
+            <a:off x="5274409" y="1602559"/>
+            <a:ext cx="2468880" cy="1447800"/>
+          </a:xfrm>
+          <a:prstGeom prst="rect">
+            <a:avLst/>
+          </a:prstGeom>
+          <a:solidFill>
+            <a:srgbClr val="1D8900">
+              <a:alpha val="9804"/>
+            </a:srgbClr>
+          </a:solidFill>
+          <a:ln w="12700">
+            <a:noFill/>
+            <a:prstDash val="dash"/>
+          </a:ln>
+        </p:spPr>
+        <p:style>
+          <a:lnRef idx="2">
+            <a:schemeClr val="accent1">
+              <a:shade val="50000"/>
+            </a:schemeClr>
+          </a:lnRef>
+          <a:fillRef idx="1">
+            <a:schemeClr val="accent1"/>
+          </a:fillRef>
+          <a:effectRef idx="0">
+            <a:schemeClr val="accent1"/>
+          </a:effectRef>
+          <a:fontRef idx="minor">
+            <a:schemeClr val="lt1"/>
+          </a:fontRef>
+        </p:style>
+        <p:txBody>
+          <a:bodyPr rot="0" spcFirstLastPara="0" vertOverflow="overflow" horzOverflow="overflow" vert="horz" wrap="square" lIns="338328" tIns="45720" rIns="91440" bIns="45720" numCol="1" spcCol="0" rtlCol="0" fromWordArt="0" anchor="t" anchorCtr="0" forceAA="0" compatLnSpc="1">
+            <a:prstTxWarp prst="textNoShape">
+              <a:avLst/>
+            </a:prstTxWarp>
+            <a:noAutofit/>
+          </a:bodyPr>
+          <a:lstStyle/>
+          <a:p>
+            <a:pPr algn="l"/>
+            <a:r>
+              <a:rPr lang="en-US" sz="1200" dirty="0">
+                <a:solidFill>
+                  <a:schemeClr val="accent6"/>
+                </a:solidFill>
+                <a:latin typeface="Arial" panose="020B0604020202020204" pitchFamily="34" charset="0"/>
+                <a:ea typeface="Amazon Ember" panose="020B0603020204020204" pitchFamily="34" charset="0"/>
+                <a:cs typeface="Arial" panose="020B0604020202020204" pitchFamily="34" charset="0"/>
+              </a:rPr>
+              <a:t>Public subnet</a:t>
+            </a:r>
+          </a:p>
+          <a:p>
+            <a:pPr algn="l"/>
+            <a:endParaRPr lang="en-US" sz="1200" dirty="0">
+              <a:solidFill>
+                <a:schemeClr val="accent5"/>
+              </a:solidFill>
+              <a:latin typeface="Arial" panose="020B0604020202020204" pitchFamily="34" charset="0"/>
+              <a:ea typeface="Amazon Ember" panose="020B0603020204020204" pitchFamily="34" charset="0"/>
+              <a:cs typeface="Arial" panose="020B0604020202020204" pitchFamily="34" charset="0"/>
+            </a:endParaRPr>
+          </a:p>
+        </p:txBody>
+      </p:sp>
+      <p:pic>
+        <p:nvPicPr>
+          <p:cNvPr id="19" name="Graphic 10">
+            <a:extLst>
+              <a:ext uri="{FF2B5EF4-FFF2-40B4-BE49-F238E27FC236}">
+                <a16:creationId xmlns:a16="http://schemas.microsoft.com/office/drawing/2014/main" id="{89B99B74-19F0-0B4B-85E3-A09DF2519E46}"/>
+              </a:ext>
+            </a:extLst>
+          </p:cNvPr>
+          <p:cNvPicPr>
+            <a:picLocks noChangeAspect="1"/>
+          </p:cNvPicPr>
+          <p:nvPr/>
+        </p:nvPicPr>
+        <p:blipFill>
+          <a:blip r:embed="rId4">
+            <a:extLst>
+              <a:ext uri="{96DAC541-7B7A-43D3-8B79-37D633B846F1}">
+                <asvg:svgBlip xmlns="" xmlns:asvg="http://schemas.microsoft.com/office/drawing/2016/SVG/main" r:embed="rId7"/>
+              </a:ext>
+            </a:extLst>
+          </a:blip>
+          <a:stretch>
+            <a:fillRect/>
+          </a:stretch>
+        </p:blipFill>
+        <p:spPr>
+          <a:xfrm>
+            <a:off x="5275876" y="1600200"/>
+            <a:ext cx="274320" cy="274320"/>
+          </a:xfrm>
+          <a:prstGeom prst="rect">
+            <a:avLst/>
+          </a:prstGeom>
+        </p:spPr>
+      </p:pic>
+      <p:sp>
+        <p:nvSpPr>
+          <p:cNvPr id="20" name="Rectangle 19">
+            <a:extLst>
+              <a:ext uri="{FF2B5EF4-FFF2-40B4-BE49-F238E27FC236}">
+                <a16:creationId xmlns:a16="http://schemas.microsoft.com/office/drawing/2014/main" id="{A85485B4-AA18-C048-B92A-A9A0F4372B98}"/>
+              </a:ext>
+            </a:extLst>
+          </p:cNvPr>
+          <p:cNvSpPr/>
+          <p:nvPr/>
+        </p:nvSpPr>
+        <p:spPr>
+          <a:xfrm>
+            <a:off x="5274409" y="3150005"/>
+            <a:ext cx="2468880" cy="2158540"/>
+          </a:xfrm>
+          <a:prstGeom prst="rect">
+            <a:avLst/>
+          </a:prstGeom>
+          <a:solidFill>
+            <a:srgbClr val="007CBC">
+              <a:alpha val="9804"/>
+            </a:srgbClr>
+          </a:solidFill>
+          <a:ln w="12700">
+            <a:noFill/>
+            <a:prstDash val="dash"/>
+          </a:ln>
+        </p:spPr>
+        <p:style>
+          <a:lnRef idx="2">
+            <a:schemeClr val="accent1">
+              <a:shade val="50000"/>
+            </a:schemeClr>
+          </a:lnRef>
+          <a:fillRef idx="1">
+            <a:schemeClr val="accent1"/>
+          </a:fillRef>
+          <a:effectRef idx="0">
+            <a:schemeClr val="accent1"/>
+          </a:effectRef>
+          <a:fontRef idx="minor">
+            <a:schemeClr val="lt1"/>
+          </a:fontRef>
+        </p:style>
+        <p:txBody>
+          <a:bodyPr rot="0" spcFirstLastPara="0" vertOverflow="overflow" horzOverflow="overflow" vert="horz" wrap="square" lIns="338328" tIns="45720" rIns="91440" bIns="45720" numCol="1" spcCol="0" rtlCol="0" fromWordArt="0" anchor="t" anchorCtr="0" forceAA="0" compatLnSpc="1">
+            <a:prstTxWarp prst="textNoShape">
+              <a:avLst/>
+            </a:prstTxWarp>
+            <a:noAutofit/>
+          </a:bodyPr>
+          <a:lstStyle/>
+          <a:p>
+            <a:pPr algn="l"/>
+            <a:r>
+              <a:rPr lang="en-US" sz="1200" dirty="0">
+                <a:solidFill>
+                  <a:schemeClr val="accent1"/>
+                </a:solidFill>
+                <a:latin typeface="Arial" panose="020B0604020202020204" pitchFamily="34" charset="0"/>
+                <a:ea typeface="Amazon Ember" panose="020B0603020204020204" pitchFamily="34" charset="0"/>
+                <a:cs typeface="Arial" panose="020B0604020202020204" pitchFamily="34" charset="0"/>
+              </a:rPr>
+              <a:t>Private subnet</a:t>
+            </a:r>
+          </a:p>
+          <a:p>
+            <a:pPr algn="l"/>
+            <a:endParaRPr lang="en-US" sz="1200" dirty="0">
+              <a:solidFill>
+                <a:schemeClr val="accent3"/>
+              </a:solidFill>
+              <a:latin typeface="Arial" panose="020B0604020202020204" pitchFamily="34" charset="0"/>
+              <a:ea typeface="Amazon Ember" panose="020B0603020204020204" pitchFamily="34" charset="0"/>
+              <a:cs typeface="Arial" panose="020B0604020202020204" pitchFamily="34" charset="0"/>
+            </a:endParaRPr>
+          </a:p>
+        </p:txBody>
+      </p:sp>
+      <p:pic>
+        <p:nvPicPr>
+          <p:cNvPr id="21" name="Graphic 13">
+            <a:extLst>
+              <a:ext uri="{FF2B5EF4-FFF2-40B4-BE49-F238E27FC236}">
+                <a16:creationId xmlns:a16="http://schemas.microsoft.com/office/drawing/2014/main" id="{3BD31095-C7B2-C24A-9990-6F9E14956A7B}"/>
+              </a:ext>
+            </a:extLst>
+          </p:cNvPr>
+          <p:cNvPicPr>
+            <a:picLocks noChangeAspect="1"/>
+          </p:cNvPicPr>
+          <p:nvPr/>
+        </p:nvPicPr>
+        <p:blipFill>
+          <a:blip r:embed="rId8">
+            <a:extLst>
+              <a:ext uri="{96DAC541-7B7A-43D3-8B79-37D633B846F1}">
+                <asvg:svgBlip xmlns="" xmlns:asvg="http://schemas.microsoft.com/office/drawing/2016/SVG/main" r:embed="rId9"/>
+              </a:ext>
+            </a:extLst>
+          </a:blip>
+          <a:stretch>
+            <a:fillRect/>
+          </a:stretch>
+        </p:blipFill>
+        <p:spPr>
+          <a:xfrm>
+            <a:off x="5272945" y="3150005"/>
+            <a:ext cx="274320" cy="274320"/>
+          </a:xfrm>
+          <a:prstGeom prst="rect">
+            <a:avLst/>
+          </a:prstGeom>
+        </p:spPr>
+      </p:pic>
+      <p:sp>
+        <p:nvSpPr>
+          <p:cNvPr id="22" name="TextBox 21">
+            <a:extLst>
+              <a:ext uri="{FF2B5EF4-FFF2-40B4-BE49-F238E27FC236}">
+                <a16:creationId xmlns:a16="http://schemas.microsoft.com/office/drawing/2014/main" id="{F90C1CC4-DFE6-0445-BD1C-DB610E1A07F5}"/>
+              </a:ext>
+            </a:extLst>
+          </p:cNvPr>
+          <p:cNvSpPr txBox="1"/>
+          <p:nvPr/>
+        </p:nvSpPr>
+        <p:spPr>
+          <a:xfrm>
+            <a:off x="5198600" y="2542576"/>
+            <a:ext cx="1513305" cy="276999"/>
+          </a:xfrm>
+          <a:prstGeom prst="rect">
+            <a:avLst/>
+          </a:prstGeom>
+          <a:noFill/>
+          <a:effectLst>
+            <a:softEdge rad="0"/>
+          </a:effectLst>
+        </p:spPr>
+        <p:txBody>
+          <a:bodyPr wrap="square" rtlCol="0">
+            <a:spAutoFit/>
+          </a:bodyPr>
+          <a:lstStyle/>
+          <a:p>
+            <a:pPr algn="ctr"/>
+            <a:r>
+              <a:rPr lang="en-US" sz="1200" dirty="0">
+                <a:latin typeface="Arial" panose="020B0604020202020204" pitchFamily="34" charset="0"/>
+                <a:ea typeface="Amazon Ember" panose="020B0603020204020204" pitchFamily="34" charset="0"/>
+                <a:cs typeface="Arial" panose="020B0604020202020204" pitchFamily="34" charset="0"/>
+              </a:rPr>
+              <a:t>RD Gateway</a:t>
+            </a:r>
+          </a:p>
+        </p:txBody>
+      </p:sp>
+      <p:sp>
+        <p:nvSpPr>
+          <p:cNvPr id="23" name="TextBox 22">
+            <a:extLst>
+              <a:ext uri="{FF2B5EF4-FFF2-40B4-BE49-F238E27FC236}">
+                <a16:creationId xmlns:a16="http://schemas.microsoft.com/office/drawing/2014/main" id="{517096B6-EF64-C245-A3E7-BEEF81BDCB9C}"/>
+              </a:ext>
+            </a:extLst>
+          </p:cNvPr>
+          <p:cNvSpPr txBox="1"/>
+          <p:nvPr/>
+        </p:nvSpPr>
+        <p:spPr>
+          <a:xfrm>
+            <a:off x="6494000" y="2545000"/>
+            <a:ext cx="1236442" cy="276999"/>
+          </a:xfrm>
+          <a:prstGeom prst="rect">
+            <a:avLst/>
+          </a:prstGeom>
+          <a:noFill/>
+        </p:spPr>
+        <p:txBody>
+          <a:bodyPr wrap="square" rtlCol="0">
+            <a:spAutoFit/>
+          </a:bodyPr>
+          <a:lstStyle/>
+          <a:p>
+            <a:pPr algn="ctr"/>
+            <a:r>
+              <a:rPr lang="en-US" sz="1200" dirty="0">
+                <a:latin typeface="Arial" panose="020B0604020202020204" pitchFamily="34" charset="0"/>
+                <a:ea typeface="Amazon Ember" panose="020B0603020204020204" pitchFamily="34" charset="0"/>
+                <a:cs typeface="Arial" panose="020B0604020202020204" pitchFamily="34" charset="0"/>
+              </a:rPr>
+              <a:t>NAT gateway</a:t>
+            </a:r>
+          </a:p>
+        </p:txBody>
+      </p:sp>
+      <p:pic>
+        <p:nvPicPr>
+          <p:cNvPr id="24" name="Graphic 40">
+            <a:extLst>
+              <a:ext uri="{FF2B5EF4-FFF2-40B4-BE49-F238E27FC236}">
+                <a16:creationId xmlns:a16="http://schemas.microsoft.com/office/drawing/2014/main" id="{C322592C-EAB9-0640-95A5-D8FF5B8E5FE6}"/>
+              </a:ext>
+            </a:extLst>
+          </p:cNvPr>
+          <p:cNvPicPr>
+            <a:picLocks noChangeAspect="1"/>
+          </p:cNvPicPr>
+          <p:nvPr/>
+        </p:nvPicPr>
+        <p:blipFill>
+          <a:blip r:embed="rId14">
+            <a:extLst>
+              <a:ext uri="{96DAC541-7B7A-43D3-8B79-37D633B846F1}">
+                <asvg:svgBlip xmlns="" xmlns:asvg="http://schemas.microsoft.com/office/drawing/2016/SVG/main" r:embed="rId17"/>
+              </a:ext>
+            </a:extLst>
+          </a:blip>
+          <a:stretch>
+            <a:fillRect/>
+          </a:stretch>
+        </p:blipFill>
+        <p:spPr>
+          <a:xfrm>
+            <a:off x="6877271" y="2090186"/>
+            <a:ext cx="469900" cy="469900"/>
+          </a:xfrm>
+          <a:prstGeom prst="rect">
+            <a:avLst/>
+          </a:prstGeom>
+        </p:spPr>
+      </p:pic>
+      <p:pic>
+        <p:nvPicPr>
+          <p:cNvPr id="25" name="Graphic 135">
+            <a:extLst>
+              <a:ext uri="{FF2B5EF4-FFF2-40B4-BE49-F238E27FC236}">
+                <a16:creationId xmlns:a16="http://schemas.microsoft.com/office/drawing/2014/main" id="{C19987B1-DB3A-1640-994D-BCB81FCC1AE4}"/>
+              </a:ext>
+            </a:extLst>
+          </p:cNvPr>
+          <p:cNvPicPr>
+            <a:picLocks noChangeAspect="1"/>
+          </p:cNvPicPr>
+          <p:nvPr/>
+        </p:nvPicPr>
+        <p:blipFill>
+          <a:blip r:embed="rId12">
+            <a:extLst>
+              <a:ext uri="{96DAC541-7B7A-43D3-8B79-37D633B846F1}">
+                <asvg:svgBlip xmlns="" xmlns:asvg="http://schemas.microsoft.com/office/drawing/2016/SVG/main" r:embed="rId13"/>
+              </a:ext>
+            </a:extLst>
+          </a:blip>
+          <a:stretch>
+            <a:fillRect/>
+          </a:stretch>
+        </p:blipFill>
+        <p:spPr>
+          <a:xfrm>
+            <a:off x="5720302" y="3446793"/>
+            <a:ext cx="469900" cy="469900"/>
+          </a:xfrm>
+          <a:prstGeom prst="rect">
+            <a:avLst/>
+          </a:prstGeom>
+        </p:spPr>
+      </p:pic>
+      <p:sp>
+        <p:nvSpPr>
+          <p:cNvPr id="26" name="TextBox 25">
+            <a:extLst>
+              <a:ext uri="{FF2B5EF4-FFF2-40B4-BE49-F238E27FC236}">
+                <a16:creationId xmlns:a16="http://schemas.microsoft.com/office/drawing/2014/main" id="{F90C1CC4-DFE6-0445-BD1C-DB610E1A07F5}"/>
+              </a:ext>
+            </a:extLst>
+          </p:cNvPr>
+          <p:cNvSpPr txBox="1"/>
+          <p:nvPr/>
+        </p:nvSpPr>
+        <p:spPr>
+          <a:xfrm>
+            <a:off x="5198600" y="3879300"/>
+            <a:ext cx="1513305" cy="276999"/>
+          </a:xfrm>
+          <a:prstGeom prst="rect">
+            <a:avLst/>
+          </a:prstGeom>
+          <a:noFill/>
+        </p:spPr>
+        <p:txBody>
+          <a:bodyPr wrap="square" rtlCol="0">
+            <a:spAutoFit/>
+          </a:bodyPr>
+          <a:lstStyle/>
+          <a:p>
+            <a:pPr algn="ctr"/>
+            <a:r>
+              <a:rPr lang="en-US" sz="1200" dirty="0" smtClean="0">
+                <a:latin typeface="Arial" panose="020B0604020202020204" pitchFamily="34" charset="0"/>
+                <a:ea typeface="Amazon Ember" panose="020B0603020204020204" pitchFamily="34" charset="0"/>
+                <a:cs typeface="Arial" panose="020B0604020202020204" pitchFamily="34" charset="0"/>
+              </a:rPr>
+              <a:t>Domain controller</a:t>
+            </a:r>
+            <a:endParaRPr lang="en-US" sz="1200" dirty="0">
+              <a:latin typeface="Arial" panose="020B0604020202020204" pitchFamily="34" charset="0"/>
+              <a:ea typeface="Amazon Ember" panose="020B0603020204020204" pitchFamily="34" charset="0"/>
+              <a:cs typeface="Arial" panose="020B0604020202020204" pitchFamily="34" charset="0"/>
+            </a:endParaRPr>
+          </a:p>
+        </p:txBody>
+      </p:sp>
+      <p:pic>
+        <p:nvPicPr>
+          <p:cNvPr id="45" name="Graphic 135">
+            <a:extLst>
+              <a:ext uri="{FF2B5EF4-FFF2-40B4-BE49-F238E27FC236}">
+                <a16:creationId xmlns:a16="http://schemas.microsoft.com/office/drawing/2014/main" id="{C19987B1-DB3A-1640-994D-BCB81FCC1AE4}"/>
+              </a:ext>
+            </a:extLst>
+          </p:cNvPr>
+          <p:cNvPicPr>
+            <a:picLocks noChangeAspect="1"/>
+          </p:cNvPicPr>
+          <p:nvPr/>
+        </p:nvPicPr>
+        <p:blipFill>
+          <a:blip r:embed="rId12">
+            <a:extLst>
+              <a:ext uri="{96DAC541-7B7A-43D3-8B79-37D633B846F1}">
+                <asvg:svgBlip xmlns="" xmlns:asvg="http://schemas.microsoft.com/office/drawing/2016/SVG/main" r:embed="rId13"/>
+              </a:ext>
+            </a:extLst>
+          </a:blip>
+          <a:stretch>
+            <a:fillRect/>
+          </a:stretch>
+        </p:blipFill>
+        <p:spPr>
+          <a:xfrm>
+            <a:off x="5720302" y="4208793"/>
+            <a:ext cx="469900" cy="469900"/>
+          </a:xfrm>
+          <a:prstGeom prst="rect">
+            <a:avLst/>
+          </a:prstGeom>
+        </p:spPr>
+      </p:pic>
+      <p:sp>
+        <p:nvSpPr>
+          <p:cNvPr id="48" name="TextBox 47">
+            <a:extLst>
+              <a:ext uri="{FF2B5EF4-FFF2-40B4-BE49-F238E27FC236}">
+                <a16:creationId xmlns:a16="http://schemas.microsoft.com/office/drawing/2014/main" id="{F90C1CC4-DFE6-0445-BD1C-DB610E1A07F5}"/>
+              </a:ext>
+            </a:extLst>
+          </p:cNvPr>
+          <p:cNvSpPr txBox="1"/>
+          <p:nvPr/>
+        </p:nvSpPr>
+        <p:spPr>
+          <a:xfrm>
+            <a:off x="5209295" y="4641300"/>
+            <a:ext cx="1513305" cy="646331"/>
+          </a:xfrm>
+          <a:prstGeom prst="rect">
+            <a:avLst/>
+          </a:prstGeom>
+          <a:noFill/>
+        </p:spPr>
+        <p:txBody>
+          <a:bodyPr wrap="square" rtlCol="0">
+            <a:spAutoFit/>
+          </a:bodyPr>
+          <a:lstStyle/>
+          <a:p>
+            <a:pPr algn="ctr"/>
+            <a:r>
+              <a:rPr lang="en-US" sz="1200" dirty="0" smtClean="0">
+                <a:latin typeface="Arial" panose="020B0604020202020204" pitchFamily="34" charset="0"/>
+                <a:ea typeface="Amazon Ember" panose="020B0603020204020204" pitchFamily="34" charset="0"/>
+                <a:cs typeface="Arial" panose="020B0604020202020204" pitchFamily="34" charset="0"/>
+              </a:rPr>
+              <a:t>SQL </a:t>
+            </a:r>
+            <a:r>
+              <a:rPr lang="en-US" sz="1200" dirty="0" smtClean="0">
+                <a:latin typeface="Arial" panose="020B0604020202020204" pitchFamily="34" charset="0"/>
+                <a:ea typeface="Amazon Ember" panose="020B0603020204020204" pitchFamily="34" charset="0"/>
+                <a:cs typeface="Arial" panose="020B0604020202020204" pitchFamily="34" charset="0"/>
+              </a:rPr>
+              <a:t>Server node with </a:t>
+            </a:r>
+          </a:p>
+          <a:p>
+            <a:pPr algn="ctr"/>
+            <a:r>
+              <a:rPr lang="en-US" sz="1200" dirty="0" smtClean="0">
+                <a:latin typeface="Arial" panose="020B0604020202020204" pitchFamily="34" charset="0"/>
+                <a:ea typeface="Amazon Ember" panose="020B0603020204020204" pitchFamily="34" charset="0"/>
+                <a:cs typeface="Arial" panose="020B0604020202020204" pitchFamily="34" charset="0"/>
+              </a:rPr>
+              <a:t>SIOS DataKeeper</a:t>
+            </a:r>
+            <a:endParaRPr lang="en-US" sz="1200" dirty="0">
+              <a:latin typeface="Arial" panose="020B0604020202020204" pitchFamily="34" charset="0"/>
+              <a:ea typeface="Amazon Ember" panose="020B0603020204020204" pitchFamily="34" charset="0"/>
+              <a:cs typeface="Arial" panose="020B0604020202020204" pitchFamily="34" charset="0"/>
+            </a:endParaRPr>
+          </a:p>
+        </p:txBody>
+      </p:sp>
+      <p:pic>
+        <p:nvPicPr>
+          <p:cNvPr id="46" name="Graphic 135">
+            <a:extLst>
+              <a:ext uri="{FF2B5EF4-FFF2-40B4-BE49-F238E27FC236}">
+                <a16:creationId xmlns:a16="http://schemas.microsoft.com/office/drawing/2014/main" id="{C19987B1-DB3A-1640-994D-BCB81FCC1AE4}"/>
+              </a:ext>
+            </a:extLst>
+          </p:cNvPr>
+          <p:cNvPicPr>
+            <a:picLocks noChangeAspect="1"/>
+          </p:cNvPicPr>
+          <p:nvPr/>
+        </p:nvPicPr>
+        <p:blipFill>
+          <a:blip r:embed="rId12">
+            <a:extLst>
+              <a:ext uri="{96DAC541-7B7A-43D3-8B79-37D633B846F1}">
+                <asvg:svgBlip xmlns="" xmlns:asvg="http://schemas.microsoft.com/office/drawing/2016/SVG/main" r:embed="rId13"/>
+              </a:ext>
+            </a:extLst>
+          </a:blip>
+          <a:stretch>
+            <a:fillRect/>
+          </a:stretch>
+        </p:blipFill>
+        <p:spPr>
+          <a:xfrm>
+            <a:off x="5716760" y="2090186"/>
+            <a:ext cx="469900" cy="469900"/>
+          </a:xfrm>
+          <a:prstGeom prst="rect">
+            <a:avLst/>
+          </a:prstGeom>
+        </p:spPr>
+      </p:pic>
+      <p:sp>
+        <p:nvSpPr>
+          <p:cNvPr id="55" name="Rectangle 54">
+            <a:extLst>
+              <a:ext uri="{FF2B5EF4-FFF2-40B4-BE49-F238E27FC236}">
+                <a16:creationId xmlns:a16="http://schemas.microsoft.com/office/drawing/2014/main" id="{D246DAA1-0260-E449-8CA2-92FF0101149D}"/>
+              </a:ext>
+            </a:extLst>
+          </p:cNvPr>
+          <p:cNvSpPr/>
+          <p:nvPr/>
+        </p:nvSpPr>
+        <p:spPr>
+          <a:xfrm>
+            <a:off x="5139576" y="926758"/>
+            <a:ext cx="2743200" cy="4553438"/>
+          </a:xfrm>
+          <a:prstGeom prst="rect">
+            <a:avLst/>
+          </a:prstGeom>
+          <a:noFill/>
+          <a:ln w="12700">
+            <a:solidFill>
+              <a:srgbClr val="5B9CD5"/>
+            </a:solidFill>
+            <a:prstDash val="dash"/>
+          </a:ln>
+        </p:spPr>
+        <p:style>
+          <a:lnRef idx="2">
+            <a:schemeClr val="accent1">
+              <a:shade val="50000"/>
+            </a:schemeClr>
+          </a:lnRef>
+          <a:fillRef idx="1">
+            <a:schemeClr val="accent1"/>
+          </a:fillRef>
+          <a:effectRef idx="0">
+            <a:schemeClr val="accent1"/>
+          </a:effectRef>
+          <a:fontRef idx="minor">
+            <a:schemeClr val="lt1"/>
+          </a:fontRef>
+        </p:style>
+        <p:txBody>
+          <a:bodyPr tIns="91440"/>
+          <a:lstStyle/>
+          <a:p>
+            <a:pPr algn="ctr" eaLnBrk="1" fontAlgn="auto" hangingPunct="1">
+              <a:spcBef>
+                <a:spcPts val="0"/>
+              </a:spcBef>
+              <a:spcAft>
+                <a:spcPts val="0"/>
+              </a:spcAft>
+              <a:defRPr/>
+            </a:pPr>
+            <a:r>
+              <a:rPr lang="en-US" sz="1200" dirty="0">
+                <a:solidFill>
+                  <a:srgbClr val="5B9CD5"/>
+                </a:solidFill>
+                <a:latin typeface="Arial" panose="020B0604020202020204" pitchFamily="34" charset="0"/>
+                <a:cs typeface="Arial" panose="020B0604020202020204" pitchFamily="34" charset="0"/>
+              </a:rPr>
+              <a:t>Availability </a:t>
+            </a:r>
+            <a:r>
+              <a:rPr lang="en-US" sz="1200" dirty="0" smtClean="0">
+                <a:solidFill>
+                  <a:srgbClr val="5B9CD5"/>
+                </a:solidFill>
+                <a:latin typeface="Arial" panose="020B0604020202020204" pitchFamily="34" charset="0"/>
+                <a:cs typeface="Arial" panose="020B0604020202020204" pitchFamily="34" charset="0"/>
+              </a:rPr>
+              <a:t>Zone </a:t>
+            </a:r>
+            <a:r>
+              <a:rPr lang="en-US" sz="1200" dirty="0" smtClean="0">
+                <a:solidFill>
+                  <a:srgbClr val="5B9CD5"/>
+                </a:solidFill>
+                <a:latin typeface="Arial" panose="020B0604020202020204" pitchFamily="34" charset="0"/>
+                <a:cs typeface="Arial" panose="020B0604020202020204" pitchFamily="34" charset="0"/>
+              </a:rPr>
+              <a:t>2</a:t>
+            </a:r>
+            <a:endParaRPr lang="en-US" sz="1200" dirty="0">
+              <a:solidFill>
+                <a:srgbClr val="5B9CD5"/>
+              </a:solidFill>
+              <a:latin typeface="Arial" panose="020B0604020202020204" pitchFamily="34" charset="0"/>
+              <a:cs typeface="Arial" panose="020B0604020202020204" pitchFamily="34" charset="0"/>
+            </a:endParaRPr>
+          </a:p>
+        </p:txBody>
+      </p:sp>
+    </p:spTree>
+    <p:extLst>
+      <p:ext uri="{BB962C8B-B14F-4D97-AF65-F5344CB8AC3E}">
+        <p14:creationId xmlns:p14="http://schemas.microsoft.com/office/powerpoint/2010/main" val="3241857173"/>
       </p:ext>
     </p:extLst>
   </p:cSld>

</xml_diff>

<commit_message>
Production doc builds - 2021/08/03 23:20:06 UTC
</commit_message>
<xml_diff>
--- a/docs/images/SIOS DataKeeper architecture.pptx
+++ b/docs/images/SIOS DataKeeper architecture.pptx
@@ -6,6 +6,8 @@
   </p:sldMasterIdLst>
   <p:sldIdLst>
     <p:sldId id="256" r:id="rId2"/>
+    <p:sldId id="257" r:id="rId3"/>
+    <p:sldId id="258" r:id="rId4"/>
   </p:sldIdLst>
   <p:sldSz cx="12192000" cy="6858000"/>
   <p:notesSz cx="6858000" cy="9144000"/>
@@ -104,6 +106,11 @@
       </a:defRPr>
     </a:lvl9pPr>
   </p:defaultTextStyle>
+  <p:extLst>
+    <p:ext uri="{EFAFB233-063F-42B5-8137-9DF3F51BA10A}">
+      <p15:sldGuideLst xmlns:p15="http://schemas.microsoft.com/office/powerpoint/2012/main"/>
+    </p:ext>
+  </p:extLst>
 </p:presentation>
 </file>
 
@@ -238,7 +245,7 @@
           <a:p>
             <a:fld id="{B1E5028E-09A8-4225-BF6F-265C8079DC33}" type="datetimeFigureOut">
               <a:rPr lang="en-US" smtClean="0"/>
-              <a:t>7/20/2021</a:t>
+              <a:t>7/26/2021</a:t>
             </a:fld>
             <a:endParaRPr lang="en-US"/>
           </a:p>
@@ -408,7 +415,7 @@
           <a:p>
             <a:fld id="{B1E5028E-09A8-4225-BF6F-265C8079DC33}" type="datetimeFigureOut">
               <a:rPr lang="en-US" smtClean="0"/>
-              <a:t>7/20/2021</a:t>
+              <a:t>7/26/2021</a:t>
             </a:fld>
             <a:endParaRPr lang="en-US"/>
           </a:p>
@@ -588,7 +595,7 @@
           <a:p>
             <a:fld id="{B1E5028E-09A8-4225-BF6F-265C8079DC33}" type="datetimeFigureOut">
               <a:rPr lang="en-US" smtClean="0"/>
-              <a:t>7/20/2021</a:t>
+              <a:t>7/26/2021</a:t>
             </a:fld>
             <a:endParaRPr lang="en-US"/>
           </a:p>
@@ -758,7 +765,7 @@
           <a:p>
             <a:fld id="{B1E5028E-09A8-4225-BF6F-265C8079DC33}" type="datetimeFigureOut">
               <a:rPr lang="en-US" smtClean="0"/>
-              <a:t>7/20/2021</a:t>
+              <a:t>7/26/2021</a:t>
             </a:fld>
             <a:endParaRPr lang="en-US"/>
           </a:p>
@@ -1004,7 +1011,7 @@
           <a:p>
             <a:fld id="{B1E5028E-09A8-4225-BF6F-265C8079DC33}" type="datetimeFigureOut">
               <a:rPr lang="en-US" smtClean="0"/>
-              <a:t>7/20/2021</a:t>
+              <a:t>7/26/2021</a:t>
             </a:fld>
             <a:endParaRPr lang="en-US"/>
           </a:p>
@@ -1236,7 +1243,7 @@
           <a:p>
             <a:fld id="{B1E5028E-09A8-4225-BF6F-265C8079DC33}" type="datetimeFigureOut">
               <a:rPr lang="en-US" smtClean="0"/>
-              <a:t>7/20/2021</a:t>
+              <a:t>7/26/2021</a:t>
             </a:fld>
             <a:endParaRPr lang="en-US"/>
           </a:p>
@@ -1603,7 +1610,7 @@
           <a:p>
             <a:fld id="{B1E5028E-09A8-4225-BF6F-265C8079DC33}" type="datetimeFigureOut">
               <a:rPr lang="en-US" smtClean="0"/>
-              <a:t>7/20/2021</a:t>
+              <a:t>7/26/2021</a:t>
             </a:fld>
             <a:endParaRPr lang="en-US"/>
           </a:p>
@@ -1721,7 +1728,7 @@
           <a:p>
             <a:fld id="{B1E5028E-09A8-4225-BF6F-265C8079DC33}" type="datetimeFigureOut">
               <a:rPr lang="en-US" smtClean="0"/>
-              <a:t>7/20/2021</a:t>
+              <a:t>7/26/2021</a:t>
             </a:fld>
             <a:endParaRPr lang="en-US"/>
           </a:p>
@@ -1816,7 +1823,7 @@
           <a:p>
             <a:fld id="{B1E5028E-09A8-4225-BF6F-265C8079DC33}" type="datetimeFigureOut">
               <a:rPr lang="en-US" smtClean="0"/>
-              <a:t>7/20/2021</a:t>
+              <a:t>7/26/2021</a:t>
             </a:fld>
             <a:endParaRPr lang="en-US"/>
           </a:p>
@@ -2093,7 +2100,7 @@
           <a:p>
             <a:fld id="{B1E5028E-09A8-4225-BF6F-265C8079DC33}" type="datetimeFigureOut">
               <a:rPr lang="en-US" smtClean="0"/>
-              <a:t>7/20/2021</a:t>
+              <a:t>7/26/2021</a:t>
             </a:fld>
             <a:endParaRPr lang="en-US"/>
           </a:p>
@@ -2346,7 +2353,7 @@
           <a:p>
             <a:fld id="{B1E5028E-09A8-4225-BF6F-265C8079DC33}" type="datetimeFigureOut">
               <a:rPr lang="en-US" smtClean="0"/>
-              <a:t>7/20/2021</a:t>
+              <a:t>7/26/2021</a:t>
             </a:fld>
             <a:endParaRPr lang="en-US"/>
           </a:p>
@@ -2559,7 +2566,7 @@
           <a:p>
             <a:fld id="{B1E5028E-09A8-4225-BF6F-265C8079DC33}" type="datetimeFigureOut">
               <a:rPr lang="en-US" smtClean="0"/>
-              <a:t>7/20/2021</a:t>
+              <a:t>7/26/2021</a:t>
             </a:fld>
             <a:endParaRPr lang="en-US"/>
           </a:p>
@@ -3049,7 +3056,7 @@
           <a:blip r:embed="rId2">
             <a:extLst>
               <a:ext uri="{96DAC541-7B7A-43D3-8B79-37D633B846F1}">
-                <asvg:svgBlip xmlns:asvg="http://schemas.microsoft.com/office/drawing/2016/SVG/main" xmlns="" r:embed="rId3"/>
+                <asvg:svgBlip xmlns="" xmlns:asvg="http://schemas.microsoft.com/office/drawing/2016/SVG/main" r:embed="rId3"/>
               </a:ext>
             </a:extLst>
           </a:blip>
@@ -3166,7 +3173,7 @@
           <a:blip r:embed="rId4">
             <a:extLst>
               <a:ext uri="{96DAC541-7B7A-43D3-8B79-37D633B846F1}">
-                <asvg:svgBlip xmlns:asvg="http://schemas.microsoft.com/office/drawing/2016/SVG/main" xmlns="" r:embed="rId7"/>
+                <asvg:svgBlip xmlns="" xmlns:asvg="http://schemas.microsoft.com/office/drawing/2016/SVG/main" r:embed="rId7"/>
               </a:ext>
             </a:extLst>
           </a:blip>
@@ -3283,7 +3290,7 @@
           <a:blip r:embed="rId8">
             <a:extLst>
               <a:ext uri="{96DAC541-7B7A-43D3-8B79-37D633B846F1}">
-                <asvg:svgBlip xmlns:asvg="http://schemas.microsoft.com/office/drawing/2016/SVG/main" xmlns="" r:embed="rId9"/>
+                <asvg:svgBlip xmlns="" xmlns:asvg="http://schemas.microsoft.com/office/drawing/2016/SVG/main" r:embed="rId9"/>
               </a:ext>
             </a:extLst>
           </a:blip>
@@ -3442,7 +3449,7 @@
           <a:blip r:embed="rId10">
             <a:extLst>
               <a:ext uri="{96DAC541-7B7A-43D3-8B79-37D633B846F1}">
-                <asvg:svgBlip xmlns:asvg="http://schemas.microsoft.com/office/drawing/2016/SVG/main" xmlns="" r:embed="rId11"/>
+                <asvg:svgBlip xmlns="" xmlns:asvg="http://schemas.microsoft.com/office/drawing/2016/SVG/main" r:embed="rId11"/>
               </a:ext>
             </a:extLst>
           </a:blip>
@@ -3478,7 +3485,7 @@
           <a:blip r:embed="rId12">
             <a:extLst>
               <a:ext uri="{96DAC541-7B7A-43D3-8B79-37D633B846F1}">
-                <asvg:svgBlip xmlns:asvg="http://schemas.microsoft.com/office/drawing/2016/SVG/main" xmlns="" r:embed="rId13"/>
+                <asvg:svgBlip xmlns="" xmlns:asvg="http://schemas.microsoft.com/office/drawing/2016/SVG/main" r:embed="rId13"/>
               </a:ext>
             </a:extLst>
           </a:blip>
@@ -3594,7 +3601,7 @@
           <a:blip r:embed="rId14">
             <a:extLst>
               <a:ext uri="{96DAC541-7B7A-43D3-8B79-37D633B846F1}">
-                <asvg:svgBlip xmlns:asvg="http://schemas.microsoft.com/office/drawing/2016/SVG/main" xmlns="" r:embed="rId17"/>
+                <asvg:svgBlip xmlns="" xmlns:asvg="http://schemas.microsoft.com/office/drawing/2016/SVG/main" r:embed="rId17"/>
               </a:ext>
             </a:extLst>
           </a:blip>
@@ -3630,7 +3637,7 @@
           <a:blip r:embed="rId12">
             <a:extLst>
               <a:ext uri="{96DAC541-7B7A-43D3-8B79-37D633B846F1}">
-                <asvg:svgBlip xmlns:asvg="http://schemas.microsoft.com/office/drawing/2016/SVG/main" xmlns="" r:embed="rId13"/>
+                <asvg:svgBlip xmlns="" xmlns:asvg="http://schemas.microsoft.com/office/drawing/2016/SVG/main" r:embed="rId13"/>
               </a:ext>
             </a:extLst>
           </a:blip>
@@ -3792,7 +3799,7 @@
           <a:blip r:embed="rId4">
             <a:extLst>
               <a:ext uri="{96DAC541-7B7A-43D3-8B79-37D633B846F1}">
-                <asvg:svgBlip xmlns:asvg="http://schemas.microsoft.com/office/drawing/2016/SVG/main" xmlns="" r:embed="rId7"/>
+                <asvg:svgBlip xmlns="" xmlns:asvg="http://schemas.microsoft.com/office/drawing/2016/SVG/main" r:embed="rId7"/>
               </a:ext>
             </a:extLst>
           </a:blip>
@@ -3909,7 +3916,7 @@
           <a:blip r:embed="rId8">
             <a:extLst>
               <a:ext uri="{96DAC541-7B7A-43D3-8B79-37D633B846F1}">
-                <asvg:svgBlip xmlns:asvg="http://schemas.microsoft.com/office/drawing/2016/SVG/main" xmlns="" r:embed="rId9"/>
+                <asvg:svgBlip xmlns="" xmlns:asvg="http://schemas.microsoft.com/office/drawing/2016/SVG/main" r:embed="rId9"/>
               </a:ext>
             </a:extLst>
           </a:blip>
@@ -4028,7 +4035,7 @@
           <a:blip r:embed="rId14">
             <a:extLst>
               <a:ext uri="{96DAC541-7B7A-43D3-8B79-37D633B846F1}">
-                <asvg:svgBlip xmlns:asvg="http://schemas.microsoft.com/office/drawing/2016/SVG/main" xmlns="" r:embed="rId17"/>
+                <asvg:svgBlip xmlns="" xmlns:asvg="http://schemas.microsoft.com/office/drawing/2016/SVG/main" r:embed="rId17"/>
               </a:ext>
             </a:extLst>
           </a:blip>
@@ -4064,7 +4071,7 @@
           <a:blip r:embed="rId12">
             <a:extLst>
               <a:ext uri="{96DAC541-7B7A-43D3-8B79-37D633B846F1}">
-                <asvg:svgBlip xmlns:asvg="http://schemas.microsoft.com/office/drawing/2016/SVG/main" xmlns="" r:embed="rId13"/>
+                <asvg:svgBlip xmlns="" xmlns:asvg="http://schemas.microsoft.com/office/drawing/2016/SVG/main" r:embed="rId13"/>
               </a:ext>
             </a:extLst>
           </a:blip>
@@ -4154,7 +4161,7 @@
                 </a14:imgProps>
               </a:ext>
               <a:ext uri="{96DAC541-7B7A-43D3-8B79-37D633B846F1}">
-                <asvg:svgBlip xmlns:asvg="http://schemas.microsoft.com/office/drawing/2016/SVG/main" xmlns="" r:embed="rId32"/>
+                <asvg:svgBlip xmlns="" xmlns:asvg="http://schemas.microsoft.com/office/drawing/2016/SVG/main" r:embed="rId32"/>
               </a:ext>
             </a:extLst>
           </a:blip>
@@ -4936,7 +4943,7 @@
           <a:blip r:embed="rId12">
             <a:extLst>
               <a:ext uri="{96DAC541-7B7A-43D3-8B79-37D633B846F1}">
-                <asvg:svgBlip xmlns:asvg="http://schemas.microsoft.com/office/drawing/2016/SVG/main" xmlns="" r:embed="rId13"/>
+                <asvg:svgBlip xmlns="" xmlns:asvg="http://schemas.microsoft.com/office/drawing/2016/SVG/main" r:embed="rId13"/>
               </a:ext>
             </a:extLst>
           </a:blip>
@@ -5017,7 +5024,7 @@
           <a:blip r:embed="rId12">
             <a:extLst>
               <a:ext uri="{96DAC541-7B7A-43D3-8B79-37D633B846F1}">
-                <asvg:svgBlip xmlns:asvg="http://schemas.microsoft.com/office/drawing/2016/SVG/main" xmlns="" r:embed="rId13"/>
+                <asvg:svgBlip xmlns="" xmlns:asvg="http://schemas.microsoft.com/office/drawing/2016/SVG/main" r:embed="rId13"/>
               </a:ext>
             </a:extLst>
           </a:blip>
@@ -5070,15 +5077,7 @@
                 <a:ea typeface="Amazon Ember" panose="020B0603020204020204" pitchFamily="34" charset="0"/>
                 <a:cs typeface="Arial" panose="020B0604020202020204" pitchFamily="34" charset="0"/>
               </a:rPr>
-              <a:t>SQL </a:t>
-            </a:r>
-            <a:r>
-              <a:rPr lang="en-US" sz="1200" smtClean="0">
-                <a:latin typeface="Arial" panose="020B0604020202020204" pitchFamily="34" charset="0"/>
-                <a:ea typeface="Amazon Ember" panose="020B0603020204020204" pitchFamily="34" charset="0"/>
-                <a:cs typeface="Arial" panose="020B0604020202020204" pitchFamily="34" charset="0"/>
-              </a:rPr>
-              <a:t>node</a:t>
+              <a:t>SQL node</a:t>
             </a:r>
             <a:endParaRPr lang="en-US" sz="1200" dirty="0">
               <a:latin typeface="Arial" panose="020B0604020202020204" pitchFamily="34" charset="0"/>
@@ -5133,7 +5132,7 @@
           </a:fontRef>
         </p:style>
         <p:txBody>
-          <a:bodyPr tIns="91440"/>
+          <a:bodyPr lIns="91440" tIns="91440" rIns="91440"/>
           <a:lstStyle/>
           <a:p>
             <a:pPr algn="ctr" eaLnBrk="1" fontAlgn="auto" hangingPunct="1">
@@ -5146,24 +5145,34 @@
               <a:defRPr/>
             </a:pPr>
             <a:r>
-              <a:rPr lang="en-US" sz="1200" smtClean="0">
+              <a:rPr lang="en-US" sz="1200" dirty="0" smtClean="0">
                 <a:solidFill>
                   <a:srgbClr val="5A6B86"/>
                 </a:solidFill>
                 <a:latin typeface="Arial" panose="020B0604020202020204" pitchFamily="34" charset="0"/>
                 <a:cs typeface="Arial" panose="020B0604020202020204" pitchFamily="34" charset="0"/>
               </a:rPr>
-              <a:t>Failover cluser </a:t>
-            </a:r>
-            <a:r>
-              <a:rPr lang="en-US" sz="1200" smtClean="0">
+              <a:t>Failover </a:t>
+            </a:r>
+            <a:r>
+              <a:rPr lang="en-US" sz="1200" dirty="0" err="1" smtClean="0">
                 <a:solidFill>
                   <a:srgbClr val="5A6B86"/>
                 </a:solidFill>
                 <a:latin typeface="Arial" panose="020B0604020202020204" pitchFamily="34" charset="0"/>
                 <a:cs typeface="Arial" panose="020B0604020202020204" pitchFamily="34" charset="0"/>
               </a:rPr>
-              <a:t>and</a:t>
+              <a:t>cluser</a:t>
+            </a:r>
+            <a:r>
+              <a:rPr lang="en-US" sz="1200" dirty="0" smtClean="0">
+                <a:solidFill>
+                  <a:srgbClr val="5A6B86"/>
+                </a:solidFill>
+                <a:latin typeface="Arial" panose="020B0604020202020204" pitchFamily="34" charset="0"/>
+                <a:cs typeface="Arial" panose="020B0604020202020204" pitchFamily="34" charset="0"/>
+              </a:rPr>
+              <a:t> and</a:t>
             </a:r>
           </a:p>
           <a:p>
@@ -5177,7 +5186,7 @@
               <a:defRPr/>
             </a:pPr>
             <a:r>
-              <a:rPr lang="en-US" sz="1200" smtClean="0">
+              <a:rPr lang="en-US" sz="1200" dirty="0" smtClean="0">
                 <a:solidFill>
                   <a:srgbClr val="5A6B86"/>
                 </a:solidFill>
@@ -5198,7 +5207,7 @@
               <a:defRPr/>
             </a:pPr>
             <a:r>
-              <a:rPr lang="en-US" sz="1200" smtClean="0">
+              <a:rPr lang="en-US" sz="1200" dirty="0" smtClean="0">
                 <a:solidFill>
                   <a:srgbClr val="5A6B86"/>
                 </a:solidFill>
@@ -5221,6 +5230,4353 @@
     <p:extLst>
       <p:ext uri="{BB962C8B-B14F-4D97-AF65-F5344CB8AC3E}">
         <p14:creationId xmlns:p14="http://schemas.microsoft.com/office/powerpoint/2010/main" val="1591469941"/>
+      </p:ext>
+    </p:extLst>
+  </p:cSld>
+  <p:clrMapOvr>
+    <a:masterClrMapping/>
+  </p:clrMapOvr>
+</p:sld>
+</file>
+
+<file path=ppt/slides/slide2.xml><?xml version="1.0" encoding="utf-8"?>
+<p:sld xmlns:a="http://schemas.openxmlformats.org/drawingml/2006/main" xmlns:r="http://schemas.openxmlformats.org/officeDocument/2006/relationships" xmlns:p="http://schemas.openxmlformats.org/presentationml/2006/main">
+  <p:cSld>
+    <p:spTree>
+      <p:nvGrpSpPr>
+        <p:cNvPr id="1" name=""/>
+        <p:cNvGrpSpPr/>
+        <p:nvPr/>
+      </p:nvGrpSpPr>
+      <p:grpSpPr>
+        <a:xfrm>
+          <a:off x="0" y="0"/>
+          <a:ext cx="0" cy="0"/>
+          <a:chOff x="0" y="0"/>
+          <a:chExt cx="0" cy="0"/>
+        </a:xfrm>
+      </p:grpSpPr>
+      <p:sp>
+        <p:nvSpPr>
+          <p:cNvPr id="4" name="Rectangle 3">
+            <a:extLst>
+              <a:ext uri="{FF2B5EF4-FFF2-40B4-BE49-F238E27FC236}">
+                <a16:creationId xmlns:a16="http://schemas.microsoft.com/office/drawing/2014/main" id="{CE7F7081-419C-2E4F-A999-2923C4338FC0}"/>
+              </a:ext>
+            </a:extLst>
+          </p:cNvPr>
+          <p:cNvSpPr/>
+          <p:nvPr/>
+        </p:nvSpPr>
+        <p:spPr>
+          <a:xfrm>
+            <a:off x="588108" y="609600"/>
+            <a:ext cx="9617662" cy="5029200"/>
+          </a:xfrm>
+          <a:prstGeom prst="rect">
+            <a:avLst/>
+          </a:prstGeom>
+          <a:noFill/>
+          <a:ln w="12700">
+            <a:solidFill>
+              <a:schemeClr val="tx1"/>
+            </a:solidFill>
+          </a:ln>
+        </p:spPr>
+        <p:style>
+          <a:lnRef idx="2">
+            <a:schemeClr val="accent1">
+              <a:shade val="50000"/>
+            </a:schemeClr>
+          </a:lnRef>
+          <a:fillRef idx="1">
+            <a:schemeClr val="accent1"/>
+          </a:fillRef>
+          <a:effectRef idx="0">
+            <a:schemeClr val="accent1"/>
+          </a:effectRef>
+          <a:fontRef idx="minor">
+            <a:schemeClr val="lt1"/>
+          </a:fontRef>
+        </p:style>
+        <p:txBody>
+          <a:bodyPr rot="0" spcFirstLastPara="0" vertOverflow="overflow" horzOverflow="overflow" vert="horz" wrap="square" lIns="457200" tIns="91440" rIns="91440" bIns="45720" numCol="1" spcCol="0" rtlCol="0" fromWordArt="0" anchor="t" anchorCtr="0" forceAA="0" compatLnSpc="1">
+            <a:prstTxWarp prst="textNoShape">
+              <a:avLst/>
+            </a:prstTxWarp>
+            <a:noAutofit/>
+          </a:bodyPr>
+          <a:lstStyle/>
+          <a:p>
+            <a:pPr algn="l"/>
+            <a:r>
+              <a:rPr lang="en-US" sz="1200" dirty="0">
+                <a:solidFill>
+                  <a:sysClr val="windowText" lastClr="000000"/>
+                </a:solidFill>
+                <a:latin typeface="Arial" panose="020B0604020202020204" pitchFamily="34" charset="0"/>
+                <a:ea typeface="Amazon Ember" panose="020B0603020204020204" pitchFamily="34" charset="0"/>
+                <a:cs typeface="Arial" panose="020B0604020202020204" pitchFamily="34" charset="0"/>
+              </a:rPr>
+              <a:t>AWS Cloud</a:t>
+            </a:r>
+          </a:p>
+        </p:txBody>
+      </p:sp>
+      <p:pic>
+        <p:nvPicPr>
+          <p:cNvPr id="5" name="Graphic 11">
+            <a:extLst>
+              <a:ext uri="{FF2B5EF4-FFF2-40B4-BE49-F238E27FC236}">
+                <a16:creationId xmlns:a16="http://schemas.microsoft.com/office/drawing/2014/main" id="{CE52C9D7-11B0-9E41-AB16-2C9849C3ECBE}"/>
+              </a:ext>
+            </a:extLst>
+          </p:cNvPr>
+          <p:cNvPicPr>
+            <a:picLocks noChangeAspect="1"/>
+          </p:cNvPicPr>
+          <p:nvPr/>
+        </p:nvPicPr>
+        <p:blipFill>
+          <a:blip r:embed="rId2">
+            <a:extLst>
+              <a:ext uri="{96DAC541-7B7A-43D3-8B79-37D633B846F1}">
+                <asvg:svgBlip xmlns="" xmlns:asvg="http://schemas.microsoft.com/office/drawing/2016/SVG/main" r:embed="rId3"/>
+              </a:ext>
+            </a:extLst>
+          </a:blip>
+          <a:stretch>
+            <a:fillRect/>
+          </a:stretch>
+        </p:blipFill>
+        <p:spPr>
+          <a:xfrm>
+            <a:off x="588108" y="609600"/>
+            <a:ext cx="330200" cy="330200"/>
+          </a:xfrm>
+          <a:prstGeom prst="rect">
+            <a:avLst/>
+          </a:prstGeom>
+        </p:spPr>
+      </p:pic>
+      <p:sp>
+        <p:nvSpPr>
+          <p:cNvPr id="6" name="Rectangle 5">
+            <a:extLst>
+              <a:ext uri="{FF2B5EF4-FFF2-40B4-BE49-F238E27FC236}">
+                <a16:creationId xmlns:a16="http://schemas.microsoft.com/office/drawing/2014/main" id="{E25F190B-F12E-614B-827A-566AC09E9D97}"/>
+              </a:ext>
+            </a:extLst>
+          </p:cNvPr>
+          <p:cNvSpPr/>
+          <p:nvPr/>
+        </p:nvSpPr>
+        <p:spPr>
+          <a:xfrm>
+            <a:off x="1795389" y="1600200"/>
+            <a:ext cx="2471811" cy="1447800"/>
+          </a:xfrm>
+          <a:prstGeom prst="rect">
+            <a:avLst/>
+          </a:prstGeom>
+          <a:solidFill>
+            <a:srgbClr val="1D8900">
+              <a:alpha val="9804"/>
+            </a:srgbClr>
+          </a:solidFill>
+          <a:ln w="12700">
+            <a:noFill/>
+            <a:prstDash val="dash"/>
+          </a:ln>
+        </p:spPr>
+        <p:style>
+          <a:lnRef idx="2">
+            <a:schemeClr val="accent1">
+              <a:shade val="50000"/>
+            </a:schemeClr>
+          </a:lnRef>
+          <a:fillRef idx="1">
+            <a:schemeClr val="accent1"/>
+          </a:fillRef>
+          <a:effectRef idx="0">
+            <a:schemeClr val="accent1"/>
+          </a:effectRef>
+          <a:fontRef idx="minor">
+            <a:schemeClr val="lt1"/>
+          </a:fontRef>
+        </p:style>
+        <p:txBody>
+          <a:bodyPr rot="0" spcFirstLastPara="0" vertOverflow="overflow" horzOverflow="overflow" vert="horz" wrap="square" lIns="338328" tIns="45720" rIns="91440" bIns="45720" numCol="1" spcCol="0" rtlCol="0" fromWordArt="0" anchor="t" anchorCtr="0" forceAA="0" compatLnSpc="1">
+            <a:prstTxWarp prst="textNoShape">
+              <a:avLst/>
+            </a:prstTxWarp>
+            <a:noAutofit/>
+          </a:bodyPr>
+          <a:lstStyle/>
+          <a:p>
+            <a:pPr algn="l"/>
+            <a:r>
+              <a:rPr lang="en-US" sz="1200" dirty="0">
+                <a:solidFill>
+                  <a:schemeClr val="accent6"/>
+                </a:solidFill>
+                <a:latin typeface="Arial" panose="020B0604020202020204" pitchFamily="34" charset="0"/>
+                <a:ea typeface="Amazon Ember" panose="020B0603020204020204" pitchFamily="34" charset="0"/>
+                <a:cs typeface="Arial" panose="020B0604020202020204" pitchFamily="34" charset="0"/>
+              </a:rPr>
+              <a:t>Public subnet</a:t>
+            </a:r>
+          </a:p>
+          <a:p>
+            <a:pPr algn="l"/>
+            <a:endParaRPr lang="en-US" sz="1200" dirty="0">
+              <a:solidFill>
+                <a:schemeClr val="accent5"/>
+              </a:solidFill>
+              <a:latin typeface="Arial" panose="020B0604020202020204" pitchFamily="34" charset="0"/>
+              <a:ea typeface="Amazon Ember" panose="020B0603020204020204" pitchFamily="34" charset="0"/>
+              <a:cs typeface="Arial" panose="020B0604020202020204" pitchFamily="34" charset="0"/>
+            </a:endParaRPr>
+          </a:p>
+        </p:txBody>
+      </p:sp>
+      <p:pic>
+        <p:nvPicPr>
+          <p:cNvPr id="7" name="Graphic 10">
+            <a:extLst>
+              <a:ext uri="{FF2B5EF4-FFF2-40B4-BE49-F238E27FC236}">
+                <a16:creationId xmlns:a16="http://schemas.microsoft.com/office/drawing/2014/main" id="{89B99B74-19F0-0B4B-85E3-A09DF2519E46}"/>
+              </a:ext>
+            </a:extLst>
+          </p:cNvPr>
+          <p:cNvPicPr>
+            <a:picLocks noChangeAspect="1"/>
+          </p:cNvPicPr>
+          <p:nvPr/>
+        </p:nvPicPr>
+        <p:blipFill>
+          <a:blip r:embed="rId4">
+            <a:extLst>
+              <a:ext uri="{96DAC541-7B7A-43D3-8B79-37D633B846F1}">
+                <asvg:svgBlip xmlns="" xmlns:asvg="http://schemas.microsoft.com/office/drawing/2016/SVG/main" r:embed="rId7"/>
+              </a:ext>
+            </a:extLst>
+          </a:blip>
+          <a:stretch>
+            <a:fillRect/>
+          </a:stretch>
+        </p:blipFill>
+        <p:spPr>
+          <a:xfrm>
+            <a:off x="1793530" y="1601002"/>
+            <a:ext cx="274320" cy="274320"/>
+          </a:xfrm>
+          <a:prstGeom prst="rect">
+            <a:avLst/>
+          </a:prstGeom>
+        </p:spPr>
+      </p:pic>
+      <p:sp>
+        <p:nvSpPr>
+          <p:cNvPr id="8" name="Rectangle 7">
+            <a:extLst>
+              <a:ext uri="{FF2B5EF4-FFF2-40B4-BE49-F238E27FC236}">
+                <a16:creationId xmlns:a16="http://schemas.microsoft.com/office/drawing/2014/main" id="{A85485B4-AA18-C048-B92A-A9A0F4372B98}"/>
+              </a:ext>
+            </a:extLst>
+          </p:cNvPr>
+          <p:cNvSpPr/>
+          <p:nvPr/>
+        </p:nvSpPr>
+        <p:spPr>
+          <a:xfrm>
+            <a:off x="1793530" y="3124200"/>
+            <a:ext cx="2473670" cy="2179104"/>
+          </a:xfrm>
+          <a:prstGeom prst="rect">
+            <a:avLst/>
+          </a:prstGeom>
+          <a:solidFill>
+            <a:srgbClr val="007CBC">
+              <a:alpha val="9804"/>
+            </a:srgbClr>
+          </a:solidFill>
+          <a:ln w="12700">
+            <a:noFill/>
+            <a:prstDash val="dash"/>
+          </a:ln>
+        </p:spPr>
+        <p:style>
+          <a:lnRef idx="2">
+            <a:schemeClr val="accent1">
+              <a:shade val="50000"/>
+            </a:schemeClr>
+          </a:lnRef>
+          <a:fillRef idx="1">
+            <a:schemeClr val="accent1"/>
+          </a:fillRef>
+          <a:effectRef idx="0">
+            <a:schemeClr val="accent1"/>
+          </a:effectRef>
+          <a:fontRef idx="minor">
+            <a:schemeClr val="lt1"/>
+          </a:fontRef>
+        </p:style>
+        <p:txBody>
+          <a:bodyPr rot="0" spcFirstLastPara="0" vertOverflow="overflow" horzOverflow="overflow" vert="horz" wrap="square" lIns="338328" tIns="45720" rIns="91440" bIns="45720" numCol="1" spcCol="0" rtlCol="0" fromWordArt="0" anchor="t" anchorCtr="0" forceAA="0" compatLnSpc="1">
+            <a:prstTxWarp prst="textNoShape">
+              <a:avLst/>
+            </a:prstTxWarp>
+            <a:noAutofit/>
+          </a:bodyPr>
+          <a:lstStyle/>
+          <a:p>
+            <a:pPr algn="l"/>
+            <a:r>
+              <a:rPr lang="en-US" sz="1200" dirty="0">
+                <a:solidFill>
+                  <a:schemeClr val="accent1"/>
+                </a:solidFill>
+                <a:latin typeface="Arial" panose="020B0604020202020204" pitchFamily="34" charset="0"/>
+                <a:ea typeface="Amazon Ember" panose="020B0603020204020204" pitchFamily="34" charset="0"/>
+                <a:cs typeface="Arial" panose="020B0604020202020204" pitchFamily="34" charset="0"/>
+              </a:rPr>
+              <a:t>Private subnet</a:t>
+            </a:r>
+          </a:p>
+          <a:p>
+            <a:pPr algn="l"/>
+            <a:endParaRPr lang="en-US" sz="1200" dirty="0">
+              <a:solidFill>
+                <a:schemeClr val="accent3"/>
+              </a:solidFill>
+              <a:latin typeface="Arial" panose="020B0604020202020204" pitchFamily="34" charset="0"/>
+              <a:ea typeface="Amazon Ember" panose="020B0603020204020204" pitchFamily="34" charset="0"/>
+              <a:cs typeface="Arial" panose="020B0604020202020204" pitchFamily="34" charset="0"/>
+            </a:endParaRPr>
+          </a:p>
+        </p:txBody>
+      </p:sp>
+      <p:pic>
+        <p:nvPicPr>
+          <p:cNvPr id="9" name="Graphic 13">
+            <a:extLst>
+              <a:ext uri="{FF2B5EF4-FFF2-40B4-BE49-F238E27FC236}">
+                <a16:creationId xmlns:a16="http://schemas.microsoft.com/office/drawing/2014/main" id="{3BD31095-C7B2-C24A-9990-6F9E14956A7B}"/>
+              </a:ext>
+            </a:extLst>
+          </p:cNvPr>
+          <p:cNvPicPr>
+            <a:picLocks noChangeAspect="1"/>
+          </p:cNvPicPr>
+          <p:nvPr/>
+        </p:nvPicPr>
+        <p:blipFill>
+          <a:blip r:embed="rId8">
+            <a:extLst>
+              <a:ext uri="{96DAC541-7B7A-43D3-8B79-37D633B846F1}">
+                <asvg:svgBlip xmlns="" xmlns:asvg="http://schemas.microsoft.com/office/drawing/2016/SVG/main" r:embed="rId9"/>
+              </a:ext>
+            </a:extLst>
+          </a:blip>
+          <a:stretch>
+            <a:fillRect/>
+          </a:stretch>
+        </p:blipFill>
+        <p:spPr>
+          <a:xfrm>
+            <a:off x="1793529" y="3158998"/>
+            <a:ext cx="274320" cy="274320"/>
+          </a:xfrm>
+          <a:prstGeom prst="rect">
+            <a:avLst/>
+          </a:prstGeom>
+        </p:spPr>
+      </p:pic>
+      <p:sp>
+        <p:nvSpPr>
+          <p:cNvPr id="10" name="Rectangle 9">
+            <a:extLst>
+              <a:ext uri="{FF2B5EF4-FFF2-40B4-BE49-F238E27FC236}">
+                <a16:creationId xmlns:a16="http://schemas.microsoft.com/office/drawing/2014/main" id="{25B2706C-95D8-A94F-9EC8-6497FA7FB136}"/>
+              </a:ext>
+            </a:extLst>
+          </p:cNvPr>
+          <p:cNvSpPr/>
+          <p:nvPr/>
+        </p:nvSpPr>
+        <p:spPr>
+          <a:xfrm>
+            <a:off x="3038910" y="1942075"/>
+            <a:ext cx="3846346" cy="978466"/>
+          </a:xfrm>
+          <a:prstGeom prst="rect">
+            <a:avLst/>
+          </a:prstGeom>
+          <a:noFill/>
+          <a:ln w="12700">
+            <a:solidFill>
+              <a:srgbClr val="D86613"/>
+            </a:solidFill>
+            <a:prstDash val="dash"/>
+          </a:ln>
+        </p:spPr>
+        <p:style>
+          <a:lnRef idx="2">
+            <a:schemeClr val="accent1">
+              <a:shade val="50000"/>
+            </a:schemeClr>
+          </a:lnRef>
+          <a:fillRef idx="1">
+            <a:schemeClr val="accent1"/>
+          </a:fillRef>
+          <a:effectRef idx="0">
+            <a:schemeClr val="accent1"/>
+          </a:effectRef>
+          <a:fontRef idx="minor">
+            <a:schemeClr val="lt1"/>
+          </a:fontRef>
+        </p:style>
+        <p:txBody>
+          <a:bodyPr rot="0" spcFirstLastPara="0" vertOverflow="overflow" horzOverflow="overflow" vert="horz" wrap="square" lIns="91440" tIns="91440" rIns="91440" bIns="45720" numCol="1" spcCol="0" rtlCol="0" fromWordArt="0" anchor="t" anchorCtr="0" forceAA="0" compatLnSpc="1">
+            <a:prstTxWarp prst="textNoShape">
+              <a:avLst/>
+            </a:prstTxWarp>
+            <a:noAutofit/>
+          </a:bodyPr>
+          <a:lstStyle/>
+          <a:p>
+            <a:pPr algn="ctr"/>
+            <a:endParaRPr lang="en-US" sz="1200" dirty="0">
+              <a:solidFill>
+                <a:srgbClr val="D86613"/>
+              </a:solidFill>
+              <a:latin typeface="Arial" panose="020B0604020202020204" pitchFamily="34" charset="0"/>
+              <a:ea typeface="Amazon Ember" panose="020B0603020204020204" pitchFamily="34" charset="0"/>
+              <a:cs typeface="Arial" panose="020B0604020202020204" pitchFamily="34" charset="0"/>
+            </a:endParaRPr>
+          </a:p>
+          <a:p>
+            <a:pPr algn="ctr"/>
+            <a:endParaRPr lang="en-US" sz="1200" dirty="0">
+              <a:solidFill>
+                <a:srgbClr val="D86613"/>
+              </a:solidFill>
+              <a:latin typeface="Arial" panose="020B0604020202020204" pitchFamily="34" charset="0"/>
+              <a:ea typeface="Amazon Ember" panose="020B0603020204020204" pitchFamily="34" charset="0"/>
+              <a:cs typeface="Arial" panose="020B0604020202020204" pitchFamily="34" charset="0"/>
+            </a:endParaRPr>
+          </a:p>
+          <a:p>
+            <a:pPr algn="ctr"/>
+            <a:r>
+              <a:rPr lang="en-US" sz="1200" dirty="0">
+                <a:solidFill>
+                  <a:srgbClr val="D86613"/>
+                </a:solidFill>
+                <a:latin typeface="Arial" panose="020B0604020202020204" pitchFamily="34" charset="0"/>
+                <a:ea typeface="Amazon Ember" panose="020B0603020204020204" pitchFamily="34" charset="0"/>
+                <a:cs typeface="Arial" panose="020B0604020202020204" pitchFamily="34" charset="0"/>
+              </a:rPr>
+              <a:t>Auto </a:t>
+            </a:r>
+            <a:r>
+              <a:rPr lang="en-US" sz="1200" dirty="0" smtClean="0">
+                <a:solidFill>
+                  <a:srgbClr val="D86613"/>
+                </a:solidFill>
+                <a:latin typeface="Arial" panose="020B0604020202020204" pitchFamily="34" charset="0"/>
+                <a:ea typeface="Amazon Ember" panose="020B0603020204020204" pitchFamily="34" charset="0"/>
+                <a:cs typeface="Arial" panose="020B0604020202020204" pitchFamily="34" charset="0"/>
+              </a:rPr>
+              <a:t>Scaling</a:t>
+            </a:r>
+          </a:p>
+          <a:p>
+            <a:pPr algn="ctr"/>
+            <a:r>
+              <a:rPr lang="en-US" sz="1200" dirty="0" smtClean="0">
+                <a:solidFill>
+                  <a:srgbClr val="D86613"/>
+                </a:solidFill>
+                <a:latin typeface="Arial" panose="020B0604020202020204" pitchFamily="34" charset="0"/>
+                <a:ea typeface="Amazon Ember" panose="020B0603020204020204" pitchFamily="34" charset="0"/>
+                <a:cs typeface="Arial" panose="020B0604020202020204" pitchFamily="34" charset="0"/>
+              </a:rPr>
+              <a:t>group</a:t>
+            </a:r>
+            <a:endParaRPr lang="en-US" sz="1200" dirty="0">
+              <a:solidFill>
+                <a:srgbClr val="D86613"/>
+              </a:solidFill>
+              <a:latin typeface="Arial" panose="020B0604020202020204" pitchFamily="34" charset="0"/>
+              <a:ea typeface="Amazon Ember" panose="020B0603020204020204" pitchFamily="34" charset="0"/>
+              <a:cs typeface="Arial" panose="020B0604020202020204" pitchFamily="34" charset="0"/>
+            </a:endParaRPr>
+          </a:p>
+        </p:txBody>
+      </p:sp>
+      <p:pic>
+        <p:nvPicPr>
+          <p:cNvPr id="11" name="Graphic 3">
+            <a:extLst>
+              <a:ext uri="{FF2B5EF4-FFF2-40B4-BE49-F238E27FC236}">
+                <a16:creationId xmlns:a16="http://schemas.microsoft.com/office/drawing/2014/main" id="{D7A7873E-A1CC-804E-816C-DC0FF152D82D}"/>
+              </a:ext>
+            </a:extLst>
+          </p:cNvPr>
+          <p:cNvPicPr>
+            <a:picLocks noChangeAspect="1"/>
+          </p:cNvPicPr>
+          <p:nvPr/>
+        </p:nvPicPr>
+        <p:blipFill>
+          <a:blip r:embed="rId10">
+            <a:extLst>
+              <a:ext uri="{96DAC541-7B7A-43D3-8B79-37D633B846F1}">
+                <asvg:svgBlip xmlns="" xmlns:asvg="http://schemas.microsoft.com/office/drawing/2016/SVG/main" r:embed="rId11"/>
+              </a:ext>
+            </a:extLst>
+          </a:blip>
+          <a:stretch>
+            <a:fillRect/>
+          </a:stretch>
+        </p:blipFill>
+        <p:spPr>
+          <a:xfrm>
+            <a:off x="4800571" y="1939667"/>
+            <a:ext cx="330200" cy="330200"/>
+          </a:xfrm>
+          <a:prstGeom prst="rect">
+            <a:avLst/>
+          </a:prstGeom>
+        </p:spPr>
+      </p:pic>
+      <p:pic>
+        <p:nvPicPr>
+          <p:cNvPr id="12" name="Graphic 135">
+            <a:extLst>
+              <a:ext uri="{FF2B5EF4-FFF2-40B4-BE49-F238E27FC236}">
+                <a16:creationId xmlns:a16="http://schemas.microsoft.com/office/drawing/2014/main" id="{C19987B1-DB3A-1640-994D-BCB81FCC1AE4}"/>
+              </a:ext>
+            </a:extLst>
+          </p:cNvPr>
+          <p:cNvPicPr>
+            <a:picLocks noChangeAspect="1"/>
+          </p:cNvPicPr>
+          <p:nvPr/>
+        </p:nvPicPr>
+        <p:blipFill>
+          <a:blip r:embed="rId12">
+            <a:extLst>
+              <a:ext uri="{96DAC541-7B7A-43D3-8B79-37D633B846F1}">
+                <asvg:svgBlip xmlns="" xmlns:asvg="http://schemas.microsoft.com/office/drawing/2016/SVG/main" r:embed="rId13"/>
+              </a:ext>
+            </a:extLst>
+          </a:blip>
+          <a:stretch>
+            <a:fillRect/>
+          </a:stretch>
+        </p:blipFill>
+        <p:spPr>
+          <a:xfrm>
+            <a:off x="3351797" y="2064381"/>
+            <a:ext cx="469900" cy="469900"/>
+          </a:xfrm>
+          <a:prstGeom prst="rect">
+            <a:avLst/>
+          </a:prstGeom>
+        </p:spPr>
+      </p:pic>
+      <p:sp>
+        <p:nvSpPr>
+          <p:cNvPr id="13" name="TextBox 12">
+            <a:extLst>
+              <a:ext uri="{FF2B5EF4-FFF2-40B4-BE49-F238E27FC236}">
+                <a16:creationId xmlns:a16="http://schemas.microsoft.com/office/drawing/2014/main" id="{F90C1CC4-DFE6-0445-BD1C-DB610E1A07F5}"/>
+              </a:ext>
+            </a:extLst>
+          </p:cNvPr>
+          <p:cNvSpPr txBox="1"/>
+          <p:nvPr/>
+        </p:nvSpPr>
+        <p:spPr>
+          <a:xfrm>
+            <a:off x="2830095" y="2540217"/>
+            <a:ext cx="1513305" cy="276999"/>
+          </a:xfrm>
+          <a:prstGeom prst="rect">
+            <a:avLst/>
+          </a:prstGeom>
+          <a:noFill/>
+        </p:spPr>
+        <p:txBody>
+          <a:bodyPr wrap="square" rtlCol="0">
+            <a:spAutoFit/>
+          </a:bodyPr>
+          <a:lstStyle/>
+          <a:p>
+            <a:pPr algn="ctr"/>
+            <a:r>
+              <a:rPr lang="en-US" sz="1200" dirty="0">
+                <a:latin typeface="Arial" panose="020B0604020202020204" pitchFamily="34" charset="0"/>
+                <a:ea typeface="Amazon Ember" panose="020B0603020204020204" pitchFamily="34" charset="0"/>
+                <a:cs typeface="Arial" panose="020B0604020202020204" pitchFamily="34" charset="0"/>
+              </a:rPr>
+              <a:t>RD Gateway</a:t>
+            </a:r>
+          </a:p>
+        </p:txBody>
+      </p:sp>
+      <p:sp>
+        <p:nvSpPr>
+          <p:cNvPr id="14" name="TextBox 13">
+            <a:extLst>
+              <a:ext uri="{FF2B5EF4-FFF2-40B4-BE49-F238E27FC236}">
+                <a16:creationId xmlns:a16="http://schemas.microsoft.com/office/drawing/2014/main" id="{517096B6-EF64-C245-A3E7-BEEF81BDCB9C}"/>
+              </a:ext>
+            </a:extLst>
+          </p:cNvPr>
+          <p:cNvSpPr txBox="1"/>
+          <p:nvPr/>
+        </p:nvSpPr>
+        <p:spPr>
+          <a:xfrm>
+            <a:off x="1893620" y="2542641"/>
+            <a:ext cx="1236442" cy="276999"/>
+          </a:xfrm>
+          <a:prstGeom prst="rect">
+            <a:avLst/>
+          </a:prstGeom>
+          <a:noFill/>
+        </p:spPr>
+        <p:txBody>
+          <a:bodyPr wrap="square" rtlCol="0">
+            <a:spAutoFit/>
+          </a:bodyPr>
+          <a:lstStyle/>
+          <a:p>
+            <a:pPr algn="ctr"/>
+            <a:r>
+              <a:rPr lang="en-US" sz="1200" dirty="0">
+                <a:latin typeface="Arial" panose="020B0604020202020204" pitchFamily="34" charset="0"/>
+                <a:ea typeface="Amazon Ember" panose="020B0603020204020204" pitchFamily="34" charset="0"/>
+                <a:cs typeface="Arial" panose="020B0604020202020204" pitchFamily="34" charset="0"/>
+              </a:rPr>
+              <a:t>NAT gateway</a:t>
+            </a:r>
+          </a:p>
+        </p:txBody>
+      </p:sp>
+      <p:pic>
+        <p:nvPicPr>
+          <p:cNvPr id="15" name="Graphic 40">
+            <a:extLst>
+              <a:ext uri="{FF2B5EF4-FFF2-40B4-BE49-F238E27FC236}">
+                <a16:creationId xmlns:a16="http://schemas.microsoft.com/office/drawing/2014/main" id="{C322592C-EAB9-0640-95A5-D8FF5B8E5FE6}"/>
+              </a:ext>
+            </a:extLst>
+          </p:cNvPr>
+          <p:cNvPicPr>
+            <a:picLocks noChangeAspect="1"/>
+          </p:cNvPicPr>
+          <p:nvPr/>
+        </p:nvPicPr>
+        <p:blipFill>
+          <a:blip r:embed="rId14">
+            <a:extLst>
+              <a:ext uri="{96DAC541-7B7A-43D3-8B79-37D633B846F1}">
+                <asvg:svgBlip xmlns="" xmlns:asvg="http://schemas.microsoft.com/office/drawing/2016/SVG/main" r:embed="rId17"/>
+              </a:ext>
+            </a:extLst>
+          </a:blip>
+          <a:stretch>
+            <a:fillRect/>
+          </a:stretch>
+        </p:blipFill>
+        <p:spPr>
+          <a:xfrm>
+            <a:off x="2276891" y="2064381"/>
+            <a:ext cx="469900" cy="469900"/>
+          </a:xfrm>
+          <a:prstGeom prst="rect">
+            <a:avLst/>
+          </a:prstGeom>
+        </p:spPr>
+      </p:pic>
+      <p:pic>
+        <p:nvPicPr>
+          <p:cNvPr id="16" name="Graphic 135">
+            <a:extLst>
+              <a:ext uri="{FF2B5EF4-FFF2-40B4-BE49-F238E27FC236}">
+                <a16:creationId xmlns:a16="http://schemas.microsoft.com/office/drawing/2014/main" id="{C19987B1-DB3A-1640-994D-BCB81FCC1AE4}"/>
+              </a:ext>
+            </a:extLst>
+          </p:cNvPr>
+          <p:cNvPicPr>
+            <a:picLocks noChangeAspect="1"/>
+          </p:cNvPicPr>
+          <p:nvPr/>
+        </p:nvPicPr>
+        <p:blipFill>
+          <a:blip r:embed="rId12">
+            <a:extLst>
+              <a:ext uri="{96DAC541-7B7A-43D3-8B79-37D633B846F1}">
+                <asvg:svgBlip xmlns="" xmlns:asvg="http://schemas.microsoft.com/office/drawing/2016/SVG/main" r:embed="rId13"/>
+              </a:ext>
+            </a:extLst>
+          </a:blip>
+          <a:stretch>
+            <a:fillRect/>
+          </a:stretch>
+        </p:blipFill>
+        <p:spPr>
+          <a:xfrm>
+            <a:off x="3341102" y="3352800"/>
+            <a:ext cx="469900" cy="469900"/>
+          </a:xfrm>
+          <a:prstGeom prst="rect">
+            <a:avLst/>
+          </a:prstGeom>
+        </p:spPr>
+      </p:pic>
+      <p:sp>
+        <p:nvSpPr>
+          <p:cNvPr id="17" name="TextBox 16">
+            <a:extLst>
+              <a:ext uri="{FF2B5EF4-FFF2-40B4-BE49-F238E27FC236}">
+                <a16:creationId xmlns:a16="http://schemas.microsoft.com/office/drawing/2014/main" id="{F90C1CC4-DFE6-0445-BD1C-DB610E1A07F5}"/>
+              </a:ext>
+            </a:extLst>
+          </p:cNvPr>
+          <p:cNvSpPr txBox="1"/>
+          <p:nvPr/>
+        </p:nvSpPr>
+        <p:spPr>
+          <a:xfrm>
+            <a:off x="2819400" y="3798209"/>
+            <a:ext cx="1513305" cy="276999"/>
+          </a:xfrm>
+          <a:prstGeom prst="rect">
+            <a:avLst/>
+          </a:prstGeom>
+          <a:noFill/>
+        </p:spPr>
+        <p:txBody>
+          <a:bodyPr wrap="square" rtlCol="0">
+            <a:spAutoFit/>
+          </a:bodyPr>
+          <a:lstStyle/>
+          <a:p>
+            <a:pPr algn="ctr"/>
+            <a:r>
+              <a:rPr lang="en-US" sz="1200" smtClean="0">
+                <a:latin typeface="Arial" panose="020B0604020202020204" pitchFamily="34" charset="0"/>
+                <a:ea typeface="Amazon Ember" panose="020B0603020204020204" pitchFamily="34" charset="0"/>
+                <a:cs typeface="Arial" panose="020B0604020202020204" pitchFamily="34" charset="0"/>
+              </a:rPr>
+              <a:t>Domain controller</a:t>
+            </a:r>
+            <a:endParaRPr lang="en-US" sz="1200" dirty="0">
+              <a:latin typeface="Arial" panose="020B0604020202020204" pitchFamily="34" charset="0"/>
+              <a:ea typeface="Amazon Ember" panose="020B0603020204020204" pitchFamily="34" charset="0"/>
+              <a:cs typeface="Arial" panose="020B0604020202020204" pitchFamily="34" charset="0"/>
+            </a:endParaRPr>
+          </a:p>
+        </p:txBody>
+      </p:sp>
+      <p:sp>
+        <p:nvSpPr>
+          <p:cNvPr id="18" name="Rectangle 17">
+            <a:extLst>
+              <a:ext uri="{FF2B5EF4-FFF2-40B4-BE49-F238E27FC236}">
+                <a16:creationId xmlns:a16="http://schemas.microsoft.com/office/drawing/2014/main" id="{E25F190B-F12E-614B-827A-566AC09E9D97}"/>
+              </a:ext>
+            </a:extLst>
+          </p:cNvPr>
+          <p:cNvSpPr/>
+          <p:nvPr/>
+        </p:nvSpPr>
+        <p:spPr>
+          <a:xfrm>
+            <a:off x="5639875" y="1576754"/>
+            <a:ext cx="2468880" cy="1447800"/>
+          </a:xfrm>
+          <a:prstGeom prst="rect">
+            <a:avLst/>
+          </a:prstGeom>
+          <a:solidFill>
+            <a:srgbClr val="1D8900">
+              <a:alpha val="9804"/>
+            </a:srgbClr>
+          </a:solidFill>
+          <a:ln w="12700">
+            <a:noFill/>
+            <a:prstDash val="dash"/>
+          </a:ln>
+        </p:spPr>
+        <p:style>
+          <a:lnRef idx="2">
+            <a:schemeClr val="accent1">
+              <a:shade val="50000"/>
+            </a:schemeClr>
+          </a:lnRef>
+          <a:fillRef idx="1">
+            <a:schemeClr val="accent1"/>
+          </a:fillRef>
+          <a:effectRef idx="0">
+            <a:schemeClr val="accent1"/>
+          </a:effectRef>
+          <a:fontRef idx="minor">
+            <a:schemeClr val="lt1"/>
+          </a:fontRef>
+        </p:style>
+        <p:txBody>
+          <a:bodyPr rot="0" spcFirstLastPara="0" vertOverflow="overflow" horzOverflow="overflow" vert="horz" wrap="square" lIns="338328" tIns="45720" rIns="91440" bIns="45720" numCol="1" spcCol="0" rtlCol="0" fromWordArt="0" anchor="t" anchorCtr="0" forceAA="0" compatLnSpc="1">
+            <a:prstTxWarp prst="textNoShape">
+              <a:avLst/>
+            </a:prstTxWarp>
+            <a:noAutofit/>
+          </a:bodyPr>
+          <a:lstStyle/>
+          <a:p>
+            <a:pPr algn="l"/>
+            <a:r>
+              <a:rPr lang="en-US" sz="1200" dirty="0">
+                <a:solidFill>
+                  <a:schemeClr val="accent6"/>
+                </a:solidFill>
+                <a:latin typeface="Arial" panose="020B0604020202020204" pitchFamily="34" charset="0"/>
+                <a:ea typeface="Amazon Ember" panose="020B0603020204020204" pitchFamily="34" charset="0"/>
+                <a:cs typeface="Arial" panose="020B0604020202020204" pitchFamily="34" charset="0"/>
+              </a:rPr>
+              <a:t>Public subnet</a:t>
+            </a:r>
+          </a:p>
+          <a:p>
+            <a:pPr algn="l"/>
+            <a:endParaRPr lang="en-US" sz="1200" dirty="0">
+              <a:solidFill>
+                <a:schemeClr val="accent5"/>
+              </a:solidFill>
+              <a:latin typeface="Arial" panose="020B0604020202020204" pitchFamily="34" charset="0"/>
+              <a:ea typeface="Amazon Ember" panose="020B0603020204020204" pitchFamily="34" charset="0"/>
+              <a:cs typeface="Arial" panose="020B0604020202020204" pitchFamily="34" charset="0"/>
+            </a:endParaRPr>
+          </a:p>
+        </p:txBody>
+      </p:sp>
+      <p:pic>
+        <p:nvPicPr>
+          <p:cNvPr id="19" name="Graphic 10">
+            <a:extLst>
+              <a:ext uri="{FF2B5EF4-FFF2-40B4-BE49-F238E27FC236}">
+                <a16:creationId xmlns:a16="http://schemas.microsoft.com/office/drawing/2014/main" id="{89B99B74-19F0-0B4B-85E3-A09DF2519E46}"/>
+              </a:ext>
+            </a:extLst>
+          </p:cNvPr>
+          <p:cNvPicPr>
+            <a:picLocks noChangeAspect="1"/>
+          </p:cNvPicPr>
+          <p:nvPr/>
+        </p:nvPicPr>
+        <p:blipFill>
+          <a:blip r:embed="rId4">
+            <a:extLst>
+              <a:ext uri="{96DAC541-7B7A-43D3-8B79-37D633B846F1}">
+                <asvg:svgBlip xmlns="" xmlns:asvg="http://schemas.microsoft.com/office/drawing/2016/SVG/main" r:embed="rId7"/>
+              </a:ext>
+            </a:extLst>
+          </a:blip>
+          <a:stretch>
+            <a:fillRect/>
+          </a:stretch>
+        </p:blipFill>
+        <p:spPr>
+          <a:xfrm>
+            <a:off x="5639876" y="1574395"/>
+            <a:ext cx="274320" cy="274320"/>
+          </a:xfrm>
+          <a:prstGeom prst="rect">
+            <a:avLst/>
+          </a:prstGeom>
+        </p:spPr>
+      </p:pic>
+      <p:sp>
+        <p:nvSpPr>
+          <p:cNvPr id="20" name="Rectangle 19">
+            <a:extLst>
+              <a:ext uri="{FF2B5EF4-FFF2-40B4-BE49-F238E27FC236}">
+                <a16:creationId xmlns:a16="http://schemas.microsoft.com/office/drawing/2014/main" id="{A85485B4-AA18-C048-B92A-A9A0F4372B98}"/>
+              </a:ext>
+            </a:extLst>
+          </p:cNvPr>
+          <p:cNvSpPr/>
+          <p:nvPr/>
+        </p:nvSpPr>
+        <p:spPr>
+          <a:xfrm>
+            <a:off x="5636944" y="3124200"/>
+            <a:ext cx="2457498" cy="2158540"/>
+          </a:xfrm>
+          <a:prstGeom prst="rect">
+            <a:avLst/>
+          </a:prstGeom>
+          <a:solidFill>
+            <a:srgbClr val="007CBC">
+              <a:alpha val="9804"/>
+            </a:srgbClr>
+          </a:solidFill>
+          <a:ln w="12700">
+            <a:noFill/>
+            <a:prstDash val="dash"/>
+          </a:ln>
+        </p:spPr>
+        <p:style>
+          <a:lnRef idx="2">
+            <a:schemeClr val="accent1">
+              <a:shade val="50000"/>
+            </a:schemeClr>
+          </a:lnRef>
+          <a:fillRef idx="1">
+            <a:schemeClr val="accent1"/>
+          </a:fillRef>
+          <a:effectRef idx="0">
+            <a:schemeClr val="accent1"/>
+          </a:effectRef>
+          <a:fontRef idx="minor">
+            <a:schemeClr val="lt1"/>
+          </a:fontRef>
+        </p:style>
+        <p:txBody>
+          <a:bodyPr rot="0" spcFirstLastPara="0" vertOverflow="overflow" horzOverflow="overflow" vert="horz" wrap="square" lIns="338328" tIns="45720" rIns="91440" bIns="45720" numCol="1" spcCol="0" rtlCol="0" fromWordArt="0" anchor="t" anchorCtr="0" forceAA="0" compatLnSpc="1">
+            <a:prstTxWarp prst="textNoShape">
+              <a:avLst/>
+            </a:prstTxWarp>
+            <a:noAutofit/>
+          </a:bodyPr>
+          <a:lstStyle/>
+          <a:p>
+            <a:pPr algn="l"/>
+            <a:r>
+              <a:rPr lang="en-US" sz="1200" dirty="0">
+                <a:solidFill>
+                  <a:schemeClr val="accent1"/>
+                </a:solidFill>
+                <a:latin typeface="Arial" panose="020B0604020202020204" pitchFamily="34" charset="0"/>
+                <a:ea typeface="Amazon Ember" panose="020B0603020204020204" pitchFamily="34" charset="0"/>
+                <a:cs typeface="Arial" panose="020B0604020202020204" pitchFamily="34" charset="0"/>
+              </a:rPr>
+              <a:t>Private subnet</a:t>
+            </a:r>
+          </a:p>
+          <a:p>
+            <a:pPr algn="l"/>
+            <a:endParaRPr lang="en-US" sz="1200" dirty="0">
+              <a:solidFill>
+                <a:schemeClr val="accent3"/>
+              </a:solidFill>
+              <a:latin typeface="Arial" panose="020B0604020202020204" pitchFamily="34" charset="0"/>
+              <a:ea typeface="Amazon Ember" panose="020B0603020204020204" pitchFamily="34" charset="0"/>
+              <a:cs typeface="Arial" panose="020B0604020202020204" pitchFamily="34" charset="0"/>
+            </a:endParaRPr>
+          </a:p>
+        </p:txBody>
+      </p:sp>
+      <p:pic>
+        <p:nvPicPr>
+          <p:cNvPr id="21" name="Graphic 13">
+            <a:extLst>
+              <a:ext uri="{FF2B5EF4-FFF2-40B4-BE49-F238E27FC236}">
+                <a16:creationId xmlns:a16="http://schemas.microsoft.com/office/drawing/2014/main" id="{3BD31095-C7B2-C24A-9990-6F9E14956A7B}"/>
+              </a:ext>
+            </a:extLst>
+          </p:cNvPr>
+          <p:cNvPicPr>
+            <a:picLocks noChangeAspect="1"/>
+          </p:cNvPicPr>
+          <p:nvPr/>
+        </p:nvPicPr>
+        <p:blipFill>
+          <a:blip r:embed="rId8">
+            <a:extLst>
+              <a:ext uri="{96DAC541-7B7A-43D3-8B79-37D633B846F1}">
+                <asvg:svgBlip xmlns="" xmlns:asvg="http://schemas.microsoft.com/office/drawing/2016/SVG/main" r:embed="rId9"/>
+              </a:ext>
+            </a:extLst>
+          </a:blip>
+          <a:stretch>
+            <a:fillRect/>
+          </a:stretch>
+        </p:blipFill>
+        <p:spPr>
+          <a:xfrm>
+            <a:off x="5636945" y="3124200"/>
+            <a:ext cx="274320" cy="274320"/>
+          </a:xfrm>
+          <a:prstGeom prst="rect">
+            <a:avLst/>
+          </a:prstGeom>
+        </p:spPr>
+      </p:pic>
+      <p:sp>
+        <p:nvSpPr>
+          <p:cNvPr id="22" name="TextBox 21">
+            <a:extLst>
+              <a:ext uri="{FF2B5EF4-FFF2-40B4-BE49-F238E27FC236}">
+                <a16:creationId xmlns:a16="http://schemas.microsoft.com/office/drawing/2014/main" id="{F90C1CC4-DFE6-0445-BD1C-DB610E1A07F5}"/>
+              </a:ext>
+            </a:extLst>
+          </p:cNvPr>
+          <p:cNvSpPr txBox="1"/>
+          <p:nvPr/>
+        </p:nvSpPr>
+        <p:spPr>
+          <a:xfrm>
+            <a:off x="5562600" y="2516771"/>
+            <a:ext cx="1513305" cy="276999"/>
+          </a:xfrm>
+          <a:prstGeom prst="rect">
+            <a:avLst/>
+          </a:prstGeom>
+          <a:noFill/>
+          <a:effectLst>
+            <a:softEdge rad="0"/>
+          </a:effectLst>
+        </p:spPr>
+        <p:txBody>
+          <a:bodyPr wrap="square" rtlCol="0">
+            <a:spAutoFit/>
+          </a:bodyPr>
+          <a:lstStyle/>
+          <a:p>
+            <a:pPr algn="ctr"/>
+            <a:r>
+              <a:rPr lang="en-US" sz="1200" dirty="0">
+                <a:latin typeface="Arial" panose="020B0604020202020204" pitchFamily="34" charset="0"/>
+                <a:ea typeface="Amazon Ember" panose="020B0603020204020204" pitchFamily="34" charset="0"/>
+                <a:cs typeface="Arial" panose="020B0604020202020204" pitchFamily="34" charset="0"/>
+              </a:rPr>
+              <a:t>RD Gateway</a:t>
+            </a:r>
+          </a:p>
+        </p:txBody>
+      </p:sp>
+      <p:sp>
+        <p:nvSpPr>
+          <p:cNvPr id="23" name="TextBox 22">
+            <a:extLst>
+              <a:ext uri="{FF2B5EF4-FFF2-40B4-BE49-F238E27FC236}">
+                <a16:creationId xmlns:a16="http://schemas.microsoft.com/office/drawing/2014/main" id="{517096B6-EF64-C245-A3E7-BEEF81BDCB9C}"/>
+              </a:ext>
+            </a:extLst>
+          </p:cNvPr>
+          <p:cNvSpPr txBox="1"/>
+          <p:nvPr/>
+        </p:nvSpPr>
+        <p:spPr>
+          <a:xfrm>
+            <a:off x="6858000" y="2519195"/>
+            <a:ext cx="1236442" cy="276999"/>
+          </a:xfrm>
+          <a:prstGeom prst="rect">
+            <a:avLst/>
+          </a:prstGeom>
+          <a:noFill/>
+        </p:spPr>
+        <p:txBody>
+          <a:bodyPr wrap="square" rtlCol="0">
+            <a:spAutoFit/>
+          </a:bodyPr>
+          <a:lstStyle/>
+          <a:p>
+            <a:pPr algn="ctr"/>
+            <a:r>
+              <a:rPr lang="en-US" sz="1200" dirty="0">
+                <a:latin typeface="Arial" panose="020B0604020202020204" pitchFamily="34" charset="0"/>
+                <a:ea typeface="Amazon Ember" panose="020B0603020204020204" pitchFamily="34" charset="0"/>
+                <a:cs typeface="Arial" panose="020B0604020202020204" pitchFamily="34" charset="0"/>
+              </a:rPr>
+              <a:t>NAT gateway</a:t>
+            </a:r>
+          </a:p>
+        </p:txBody>
+      </p:sp>
+      <p:pic>
+        <p:nvPicPr>
+          <p:cNvPr id="24" name="Graphic 40">
+            <a:extLst>
+              <a:ext uri="{FF2B5EF4-FFF2-40B4-BE49-F238E27FC236}">
+                <a16:creationId xmlns:a16="http://schemas.microsoft.com/office/drawing/2014/main" id="{C322592C-EAB9-0640-95A5-D8FF5B8E5FE6}"/>
+              </a:ext>
+            </a:extLst>
+          </p:cNvPr>
+          <p:cNvPicPr>
+            <a:picLocks noChangeAspect="1"/>
+          </p:cNvPicPr>
+          <p:nvPr/>
+        </p:nvPicPr>
+        <p:blipFill>
+          <a:blip r:embed="rId14">
+            <a:extLst>
+              <a:ext uri="{96DAC541-7B7A-43D3-8B79-37D633B846F1}">
+                <asvg:svgBlip xmlns="" xmlns:asvg="http://schemas.microsoft.com/office/drawing/2016/SVG/main" r:embed="rId17"/>
+              </a:ext>
+            </a:extLst>
+          </a:blip>
+          <a:stretch>
+            <a:fillRect/>
+          </a:stretch>
+        </p:blipFill>
+        <p:spPr>
+          <a:xfrm>
+            <a:off x="7241271" y="2064381"/>
+            <a:ext cx="469900" cy="469900"/>
+          </a:xfrm>
+          <a:prstGeom prst="rect">
+            <a:avLst/>
+          </a:prstGeom>
+        </p:spPr>
+      </p:pic>
+      <p:pic>
+        <p:nvPicPr>
+          <p:cNvPr id="25" name="Graphic 135">
+            <a:extLst>
+              <a:ext uri="{FF2B5EF4-FFF2-40B4-BE49-F238E27FC236}">
+                <a16:creationId xmlns:a16="http://schemas.microsoft.com/office/drawing/2014/main" id="{C19987B1-DB3A-1640-994D-BCB81FCC1AE4}"/>
+              </a:ext>
+            </a:extLst>
+          </p:cNvPr>
+          <p:cNvPicPr>
+            <a:picLocks noChangeAspect="1"/>
+          </p:cNvPicPr>
+          <p:nvPr/>
+        </p:nvPicPr>
+        <p:blipFill>
+          <a:blip r:embed="rId12">
+            <a:extLst>
+              <a:ext uri="{96DAC541-7B7A-43D3-8B79-37D633B846F1}">
+                <asvg:svgBlip xmlns="" xmlns:asvg="http://schemas.microsoft.com/office/drawing/2016/SVG/main" r:embed="rId13"/>
+              </a:ext>
+            </a:extLst>
+          </a:blip>
+          <a:stretch>
+            <a:fillRect/>
+          </a:stretch>
+        </p:blipFill>
+        <p:spPr>
+          <a:xfrm>
+            <a:off x="6084302" y="3352800"/>
+            <a:ext cx="469900" cy="469900"/>
+          </a:xfrm>
+          <a:prstGeom prst="rect">
+            <a:avLst/>
+          </a:prstGeom>
+        </p:spPr>
+      </p:pic>
+      <p:sp>
+        <p:nvSpPr>
+          <p:cNvPr id="26" name="TextBox 25">
+            <a:extLst>
+              <a:ext uri="{FF2B5EF4-FFF2-40B4-BE49-F238E27FC236}">
+                <a16:creationId xmlns:a16="http://schemas.microsoft.com/office/drawing/2014/main" id="{F90C1CC4-DFE6-0445-BD1C-DB610E1A07F5}"/>
+              </a:ext>
+            </a:extLst>
+          </p:cNvPr>
+          <p:cNvSpPr txBox="1"/>
+          <p:nvPr/>
+        </p:nvSpPr>
+        <p:spPr>
+          <a:xfrm>
+            <a:off x="5562600" y="3798209"/>
+            <a:ext cx="1513305" cy="276999"/>
+          </a:xfrm>
+          <a:prstGeom prst="rect">
+            <a:avLst/>
+          </a:prstGeom>
+          <a:noFill/>
+        </p:spPr>
+        <p:txBody>
+          <a:bodyPr wrap="square" rtlCol="0">
+            <a:spAutoFit/>
+          </a:bodyPr>
+          <a:lstStyle/>
+          <a:p>
+            <a:pPr algn="ctr"/>
+            <a:r>
+              <a:rPr lang="en-US" sz="1200" smtClean="0">
+                <a:latin typeface="Arial" panose="020B0604020202020204" pitchFamily="34" charset="0"/>
+                <a:ea typeface="Amazon Ember" panose="020B0603020204020204" pitchFamily="34" charset="0"/>
+                <a:cs typeface="Arial" panose="020B0604020202020204" pitchFamily="34" charset="0"/>
+              </a:rPr>
+              <a:t>Domain controller</a:t>
+            </a:r>
+            <a:endParaRPr lang="en-US" sz="1200" dirty="0">
+              <a:latin typeface="Arial" panose="020B0604020202020204" pitchFamily="34" charset="0"/>
+              <a:ea typeface="Amazon Ember" panose="020B0603020204020204" pitchFamily="34" charset="0"/>
+              <a:cs typeface="Arial" panose="020B0604020202020204" pitchFamily="34" charset="0"/>
+            </a:endParaRPr>
+          </a:p>
+        </p:txBody>
+      </p:sp>
+      <p:pic>
+        <p:nvPicPr>
+          <p:cNvPr id="27" name="Graphic 43">
+            <a:extLst>
+              <a:ext uri="{FF2B5EF4-FFF2-40B4-BE49-F238E27FC236}">
+                <a16:creationId xmlns:a16="http://schemas.microsoft.com/office/drawing/2014/main" id="{AA07898E-3D66-5446-8B50-9BAB110FEFDB}"/>
+              </a:ext>
+            </a:extLst>
+          </p:cNvPr>
+          <p:cNvPicPr>
+            <a:picLocks noChangeAspect="1"/>
+          </p:cNvPicPr>
+          <p:nvPr/>
+        </p:nvPicPr>
+        <p:blipFill>
+          <a:blip r:embed="rId18">
+            <a:extLst>
+              <a:ext uri="{BEBA8EAE-BF5A-486C-A8C5-ECC9F3942E4B}">
+                <a14:imgProps xmlns:a14="http://schemas.microsoft.com/office/drawing/2010/main">
+                  <a14:imgLayer r:embed="rId19">
+                    <a14:imgEffect>
+                      <a14:artisticBlur/>
+                    </a14:imgEffect>
+                  </a14:imgLayer>
+                </a14:imgProps>
+              </a:ext>
+              <a:ext uri="{96DAC541-7B7A-43D3-8B79-37D633B846F1}">
+                <asvg:svgBlip xmlns="" xmlns:asvg="http://schemas.microsoft.com/office/drawing/2016/SVG/main" r:embed="rId32"/>
+              </a:ext>
+            </a:extLst>
+          </a:blip>
+          <a:stretch>
+            <a:fillRect/>
+          </a:stretch>
+        </p:blipFill>
+        <p:spPr>
+          <a:xfrm>
+            <a:off x="6083300" y="2064381"/>
+            <a:ext cx="469900" cy="469900"/>
+          </a:xfrm>
+          <a:prstGeom prst="rect">
+            <a:avLst/>
+          </a:prstGeom>
+        </p:spPr>
+      </p:pic>
+      <p:pic>
+        <p:nvPicPr>
+          <p:cNvPr id="28" name="Graphic 17">
+            <a:extLst>
+              <a:ext uri="{FF2B5EF4-FFF2-40B4-BE49-F238E27FC236}">
+                <a16:creationId xmlns:a16="http://schemas.microsoft.com/office/drawing/2014/main" id="{633BC3DF-5160-6843-B872-94C5C92E5BF4}"/>
+              </a:ext>
+            </a:extLst>
+          </p:cNvPr>
+          <p:cNvPicPr>
+            <a:picLocks noChangeAspect="1" noChangeArrowheads="1"/>
+          </p:cNvPicPr>
+          <p:nvPr/>
+        </p:nvPicPr>
+        <p:blipFill>
+          <a:blip r:embed="rId33" cstate="print">
+            <a:extLst>
+              <a:ext uri="{28A0092B-C50C-407E-A947-70E740481C1C}">
+                <a14:useLocalDpi xmlns:a14="http://schemas.microsoft.com/office/drawing/2010/main" val="0"/>
+              </a:ext>
+            </a:extLst>
+          </a:blip>
+          <a:srcRect/>
+          <a:stretch>
+            <a:fillRect/>
+          </a:stretch>
+        </p:blipFill>
+        <p:spPr bwMode="auto">
+          <a:xfrm>
+            <a:off x="8975457" y="1991841"/>
+            <a:ext cx="762000" cy="762000"/>
+          </a:xfrm>
+          <a:prstGeom prst="rect">
+            <a:avLst/>
+          </a:prstGeom>
+          <a:noFill/>
+          <a:ln>
+            <a:noFill/>
+          </a:ln>
+          <a:extLst>
+            <a:ext uri="{909E8E84-426E-40DD-AFC4-6F175D3DCCD1}">
+              <a14:hiddenFill xmlns:a14="http://schemas.microsoft.com/office/drawing/2010/main">
+                <a:solidFill>
+                  <a:srgbClr val="FFFFFF"/>
+                </a:solidFill>
+              </a14:hiddenFill>
+            </a:ext>
+            <a:ext uri="{91240B29-F687-4F45-9708-019B960494DF}">
+              <a14:hiddenLine xmlns:a14="http://schemas.microsoft.com/office/drawing/2010/main" w="9525">
+                <a:solidFill>
+                  <a:srgbClr val="000000"/>
+                </a:solidFill>
+                <a:miter lim="800000"/>
+                <a:headEnd/>
+                <a:tailEnd/>
+              </a14:hiddenLine>
+            </a:ext>
+          </a:extLst>
+        </p:spPr>
+      </p:pic>
+      <p:sp>
+        <p:nvSpPr>
+          <p:cNvPr id="29" name="TextBox 11">
+            <a:extLst>
+              <a:ext uri="{FF2B5EF4-FFF2-40B4-BE49-F238E27FC236}">
+                <a16:creationId xmlns:a16="http://schemas.microsoft.com/office/drawing/2014/main" id="{BBEC601B-D650-7947-9D7F-6579E2990B06}"/>
+              </a:ext>
+            </a:extLst>
+          </p:cNvPr>
+          <p:cNvSpPr txBox="1">
+            <a:spLocks noChangeArrowheads="1"/>
+          </p:cNvSpPr>
+          <p:nvPr/>
+        </p:nvSpPr>
+        <p:spPr bwMode="auto">
+          <a:xfrm>
+            <a:off x="8218220" y="2753841"/>
+            <a:ext cx="2292350" cy="276999"/>
+          </a:xfrm>
+          <a:prstGeom prst="rect">
+            <a:avLst/>
+          </a:prstGeom>
+          <a:noFill/>
+          <a:ln>
+            <a:noFill/>
+          </a:ln>
+          <a:extLst>
+            <a:ext uri="{909E8E84-426E-40DD-AFC4-6F175D3DCCD1}">
+              <a14:hiddenFill xmlns:a14="http://schemas.microsoft.com/office/drawing/2010/main">
+                <a:solidFill>
+                  <a:srgbClr val="FFFFFF"/>
+                </a:solidFill>
+              </a14:hiddenFill>
+            </a:ext>
+            <a:ext uri="{91240B29-F687-4F45-9708-019B960494DF}">
+              <a14:hiddenLine xmlns:a14="http://schemas.microsoft.com/office/drawing/2010/main" w="9525">
+                <a:solidFill>
+                  <a:srgbClr val="000000"/>
+                </a:solidFill>
+                <a:miter lim="800000"/>
+                <a:headEnd/>
+                <a:tailEnd/>
+              </a14:hiddenLine>
+            </a:ext>
+          </a:extLst>
+        </p:spPr>
+        <p:txBody>
+          <a:bodyPr>
+            <a:spAutoFit/>
+          </a:bodyPr>
+          <a:lstStyle>
+            <a:lvl1pPr>
+              <a:defRPr>
+                <a:solidFill>
+                  <a:schemeClr val="tx1"/>
+                </a:solidFill>
+                <a:latin typeface="Calibri" panose="020F0502020204030204" pitchFamily="34" charset="0"/>
+              </a:defRPr>
+            </a:lvl1pPr>
+            <a:lvl2pPr marL="742950" indent="-285750">
+              <a:defRPr>
+                <a:solidFill>
+                  <a:schemeClr val="tx1"/>
+                </a:solidFill>
+                <a:latin typeface="Calibri" panose="020F0502020204030204" pitchFamily="34" charset="0"/>
+              </a:defRPr>
+            </a:lvl2pPr>
+            <a:lvl3pPr marL="1143000" indent="-228600">
+              <a:defRPr>
+                <a:solidFill>
+                  <a:schemeClr val="tx1"/>
+                </a:solidFill>
+                <a:latin typeface="Calibri" panose="020F0502020204030204" pitchFamily="34" charset="0"/>
+              </a:defRPr>
+            </a:lvl3pPr>
+            <a:lvl4pPr marL="1600200" indent="-228600">
+              <a:defRPr>
+                <a:solidFill>
+                  <a:schemeClr val="tx1"/>
+                </a:solidFill>
+                <a:latin typeface="Calibri" panose="020F0502020204030204" pitchFamily="34" charset="0"/>
+              </a:defRPr>
+            </a:lvl4pPr>
+            <a:lvl5pPr marL="2057400" indent="-228600">
+              <a:defRPr>
+                <a:solidFill>
+                  <a:schemeClr val="tx1"/>
+                </a:solidFill>
+                <a:latin typeface="Calibri" panose="020F0502020204030204" pitchFamily="34" charset="0"/>
+              </a:defRPr>
+            </a:lvl5pPr>
+            <a:lvl6pPr marL="2514600" indent="-228600" eaLnBrk="0" fontAlgn="base" hangingPunct="0">
+              <a:spcBef>
+                <a:spcPct val="0"/>
+              </a:spcBef>
+              <a:spcAft>
+                <a:spcPct val="0"/>
+              </a:spcAft>
+              <a:defRPr>
+                <a:solidFill>
+                  <a:schemeClr val="tx1"/>
+                </a:solidFill>
+                <a:latin typeface="Calibri" panose="020F0502020204030204" pitchFamily="34" charset="0"/>
+              </a:defRPr>
+            </a:lvl6pPr>
+            <a:lvl7pPr marL="2971800" indent="-228600" eaLnBrk="0" fontAlgn="base" hangingPunct="0">
+              <a:spcBef>
+                <a:spcPct val="0"/>
+              </a:spcBef>
+              <a:spcAft>
+                <a:spcPct val="0"/>
+              </a:spcAft>
+              <a:defRPr>
+                <a:solidFill>
+                  <a:schemeClr val="tx1"/>
+                </a:solidFill>
+                <a:latin typeface="Calibri" panose="020F0502020204030204" pitchFamily="34" charset="0"/>
+              </a:defRPr>
+            </a:lvl7pPr>
+            <a:lvl8pPr marL="3429000" indent="-228600" eaLnBrk="0" fontAlgn="base" hangingPunct="0">
+              <a:spcBef>
+                <a:spcPct val="0"/>
+              </a:spcBef>
+              <a:spcAft>
+                <a:spcPct val="0"/>
+              </a:spcAft>
+              <a:defRPr>
+                <a:solidFill>
+                  <a:schemeClr val="tx1"/>
+                </a:solidFill>
+                <a:latin typeface="Calibri" panose="020F0502020204030204" pitchFamily="34" charset="0"/>
+              </a:defRPr>
+            </a:lvl8pPr>
+            <a:lvl9pPr marL="3886200" indent="-228600" eaLnBrk="0" fontAlgn="base" hangingPunct="0">
+              <a:spcBef>
+                <a:spcPct val="0"/>
+              </a:spcBef>
+              <a:spcAft>
+                <a:spcPct val="0"/>
+              </a:spcAft>
+              <a:defRPr>
+                <a:solidFill>
+                  <a:schemeClr val="tx1"/>
+                </a:solidFill>
+                <a:latin typeface="Calibri" panose="020F0502020204030204" pitchFamily="34" charset="0"/>
+              </a:defRPr>
+            </a:lvl9pPr>
+          </a:lstStyle>
+          <a:p>
+            <a:pPr algn="ctr" eaLnBrk="1" hangingPunct="1"/>
+            <a:r>
+              <a:rPr lang="en-US" altLang="en-US" sz="1200" dirty="0">
+                <a:latin typeface="Arial" panose="020B0604020202020204" pitchFamily="34" charset="0"/>
+                <a:ea typeface="Amazon Ember" panose="020B0603020204020204" pitchFamily="34" charset="0"/>
+                <a:cs typeface="Arial" panose="020B0604020202020204" pitchFamily="34" charset="0"/>
+              </a:rPr>
+              <a:t>AWS Secrets Manager</a:t>
+            </a:r>
+          </a:p>
+        </p:txBody>
+      </p:sp>
+      <p:pic>
+        <p:nvPicPr>
+          <p:cNvPr id="30" name="Graphic 15">
+            <a:extLst>
+              <a:ext uri="{FF2B5EF4-FFF2-40B4-BE49-F238E27FC236}">
+                <a16:creationId xmlns:a16="http://schemas.microsoft.com/office/drawing/2014/main" id="{3A010F8A-DF9B-CA43-8D41-3A122544E272}"/>
+              </a:ext>
+            </a:extLst>
+          </p:cNvPr>
+          <p:cNvPicPr>
+            <a:picLocks noChangeAspect="1" noChangeArrowheads="1"/>
+          </p:cNvPicPr>
+          <p:nvPr/>
+        </p:nvPicPr>
+        <p:blipFill>
+          <a:blip r:embed="rId34" cstate="print">
+            <a:extLst>
+              <a:ext uri="{28A0092B-C50C-407E-A947-70E740481C1C}">
+                <a14:useLocalDpi xmlns:a14="http://schemas.microsoft.com/office/drawing/2010/main" val="0"/>
+              </a:ext>
+            </a:extLst>
+          </a:blip>
+          <a:srcRect/>
+          <a:stretch>
+            <a:fillRect/>
+          </a:stretch>
+        </p:blipFill>
+        <p:spPr bwMode="auto">
+          <a:xfrm>
+            <a:off x="8982075" y="3313208"/>
+            <a:ext cx="762000" cy="762000"/>
+          </a:xfrm>
+          <a:prstGeom prst="rect">
+            <a:avLst/>
+          </a:prstGeom>
+          <a:noFill/>
+          <a:ln>
+            <a:noFill/>
+          </a:ln>
+          <a:extLst>
+            <a:ext uri="{909E8E84-426E-40DD-AFC4-6F175D3DCCD1}">
+              <a14:hiddenFill xmlns:a14="http://schemas.microsoft.com/office/drawing/2010/main">
+                <a:solidFill>
+                  <a:srgbClr val="FFFFFF"/>
+                </a:solidFill>
+              </a14:hiddenFill>
+            </a:ext>
+            <a:ext uri="{91240B29-F687-4F45-9708-019B960494DF}">
+              <a14:hiddenLine xmlns:a14="http://schemas.microsoft.com/office/drawing/2010/main" w="9525">
+                <a:solidFill>
+                  <a:srgbClr val="000000"/>
+                </a:solidFill>
+                <a:miter lim="800000"/>
+                <a:headEnd/>
+                <a:tailEnd/>
+              </a14:hiddenLine>
+            </a:ext>
+          </a:extLst>
+        </p:spPr>
+      </p:pic>
+      <p:sp>
+        <p:nvSpPr>
+          <p:cNvPr id="31" name="TextBox 11">
+            <a:extLst>
+              <a:ext uri="{FF2B5EF4-FFF2-40B4-BE49-F238E27FC236}">
+                <a16:creationId xmlns:a16="http://schemas.microsoft.com/office/drawing/2014/main" id="{EE7EF599-CC93-1843-94CE-F010641A8D23}"/>
+              </a:ext>
+            </a:extLst>
+          </p:cNvPr>
+          <p:cNvSpPr txBox="1">
+            <a:spLocks noChangeArrowheads="1"/>
+          </p:cNvSpPr>
+          <p:nvPr/>
+        </p:nvSpPr>
+        <p:spPr bwMode="auto">
+          <a:xfrm>
+            <a:off x="8223250" y="4066401"/>
+            <a:ext cx="2292350" cy="276999"/>
+          </a:xfrm>
+          <a:prstGeom prst="rect">
+            <a:avLst/>
+          </a:prstGeom>
+          <a:noFill/>
+          <a:ln>
+            <a:noFill/>
+          </a:ln>
+          <a:extLst>
+            <a:ext uri="{909E8E84-426E-40DD-AFC4-6F175D3DCCD1}">
+              <a14:hiddenFill xmlns:a14="http://schemas.microsoft.com/office/drawing/2010/main">
+                <a:solidFill>
+                  <a:srgbClr val="FFFFFF"/>
+                </a:solidFill>
+              </a14:hiddenFill>
+            </a:ext>
+            <a:ext uri="{91240B29-F687-4F45-9708-019B960494DF}">
+              <a14:hiddenLine xmlns:a14="http://schemas.microsoft.com/office/drawing/2010/main" w="9525">
+                <a:solidFill>
+                  <a:srgbClr val="000000"/>
+                </a:solidFill>
+                <a:miter lim="800000"/>
+                <a:headEnd/>
+                <a:tailEnd/>
+              </a14:hiddenLine>
+            </a:ext>
+          </a:extLst>
+        </p:spPr>
+        <p:txBody>
+          <a:bodyPr>
+            <a:spAutoFit/>
+          </a:bodyPr>
+          <a:lstStyle>
+            <a:lvl1pPr>
+              <a:defRPr>
+                <a:solidFill>
+                  <a:schemeClr val="tx1"/>
+                </a:solidFill>
+                <a:latin typeface="Calibri" panose="020F0502020204030204" pitchFamily="34" charset="0"/>
+              </a:defRPr>
+            </a:lvl1pPr>
+            <a:lvl2pPr marL="742950" indent="-285750">
+              <a:defRPr>
+                <a:solidFill>
+                  <a:schemeClr val="tx1"/>
+                </a:solidFill>
+                <a:latin typeface="Calibri" panose="020F0502020204030204" pitchFamily="34" charset="0"/>
+              </a:defRPr>
+            </a:lvl2pPr>
+            <a:lvl3pPr marL="1143000" indent="-228600">
+              <a:defRPr>
+                <a:solidFill>
+                  <a:schemeClr val="tx1"/>
+                </a:solidFill>
+                <a:latin typeface="Calibri" panose="020F0502020204030204" pitchFamily="34" charset="0"/>
+              </a:defRPr>
+            </a:lvl3pPr>
+            <a:lvl4pPr marL="1600200" indent="-228600">
+              <a:defRPr>
+                <a:solidFill>
+                  <a:schemeClr val="tx1"/>
+                </a:solidFill>
+                <a:latin typeface="Calibri" panose="020F0502020204030204" pitchFamily="34" charset="0"/>
+              </a:defRPr>
+            </a:lvl4pPr>
+            <a:lvl5pPr marL="2057400" indent="-228600">
+              <a:defRPr>
+                <a:solidFill>
+                  <a:schemeClr val="tx1"/>
+                </a:solidFill>
+                <a:latin typeface="Calibri" panose="020F0502020204030204" pitchFamily="34" charset="0"/>
+              </a:defRPr>
+            </a:lvl5pPr>
+            <a:lvl6pPr marL="2514600" indent="-228600" eaLnBrk="0" fontAlgn="base" hangingPunct="0">
+              <a:spcBef>
+                <a:spcPct val="0"/>
+              </a:spcBef>
+              <a:spcAft>
+                <a:spcPct val="0"/>
+              </a:spcAft>
+              <a:defRPr>
+                <a:solidFill>
+                  <a:schemeClr val="tx1"/>
+                </a:solidFill>
+                <a:latin typeface="Calibri" panose="020F0502020204030204" pitchFamily="34" charset="0"/>
+              </a:defRPr>
+            </a:lvl6pPr>
+            <a:lvl7pPr marL="2971800" indent="-228600" eaLnBrk="0" fontAlgn="base" hangingPunct="0">
+              <a:spcBef>
+                <a:spcPct val="0"/>
+              </a:spcBef>
+              <a:spcAft>
+                <a:spcPct val="0"/>
+              </a:spcAft>
+              <a:defRPr>
+                <a:solidFill>
+                  <a:schemeClr val="tx1"/>
+                </a:solidFill>
+                <a:latin typeface="Calibri" panose="020F0502020204030204" pitchFamily="34" charset="0"/>
+              </a:defRPr>
+            </a:lvl7pPr>
+            <a:lvl8pPr marL="3429000" indent="-228600" eaLnBrk="0" fontAlgn="base" hangingPunct="0">
+              <a:spcBef>
+                <a:spcPct val="0"/>
+              </a:spcBef>
+              <a:spcAft>
+                <a:spcPct val="0"/>
+              </a:spcAft>
+              <a:defRPr>
+                <a:solidFill>
+                  <a:schemeClr val="tx1"/>
+                </a:solidFill>
+                <a:latin typeface="Calibri" panose="020F0502020204030204" pitchFamily="34" charset="0"/>
+              </a:defRPr>
+            </a:lvl8pPr>
+            <a:lvl9pPr marL="3886200" indent="-228600" eaLnBrk="0" fontAlgn="base" hangingPunct="0">
+              <a:spcBef>
+                <a:spcPct val="0"/>
+              </a:spcBef>
+              <a:spcAft>
+                <a:spcPct val="0"/>
+              </a:spcAft>
+              <a:defRPr>
+                <a:solidFill>
+                  <a:schemeClr val="tx1"/>
+                </a:solidFill>
+                <a:latin typeface="Calibri" panose="020F0502020204030204" pitchFamily="34" charset="0"/>
+              </a:defRPr>
+            </a:lvl9pPr>
+          </a:lstStyle>
+          <a:p>
+            <a:pPr algn="ctr" eaLnBrk="1" hangingPunct="1"/>
+            <a:r>
+              <a:rPr lang="en-US" altLang="en-US" sz="1200" dirty="0">
+                <a:latin typeface="Arial" panose="020B0604020202020204" pitchFamily="34" charset="0"/>
+                <a:ea typeface="Amazon Ember" panose="020B0603020204020204" pitchFamily="34" charset="0"/>
+                <a:cs typeface="Arial" panose="020B0604020202020204" pitchFamily="34" charset="0"/>
+              </a:rPr>
+              <a:t>AWS Systems Manager</a:t>
+            </a:r>
+          </a:p>
+        </p:txBody>
+      </p:sp>
+      <p:sp>
+        <p:nvSpPr>
+          <p:cNvPr id="39" name="Rectangle 38">
+            <a:extLst>
+              <a:ext uri="{FF2B5EF4-FFF2-40B4-BE49-F238E27FC236}">
+                <a16:creationId xmlns:a16="http://schemas.microsoft.com/office/drawing/2014/main" id="{34D72B91-09F3-9A42-B66A-106F01CCE8B4}"/>
+              </a:ext>
+            </a:extLst>
+          </p:cNvPr>
+          <p:cNvSpPr/>
+          <p:nvPr/>
+        </p:nvSpPr>
+        <p:spPr>
+          <a:xfrm>
+            <a:off x="1044620" y="1214882"/>
+            <a:ext cx="7462524" cy="4195318"/>
+          </a:xfrm>
+          <a:prstGeom prst="rect">
+            <a:avLst/>
+          </a:prstGeom>
+          <a:noFill/>
+          <a:ln w="12700">
+            <a:solidFill>
+              <a:srgbClr val="1E8900"/>
+            </a:solidFill>
+          </a:ln>
+        </p:spPr>
+        <p:style>
+          <a:lnRef idx="2">
+            <a:schemeClr val="accent1">
+              <a:shade val="50000"/>
+            </a:schemeClr>
+          </a:lnRef>
+          <a:fillRef idx="1">
+            <a:schemeClr val="accent1"/>
+          </a:fillRef>
+          <a:effectRef idx="0">
+            <a:schemeClr val="accent1"/>
+          </a:effectRef>
+          <a:fontRef idx="minor">
+            <a:schemeClr val="lt1"/>
+          </a:fontRef>
+        </p:style>
+        <p:txBody>
+          <a:bodyPr lIns="457200" tIns="91440"/>
+          <a:lstStyle/>
+          <a:p>
+            <a:pPr eaLnBrk="1" fontAlgn="auto" hangingPunct="1">
+              <a:spcBef>
+                <a:spcPts val="0"/>
+              </a:spcBef>
+              <a:spcAft>
+                <a:spcPts val="0"/>
+              </a:spcAft>
+              <a:defRPr/>
+            </a:pPr>
+            <a:r>
+              <a:rPr lang="en-US" sz="1200" dirty="0">
+                <a:ln w="0"/>
+                <a:solidFill>
+                  <a:srgbClr val="1E8900"/>
+                </a:solidFill>
+                <a:latin typeface="Arial" panose="020B0604020202020204" pitchFamily="34" charset="0"/>
+                <a:cs typeface="Arial" panose="020B0604020202020204" pitchFamily="34" charset="0"/>
+              </a:rPr>
+              <a:t>VPC</a:t>
+            </a:r>
+          </a:p>
+        </p:txBody>
+      </p:sp>
+      <p:pic>
+        <p:nvPicPr>
+          <p:cNvPr id="40" name="Graphic 28">
+            <a:extLst>
+              <a:ext uri="{FF2B5EF4-FFF2-40B4-BE49-F238E27FC236}">
+                <a16:creationId xmlns:a16="http://schemas.microsoft.com/office/drawing/2014/main" id="{88C69878-A4A8-CE45-B624-0223CB16619E}"/>
+              </a:ext>
+            </a:extLst>
+          </p:cNvPr>
+          <p:cNvPicPr>
+            <a:picLocks noChangeAspect="1" noChangeArrowheads="1"/>
+          </p:cNvPicPr>
+          <p:nvPr/>
+        </p:nvPicPr>
+        <p:blipFill>
+          <a:blip r:embed="rId35" cstate="print">
+            <a:extLst>
+              <a:ext uri="{28A0092B-C50C-407E-A947-70E740481C1C}">
+                <a14:useLocalDpi xmlns:a14="http://schemas.microsoft.com/office/drawing/2010/main" val="0"/>
+              </a:ext>
+            </a:extLst>
+          </a:blip>
+          <a:srcRect/>
+          <a:stretch>
+            <a:fillRect/>
+          </a:stretch>
+        </p:blipFill>
+        <p:spPr bwMode="auto">
+          <a:xfrm>
+            <a:off x="1044620" y="1214882"/>
+            <a:ext cx="330200" cy="330200"/>
+          </a:xfrm>
+          <a:prstGeom prst="rect">
+            <a:avLst/>
+          </a:prstGeom>
+          <a:noFill/>
+          <a:ln>
+            <a:noFill/>
+          </a:ln>
+          <a:extLst>
+            <a:ext uri="{909E8E84-426E-40DD-AFC4-6F175D3DCCD1}">
+              <a14:hiddenFill xmlns:a14="http://schemas.microsoft.com/office/drawing/2010/main">
+                <a:solidFill>
+                  <a:srgbClr val="FFFFFF"/>
+                </a:solidFill>
+              </a14:hiddenFill>
+            </a:ext>
+            <a:ext uri="{91240B29-F687-4F45-9708-019B960494DF}">
+              <a14:hiddenLine xmlns:a14="http://schemas.microsoft.com/office/drawing/2010/main" w="9525">
+                <a:solidFill>
+                  <a:srgbClr val="000000"/>
+                </a:solidFill>
+                <a:miter lim="800000"/>
+                <a:headEnd/>
+                <a:tailEnd/>
+              </a14:hiddenLine>
+            </a:ext>
+          </a:extLst>
+        </p:spPr>
+      </p:pic>
+      <p:sp>
+        <p:nvSpPr>
+          <p:cNvPr id="41" name="Rectangle 40">
+            <a:extLst>
+              <a:ext uri="{FF2B5EF4-FFF2-40B4-BE49-F238E27FC236}">
+                <a16:creationId xmlns:a16="http://schemas.microsoft.com/office/drawing/2014/main" id="{D246DAA1-0260-E449-8CA2-92FF0101149D}"/>
+              </a:ext>
+            </a:extLst>
+          </p:cNvPr>
+          <p:cNvSpPr/>
+          <p:nvPr/>
+        </p:nvSpPr>
+        <p:spPr>
+          <a:xfrm>
+            <a:off x="1447800" y="932962"/>
+            <a:ext cx="2884905" cy="4553438"/>
+          </a:xfrm>
+          <a:prstGeom prst="rect">
+            <a:avLst/>
+          </a:prstGeom>
+          <a:noFill/>
+          <a:ln w="12700">
+            <a:solidFill>
+              <a:srgbClr val="5B9CD5"/>
+            </a:solidFill>
+            <a:prstDash val="dash"/>
+          </a:ln>
+        </p:spPr>
+        <p:style>
+          <a:lnRef idx="2">
+            <a:schemeClr val="accent1">
+              <a:shade val="50000"/>
+            </a:schemeClr>
+          </a:lnRef>
+          <a:fillRef idx="1">
+            <a:schemeClr val="accent1"/>
+          </a:fillRef>
+          <a:effectRef idx="0">
+            <a:schemeClr val="accent1"/>
+          </a:effectRef>
+          <a:fontRef idx="minor">
+            <a:schemeClr val="lt1"/>
+          </a:fontRef>
+        </p:style>
+        <p:txBody>
+          <a:bodyPr tIns="91440"/>
+          <a:lstStyle/>
+          <a:p>
+            <a:pPr algn="ctr" eaLnBrk="1" fontAlgn="auto" hangingPunct="1">
+              <a:spcBef>
+                <a:spcPts val="0"/>
+              </a:spcBef>
+              <a:spcAft>
+                <a:spcPts val="0"/>
+              </a:spcAft>
+              <a:defRPr/>
+            </a:pPr>
+            <a:r>
+              <a:rPr lang="en-US" sz="1200">
+                <a:solidFill>
+                  <a:srgbClr val="5B9CD5"/>
+                </a:solidFill>
+                <a:latin typeface="Arial" panose="020B0604020202020204" pitchFamily="34" charset="0"/>
+                <a:cs typeface="Arial" panose="020B0604020202020204" pitchFamily="34" charset="0"/>
+              </a:rPr>
+              <a:t>Availability </a:t>
+            </a:r>
+            <a:r>
+              <a:rPr lang="en-US" sz="1200" smtClean="0">
+                <a:solidFill>
+                  <a:srgbClr val="5B9CD5"/>
+                </a:solidFill>
+                <a:latin typeface="Arial" panose="020B0604020202020204" pitchFamily="34" charset="0"/>
+                <a:cs typeface="Arial" panose="020B0604020202020204" pitchFamily="34" charset="0"/>
+              </a:rPr>
+              <a:t>Zone 1</a:t>
+            </a:r>
+            <a:endParaRPr lang="en-US" sz="1200" dirty="0">
+              <a:solidFill>
+                <a:srgbClr val="5B9CD5"/>
+              </a:solidFill>
+              <a:latin typeface="Arial" panose="020B0604020202020204" pitchFamily="34" charset="0"/>
+              <a:cs typeface="Arial" panose="020B0604020202020204" pitchFamily="34" charset="0"/>
+            </a:endParaRPr>
+          </a:p>
+        </p:txBody>
+      </p:sp>
+      <p:sp>
+        <p:nvSpPr>
+          <p:cNvPr id="42" name="Rectangle 41">
+            <a:extLst>
+              <a:ext uri="{FF2B5EF4-FFF2-40B4-BE49-F238E27FC236}">
+                <a16:creationId xmlns:a16="http://schemas.microsoft.com/office/drawing/2014/main" id="{D246DAA1-0260-E449-8CA2-92FF0101149D}"/>
+              </a:ext>
+            </a:extLst>
+          </p:cNvPr>
+          <p:cNvSpPr/>
+          <p:nvPr/>
+        </p:nvSpPr>
+        <p:spPr>
+          <a:xfrm>
+            <a:off x="5573295" y="932962"/>
+            <a:ext cx="2884905" cy="4553438"/>
+          </a:xfrm>
+          <a:prstGeom prst="rect">
+            <a:avLst/>
+          </a:prstGeom>
+          <a:noFill/>
+          <a:ln w="12700">
+            <a:solidFill>
+              <a:srgbClr val="5B9CD5"/>
+            </a:solidFill>
+            <a:prstDash val="dash"/>
+          </a:ln>
+        </p:spPr>
+        <p:style>
+          <a:lnRef idx="2">
+            <a:schemeClr val="accent1">
+              <a:shade val="50000"/>
+            </a:schemeClr>
+          </a:lnRef>
+          <a:fillRef idx="1">
+            <a:schemeClr val="accent1"/>
+          </a:fillRef>
+          <a:effectRef idx="0">
+            <a:schemeClr val="accent1"/>
+          </a:effectRef>
+          <a:fontRef idx="minor">
+            <a:schemeClr val="lt1"/>
+          </a:fontRef>
+        </p:style>
+        <p:txBody>
+          <a:bodyPr tIns="91440"/>
+          <a:lstStyle/>
+          <a:p>
+            <a:pPr algn="ctr" eaLnBrk="1" fontAlgn="auto" hangingPunct="1">
+              <a:spcBef>
+                <a:spcPts val="0"/>
+              </a:spcBef>
+              <a:spcAft>
+                <a:spcPts val="0"/>
+              </a:spcAft>
+              <a:defRPr/>
+            </a:pPr>
+            <a:r>
+              <a:rPr lang="en-US" sz="1200">
+                <a:solidFill>
+                  <a:srgbClr val="5B9CD5"/>
+                </a:solidFill>
+                <a:latin typeface="Arial" panose="020B0604020202020204" pitchFamily="34" charset="0"/>
+                <a:cs typeface="Arial" panose="020B0604020202020204" pitchFamily="34" charset="0"/>
+              </a:rPr>
+              <a:t>Availability </a:t>
+            </a:r>
+            <a:r>
+              <a:rPr lang="en-US" sz="1200" smtClean="0">
+                <a:solidFill>
+                  <a:srgbClr val="5B9CD5"/>
+                </a:solidFill>
+                <a:latin typeface="Arial" panose="020B0604020202020204" pitchFamily="34" charset="0"/>
+                <a:cs typeface="Arial" panose="020B0604020202020204" pitchFamily="34" charset="0"/>
+              </a:rPr>
+              <a:t>Zone 2</a:t>
+            </a:r>
+            <a:endParaRPr lang="en-US" sz="1200" dirty="0">
+              <a:solidFill>
+                <a:srgbClr val="5B9CD5"/>
+              </a:solidFill>
+              <a:latin typeface="Arial" panose="020B0604020202020204" pitchFamily="34" charset="0"/>
+              <a:cs typeface="Arial" panose="020B0604020202020204" pitchFamily="34" charset="0"/>
+            </a:endParaRPr>
+          </a:p>
+        </p:txBody>
+      </p:sp>
+      <p:pic>
+        <p:nvPicPr>
+          <p:cNvPr id="43" name="Graphic 135">
+            <a:extLst>
+              <a:ext uri="{FF2B5EF4-FFF2-40B4-BE49-F238E27FC236}">
+                <a16:creationId xmlns:a16="http://schemas.microsoft.com/office/drawing/2014/main" id="{C19987B1-DB3A-1640-994D-BCB81FCC1AE4}"/>
+              </a:ext>
+            </a:extLst>
+          </p:cNvPr>
+          <p:cNvPicPr>
+            <a:picLocks noChangeAspect="1"/>
+          </p:cNvPicPr>
+          <p:nvPr/>
+        </p:nvPicPr>
+        <p:blipFill>
+          <a:blip r:embed="rId12">
+            <a:extLst>
+              <a:ext uri="{96DAC541-7B7A-43D3-8B79-37D633B846F1}">
+                <asvg:svgBlip xmlns="" xmlns:asvg="http://schemas.microsoft.com/office/drawing/2016/SVG/main" r:embed="rId13"/>
+              </a:ext>
+            </a:extLst>
+          </a:blip>
+          <a:stretch>
+            <a:fillRect/>
+          </a:stretch>
+        </p:blipFill>
+        <p:spPr>
+          <a:xfrm>
+            <a:off x="3341102" y="4114800"/>
+            <a:ext cx="469900" cy="469900"/>
+          </a:xfrm>
+          <a:prstGeom prst="rect">
+            <a:avLst/>
+          </a:prstGeom>
+        </p:spPr>
+      </p:pic>
+      <p:sp>
+        <p:nvSpPr>
+          <p:cNvPr id="44" name="TextBox 43">
+            <a:extLst>
+              <a:ext uri="{FF2B5EF4-FFF2-40B4-BE49-F238E27FC236}">
+                <a16:creationId xmlns:a16="http://schemas.microsoft.com/office/drawing/2014/main" id="{F90C1CC4-DFE6-0445-BD1C-DB610E1A07F5}"/>
+              </a:ext>
+            </a:extLst>
+          </p:cNvPr>
+          <p:cNvSpPr txBox="1"/>
+          <p:nvPr/>
+        </p:nvSpPr>
+        <p:spPr>
+          <a:xfrm>
+            <a:off x="2819400" y="4560209"/>
+            <a:ext cx="1513305" cy="646331"/>
+          </a:xfrm>
+          <a:prstGeom prst="rect">
+            <a:avLst/>
+          </a:prstGeom>
+          <a:noFill/>
+        </p:spPr>
+        <p:txBody>
+          <a:bodyPr wrap="square" rtlCol="0">
+            <a:spAutoFit/>
+          </a:bodyPr>
+          <a:lstStyle/>
+          <a:p>
+            <a:pPr algn="ctr"/>
+            <a:r>
+              <a:rPr lang="en-US" sz="1200" dirty="0" smtClean="0">
+                <a:latin typeface="Arial" panose="020B0604020202020204" pitchFamily="34" charset="0"/>
+                <a:ea typeface="Amazon Ember" panose="020B0603020204020204" pitchFamily="34" charset="0"/>
+                <a:cs typeface="Arial" panose="020B0604020202020204" pitchFamily="34" charset="0"/>
+              </a:rPr>
+              <a:t>SQL </a:t>
+            </a:r>
+            <a:r>
+              <a:rPr lang="en-US" sz="1200" dirty="0" smtClean="0">
+                <a:latin typeface="Arial" panose="020B0604020202020204" pitchFamily="34" charset="0"/>
+                <a:ea typeface="Amazon Ember" panose="020B0603020204020204" pitchFamily="34" charset="0"/>
+                <a:cs typeface="Arial" panose="020B0604020202020204" pitchFamily="34" charset="0"/>
+              </a:rPr>
+              <a:t>Server node with SIOS DataKeeper</a:t>
+            </a:r>
+            <a:endParaRPr lang="en-US" sz="1200" dirty="0">
+              <a:latin typeface="Arial" panose="020B0604020202020204" pitchFamily="34" charset="0"/>
+              <a:ea typeface="Amazon Ember" panose="020B0603020204020204" pitchFamily="34" charset="0"/>
+              <a:cs typeface="Arial" panose="020B0604020202020204" pitchFamily="34" charset="0"/>
+            </a:endParaRPr>
+          </a:p>
+        </p:txBody>
+      </p:sp>
+      <p:pic>
+        <p:nvPicPr>
+          <p:cNvPr id="45" name="Graphic 135">
+            <a:extLst>
+              <a:ext uri="{FF2B5EF4-FFF2-40B4-BE49-F238E27FC236}">
+                <a16:creationId xmlns:a16="http://schemas.microsoft.com/office/drawing/2014/main" id="{C19987B1-DB3A-1640-994D-BCB81FCC1AE4}"/>
+              </a:ext>
+            </a:extLst>
+          </p:cNvPr>
+          <p:cNvPicPr>
+            <a:picLocks noChangeAspect="1"/>
+          </p:cNvPicPr>
+          <p:nvPr/>
+        </p:nvPicPr>
+        <p:blipFill>
+          <a:blip r:embed="rId12">
+            <a:extLst>
+              <a:ext uri="{96DAC541-7B7A-43D3-8B79-37D633B846F1}">
+                <asvg:svgBlip xmlns="" xmlns:asvg="http://schemas.microsoft.com/office/drawing/2016/SVG/main" r:embed="rId13"/>
+              </a:ext>
+            </a:extLst>
+          </a:blip>
+          <a:stretch>
+            <a:fillRect/>
+          </a:stretch>
+        </p:blipFill>
+        <p:spPr>
+          <a:xfrm>
+            <a:off x="6084302" y="4114800"/>
+            <a:ext cx="469900" cy="469900"/>
+          </a:xfrm>
+          <a:prstGeom prst="rect">
+            <a:avLst/>
+          </a:prstGeom>
+        </p:spPr>
+      </p:pic>
+      <p:sp>
+        <p:nvSpPr>
+          <p:cNvPr id="48" name="TextBox 47">
+            <a:extLst>
+              <a:ext uri="{FF2B5EF4-FFF2-40B4-BE49-F238E27FC236}">
+                <a16:creationId xmlns:a16="http://schemas.microsoft.com/office/drawing/2014/main" id="{F90C1CC4-DFE6-0445-BD1C-DB610E1A07F5}"/>
+              </a:ext>
+            </a:extLst>
+          </p:cNvPr>
+          <p:cNvSpPr txBox="1"/>
+          <p:nvPr/>
+        </p:nvSpPr>
+        <p:spPr>
+          <a:xfrm>
+            <a:off x="5573295" y="4580773"/>
+            <a:ext cx="1513305" cy="646331"/>
+          </a:xfrm>
+          <a:prstGeom prst="rect">
+            <a:avLst/>
+          </a:prstGeom>
+          <a:noFill/>
+        </p:spPr>
+        <p:txBody>
+          <a:bodyPr wrap="square" rtlCol="0">
+            <a:spAutoFit/>
+          </a:bodyPr>
+          <a:lstStyle/>
+          <a:p>
+            <a:pPr algn="ctr"/>
+            <a:r>
+              <a:rPr lang="en-US" sz="1200" dirty="0" smtClean="0">
+                <a:latin typeface="Arial" panose="020B0604020202020204" pitchFamily="34" charset="0"/>
+                <a:ea typeface="Amazon Ember" panose="020B0603020204020204" pitchFamily="34" charset="0"/>
+                <a:cs typeface="Arial" panose="020B0604020202020204" pitchFamily="34" charset="0"/>
+              </a:rPr>
+              <a:t>SQL </a:t>
+            </a:r>
+            <a:r>
+              <a:rPr lang="en-US" sz="1200" dirty="0" smtClean="0">
+                <a:latin typeface="Arial" panose="020B0604020202020204" pitchFamily="34" charset="0"/>
+                <a:ea typeface="Amazon Ember" panose="020B0603020204020204" pitchFamily="34" charset="0"/>
+                <a:cs typeface="Arial" panose="020B0604020202020204" pitchFamily="34" charset="0"/>
+              </a:rPr>
+              <a:t>Server node with SIOS DataKeeper</a:t>
+            </a:r>
+            <a:endParaRPr lang="en-US" sz="1200" dirty="0">
+              <a:latin typeface="Arial" panose="020B0604020202020204" pitchFamily="34" charset="0"/>
+              <a:ea typeface="Amazon Ember" panose="020B0603020204020204" pitchFamily="34" charset="0"/>
+              <a:cs typeface="Arial" panose="020B0604020202020204" pitchFamily="34" charset="0"/>
+            </a:endParaRPr>
+          </a:p>
+        </p:txBody>
+      </p:sp>
+    </p:spTree>
+    <p:extLst>
+      <p:ext uri="{BB962C8B-B14F-4D97-AF65-F5344CB8AC3E}">
+        <p14:creationId xmlns:p14="http://schemas.microsoft.com/office/powerpoint/2010/main" val="477280031"/>
+      </p:ext>
+    </p:extLst>
+  </p:cSld>
+  <p:clrMapOvr>
+    <a:masterClrMapping/>
+  </p:clrMapOvr>
+</p:sld>
+</file>
+
+<file path=ppt/slides/slide3.xml><?xml version="1.0" encoding="utf-8"?>
+<p:sld xmlns:a="http://schemas.openxmlformats.org/drawingml/2006/main" xmlns:r="http://schemas.openxmlformats.org/officeDocument/2006/relationships" xmlns:p="http://schemas.openxmlformats.org/presentationml/2006/main">
+  <p:cSld>
+    <p:spTree>
+      <p:nvGrpSpPr>
+        <p:cNvPr id="1" name=""/>
+        <p:cNvGrpSpPr/>
+        <p:nvPr/>
+      </p:nvGrpSpPr>
+      <p:grpSpPr>
+        <a:xfrm>
+          <a:off x="0" y="0"/>
+          <a:ext cx="0" cy="0"/>
+          <a:chOff x="0" y="0"/>
+          <a:chExt cx="0" cy="0"/>
+        </a:xfrm>
+      </p:grpSpPr>
+      <p:sp>
+        <p:nvSpPr>
+          <p:cNvPr id="4" name="Rectangle 3">
+            <a:extLst>
+              <a:ext uri="{FF2B5EF4-FFF2-40B4-BE49-F238E27FC236}">
+                <a16:creationId xmlns:a16="http://schemas.microsoft.com/office/drawing/2014/main" id="{CE7F7081-419C-2E4F-A999-2923C4338FC0}"/>
+              </a:ext>
+            </a:extLst>
+          </p:cNvPr>
+          <p:cNvSpPr/>
+          <p:nvPr/>
+        </p:nvSpPr>
+        <p:spPr>
+          <a:xfrm>
+            <a:off x="588108" y="609600"/>
+            <a:ext cx="9241692" cy="5029200"/>
+          </a:xfrm>
+          <a:prstGeom prst="rect">
+            <a:avLst/>
+          </a:prstGeom>
+          <a:noFill/>
+          <a:ln w="12700">
+            <a:solidFill>
+              <a:schemeClr val="tx1"/>
+            </a:solidFill>
+          </a:ln>
+        </p:spPr>
+        <p:style>
+          <a:lnRef idx="2">
+            <a:schemeClr val="accent1">
+              <a:shade val="50000"/>
+            </a:schemeClr>
+          </a:lnRef>
+          <a:fillRef idx="1">
+            <a:schemeClr val="accent1"/>
+          </a:fillRef>
+          <a:effectRef idx="0">
+            <a:schemeClr val="accent1"/>
+          </a:effectRef>
+          <a:fontRef idx="minor">
+            <a:schemeClr val="lt1"/>
+          </a:fontRef>
+        </p:style>
+        <p:txBody>
+          <a:bodyPr rot="0" spcFirstLastPara="0" vertOverflow="overflow" horzOverflow="overflow" vert="horz" wrap="square" lIns="457200" tIns="91440" rIns="91440" bIns="45720" numCol="1" spcCol="0" rtlCol="0" fromWordArt="0" anchor="t" anchorCtr="0" forceAA="0" compatLnSpc="1">
+            <a:prstTxWarp prst="textNoShape">
+              <a:avLst/>
+            </a:prstTxWarp>
+            <a:noAutofit/>
+          </a:bodyPr>
+          <a:lstStyle/>
+          <a:p>
+            <a:pPr algn="l"/>
+            <a:r>
+              <a:rPr lang="en-US" sz="1200" dirty="0">
+                <a:solidFill>
+                  <a:sysClr val="windowText" lastClr="000000"/>
+                </a:solidFill>
+                <a:latin typeface="Arial" panose="020B0604020202020204" pitchFamily="34" charset="0"/>
+                <a:ea typeface="Amazon Ember" panose="020B0603020204020204" pitchFamily="34" charset="0"/>
+                <a:cs typeface="Arial" panose="020B0604020202020204" pitchFamily="34" charset="0"/>
+              </a:rPr>
+              <a:t>AWS Cloud</a:t>
+            </a:r>
+          </a:p>
+        </p:txBody>
+      </p:sp>
+      <p:pic>
+        <p:nvPicPr>
+          <p:cNvPr id="5" name="Graphic 11">
+            <a:extLst>
+              <a:ext uri="{FF2B5EF4-FFF2-40B4-BE49-F238E27FC236}">
+                <a16:creationId xmlns:a16="http://schemas.microsoft.com/office/drawing/2014/main" id="{CE52C9D7-11B0-9E41-AB16-2C9849C3ECBE}"/>
+              </a:ext>
+            </a:extLst>
+          </p:cNvPr>
+          <p:cNvPicPr>
+            <a:picLocks noChangeAspect="1"/>
+          </p:cNvPicPr>
+          <p:nvPr/>
+        </p:nvPicPr>
+        <p:blipFill>
+          <a:blip r:embed="rId2">
+            <a:extLst>
+              <a:ext uri="{96DAC541-7B7A-43D3-8B79-37D633B846F1}">
+                <asvg:svgBlip xmlns="" xmlns:asvg="http://schemas.microsoft.com/office/drawing/2016/SVG/main" r:embed="rId3"/>
+              </a:ext>
+            </a:extLst>
+          </a:blip>
+          <a:stretch>
+            <a:fillRect/>
+          </a:stretch>
+        </p:blipFill>
+        <p:spPr>
+          <a:xfrm>
+            <a:off x="588108" y="609600"/>
+            <a:ext cx="330200" cy="330200"/>
+          </a:xfrm>
+          <a:prstGeom prst="rect">
+            <a:avLst/>
+          </a:prstGeom>
+        </p:spPr>
+      </p:pic>
+      <p:sp>
+        <p:nvSpPr>
+          <p:cNvPr id="6" name="Rectangle 5">
+            <a:extLst>
+              <a:ext uri="{FF2B5EF4-FFF2-40B4-BE49-F238E27FC236}">
+                <a16:creationId xmlns:a16="http://schemas.microsoft.com/office/drawing/2014/main" id="{E25F190B-F12E-614B-827A-566AC09E9D97}"/>
+              </a:ext>
+            </a:extLst>
+          </p:cNvPr>
+          <p:cNvSpPr/>
+          <p:nvPr/>
+        </p:nvSpPr>
+        <p:spPr>
+          <a:xfrm>
+            <a:off x="1583496" y="1600200"/>
+            <a:ext cx="2471811" cy="1447800"/>
+          </a:xfrm>
+          <a:prstGeom prst="rect">
+            <a:avLst/>
+          </a:prstGeom>
+          <a:solidFill>
+            <a:srgbClr val="1D8900">
+              <a:alpha val="9804"/>
+            </a:srgbClr>
+          </a:solidFill>
+          <a:ln w="12700">
+            <a:noFill/>
+            <a:prstDash val="dash"/>
+          </a:ln>
+        </p:spPr>
+        <p:style>
+          <a:lnRef idx="2">
+            <a:schemeClr val="accent1">
+              <a:shade val="50000"/>
+            </a:schemeClr>
+          </a:lnRef>
+          <a:fillRef idx="1">
+            <a:schemeClr val="accent1"/>
+          </a:fillRef>
+          <a:effectRef idx="0">
+            <a:schemeClr val="accent1"/>
+          </a:effectRef>
+          <a:fontRef idx="minor">
+            <a:schemeClr val="lt1"/>
+          </a:fontRef>
+        </p:style>
+        <p:txBody>
+          <a:bodyPr rot="0" spcFirstLastPara="0" vertOverflow="overflow" horzOverflow="overflow" vert="horz" wrap="square" lIns="338328" tIns="45720" rIns="91440" bIns="45720" numCol="1" spcCol="0" rtlCol="0" fromWordArt="0" anchor="t" anchorCtr="0" forceAA="0" compatLnSpc="1">
+            <a:prstTxWarp prst="textNoShape">
+              <a:avLst/>
+            </a:prstTxWarp>
+            <a:noAutofit/>
+          </a:bodyPr>
+          <a:lstStyle/>
+          <a:p>
+            <a:pPr algn="l"/>
+            <a:r>
+              <a:rPr lang="en-US" sz="1200" dirty="0">
+                <a:solidFill>
+                  <a:schemeClr val="accent6"/>
+                </a:solidFill>
+                <a:latin typeface="Arial" panose="020B0604020202020204" pitchFamily="34" charset="0"/>
+                <a:ea typeface="Amazon Ember" panose="020B0603020204020204" pitchFamily="34" charset="0"/>
+                <a:cs typeface="Arial" panose="020B0604020202020204" pitchFamily="34" charset="0"/>
+              </a:rPr>
+              <a:t>Public subnet</a:t>
+            </a:r>
+          </a:p>
+          <a:p>
+            <a:pPr algn="l"/>
+            <a:endParaRPr lang="en-US" sz="1200" dirty="0">
+              <a:solidFill>
+                <a:schemeClr val="accent5"/>
+              </a:solidFill>
+              <a:latin typeface="Arial" panose="020B0604020202020204" pitchFamily="34" charset="0"/>
+              <a:ea typeface="Amazon Ember" panose="020B0603020204020204" pitchFamily="34" charset="0"/>
+              <a:cs typeface="Arial" panose="020B0604020202020204" pitchFamily="34" charset="0"/>
+            </a:endParaRPr>
+          </a:p>
+        </p:txBody>
+      </p:sp>
+      <p:pic>
+        <p:nvPicPr>
+          <p:cNvPr id="7" name="Graphic 10">
+            <a:extLst>
+              <a:ext uri="{FF2B5EF4-FFF2-40B4-BE49-F238E27FC236}">
+                <a16:creationId xmlns:a16="http://schemas.microsoft.com/office/drawing/2014/main" id="{89B99B74-19F0-0B4B-85E3-A09DF2519E46}"/>
+              </a:ext>
+            </a:extLst>
+          </p:cNvPr>
+          <p:cNvPicPr>
+            <a:picLocks noChangeAspect="1"/>
+          </p:cNvPicPr>
+          <p:nvPr/>
+        </p:nvPicPr>
+        <p:blipFill>
+          <a:blip r:embed="rId4">
+            <a:extLst>
+              <a:ext uri="{96DAC541-7B7A-43D3-8B79-37D633B846F1}">
+                <asvg:svgBlip xmlns="" xmlns:asvg="http://schemas.microsoft.com/office/drawing/2016/SVG/main" r:embed="rId7"/>
+              </a:ext>
+            </a:extLst>
+          </a:blip>
+          <a:stretch>
+            <a:fillRect/>
+          </a:stretch>
+        </p:blipFill>
+        <p:spPr>
+          <a:xfrm>
+            <a:off x="1584816" y="1600200"/>
+            <a:ext cx="274320" cy="274320"/>
+          </a:xfrm>
+          <a:prstGeom prst="rect">
+            <a:avLst/>
+          </a:prstGeom>
+        </p:spPr>
+      </p:pic>
+      <p:sp>
+        <p:nvSpPr>
+          <p:cNvPr id="8" name="Rectangle 7">
+            <a:extLst>
+              <a:ext uri="{FF2B5EF4-FFF2-40B4-BE49-F238E27FC236}">
+                <a16:creationId xmlns:a16="http://schemas.microsoft.com/office/drawing/2014/main" id="{A85485B4-AA18-C048-B92A-A9A0F4372B98}"/>
+              </a:ext>
+            </a:extLst>
+          </p:cNvPr>
+          <p:cNvSpPr/>
+          <p:nvPr/>
+        </p:nvSpPr>
+        <p:spPr>
+          <a:xfrm>
+            <a:off x="1584961" y="3124200"/>
+            <a:ext cx="2468880" cy="2179104"/>
+          </a:xfrm>
+          <a:prstGeom prst="rect">
+            <a:avLst/>
+          </a:prstGeom>
+          <a:solidFill>
+            <a:srgbClr val="007CBC">
+              <a:alpha val="9804"/>
+            </a:srgbClr>
+          </a:solidFill>
+          <a:ln w="12700">
+            <a:noFill/>
+            <a:prstDash val="dash"/>
+          </a:ln>
+        </p:spPr>
+        <p:style>
+          <a:lnRef idx="2">
+            <a:schemeClr val="accent1">
+              <a:shade val="50000"/>
+            </a:schemeClr>
+          </a:lnRef>
+          <a:fillRef idx="1">
+            <a:schemeClr val="accent1"/>
+          </a:fillRef>
+          <a:effectRef idx="0">
+            <a:schemeClr val="accent1"/>
+          </a:effectRef>
+          <a:fontRef idx="minor">
+            <a:schemeClr val="lt1"/>
+          </a:fontRef>
+        </p:style>
+        <p:txBody>
+          <a:bodyPr rot="0" spcFirstLastPara="0" vertOverflow="overflow" horzOverflow="overflow" vert="horz" wrap="square" lIns="338328" tIns="45720" rIns="91440" bIns="45720" numCol="1" spcCol="0" rtlCol="0" fromWordArt="0" anchor="t" anchorCtr="0" forceAA="0" compatLnSpc="1">
+            <a:prstTxWarp prst="textNoShape">
+              <a:avLst/>
+            </a:prstTxWarp>
+            <a:noAutofit/>
+          </a:bodyPr>
+          <a:lstStyle/>
+          <a:p>
+            <a:pPr algn="l"/>
+            <a:r>
+              <a:rPr lang="en-US" sz="1200" dirty="0">
+                <a:solidFill>
+                  <a:schemeClr val="accent1"/>
+                </a:solidFill>
+                <a:latin typeface="Arial" panose="020B0604020202020204" pitchFamily="34" charset="0"/>
+                <a:ea typeface="Amazon Ember" panose="020B0603020204020204" pitchFamily="34" charset="0"/>
+                <a:cs typeface="Arial" panose="020B0604020202020204" pitchFamily="34" charset="0"/>
+              </a:rPr>
+              <a:t>Private subnet</a:t>
+            </a:r>
+          </a:p>
+          <a:p>
+            <a:pPr algn="l"/>
+            <a:endParaRPr lang="en-US" sz="1200" dirty="0">
+              <a:solidFill>
+                <a:schemeClr val="accent3"/>
+              </a:solidFill>
+              <a:latin typeface="Arial" panose="020B0604020202020204" pitchFamily="34" charset="0"/>
+              <a:ea typeface="Amazon Ember" panose="020B0603020204020204" pitchFamily="34" charset="0"/>
+              <a:cs typeface="Arial" panose="020B0604020202020204" pitchFamily="34" charset="0"/>
+            </a:endParaRPr>
+          </a:p>
+        </p:txBody>
+      </p:sp>
+      <p:pic>
+        <p:nvPicPr>
+          <p:cNvPr id="9" name="Graphic 13">
+            <a:extLst>
+              <a:ext uri="{FF2B5EF4-FFF2-40B4-BE49-F238E27FC236}">
+                <a16:creationId xmlns:a16="http://schemas.microsoft.com/office/drawing/2014/main" id="{3BD31095-C7B2-C24A-9990-6F9E14956A7B}"/>
+              </a:ext>
+            </a:extLst>
+          </p:cNvPr>
+          <p:cNvPicPr>
+            <a:picLocks noChangeAspect="1"/>
+          </p:cNvPicPr>
+          <p:nvPr/>
+        </p:nvPicPr>
+        <p:blipFill>
+          <a:blip r:embed="rId8">
+            <a:extLst>
+              <a:ext uri="{96DAC541-7B7A-43D3-8B79-37D633B846F1}">
+                <asvg:svgBlip xmlns="" xmlns:asvg="http://schemas.microsoft.com/office/drawing/2016/SVG/main" r:embed="rId9"/>
+              </a:ext>
+            </a:extLst>
+          </a:blip>
+          <a:stretch>
+            <a:fillRect/>
+          </a:stretch>
+        </p:blipFill>
+        <p:spPr>
+          <a:xfrm>
+            <a:off x="1584816" y="3129760"/>
+            <a:ext cx="274320" cy="274320"/>
+          </a:xfrm>
+          <a:prstGeom prst="rect">
+            <a:avLst/>
+          </a:prstGeom>
+        </p:spPr>
+      </p:pic>
+      <p:sp>
+        <p:nvSpPr>
+          <p:cNvPr id="10" name="Rectangle 9">
+            <a:extLst>
+              <a:ext uri="{FF2B5EF4-FFF2-40B4-BE49-F238E27FC236}">
+                <a16:creationId xmlns:a16="http://schemas.microsoft.com/office/drawing/2014/main" id="{25B2706C-95D8-A94F-9EC8-6497FA7FB136}"/>
+              </a:ext>
+            </a:extLst>
+          </p:cNvPr>
+          <p:cNvSpPr/>
+          <p:nvPr/>
+        </p:nvSpPr>
+        <p:spPr>
+          <a:xfrm>
+            <a:off x="2822991" y="1942075"/>
+            <a:ext cx="3696603" cy="978466"/>
+          </a:xfrm>
+          <a:prstGeom prst="rect">
+            <a:avLst/>
+          </a:prstGeom>
+          <a:noFill/>
+          <a:ln w="12700">
+            <a:solidFill>
+              <a:srgbClr val="D86613"/>
+            </a:solidFill>
+            <a:prstDash val="dash"/>
+          </a:ln>
+        </p:spPr>
+        <p:style>
+          <a:lnRef idx="2">
+            <a:schemeClr val="accent1">
+              <a:shade val="50000"/>
+            </a:schemeClr>
+          </a:lnRef>
+          <a:fillRef idx="1">
+            <a:schemeClr val="accent1"/>
+          </a:fillRef>
+          <a:effectRef idx="0">
+            <a:schemeClr val="accent1"/>
+          </a:effectRef>
+          <a:fontRef idx="minor">
+            <a:schemeClr val="lt1"/>
+          </a:fontRef>
+        </p:style>
+        <p:txBody>
+          <a:bodyPr rot="0" spcFirstLastPara="0" vertOverflow="overflow" horzOverflow="overflow" vert="horz" wrap="square" lIns="91440" tIns="91440" rIns="91440" bIns="45720" numCol="1" spcCol="0" rtlCol="0" fromWordArt="0" anchor="t" anchorCtr="0" forceAA="0" compatLnSpc="1">
+            <a:prstTxWarp prst="textNoShape">
+              <a:avLst/>
+            </a:prstTxWarp>
+            <a:noAutofit/>
+          </a:bodyPr>
+          <a:lstStyle/>
+          <a:p>
+            <a:pPr algn="ctr"/>
+            <a:endParaRPr lang="en-US" sz="1200" dirty="0">
+              <a:solidFill>
+                <a:srgbClr val="D86613"/>
+              </a:solidFill>
+              <a:latin typeface="Arial" panose="020B0604020202020204" pitchFamily="34" charset="0"/>
+              <a:ea typeface="Amazon Ember" panose="020B0603020204020204" pitchFamily="34" charset="0"/>
+              <a:cs typeface="Arial" panose="020B0604020202020204" pitchFamily="34" charset="0"/>
+            </a:endParaRPr>
+          </a:p>
+          <a:p>
+            <a:pPr algn="ctr"/>
+            <a:endParaRPr lang="en-US" sz="1200" dirty="0">
+              <a:solidFill>
+                <a:srgbClr val="D86613"/>
+              </a:solidFill>
+              <a:latin typeface="Arial" panose="020B0604020202020204" pitchFamily="34" charset="0"/>
+              <a:ea typeface="Amazon Ember" panose="020B0603020204020204" pitchFamily="34" charset="0"/>
+              <a:cs typeface="Arial" panose="020B0604020202020204" pitchFamily="34" charset="0"/>
+            </a:endParaRPr>
+          </a:p>
+          <a:p>
+            <a:pPr algn="ctr"/>
+            <a:r>
+              <a:rPr lang="en-US" sz="1200" dirty="0">
+                <a:solidFill>
+                  <a:srgbClr val="D86613"/>
+                </a:solidFill>
+                <a:latin typeface="Arial" panose="020B0604020202020204" pitchFamily="34" charset="0"/>
+                <a:ea typeface="Amazon Ember" panose="020B0603020204020204" pitchFamily="34" charset="0"/>
+                <a:cs typeface="Arial" panose="020B0604020202020204" pitchFamily="34" charset="0"/>
+              </a:rPr>
+              <a:t>Auto </a:t>
+            </a:r>
+            <a:r>
+              <a:rPr lang="en-US" sz="1200" dirty="0" smtClean="0">
+                <a:solidFill>
+                  <a:srgbClr val="D86613"/>
+                </a:solidFill>
+                <a:latin typeface="Arial" panose="020B0604020202020204" pitchFamily="34" charset="0"/>
+                <a:ea typeface="Amazon Ember" panose="020B0603020204020204" pitchFamily="34" charset="0"/>
+                <a:cs typeface="Arial" panose="020B0604020202020204" pitchFamily="34" charset="0"/>
+              </a:rPr>
+              <a:t>Scaling</a:t>
+            </a:r>
+          </a:p>
+          <a:p>
+            <a:pPr algn="ctr"/>
+            <a:r>
+              <a:rPr lang="en-US" sz="1200" dirty="0" smtClean="0">
+                <a:solidFill>
+                  <a:srgbClr val="D86613"/>
+                </a:solidFill>
+                <a:latin typeface="Arial" panose="020B0604020202020204" pitchFamily="34" charset="0"/>
+                <a:ea typeface="Amazon Ember" panose="020B0603020204020204" pitchFamily="34" charset="0"/>
+                <a:cs typeface="Arial" panose="020B0604020202020204" pitchFamily="34" charset="0"/>
+              </a:rPr>
+              <a:t>group</a:t>
+            </a:r>
+            <a:endParaRPr lang="en-US" sz="1200" dirty="0">
+              <a:solidFill>
+                <a:srgbClr val="D86613"/>
+              </a:solidFill>
+              <a:latin typeface="Arial" panose="020B0604020202020204" pitchFamily="34" charset="0"/>
+              <a:ea typeface="Amazon Ember" panose="020B0603020204020204" pitchFamily="34" charset="0"/>
+              <a:cs typeface="Arial" panose="020B0604020202020204" pitchFamily="34" charset="0"/>
+            </a:endParaRPr>
+          </a:p>
+        </p:txBody>
+      </p:sp>
+      <p:pic>
+        <p:nvPicPr>
+          <p:cNvPr id="11" name="Graphic 3">
+            <a:extLst>
+              <a:ext uri="{FF2B5EF4-FFF2-40B4-BE49-F238E27FC236}">
+                <a16:creationId xmlns:a16="http://schemas.microsoft.com/office/drawing/2014/main" id="{D7A7873E-A1CC-804E-816C-DC0FF152D82D}"/>
+              </a:ext>
+            </a:extLst>
+          </p:cNvPr>
+          <p:cNvPicPr>
+            <a:picLocks noChangeAspect="1"/>
+          </p:cNvPicPr>
+          <p:nvPr/>
+        </p:nvPicPr>
+        <p:blipFill>
+          <a:blip r:embed="rId10">
+            <a:extLst>
+              <a:ext uri="{96DAC541-7B7A-43D3-8B79-37D633B846F1}">
+                <asvg:svgBlip xmlns="" xmlns:asvg="http://schemas.microsoft.com/office/drawing/2016/SVG/main" r:embed="rId11"/>
+              </a:ext>
+            </a:extLst>
+          </a:blip>
+          <a:stretch>
+            <a:fillRect/>
+          </a:stretch>
+        </p:blipFill>
+        <p:spPr>
+          <a:xfrm>
+            <a:off x="4504503" y="1935264"/>
+            <a:ext cx="330200" cy="330200"/>
+          </a:xfrm>
+          <a:prstGeom prst="rect">
+            <a:avLst/>
+          </a:prstGeom>
+        </p:spPr>
+      </p:pic>
+      <p:pic>
+        <p:nvPicPr>
+          <p:cNvPr id="12" name="Graphic 135">
+            <a:extLst>
+              <a:ext uri="{FF2B5EF4-FFF2-40B4-BE49-F238E27FC236}">
+                <a16:creationId xmlns:a16="http://schemas.microsoft.com/office/drawing/2014/main" id="{C19987B1-DB3A-1640-994D-BCB81FCC1AE4}"/>
+              </a:ext>
+            </a:extLst>
+          </p:cNvPr>
+          <p:cNvPicPr>
+            <a:picLocks noChangeAspect="1"/>
+          </p:cNvPicPr>
+          <p:nvPr/>
+        </p:nvPicPr>
+        <p:blipFill>
+          <a:blip r:embed="rId12">
+            <a:extLst>
+              <a:ext uri="{96DAC541-7B7A-43D3-8B79-37D633B846F1}">
+                <asvg:svgBlip xmlns="" xmlns:asvg="http://schemas.microsoft.com/office/drawing/2016/SVG/main" r:embed="rId13"/>
+              </a:ext>
+            </a:extLst>
+          </a:blip>
+          <a:stretch>
+            <a:fillRect/>
+          </a:stretch>
+        </p:blipFill>
+        <p:spPr>
+          <a:xfrm>
+            <a:off x="3123197" y="2064381"/>
+            <a:ext cx="469900" cy="469900"/>
+          </a:xfrm>
+          <a:prstGeom prst="rect">
+            <a:avLst/>
+          </a:prstGeom>
+        </p:spPr>
+      </p:pic>
+      <p:sp>
+        <p:nvSpPr>
+          <p:cNvPr id="13" name="TextBox 12">
+            <a:extLst>
+              <a:ext uri="{FF2B5EF4-FFF2-40B4-BE49-F238E27FC236}">
+                <a16:creationId xmlns:a16="http://schemas.microsoft.com/office/drawing/2014/main" id="{F90C1CC4-DFE6-0445-BD1C-DB610E1A07F5}"/>
+              </a:ext>
+            </a:extLst>
+          </p:cNvPr>
+          <p:cNvSpPr txBox="1"/>
+          <p:nvPr/>
+        </p:nvSpPr>
+        <p:spPr>
+          <a:xfrm>
+            <a:off x="2601495" y="2540217"/>
+            <a:ext cx="1513305" cy="276999"/>
+          </a:xfrm>
+          <a:prstGeom prst="rect">
+            <a:avLst/>
+          </a:prstGeom>
+          <a:noFill/>
+        </p:spPr>
+        <p:txBody>
+          <a:bodyPr wrap="square" rtlCol="0">
+            <a:spAutoFit/>
+          </a:bodyPr>
+          <a:lstStyle/>
+          <a:p>
+            <a:pPr algn="ctr"/>
+            <a:r>
+              <a:rPr lang="en-US" sz="1200" dirty="0">
+                <a:latin typeface="Arial" panose="020B0604020202020204" pitchFamily="34" charset="0"/>
+                <a:ea typeface="Amazon Ember" panose="020B0603020204020204" pitchFamily="34" charset="0"/>
+                <a:cs typeface="Arial" panose="020B0604020202020204" pitchFamily="34" charset="0"/>
+              </a:rPr>
+              <a:t>RD Gateway</a:t>
+            </a:r>
+          </a:p>
+        </p:txBody>
+      </p:sp>
+      <p:sp>
+        <p:nvSpPr>
+          <p:cNvPr id="14" name="TextBox 13">
+            <a:extLst>
+              <a:ext uri="{FF2B5EF4-FFF2-40B4-BE49-F238E27FC236}">
+                <a16:creationId xmlns:a16="http://schemas.microsoft.com/office/drawing/2014/main" id="{517096B6-EF64-C245-A3E7-BEEF81BDCB9C}"/>
+              </a:ext>
+            </a:extLst>
+          </p:cNvPr>
+          <p:cNvSpPr txBox="1"/>
+          <p:nvPr/>
+        </p:nvSpPr>
+        <p:spPr>
+          <a:xfrm>
+            <a:off x="1665020" y="2542641"/>
+            <a:ext cx="1236442" cy="276999"/>
+          </a:xfrm>
+          <a:prstGeom prst="rect">
+            <a:avLst/>
+          </a:prstGeom>
+          <a:noFill/>
+        </p:spPr>
+        <p:txBody>
+          <a:bodyPr wrap="square" rtlCol="0">
+            <a:spAutoFit/>
+          </a:bodyPr>
+          <a:lstStyle/>
+          <a:p>
+            <a:pPr algn="ctr"/>
+            <a:r>
+              <a:rPr lang="en-US" sz="1200" dirty="0">
+                <a:latin typeface="Arial" panose="020B0604020202020204" pitchFamily="34" charset="0"/>
+                <a:ea typeface="Amazon Ember" panose="020B0603020204020204" pitchFamily="34" charset="0"/>
+                <a:cs typeface="Arial" panose="020B0604020202020204" pitchFamily="34" charset="0"/>
+              </a:rPr>
+              <a:t>NAT gateway</a:t>
+            </a:r>
+          </a:p>
+        </p:txBody>
+      </p:sp>
+      <p:pic>
+        <p:nvPicPr>
+          <p:cNvPr id="15" name="Graphic 40">
+            <a:extLst>
+              <a:ext uri="{FF2B5EF4-FFF2-40B4-BE49-F238E27FC236}">
+                <a16:creationId xmlns:a16="http://schemas.microsoft.com/office/drawing/2014/main" id="{C322592C-EAB9-0640-95A5-D8FF5B8E5FE6}"/>
+              </a:ext>
+            </a:extLst>
+          </p:cNvPr>
+          <p:cNvPicPr>
+            <a:picLocks noChangeAspect="1"/>
+          </p:cNvPicPr>
+          <p:nvPr/>
+        </p:nvPicPr>
+        <p:blipFill>
+          <a:blip r:embed="rId14">
+            <a:extLst>
+              <a:ext uri="{96DAC541-7B7A-43D3-8B79-37D633B846F1}">
+                <asvg:svgBlip xmlns="" xmlns:asvg="http://schemas.microsoft.com/office/drawing/2016/SVG/main" r:embed="rId17"/>
+              </a:ext>
+            </a:extLst>
+          </a:blip>
+          <a:stretch>
+            <a:fillRect/>
+          </a:stretch>
+        </p:blipFill>
+        <p:spPr>
+          <a:xfrm>
+            <a:off x="2048291" y="2064381"/>
+            <a:ext cx="469900" cy="469900"/>
+          </a:xfrm>
+          <a:prstGeom prst="rect">
+            <a:avLst/>
+          </a:prstGeom>
+        </p:spPr>
+      </p:pic>
+      <p:pic>
+        <p:nvPicPr>
+          <p:cNvPr id="16" name="Graphic 135">
+            <a:extLst>
+              <a:ext uri="{FF2B5EF4-FFF2-40B4-BE49-F238E27FC236}">
+                <a16:creationId xmlns:a16="http://schemas.microsoft.com/office/drawing/2014/main" id="{C19987B1-DB3A-1640-994D-BCB81FCC1AE4}"/>
+              </a:ext>
+            </a:extLst>
+          </p:cNvPr>
+          <p:cNvPicPr>
+            <a:picLocks noChangeAspect="1"/>
+          </p:cNvPicPr>
+          <p:nvPr/>
+        </p:nvPicPr>
+        <p:blipFill>
+          <a:blip r:embed="rId12">
+            <a:extLst>
+              <a:ext uri="{96DAC541-7B7A-43D3-8B79-37D633B846F1}">
+                <asvg:svgBlip xmlns="" xmlns:asvg="http://schemas.microsoft.com/office/drawing/2016/SVG/main" r:embed="rId13"/>
+              </a:ext>
+            </a:extLst>
+          </a:blip>
+          <a:stretch>
+            <a:fillRect/>
+          </a:stretch>
+        </p:blipFill>
+        <p:spPr>
+          <a:xfrm>
+            <a:off x="3112502" y="3446793"/>
+            <a:ext cx="469900" cy="469900"/>
+          </a:xfrm>
+          <a:prstGeom prst="rect">
+            <a:avLst/>
+          </a:prstGeom>
+        </p:spPr>
+      </p:pic>
+      <p:sp>
+        <p:nvSpPr>
+          <p:cNvPr id="17" name="TextBox 16">
+            <a:extLst>
+              <a:ext uri="{FF2B5EF4-FFF2-40B4-BE49-F238E27FC236}">
+                <a16:creationId xmlns:a16="http://schemas.microsoft.com/office/drawing/2014/main" id="{F90C1CC4-DFE6-0445-BD1C-DB610E1A07F5}"/>
+              </a:ext>
+            </a:extLst>
+          </p:cNvPr>
+          <p:cNvSpPr txBox="1"/>
+          <p:nvPr/>
+        </p:nvSpPr>
+        <p:spPr>
+          <a:xfrm>
+            <a:off x="2590800" y="3879300"/>
+            <a:ext cx="1513305" cy="276999"/>
+          </a:xfrm>
+          <a:prstGeom prst="rect">
+            <a:avLst/>
+          </a:prstGeom>
+          <a:noFill/>
+        </p:spPr>
+        <p:txBody>
+          <a:bodyPr wrap="square" rtlCol="0">
+            <a:spAutoFit/>
+          </a:bodyPr>
+          <a:lstStyle/>
+          <a:p>
+            <a:pPr algn="ctr"/>
+            <a:r>
+              <a:rPr lang="en-US" sz="1200" dirty="0" smtClean="0">
+                <a:latin typeface="Arial" panose="020B0604020202020204" pitchFamily="34" charset="0"/>
+                <a:ea typeface="Amazon Ember" panose="020B0603020204020204" pitchFamily="34" charset="0"/>
+                <a:cs typeface="Arial" panose="020B0604020202020204" pitchFamily="34" charset="0"/>
+              </a:rPr>
+              <a:t>Domain controller</a:t>
+            </a:r>
+            <a:endParaRPr lang="en-US" sz="1200" dirty="0">
+              <a:latin typeface="Arial" panose="020B0604020202020204" pitchFamily="34" charset="0"/>
+              <a:ea typeface="Amazon Ember" panose="020B0603020204020204" pitchFamily="34" charset="0"/>
+              <a:cs typeface="Arial" panose="020B0604020202020204" pitchFamily="34" charset="0"/>
+            </a:endParaRPr>
+          </a:p>
+        </p:txBody>
+      </p:sp>
+      <p:pic>
+        <p:nvPicPr>
+          <p:cNvPr id="28" name="Graphic 17">
+            <a:extLst>
+              <a:ext uri="{FF2B5EF4-FFF2-40B4-BE49-F238E27FC236}">
+                <a16:creationId xmlns:a16="http://schemas.microsoft.com/office/drawing/2014/main" id="{633BC3DF-5160-6843-B872-94C5C92E5BF4}"/>
+              </a:ext>
+            </a:extLst>
+          </p:cNvPr>
+          <p:cNvPicPr>
+            <a:picLocks noChangeAspect="1" noChangeArrowheads="1"/>
+          </p:cNvPicPr>
+          <p:nvPr/>
+        </p:nvPicPr>
+        <p:blipFill>
+          <a:blip r:embed="rId18" cstate="print">
+            <a:extLst>
+              <a:ext uri="{28A0092B-C50C-407E-A947-70E740481C1C}">
+                <a14:useLocalDpi xmlns:a14="http://schemas.microsoft.com/office/drawing/2010/main" val="0"/>
+              </a:ext>
+            </a:extLst>
+          </a:blip>
+          <a:srcRect/>
+          <a:stretch>
+            <a:fillRect/>
+          </a:stretch>
+        </p:blipFill>
+        <p:spPr bwMode="auto">
+          <a:xfrm>
+            <a:off x="8546202" y="1975995"/>
+            <a:ext cx="762000" cy="762000"/>
+          </a:xfrm>
+          <a:prstGeom prst="rect">
+            <a:avLst/>
+          </a:prstGeom>
+          <a:noFill/>
+          <a:ln>
+            <a:noFill/>
+          </a:ln>
+          <a:extLst>
+            <a:ext uri="{909E8E84-426E-40DD-AFC4-6F175D3DCCD1}">
+              <a14:hiddenFill xmlns:a14="http://schemas.microsoft.com/office/drawing/2010/main">
+                <a:solidFill>
+                  <a:srgbClr val="FFFFFF"/>
+                </a:solidFill>
+              </a14:hiddenFill>
+            </a:ext>
+            <a:ext uri="{91240B29-F687-4F45-9708-019B960494DF}">
+              <a14:hiddenLine xmlns:a14="http://schemas.microsoft.com/office/drawing/2010/main" w="9525">
+                <a:solidFill>
+                  <a:srgbClr val="000000"/>
+                </a:solidFill>
+                <a:miter lim="800000"/>
+                <a:headEnd/>
+                <a:tailEnd/>
+              </a14:hiddenLine>
+            </a:ext>
+          </a:extLst>
+        </p:spPr>
+      </p:pic>
+      <p:sp>
+        <p:nvSpPr>
+          <p:cNvPr id="29" name="TextBox 11">
+            <a:extLst>
+              <a:ext uri="{FF2B5EF4-FFF2-40B4-BE49-F238E27FC236}">
+                <a16:creationId xmlns:a16="http://schemas.microsoft.com/office/drawing/2014/main" id="{BBEC601B-D650-7947-9D7F-6579E2990B06}"/>
+              </a:ext>
+            </a:extLst>
+          </p:cNvPr>
+          <p:cNvSpPr txBox="1">
+            <a:spLocks noChangeArrowheads="1"/>
+          </p:cNvSpPr>
+          <p:nvPr/>
+        </p:nvSpPr>
+        <p:spPr bwMode="auto">
+          <a:xfrm>
+            <a:off x="7788965" y="2737995"/>
+            <a:ext cx="2292350" cy="276999"/>
+          </a:xfrm>
+          <a:prstGeom prst="rect">
+            <a:avLst/>
+          </a:prstGeom>
+          <a:noFill/>
+          <a:ln>
+            <a:noFill/>
+          </a:ln>
+          <a:extLst>
+            <a:ext uri="{909E8E84-426E-40DD-AFC4-6F175D3DCCD1}">
+              <a14:hiddenFill xmlns:a14="http://schemas.microsoft.com/office/drawing/2010/main">
+                <a:solidFill>
+                  <a:srgbClr val="FFFFFF"/>
+                </a:solidFill>
+              </a14:hiddenFill>
+            </a:ext>
+            <a:ext uri="{91240B29-F687-4F45-9708-019B960494DF}">
+              <a14:hiddenLine xmlns:a14="http://schemas.microsoft.com/office/drawing/2010/main" w="9525">
+                <a:solidFill>
+                  <a:srgbClr val="000000"/>
+                </a:solidFill>
+                <a:miter lim="800000"/>
+                <a:headEnd/>
+                <a:tailEnd/>
+              </a14:hiddenLine>
+            </a:ext>
+          </a:extLst>
+        </p:spPr>
+        <p:txBody>
+          <a:bodyPr>
+            <a:spAutoFit/>
+          </a:bodyPr>
+          <a:lstStyle>
+            <a:lvl1pPr>
+              <a:defRPr>
+                <a:solidFill>
+                  <a:schemeClr val="tx1"/>
+                </a:solidFill>
+                <a:latin typeface="Calibri" panose="020F0502020204030204" pitchFamily="34" charset="0"/>
+              </a:defRPr>
+            </a:lvl1pPr>
+            <a:lvl2pPr marL="742950" indent="-285750">
+              <a:defRPr>
+                <a:solidFill>
+                  <a:schemeClr val="tx1"/>
+                </a:solidFill>
+                <a:latin typeface="Calibri" panose="020F0502020204030204" pitchFamily="34" charset="0"/>
+              </a:defRPr>
+            </a:lvl2pPr>
+            <a:lvl3pPr marL="1143000" indent="-228600">
+              <a:defRPr>
+                <a:solidFill>
+                  <a:schemeClr val="tx1"/>
+                </a:solidFill>
+                <a:latin typeface="Calibri" panose="020F0502020204030204" pitchFamily="34" charset="0"/>
+              </a:defRPr>
+            </a:lvl3pPr>
+            <a:lvl4pPr marL="1600200" indent="-228600">
+              <a:defRPr>
+                <a:solidFill>
+                  <a:schemeClr val="tx1"/>
+                </a:solidFill>
+                <a:latin typeface="Calibri" panose="020F0502020204030204" pitchFamily="34" charset="0"/>
+              </a:defRPr>
+            </a:lvl4pPr>
+            <a:lvl5pPr marL="2057400" indent="-228600">
+              <a:defRPr>
+                <a:solidFill>
+                  <a:schemeClr val="tx1"/>
+                </a:solidFill>
+                <a:latin typeface="Calibri" panose="020F0502020204030204" pitchFamily="34" charset="0"/>
+              </a:defRPr>
+            </a:lvl5pPr>
+            <a:lvl6pPr marL="2514600" indent="-228600" eaLnBrk="0" fontAlgn="base" hangingPunct="0">
+              <a:spcBef>
+                <a:spcPct val="0"/>
+              </a:spcBef>
+              <a:spcAft>
+                <a:spcPct val="0"/>
+              </a:spcAft>
+              <a:defRPr>
+                <a:solidFill>
+                  <a:schemeClr val="tx1"/>
+                </a:solidFill>
+                <a:latin typeface="Calibri" panose="020F0502020204030204" pitchFamily="34" charset="0"/>
+              </a:defRPr>
+            </a:lvl6pPr>
+            <a:lvl7pPr marL="2971800" indent="-228600" eaLnBrk="0" fontAlgn="base" hangingPunct="0">
+              <a:spcBef>
+                <a:spcPct val="0"/>
+              </a:spcBef>
+              <a:spcAft>
+                <a:spcPct val="0"/>
+              </a:spcAft>
+              <a:defRPr>
+                <a:solidFill>
+                  <a:schemeClr val="tx1"/>
+                </a:solidFill>
+                <a:latin typeface="Calibri" panose="020F0502020204030204" pitchFamily="34" charset="0"/>
+              </a:defRPr>
+            </a:lvl7pPr>
+            <a:lvl8pPr marL="3429000" indent="-228600" eaLnBrk="0" fontAlgn="base" hangingPunct="0">
+              <a:spcBef>
+                <a:spcPct val="0"/>
+              </a:spcBef>
+              <a:spcAft>
+                <a:spcPct val="0"/>
+              </a:spcAft>
+              <a:defRPr>
+                <a:solidFill>
+                  <a:schemeClr val="tx1"/>
+                </a:solidFill>
+                <a:latin typeface="Calibri" panose="020F0502020204030204" pitchFamily="34" charset="0"/>
+              </a:defRPr>
+            </a:lvl8pPr>
+            <a:lvl9pPr marL="3886200" indent="-228600" eaLnBrk="0" fontAlgn="base" hangingPunct="0">
+              <a:spcBef>
+                <a:spcPct val="0"/>
+              </a:spcBef>
+              <a:spcAft>
+                <a:spcPct val="0"/>
+              </a:spcAft>
+              <a:defRPr>
+                <a:solidFill>
+                  <a:schemeClr val="tx1"/>
+                </a:solidFill>
+                <a:latin typeface="Calibri" panose="020F0502020204030204" pitchFamily="34" charset="0"/>
+              </a:defRPr>
+            </a:lvl9pPr>
+          </a:lstStyle>
+          <a:p>
+            <a:pPr algn="ctr" eaLnBrk="1" hangingPunct="1"/>
+            <a:r>
+              <a:rPr lang="en-US" altLang="en-US" sz="1200" dirty="0">
+                <a:latin typeface="Arial" panose="020B0604020202020204" pitchFamily="34" charset="0"/>
+                <a:ea typeface="Amazon Ember" panose="020B0603020204020204" pitchFamily="34" charset="0"/>
+                <a:cs typeface="Arial" panose="020B0604020202020204" pitchFamily="34" charset="0"/>
+              </a:rPr>
+              <a:t>AWS Secrets Manager</a:t>
+            </a:r>
+          </a:p>
+        </p:txBody>
+      </p:sp>
+      <p:pic>
+        <p:nvPicPr>
+          <p:cNvPr id="30" name="Graphic 15">
+            <a:extLst>
+              <a:ext uri="{FF2B5EF4-FFF2-40B4-BE49-F238E27FC236}">
+                <a16:creationId xmlns:a16="http://schemas.microsoft.com/office/drawing/2014/main" id="{3A010F8A-DF9B-CA43-8D41-3A122544E272}"/>
+              </a:ext>
+            </a:extLst>
+          </p:cNvPr>
+          <p:cNvPicPr>
+            <a:picLocks noChangeAspect="1" noChangeArrowheads="1"/>
+          </p:cNvPicPr>
+          <p:nvPr/>
+        </p:nvPicPr>
+        <p:blipFill>
+          <a:blip r:embed="rId19" cstate="print">
+            <a:extLst>
+              <a:ext uri="{28A0092B-C50C-407E-A947-70E740481C1C}">
+                <a14:useLocalDpi xmlns:a14="http://schemas.microsoft.com/office/drawing/2010/main" val="0"/>
+              </a:ext>
+            </a:extLst>
+          </a:blip>
+          <a:srcRect/>
+          <a:stretch>
+            <a:fillRect/>
+          </a:stretch>
+        </p:blipFill>
+        <p:spPr bwMode="auto">
+          <a:xfrm>
+            <a:off x="8552820" y="3297362"/>
+            <a:ext cx="762000" cy="762000"/>
+          </a:xfrm>
+          <a:prstGeom prst="rect">
+            <a:avLst/>
+          </a:prstGeom>
+          <a:noFill/>
+          <a:ln>
+            <a:noFill/>
+          </a:ln>
+          <a:extLst>
+            <a:ext uri="{909E8E84-426E-40DD-AFC4-6F175D3DCCD1}">
+              <a14:hiddenFill xmlns:a14="http://schemas.microsoft.com/office/drawing/2010/main">
+                <a:solidFill>
+                  <a:srgbClr val="FFFFFF"/>
+                </a:solidFill>
+              </a14:hiddenFill>
+            </a:ext>
+            <a:ext uri="{91240B29-F687-4F45-9708-019B960494DF}">
+              <a14:hiddenLine xmlns:a14="http://schemas.microsoft.com/office/drawing/2010/main" w="9525">
+                <a:solidFill>
+                  <a:srgbClr val="000000"/>
+                </a:solidFill>
+                <a:miter lim="800000"/>
+                <a:headEnd/>
+                <a:tailEnd/>
+              </a14:hiddenLine>
+            </a:ext>
+          </a:extLst>
+        </p:spPr>
+      </p:pic>
+      <p:sp>
+        <p:nvSpPr>
+          <p:cNvPr id="31" name="TextBox 11">
+            <a:extLst>
+              <a:ext uri="{FF2B5EF4-FFF2-40B4-BE49-F238E27FC236}">
+                <a16:creationId xmlns:a16="http://schemas.microsoft.com/office/drawing/2014/main" id="{EE7EF599-CC93-1843-94CE-F010641A8D23}"/>
+              </a:ext>
+            </a:extLst>
+          </p:cNvPr>
+          <p:cNvSpPr txBox="1">
+            <a:spLocks noChangeArrowheads="1"/>
+          </p:cNvSpPr>
+          <p:nvPr/>
+        </p:nvSpPr>
+        <p:spPr bwMode="auto">
+          <a:xfrm>
+            <a:off x="7793995" y="4050555"/>
+            <a:ext cx="2292350" cy="276999"/>
+          </a:xfrm>
+          <a:prstGeom prst="rect">
+            <a:avLst/>
+          </a:prstGeom>
+          <a:noFill/>
+          <a:ln>
+            <a:noFill/>
+          </a:ln>
+          <a:extLst>
+            <a:ext uri="{909E8E84-426E-40DD-AFC4-6F175D3DCCD1}">
+              <a14:hiddenFill xmlns:a14="http://schemas.microsoft.com/office/drawing/2010/main">
+                <a:solidFill>
+                  <a:srgbClr val="FFFFFF"/>
+                </a:solidFill>
+              </a14:hiddenFill>
+            </a:ext>
+            <a:ext uri="{91240B29-F687-4F45-9708-019B960494DF}">
+              <a14:hiddenLine xmlns:a14="http://schemas.microsoft.com/office/drawing/2010/main" w="9525">
+                <a:solidFill>
+                  <a:srgbClr val="000000"/>
+                </a:solidFill>
+                <a:miter lim="800000"/>
+                <a:headEnd/>
+                <a:tailEnd/>
+              </a14:hiddenLine>
+            </a:ext>
+          </a:extLst>
+        </p:spPr>
+        <p:txBody>
+          <a:bodyPr>
+            <a:spAutoFit/>
+          </a:bodyPr>
+          <a:lstStyle>
+            <a:lvl1pPr>
+              <a:defRPr>
+                <a:solidFill>
+                  <a:schemeClr val="tx1"/>
+                </a:solidFill>
+                <a:latin typeface="Calibri" panose="020F0502020204030204" pitchFamily="34" charset="0"/>
+              </a:defRPr>
+            </a:lvl1pPr>
+            <a:lvl2pPr marL="742950" indent="-285750">
+              <a:defRPr>
+                <a:solidFill>
+                  <a:schemeClr val="tx1"/>
+                </a:solidFill>
+                <a:latin typeface="Calibri" panose="020F0502020204030204" pitchFamily="34" charset="0"/>
+              </a:defRPr>
+            </a:lvl2pPr>
+            <a:lvl3pPr marL="1143000" indent="-228600">
+              <a:defRPr>
+                <a:solidFill>
+                  <a:schemeClr val="tx1"/>
+                </a:solidFill>
+                <a:latin typeface="Calibri" panose="020F0502020204030204" pitchFamily="34" charset="0"/>
+              </a:defRPr>
+            </a:lvl3pPr>
+            <a:lvl4pPr marL="1600200" indent="-228600">
+              <a:defRPr>
+                <a:solidFill>
+                  <a:schemeClr val="tx1"/>
+                </a:solidFill>
+                <a:latin typeface="Calibri" panose="020F0502020204030204" pitchFamily="34" charset="0"/>
+              </a:defRPr>
+            </a:lvl4pPr>
+            <a:lvl5pPr marL="2057400" indent="-228600">
+              <a:defRPr>
+                <a:solidFill>
+                  <a:schemeClr val="tx1"/>
+                </a:solidFill>
+                <a:latin typeface="Calibri" panose="020F0502020204030204" pitchFamily="34" charset="0"/>
+              </a:defRPr>
+            </a:lvl5pPr>
+            <a:lvl6pPr marL="2514600" indent="-228600" eaLnBrk="0" fontAlgn="base" hangingPunct="0">
+              <a:spcBef>
+                <a:spcPct val="0"/>
+              </a:spcBef>
+              <a:spcAft>
+                <a:spcPct val="0"/>
+              </a:spcAft>
+              <a:defRPr>
+                <a:solidFill>
+                  <a:schemeClr val="tx1"/>
+                </a:solidFill>
+                <a:latin typeface="Calibri" panose="020F0502020204030204" pitchFamily="34" charset="0"/>
+              </a:defRPr>
+            </a:lvl6pPr>
+            <a:lvl7pPr marL="2971800" indent="-228600" eaLnBrk="0" fontAlgn="base" hangingPunct="0">
+              <a:spcBef>
+                <a:spcPct val="0"/>
+              </a:spcBef>
+              <a:spcAft>
+                <a:spcPct val="0"/>
+              </a:spcAft>
+              <a:defRPr>
+                <a:solidFill>
+                  <a:schemeClr val="tx1"/>
+                </a:solidFill>
+                <a:latin typeface="Calibri" panose="020F0502020204030204" pitchFamily="34" charset="0"/>
+              </a:defRPr>
+            </a:lvl7pPr>
+            <a:lvl8pPr marL="3429000" indent="-228600" eaLnBrk="0" fontAlgn="base" hangingPunct="0">
+              <a:spcBef>
+                <a:spcPct val="0"/>
+              </a:spcBef>
+              <a:spcAft>
+                <a:spcPct val="0"/>
+              </a:spcAft>
+              <a:defRPr>
+                <a:solidFill>
+                  <a:schemeClr val="tx1"/>
+                </a:solidFill>
+                <a:latin typeface="Calibri" panose="020F0502020204030204" pitchFamily="34" charset="0"/>
+              </a:defRPr>
+            </a:lvl8pPr>
+            <a:lvl9pPr marL="3886200" indent="-228600" eaLnBrk="0" fontAlgn="base" hangingPunct="0">
+              <a:spcBef>
+                <a:spcPct val="0"/>
+              </a:spcBef>
+              <a:spcAft>
+                <a:spcPct val="0"/>
+              </a:spcAft>
+              <a:defRPr>
+                <a:solidFill>
+                  <a:schemeClr val="tx1"/>
+                </a:solidFill>
+                <a:latin typeface="Calibri" panose="020F0502020204030204" pitchFamily="34" charset="0"/>
+              </a:defRPr>
+            </a:lvl9pPr>
+          </a:lstStyle>
+          <a:p>
+            <a:pPr algn="ctr" eaLnBrk="1" hangingPunct="1"/>
+            <a:r>
+              <a:rPr lang="en-US" altLang="en-US" sz="1200" dirty="0">
+                <a:latin typeface="Arial" panose="020B0604020202020204" pitchFamily="34" charset="0"/>
+                <a:ea typeface="Amazon Ember" panose="020B0603020204020204" pitchFamily="34" charset="0"/>
+                <a:cs typeface="Arial" panose="020B0604020202020204" pitchFamily="34" charset="0"/>
+              </a:rPr>
+              <a:t>AWS Systems Manager</a:t>
+            </a:r>
+          </a:p>
+        </p:txBody>
+      </p:sp>
+      <p:sp>
+        <p:nvSpPr>
+          <p:cNvPr id="39" name="Rectangle 38">
+            <a:extLst>
+              <a:ext uri="{FF2B5EF4-FFF2-40B4-BE49-F238E27FC236}">
+                <a16:creationId xmlns:a16="http://schemas.microsoft.com/office/drawing/2014/main" id="{34D72B91-09F3-9A42-B66A-106F01CCE8B4}"/>
+              </a:ext>
+            </a:extLst>
+          </p:cNvPr>
+          <p:cNvSpPr/>
+          <p:nvPr/>
+        </p:nvSpPr>
+        <p:spPr>
+          <a:xfrm>
+            <a:off x="1044620" y="1214882"/>
+            <a:ext cx="7032580" cy="4195318"/>
+          </a:xfrm>
+          <a:prstGeom prst="rect">
+            <a:avLst/>
+          </a:prstGeom>
+          <a:noFill/>
+          <a:ln w="12700">
+            <a:solidFill>
+              <a:srgbClr val="1E8900"/>
+            </a:solidFill>
+          </a:ln>
+        </p:spPr>
+        <p:style>
+          <a:lnRef idx="2">
+            <a:schemeClr val="accent1">
+              <a:shade val="50000"/>
+            </a:schemeClr>
+          </a:lnRef>
+          <a:fillRef idx="1">
+            <a:schemeClr val="accent1"/>
+          </a:fillRef>
+          <a:effectRef idx="0">
+            <a:schemeClr val="accent1"/>
+          </a:effectRef>
+          <a:fontRef idx="minor">
+            <a:schemeClr val="lt1"/>
+          </a:fontRef>
+        </p:style>
+        <p:txBody>
+          <a:bodyPr lIns="457200" tIns="91440"/>
+          <a:lstStyle/>
+          <a:p>
+            <a:pPr eaLnBrk="1" fontAlgn="auto" hangingPunct="1">
+              <a:spcBef>
+                <a:spcPts val="0"/>
+              </a:spcBef>
+              <a:spcAft>
+                <a:spcPts val="0"/>
+              </a:spcAft>
+              <a:defRPr/>
+            </a:pPr>
+            <a:r>
+              <a:rPr lang="en-US" sz="1200" dirty="0">
+                <a:ln w="0"/>
+                <a:solidFill>
+                  <a:srgbClr val="1E8900"/>
+                </a:solidFill>
+                <a:latin typeface="Arial" panose="020B0604020202020204" pitchFamily="34" charset="0"/>
+                <a:cs typeface="Arial" panose="020B0604020202020204" pitchFamily="34" charset="0"/>
+              </a:rPr>
+              <a:t>VPC</a:t>
+            </a:r>
+          </a:p>
+        </p:txBody>
+      </p:sp>
+      <p:pic>
+        <p:nvPicPr>
+          <p:cNvPr id="40" name="Graphic 28">
+            <a:extLst>
+              <a:ext uri="{FF2B5EF4-FFF2-40B4-BE49-F238E27FC236}">
+                <a16:creationId xmlns:a16="http://schemas.microsoft.com/office/drawing/2014/main" id="{88C69878-A4A8-CE45-B624-0223CB16619E}"/>
+              </a:ext>
+            </a:extLst>
+          </p:cNvPr>
+          <p:cNvPicPr>
+            <a:picLocks noChangeAspect="1" noChangeArrowheads="1"/>
+          </p:cNvPicPr>
+          <p:nvPr/>
+        </p:nvPicPr>
+        <p:blipFill>
+          <a:blip r:embed="rId20" cstate="print">
+            <a:extLst>
+              <a:ext uri="{28A0092B-C50C-407E-A947-70E740481C1C}">
+                <a14:useLocalDpi xmlns:a14="http://schemas.microsoft.com/office/drawing/2010/main" val="0"/>
+              </a:ext>
+            </a:extLst>
+          </a:blip>
+          <a:srcRect/>
+          <a:stretch>
+            <a:fillRect/>
+          </a:stretch>
+        </p:blipFill>
+        <p:spPr bwMode="auto">
+          <a:xfrm>
+            <a:off x="1044620" y="1214882"/>
+            <a:ext cx="330200" cy="330200"/>
+          </a:xfrm>
+          <a:prstGeom prst="rect">
+            <a:avLst/>
+          </a:prstGeom>
+          <a:noFill/>
+          <a:ln>
+            <a:noFill/>
+          </a:ln>
+          <a:extLst>
+            <a:ext uri="{909E8E84-426E-40DD-AFC4-6F175D3DCCD1}">
+              <a14:hiddenFill xmlns:a14="http://schemas.microsoft.com/office/drawing/2010/main">
+                <a:solidFill>
+                  <a:srgbClr val="FFFFFF"/>
+                </a:solidFill>
+              </a14:hiddenFill>
+            </a:ext>
+            <a:ext uri="{91240B29-F687-4F45-9708-019B960494DF}">
+              <a14:hiddenLine xmlns:a14="http://schemas.microsoft.com/office/drawing/2010/main" w="9525">
+                <a:solidFill>
+                  <a:srgbClr val="000000"/>
+                </a:solidFill>
+                <a:miter lim="800000"/>
+                <a:headEnd/>
+                <a:tailEnd/>
+              </a14:hiddenLine>
+            </a:ext>
+          </a:extLst>
+        </p:spPr>
+      </p:pic>
+      <p:sp>
+        <p:nvSpPr>
+          <p:cNvPr id="41" name="Rectangle 40">
+            <a:extLst>
+              <a:ext uri="{FF2B5EF4-FFF2-40B4-BE49-F238E27FC236}">
+                <a16:creationId xmlns:a16="http://schemas.microsoft.com/office/drawing/2014/main" id="{D246DAA1-0260-E449-8CA2-92FF0101149D}"/>
+              </a:ext>
+            </a:extLst>
+          </p:cNvPr>
+          <p:cNvSpPr/>
+          <p:nvPr/>
+        </p:nvSpPr>
+        <p:spPr>
+          <a:xfrm>
+            <a:off x="1447801" y="932962"/>
+            <a:ext cx="2743200" cy="4553438"/>
+          </a:xfrm>
+          <a:prstGeom prst="rect">
+            <a:avLst/>
+          </a:prstGeom>
+          <a:noFill/>
+          <a:ln w="12700">
+            <a:solidFill>
+              <a:srgbClr val="5B9CD5"/>
+            </a:solidFill>
+            <a:prstDash val="dash"/>
+          </a:ln>
+        </p:spPr>
+        <p:style>
+          <a:lnRef idx="2">
+            <a:schemeClr val="accent1">
+              <a:shade val="50000"/>
+            </a:schemeClr>
+          </a:lnRef>
+          <a:fillRef idx="1">
+            <a:schemeClr val="accent1"/>
+          </a:fillRef>
+          <a:effectRef idx="0">
+            <a:schemeClr val="accent1"/>
+          </a:effectRef>
+          <a:fontRef idx="minor">
+            <a:schemeClr val="lt1"/>
+          </a:fontRef>
+        </p:style>
+        <p:txBody>
+          <a:bodyPr tIns="91440"/>
+          <a:lstStyle/>
+          <a:p>
+            <a:pPr algn="ctr" eaLnBrk="1" fontAlgn="auto" hangingPunct="1">
+              <a:spcBef>
+                <a:spcPts val="0"/>
+              </a:spcBef>
+              <a:spcAft>
+                <a:spcPts val="0"/>
+              </a:spcAft>
+              <a:defRPr/>
+            </a:pPr>
+            <a:r>
+              <a:rPr lang="en-US" sz="1200">
+                <a:solidFill>
+                  <a:srgbClr val="5B9CD5"/>
+                </a:solidFill>
+                <a:latin typeface="Arial" panose="020B0604020202020204" pitchFamily="34" charset="0"/>
+                <a:cs typeface="Arial" panose="020B0604020202020204" pitchFamily="34" charset="0"/>
+              </a:rPr>
+              <a:t>Availability </a:t>
+            </a:r>
+            <a:r>
+              <a:rPr lang="en-US" sz="1200" smtClean="0">
+                <a:solidFill>
+                  <a:srgbClr val="5B9CD5"/>
+                </a:solidFill>
+                <a:latin typeface="Arial" panose="020B0604020202020204" pitchFamily="34" charset="0"/>
+                <a:cs typeface="Arial" panose="020B0604020202020204" pitchFamily="34" charset="0"/>
+              </a:rPr>
+              <a:t>Zone 1</a:t>
+            </a:r>
+            <a:endParaRPr lang="en-US" sz="1200" dirty="0">
+              <a:solidFill>
+                <a:srgbClr val="5B9CD5"/>
+              </a:solidFill>
+              <a:latin typeface="Arial" panose="020B0604020202020204" pitchFamily="34" charset="0"/>
+              <a:cs typeface="Arial" panose="020B0604020202020204" pitchFamily="34" charset="0"/>
+            </a:endParaRPr>
+          </a:p>
+        </p:txBody>
+      </p:sp>
+      <p:pic>
+        <p:nvPicPr>
+          <p:cNvPr id="43" name="Graphic 135">
+            <a:extLst>
+              <a:ext uri="{FF2B5EF4-FFF2-40B4-BE49-F238E27FC236}">
+                <a16:creationId xmlns:a16="http://schemas.microsoft.com/office/drawing/2014/main" id="{C19987B1-DB3A-1640-994D-BCB81FCC1AE4}"/>
+              </a:ext>
+            </a:extLst>
+          </p:cNvPr>
+          <p:cNvPicPr>
+            <a:picLocks noChangeAspect="1"/>
+          </p:cNvPicPr>
+          <p:nvPr/>
+        </p:nvPicPr>
+        <p:blipFill>
+          <a:blip r:embed="rId12">
+            <a:extLst>
+              <a:ext uri="{96DAC541-7B7A-43D3-8B79-37D633B846F1}">
+                <asvg:svgBlip xmlns="" xmlns:asvg="http://schemas.microsoft.com/office/drawing/2016/SVG/main" r:embed="rId13"/>
+              </a:ext>
+            </a:extLst>
+          </a:blip>
+          <a:stretch>
+            <a:fillRect/>
+          </a:stretch>
+        </p:blipFill>
+        <p:spPr>
+          <a:xfrm>
+            <a:off x="3112502" y="4208793"/>
+            <a:ext cx="469900" cy="469900"/>
+          </a:xfrm>
+          <a:prstGeom prst="rect">
+            <a:avLst/>
+          </a:prstGeom>
+        </p:spPr>
+      </p:pic>
+      <p:sp>
+        <p:nvSpPr>
+          <p:cNvPr id="44" name="TextBox 43">
+            <a:extLst>
+              <a:ext uri="{FF2B5EF4-FFF2-40B4-BE49-F238E27FC236}">
+                <a16:creationId xmlns:a16="http://schemas.microsoft.com/office/drawing/2014/main" id="{F90C1CC4-DFE6-0445-BD1C-DB610E1A07F5}"/>
+              </a:ext>
+            </a:extLst>
+          </p:cNvPr>
+          <p:cNvSpPr txBox="1"/>
+          <p:nvPr/>
+        </p:nvSpPr>
+        <p:spPr>
+          <a:xfrm>
+            <a:off x="2590800" y="4641300"/>
+            <a:ext cx="1513305" cy="646331"/>
+          </a:xfrm>
+          <a:prstGeom prst="rect">
+            <a:avLst/>
+          </a:prstGeom>
+          <a:noFill/>
+        </p:spPr>
+        <p:txBody>
+          <a:bodyPr wrap="square" rtlCol="0">
+            <a:spAutoFit/>
+          </a:bodyPr>
+          <a:lstStyle/>
+          <a:p>
+            <a:pPr algn="ctr"/>
+            <a:r>
+              <a:rPr lang="en-US" sz="1200" dirty="0" smtClean="0">
+                <a:latin typeface="Arial" panose="020B0604020202020204" pitchFamily="34" charset="0"/>
+                <a:ea typeface="Amazon Ember" panose="020B0603020204020204" pitchFamily="34" charset="0"/>
+                <a:cs typeface="Arial" panose="020B0604020202020204" pitchFamily="34" charset="0"/>
+              </a:rPr>
+              <a:t>SQL </a:t>
+            </a:r>
+            <a:r>
+              <a:rPr lang="en-US" sz="1200" dirty="0" smtClean="0">
+                <a:latin typeface="Arial" panose="020B0604020202020204" pitchFamily="34" charset="0"/>
+                <a:ea typeface="Amazon Ember" panose="020B0603020204020204" pitchFamily="34" charset="0"/>
+                <a:cs typeface="Arial" panose="020B0604020202020204" pitchFamily="34" charset="0"/>
+              </a:rPr>
+              <a:t>Server node with </a:t>
+            </a:r>
+          </a:p>
+          <a:p>
+            <a:pPr algn="ctr"/>
+            <a:r>
+              <a:rPr lang="en-US" sz="1200" dirty="0" smtClean="0">
+                <a:latin typeface="Arial" panose="020B0604020202020204" pitchFamily="34" charset="0"/>
+                <a:ea typeface="Amazon Ember" panose="020B0603020204020204" pitchFamily="34" charset="0"/>
+                <a:cs typeface="Arial" panose="020B0604020202020204" pitchFamily="34" charset="0"/>
+              </a:rPr>
+              <a:t>SIOS DataKeeper</a:t>
+            </a:r>
+            <a:endParaRPr lang="en-US" sz="1200" dirty="0">
+              <a:latin typeface="Arial" panose="020B0604020202020204" pitchFamily="34" charset="0"/>
+              <a:ea typeface="Amazon Ember" panose="020B0603020204020204" pitchFamily="34" charset="0"/>
+              <a:cs typeface="Arial" panose="020B0604020202020204" pitchFamily="34" charset="0"/>
+            </a:endParaRPr>
+          </a:p>
+        </p:txBody>
+      </p:sp>
+      <p:sp>
+        <p:nvSpPr>
+          <p:cNvPr id="18" name="Rectangle 17">
+            <a:extLst>
+              <a:ext uri="{FF2B5EF4-FFF2-40B4-BE49-F238E27FC236}">
+                <a16:creationId xmlns:a16="http://schemas.microsoft.com/office/drawing/2014/main" id="{E25F190B-F12E-614B-827A-566AC09E9D97}"/>
+              </a:ext>
+            </a:extLst>
+          </p:cNvPr>
+          <p:cNvSpPr/>
+          <p:nvPr/>
+        </p:nvSpPr>
+        <p:spPr>
+          <a:xfrm>
+            <a:off x="5274409" y="1602559"/>
+            <a:ext cx="2468880" cy="1447800"/>
+          </a:xfrm>
+          <a:prstGeom prst="rect">
+            <a:avLst/>
+          </a:prstGeom>
+          <a:solidFill>
+            <a:srgbClr val="1D8900">
+              <a:alpha val="9804"/>
+            </a:srgbClr>
+          </a:solidFill>
+          <a:ln w="12700">
+            <a:noFill/>
+            <a:prstDash val="dash"/>
+          </a:ln>
+        </p:spPr>
+        <p:style>
+          <a:lnRef idx="2">
+            <a:schemeClr val="accent1">
+              <a:shade val="50000"/>
+            </a:schemeClr>
+          </a:lnRef>
+          <a:fillRef idx="1">
+            <a:schemeClr val="accent1"/>
+          </a:fillRef>
+          <a:effectRef idx="0">
+            <a:schemeClr val="accent1"/>
+          </a:effectRef>
+          <a:fontRef idx="minor">
+            <a:schemeClr val="lt1"/>
+          </a:fontRef>
+        </p:style>
+        <p:txBody>
+          <a:bodyPr rot="0" spcFirstLastPara="0" vertOverflow="overflow" horzOverflow="overflow" vert="horz" wrap="square" lIns="338328" tIns="45720" rIns="91440" bIns="45720" numCol="1" spcCol="0" rtlCol="0" fromWordArt="0" anchor="t" anchorCtr="0" forceAA="0" compatLnSpc="1">
+            <a:prstTxWarp prst="textNoShape">
+              <a:avLst/>
+            </a:prstTxWarp>
+            <a:noAutofit/>
+          </a:bodyPr>
+          <a:lstStyle/>
+          <a:p>
+            <a:pPr algn="l"/>
+            <a:r>
+              <a:rPr lang="en-US" sz="1200" dirty="0">
+                <a:solidFill>
+                  <a:schemeClr val="accent6"/>
+                </a:solidFill>
+                <a:latin typeface="Arial" panose="020B0604020202020204" pitchFamily="34" charset="0"/>
+                <a:ea typeface="Amazon Ember" panose="020B0603020204020204" pitchFamily="34" charset="0"/>
+                <a:cs typeface="Arial" panose="020B0604020202020204" pitchFamily="34" charset="0"/>
+              </a:rPr>
+              <a:t>Public subnet</a:t>
+            </a:r>
+          </a:p>
+          <a:p>
+            <a:pPr algn="l"/>
+            <a:endParaRPr lang="en-US" sz="1200" dirty="0">
+              <a:solidFill>
+                <a:schemeClr val="accent5"/>
+              </a:solidFill>
+              <a:latin typeface="Arial" panose="020B0604020202020204" pitchFamily="34" charset="0"/>
+              <a:ea typeface="Amazon Ember" panose="020B0603020204020204" pitchFamily="34" charset="0"/>
+              <a:cs typeface="Arial" panose="020B0604020202020204" pitchFamily="34" charset="0"/>
+            </a:endParaRPr>
+          </a:p>
+        </p:txBody>
+      </p:sp>
+      <p:pic>
+        <p:nvPicPr>
+          <p:cNvPr id="19" name="Graphic 10">
+            <a:extLst>
+              <a:ext uri="{FF2B5EF4-FFF2-40B4-BE49-F238E27FC236}">
+                <a16:creationId xmlns:a16="http://schemas.microsoft.com/office/drawing/2014/main" id="{89B99B74-19F0-0B4B-85E3-A09DF2519E46}"/>
+              </a:ext>
+            </a:extLst>
+          </p:cNvPr>
+          <p:cNvPicPr>
+            <a:picLocks noChangeAspect="1"/>
+          </p:cNvPicPr>
+          <p:nvPr/>
+        </p:nvPicPr>
+        <p:blipFill>
+          <a:blip r:embed="rId4">
+            <a:extLst>
+              <a:ext uri="{96DAC541-7B7A-43D3-8B79-37D633B846F1}">
+                <asvg:svgBlip xmlns="" xmlns:asvg="http://schemas.microsoft.com/office/drawing/2016/SVG/main" r:embed="rId7"/>
+              </a:ext>
+            </a:extLst>
+          </a:blip>
+          <a:stretch>
+            <a:fillRect/>
+          </a:stretch>
+        </p:blipFill>
+        <p:spPr>
+          <a:xfrm>
+            <a:off x="5275876" y="1600200"/>
+            <a:ext cx="274320" cy="274320"/>
+          </a:xfrm>
+          <a:prstGeom prst="rect">
+            <a:avLst/>
+          </a:prstGeom>
+        </p:spPr>
+      </p:pic>
+      <p:sp>
+        <p:nvSpPr>
+          <p:cNvPr id="20" name="Rectangle 19">
+            <a:extLst>
+              <a:ext uri="{FF2B5EF4-FFF2-40B4-BE49-F238E27FC236}">
+                <a16:creationId xmlns:a16="http://schemas.microsoft.com/office/drawing/2014/main" id="{A85485B4-AA18-C048-B92A-A9A0F4372B98}"/>
+              </a:ext>
+            </a:extLst>
+          </p:cNvPr>
+          <p:cNvSpPr/>
+          <p:nvPr/>
+        </p:nvSpPr>
+        <p:spPr>
+          <a:xfrm>
+            <a:off x="5274409" y="3150005"/>
+            <a:ext cx="2468880" cy="2158540"/>
+          </a:xfrm>
+          <a:prstGeom prst="rect">
+            <a:avLst/>
+          </a:prstGeom>
+          <a:solidFill>
+            <a:srgbClr val="007CBC">
+              <a:alpha val="9804"/>
+            </a:srgbClr>
+          </a:solidFill>
+          <a:ln w="12700">
+            <a:noFill/>
+            <a:prstDash val="dash"/>
+          </a:ln>
+        </p:spPr>
+        <p:style>
+          <a:lnRef idx="2">
+            <a:schemeClr val="accent1">
+              <a:shade val="50000"/>
+            </a:schemeClr>
+          </a:lnRef>
+          <a:fillRef idx="1">
+            <a:schemeClr val="accent1"/>
+          </a:fillRef>
+          <a:effectRef idx="0">
+            <a:schemeClr val="accent1"/>
+          </a:effectRef>
+          <a:fontRef idx="minor">
+            <a:schemeClr val="lt1"/>
+          </a:fontRef>
+        </p:style>
+        <p:txBody>
+          <a:bodyPr rot="0" spcFirstLastPara="0" vertOverflow="overflow" horzOverflow="overflow" vert="horz" wrap="square" lIns="338328" tIns="45720" rIns="91440" bIns="45720" numCol="1" spcCol="0" rtlCol="0" fromWordArt="0" anchor="t" anchorCtr="0" forceAA="0" compatLnSpc="1">
+            <a:prstTxWarp prst="textNoShape">
+              <a:avLst/>
+            </a:prstTxWarp>
+            <a:noAutofit/>
+          </a:bodyPr>
+          <a:lstStyle/>
+          <a:p>
+            <a:pPr algn="l"/>
+            <a:r>
+              <a:rPr lang="en-US" sz="1200" dirty="0">
+                <a:solidFill>
+                  <a:schemeClr val="accent1"/>
+                </a:solidFill>
+                <a:latin typeface="Arial" panose="020B0604020202020204" pitchFamily="34" charset="0"/>
+                <a:ea typeface="Amazon Ember" panose="020B0603020204020204" pitchFamily="34" charset="0"/>
+                <a:cs typeface="Arial" panose="020B0604020202020204" pitchFamily="34" charset="0"/>
+              </a:rPr>
+              <a:t>Private subnet</a:t>
+            </a:r>
+          </a:p>
+          <a:p>
+            <a:pPr algn="l"/>
+            <a:endParaRPr lang="en-US" sz="1200" dirty="0">
+              <a:solidFill>
+                <a:schemeClr val="accent3"/>
+              </a:solidFill>
+              <a:latin typeface="Arial" panose="020B0604020202020204" pitchFamily="34" charset="0"/>
+              <a:ea typeface="Amazon Ember" panose="020B0603020204020204" pitchFamily="34" charset="0"/>
+              <a:cs typeface="Arial" panose="020B0604020202020204" pitchFamily="34" charset="0"/>
+            </a:endParaRPr>
+          </a:p>
+        </p:txBody>
+      </p:sp>
+      <p:pic>
+        <p:nvPicPr>
+          <p:cNvPr id="21" name="Graphic 13">
+            <a:extLst>
+              <a:ext uri="{FF2B5EF4-FFF2-40B4-BE49-F238E27FC236}">
+                <a16:creationId xmlns:a16="http://schemas.microsoft.com/office/drawing/2014/main" id="{3BD31095-C7B2-C24A-9990-6F9E14956A7B}"/>
+              </a:ext>
+            </a:extLst>
+          </p:cNvPr>
+          <p:cNvPicPr>
+            <a:picLocks noChangeAspect="1"/>
+          </p:cNvPicPr>
+          <p:nvPr/>
+        </p:nvPicPr>
+        <p:blipFill>
+          <a:blip r:embed="rId8">
+            <a:extLst>
+              <a:ext uri="{96DAC541-7B7A-43D3-8B79-37D633B846F1}">
+                <asvg:svgBlip xmlns="" xmlns:asvg="http://schemas.microsoft.com/office/drawing/2016/SVG/main" r:embed="rId9"/>
+              </a:ext>
+            </a:extLst>
+          </a:blip>
+          <a:stretch>
+            <a:fillRect/>
+          </a:stretch>
+        </p:blipFill>
+        <p:spPr>
+          <a:xfrm>
+            <a:off x="5272945" y="3150005"/>
+            <a:ext cx="274320" cy="274320"/>
+          </a:xfrm>
+          <a:prstGeom prst="rect">
+            <a:avLst/>
+          </a:prstGeom>
+        </p:spPr>
+      </p:pic>
+      <p:sp>
+        <p:nvSpPr>
+          <p:cNvPr id="22" name="TextBox 21">
+            <a:extLst>
+              <a:ext uri="{FF2B5EF4-FFF2-40B4-BE49-F238E27FC236}">
+                <a16:creationId xmlns:a16="http://schemas.microsoft.com/office/drawing/2014/main" id="{F90C1CC4-DFE6-0445-BD1C-DB610E1A07F5}"/>
+              </a:ext>
+            </a:extLst>
+          </p:cNvPr>
+          <p:cNvSpPr txBox="1"/>
+          <p:nvPr/>
+        </p:nvSpPr>
+        <p:spPr>
+          <a:xfrm>
+            <a:off x="5198600" y="2542576"/>
+            <a:ext cx="1513305" cy="276999"/>
+          </a:xfrm>
+          <a:prstGeom prst="rect">
+            <a:avLst/>
+          </a:prstGeom>
+          <a:noFill/>
+          <a:effectLst>
+            <a:softEdge rad="0"/>
+          </a:effectLst>
+        </p:spPr>
+        <p:txBody>
+          <a:bodyPr wrap="square" rtlCol="0">
+            <a:spAutoFit/>
+          </a:bodyPr>
+          <a:lstStyle/>
+          <a:p>
+            <a:pPr algn="ctr"/>
+            <a:r>
+              <a:rPr lang="en-US" sz="1200" dirty="0">
+                <a:latin typeface="Arial" panose="020B0604020202020204" pitchFamily="34" charset="0"/>
+                <a:ea typeface="Amazon Ember" panose="020B0603020204020204" pitchFamily="34" charset="0"/>
+                <a:cs typeface="Arial" panose="020B0604020202020204" pitchFamily="34" charset="0"/>
+              </a:rPr>
+              <a:t>RD Gateway</a:t>
+            </a:r>
+          </a:p>
+        </p:txBody>
+      </p:sp>
+      <p:sp>
+        <p:nvSpPr>
+          <p:cNvPr id="23" name="TextBox 22">
+            <a:extLst>
+              <a:ext uri="{FF2B5EF4-FFF2-40B4-BE49-F238E27FC236}">
+                <a16:creationId xmlns:a16="http://schemas.microsoft.com/office/drawing/2014/main" id="{517096B6-EF64-C245-A3E7-BEEF81BDCB9C}"/>
+              </a:ext>
+            </a:extLst>
+          </p:cNvPr>
+          <p:cNvSpPr txBox="1"/>
+          <p:nvPr/>
+        </p:nvSpPr>
+        <p:spPr>
+          <a:xfrm>
+            <a:off x="6494000" y="2545000"/>
+            <a:ext cx="1236442" cy="276999"/>
+          </a:xfrm>
+          <a:prstGeom prst="rect">
+            <a:avLst/>
+          </a:prstGeom>
+          <a:noFill/>
+        </p:spPr>
+        <p:txBody>
+          <a:bodyPr wrap="square" rtlCol="0">
+            <a:spAutoFit/>
+          </a:bodyPr>
+          <a:lstStyle/>
+          <a:p>
+            <a:pPr algn="ctr"/>
+            <a:r>
+              <a:rPr lang="en-US" sz="1200" dirty="0">
+                <a:latin typeface="Arial" panose="020B0604020202020204" pitchFamily="34" charset="0"/>
+                <a:ea typeface="Amazon Ember" panose="020B0603020204020204" pitchFamily="34" charset="0"/>
+                <a:cs typeface="Arial" panose="020B0604020202020204" pitchFamily="34" charset="0"/>
+              </a:rPr>
+              <a:t>NAT gateway</a:t>
+            </a:r>
+          </a:p>
+        </p:txBody>
+      </p:sp>
+      <p:pic>
+        <p:nvPicPr>
+          <p:cNvPr id="24" name="Graphic 40">
+            <a:extLst>
+              <a:ext uri="{FF2B5EF4-FFF2-40B4-BE49-F238E27FC236}">
+                <a16:creationId xmlns:a16="http://schemas.microsoft.com/office/drawing/2014/main" id="{C322592C-EAB9-0640-95A5-D8FF5B8E5FE6}"/>
+              </a:ext>
+            </a:extLst>
+          </p:cNvPr>
+          <p:cNvPicPr>
+            <a:picLocks noChangeAspect="1"/>
+          </p:cNvPicPr>
+          <p:nvPr/>
+        </p:nvPicPr>
+        <p:blipFill>
+          <a:blip r:embed="rId14">
+            <a:extLst>
+              <a:ext uri="{96DAC541-7B7A-43D3-8B79-37D633B846F1}">
+                <asvg:svgBlip xmlns="" xmlns:asvg="http://schemas.microsoft.com/office/drawing/2016/SVG/main" r:embed="rId17"/>
+              </a:ext>
+            </a:extLst>
+          </a:blip>
+          <a:stretch>
+            <a:fillRect/>
+          </a:stretch>
+        </p:blipFill>
+        <p:spPr>
+          <a:xfrm>
+            <a:off x="6877271" y="2090186"/>
+            <a:ext cx="469900" cy="469900"/>
+          </a:xfrm>
+          <a:prstGeom prst="rect">
+            <a:avLst/>
+          </a:prstGeom>
+        </p:spPr>
+      </p:pic>
+      <p:pic>
+        <p:nvPicPr>
+          <p:cNvPr id="25" name="Graphic 135">
+            <a:extLst>
+              <a:ext uri="{FF2B5EF4-FFF2-40B4-BE49-F238E27FC236}">
+                <a16:creationId xmlns:a16="http://schemas.microsoft.com/office/drawing/2014/main" id="{C19987B1-DB3A-1640-994D-BCB81FCC1AE4}"/>
+              </a:ext>
+            </a:extLst>
+          </p:cNvPr>
+          <p:cNvPicPr>
+            <a:picLocks noChangeAspect="1"/>
+          </p:cNvPicPr>
+          <p:nvPr/>
+        </p:nvPicPr>
+        <p:blipFill>
+          <a:blip r:embed="rId12">
+            <a:extLst>
+              <a:ext uri="{96DAC541-7B7A-43D3-8B79-37D633B846F1}">
+                <asvg:svgBlip xmlns="" xmlns:asvg="http://schemas.microsoft.com/office/drawing/2016/SVG/main" r:embed="rId13"/>
+              </a:ext>
+            </a:extLst>
+          </a:blip>
+          <a:stretch>
+            <a:fillRect/>
+          </a:stretch>
+        </p:blipFill>
+        <p:spPr>
+          <a:xfrm>
+            <a:off x="5720302" y="3446793"/>
+            <a:ext cx="469900" cy="469900"/>
+          </a:xfrm>
+          <a:prstGeom prst="rect">
+            <a:avLst/>
+          </a:prstGeom>
+        </p:spPr>
+      </p:pic>
+      <p:sp>
+        <p:nvSpPr>
+          <p:cNvPr id="26" name="TextBox 25">
+            <a:extLst>
+              <a:ext uri="{FF2B5EF4-FFF2-40B4-BE49-F238E27FC236}">
+                <a16:creationId xmlns:a16="http://schemas.microsoft.com/office/drawing/2014/main" id="{F90C1CC4-DFE6-0445-BD1C-DB610E1A07F5}"/>
+              </a:ext>
+            </a:extLst>
+          </p:cNvPr>
+          <p:cNvSpPr txBox="1"/>
+          <p:nvPr/>
+        </p:nvSpPr>
+        <p:spPr>
+          <a:xfrm>
+            <a:off x="5198600" y="3879300"/>
+            <a:ext cx="1513305" cy="276999"/>
+          </a:xfrm>
+          <a:prstGeom prst="rect">
+            <a:avLst/>
+          </a:prstGeom>
+          <a:noFill/>
+        </p:spPr>
+        <p:txBody>
+          <a:bodyPr wrap="square" rtlCol="0">
+            <a:spAutoFit/>
+          </a:bodyPr>
+          <a:lstStyle/>
+          <a:p>
+            <a:pPr algn="ctr"/>
+            <a:r>
+              <a:rPr lang="en-US" sz="1200" dirty="0" smtClean="0">
+                <a:latin typeface="Arial" panose="020B0604020202020204" pitchFamily="34" charset="0"/>
+                <a:ea typeface="Amazon Ember" panose="020B0603020204020204" pitchFamily="34" charset="0"/>
+                <a:cs typeface="Arial" panose="020B0604020202020204" pitchFamily="34" charset="0"/>
+              </a:rPr>
+              <a:t>Domain controller</a:t>
+            </a:r>
+            <a:endParaRPr lang="en-US" sz="1200" dirty="0">
+              <a:latin typeface="Arial" panose="020B0604020202020204" pitchFamily="34" charset="0"/>
+              <a:ea typeface="Amazon Ember" panose="020B0603020204020204" pitchFamily="34" charset="0"/>
+              <a:cs typeface="Arial" panose="020B0604020202020204" pitchFamily="34" charset="0"/>
+            </a:endParaRPr>
+          </a:p>
+        </p:txBody>
+      </p:sp>
+      <p:pic>
+        <p:nvPicPr>
+          <p:cNvPr id="45" name="Graphic 135">
+            <a:extLst>
+              <a:ext uri="{FF2B5EF4-FFF2-40B4-BE49-F238E27FC236}">
+                <a16:creationId xmlns:a16="http://schemas.microsoft.com/office/drawing/2014/main" id="{C19987B1-DB3A-1640-994D-BCB81FCC1AE4}"/>
+              </a:ext>
+            </a:extLst>
+          </p:cNvPr>
+          <p:cNvPicPr>
+            <a:picLocks noChangeAspect="1"/>
+          </p:cNvPicPr>
+          <p:nvPr/>
+        </p:nvPicPr>
+        <p:blipFill>
+          <a:blip r:embed="rId12">
+            <a:extLst>
+              <a:ext uri="{96DAC541-7B7A-43D3-8B79-37D633B846F1}">
+                <asvg:svgBlip xmlns="" xmlns:asvg="http://schemas.microsoft.com/office/drawing/2016/SVG/main" r:embed="rId13"/>
+              </a:ext>
+            </a:extLst>
+          </a:blip>
+          <a:stretch>
+            <a:fillRect/>
+          </a:stretch>
+        </p:blipFill>
+        <p:spPr>
+          <a:xfrm>
+            <a:off x="5720302" y="4208793"/>
+            <a:ext cx="469900" cy="469900"/>
+          </a:xfrm>
+          <a:prstGeom prst="rect">
+            <a:avLst/>
+          </a:prstGeom>
+        </p:spPr>
+      </p:pic>
+      <p:sp>
+        <p:nvSpPr>
+          <p:cNvPr id="48" name="TextBox 47">
+            <a:extLst>
+              <a:ext uri="{FF2B5EF4-FFF2-40B4-BE49-F238E27FC236}">
+                <a16:creationId xmlns:a16="http://schemas.microsoft.com/office/drawing/2014/main" id="{F90C1CC4-DFE6-0445-BD1C-DB610E1A07F5}"/>
+              </a:ext>
+            </a:extLst>
+          </p:cNvPr>
+          <p:cNvSpPr txBox="1"/>
+          <p:nvPr/>
+        </p:nvSpPr>
+        <p:spPr>
+          <a:xfrm>
+            <a:off x="5209295" y="4641300"/>
+            <a:ext cx="1513305" cy="646331"/>
+          </a:xfrm>
+          <a:prstGeom prst="rect">
+            <a:avLst/>
+          </a:prstGeom>
+          <a:noFill/>
+        </p:spPr>
+        <p:txBody>
+          <a:bodyPr wrap="square" rtlCol="0">
+            <a:spAutoFit/>
+          </a:bodyPr>
+          <a:lstStyle/>
+          <a:p>
+            <a:pPr algn="ctr"/>
+            <a:r>
+              <a:rPr lang="en-US" sz="1200" dirty="0" smtClean="0">
+                <a:latin typeface="Arial" panose="020B0604020202020204" pitchFamily="34" charset="0"/>
+                <a:ea typeface="Amazon Ember" panose="020B0603020204020204" pitchFamily="34" charset="0"/>
+                <a:cs typeface="Arial" panose="020B0604020202020204" pitchFamily="34" charset="0"/>
+              </a:rPr>
+              <a:t>SQL </a:t>
+            </a:r>
+            <a:r>
+              <a:rPr lang="en-US" sz="1200" dirty="0" smtClean="0">
+                <a:latin typeface="Arial" panose="020B0604020202020204" pitchFamily="34" charset="0"/>
+                <a:ea typeface="Amazon Ember" panose="020B0603020204020204" pitchFamily="34" charset="0"/>
+                <a:cs typeface="Arial" panose="020B0604020202020204" pitchFamily="34" charset="0"/>
+              </a:rPr>
+              <a:t>Server node with </a:t>
+            </a:r>
+          </a:p>
+          <a:p>
+            <a:pPr algn="ctr"/>
+            <a:r>
+              <a:rPr lang="en-US" sz="1200" dirty="0" smtClean="0">
+                <a:latin typeface="Arial" panose="020B0604020202020204" pitchFamily="34" charset="0"/>
+                <a:ea typeface="Amazon Ember" panose="020B0603020204020204" pitchFamily="34" charset="0"/>
+                <a:cs typeface="Arial" panose="020B0604020202020204" pitchFamily="34" charset="0"/>
+              </a:rPr>
+              <a:t>SIOS DataKeeper</a:t>
+            </a:r>
+            <a:endParaRPr lang="en-US" sz="1200" dirty="0">
+              <a:latin typeface="Arial" panose="020B0604020202020204" pitchFamily="34" charset="0"/>
+              <a:ea typeface="Amazon Ember" panose="020B0603020204020204" pitchFamily="34" charset="0"/>
+              <a:cs typeface="Arial" panose="020B0604020202020204" pitchFamily="34" charset="0"/>
+            </a:endParaRPr>
+          </a:p>
+        </p:txBody>
+      </p:sp>
+      <p:pic>
+        <p:nvPicPr>
+          <p:cNvPr id="46" name="Graphic 135">
+            <a:extLst>
+              <a:ext uri="{FF2B5EF4-FFF2-40B4-BE49-F238E27FC236}">
+                <a16:creationId xmlns:a16="http://schemas.microsoft.com/office/drawing/2014/main" id="{C19987B1-DB3A-1640-994D-BCB81FCC1AE4}"/>
+              </a:ext>
+            </a:extLst>
+          </p:cNvPr>
+          <p:cNvPicPr>
+            <a:picLocks noChangeAspect="1"/>
+          </p:cNvPicPr>
+          <p:nvPr/>
+        </p:nvPicPr>
+        <p:blipFill>
+          <a:blip r:embed="rId12">
+            <a:extLst>
+              <a:ext uri="{96DAC541-7B7A-43D3-8B79-37D633B846F1}">
+                <asvg:svgBlip xmlns="" xmlns:asvg="http://schemas.microsoft.com/office/drawing/2016/SVG/main" r:embed="rId13"/>
+              </a:ext>
+            </a:extLst>
+          </a:blip>
+          <a:stretch>
+            <a:fillRect/>
+          </a:stretch>
+        </p:blipFill>
+        <p:spPr>
+          <a:xfrm>
+            <a:off x="5716760" y="2090186"/>
+            <a:ext cx="469900" cy="469900"/>
+          </a:xfrm>
+          <a:prstGeom prst="rect">
+            <a:avLst/>
+          </a:prstGeom>
+        </p:spPr>
+      </p:pic>
+      <p:sp>
+        <p:nvSpPr>
+          <p:cNvPr id="55" name="Rectangle 54">
+            <a:extLst>
+              <a:ext uri="{FF2B5EF4-FFF2-40B4-BE49-F238E27FC236}">
+                <a16:creationId xmlns:a16="http://schemas.microsoft.com/office/drawing/2014/main" id="{D246DAA1-0260-E449-8CA2-92FF0101149D}"/>
+              </a:ext>
+            </a:extLst>
+          </p:cNvPr>
+          <p:cNvSpPr/>
+          <p:nvPr/>
+        </p:nvSpPr>
+        <p:spPr>
+          <a:xfrm>
+            <a:off x="5139576" y="926758"/>
+            <a:ext cx="2743200" cy="4553438"/>
+          </a:xfrm>
+          <a:prstGeom prst="rect">
+            <a:avLst/>
+          </a:prstGeom>
+          <a:noFill/>
+          <a:ln w="12700">
+            <a:solidFill>
+              <a:srgbClr val="5B9CD5"/>
+            </a:solidFill>
+            <a:prstDash val="dash"/>
+          </a:ln>
+        </p:spPr>
+        <p:style>
+          <a:lnRef idx="2">
+            <a:schemeClr val="accent1">
+              <a:shade val="50000"/>
+            </a:schemeClr>
+          </a:lnRef>
+          <a:fillRef idx="1">
+            <a:schemeClr val="accent1"/>
+          </a:fillRef>
+          <a:effectRef idx="0">
+            <a:schemeClr val="accent1"/>
+          </a:effectRef>
+          <a:fontRef idx="minor">
+            <a:schemeClr val="lt1"/>
+          </a:fontRef>
+        </p:style>
+        <p:txBody>
+          <a:bodyPr tIns="91440"/>
+          <a:lstStyle/>
+          <a:p>
+            <a:pPr algn="ctr" eaLnBrk="1" fontAlgn="auto" hangingPunct="1">
+              <a:spcBef>
+                <a:spcPts val="0"/>
+              </a:spcBef>
+              <a:spcAft>
+                <a:spcPts val="0"/>
+              </a:spcAft>
+              <a:defRPr/>
+            </a:pPr>
+            <a:r>
+              <a:rPr lang="en-US" sz="1200" dirty="0">
+                <a:solidFill>
+                  <a:srgbClr val="5B9CD5"/>
+                </a:solidFill>
+                <a:latin typeface="Arial" panose="020B0604020202020204" pitchFamily="34" charset="0"/>
+                <a:cs typeface="Arial" panose="020B0604020202020204" pitchFamily="34" charset="0"/>
+              </a:rPr>
+              <a:t>Availability </a:t>
+            </a:r>
+            <a:r>
+              <a:rPr lang="en-US" sz="1200" dirty="0" smtClean="0">
+                <a:solidFill>
+                  <a:srgbClr val="5B9CD5"/>
+                </a:solidFill>
+                <a:latin typeface="Arial" panose="020B0604020202020204" pitchFamily="34" charset="0"/>
+                <a:cs typeface="Arial" panose="020B0604020202020204" pitchFamily="34" charset="0"/>
+              </a:rPr>
+              <a:t>Zone </a:t>
+            </a:r>
+            <a:r>
+              <a:rPr lang="en-US" sz="1200" dirty="0" smtClean="0">
+                <a:solidFill>
+                  <a:srgbClr val="5B9CD5"/>
+                </a:solidFill>
+                <a:latin typeface="Arial" panose="020B0604020202020204" pitchFamily="34" charset="0"/>
+                <a:cs typeface="Arial" panose="020B0604020202020204" pitchFamily="34" charset="0"/>
+              </a:rPr>
+              <a:t>2</a:t>
+            </a:r>
+            <a:endParaRPr lang="en-US" sz="1200" dirty="0">
+              <a:solidFill>
+                <a:srgbClr val="5B9CD5"/>
+              </a:solidFill>
+              <a:latin typeface="Arial" panose="020B0604020202020204" pitchFamily="34" charset="0"/>
+              <a:cs typeface="Arial" panose="020B0604020202020204" pitchFamily="34" charset="0"/>
+            </a:endParaRPr>
+          </a:p>
+        </p:txBody>
+      </p:sp>
+    </p:spTree>
+    <p:extLst>
+      <p:ext uri="{BB962C8B-B14F-4D97-AF65-F5344CB8AC3E}">
+        <p14:creationId xmlns:p14="http://schemas.microsoft.com/office/powerpoint/2010/main" val="3241857173"/>
       </p:ext>
     </p:extLst>
   </p:cSld>

</xml_diff>

<commit_message>
Production doc builds - 2021/11/22 20:49:02 UTC
</commit_message>
<xml_diff>
--- a/docs/images/SIOS DataKeeper architecture.pptx
+++ b/docs/images/SIOS DataKeeper architecture.pptx
@@ -8,6 +8,7 @@
     <p:sldId id="256" r:id="rId2"/>
     <p:sldId id="257" r:id="rId3"/>
     <p:sldId id="258" r:id="rId4"/>
+    <p:sldId id="259" r:id="rId5"/>
   </p:sldIdLst>
   <p:sldSz cx="12192000" cy="6858000"/>
   <p:notesSz cx="6858000" cy="9144000"/>
@@ -245,7 +246,7 @@
           <a:p>
             <a:fld id="{B1E5028E-09A8-4225-BF6F-265C8079DC33}" type="datetimeFigureOut">
               <a:rPr lang="en-US" smtClean="0"/>
-              <a:t>7/26/2021</a:t>
+              <a:t>7/30/2021</a:t>
             </a:fld>
             <a:endParaRPr lang="en-US"/>
           </a:p>
@@ -415,7 +416,7 @@
           <a:p>
             <a:fld id="{B1E5028E-09A8-4225-BF6F-265C8079DC33}" type="datetimeFigureOut">
               <a:rPr lang="en-US" smtClean="0"/>
-              <a:t>7/26/2021</a:t>
+              <a:t>7/30/2021</a:t>
             </a:fld>
             <a:endParaRPr lang="en-US"/>
           </a:p>
@@ -595,7 +596,7 @@
           <a:p>
             <a:fld id="{B1E5028E-09A8-4225-BF6F-265C8079DC33}" type="datetimeFigureOut">
               <a:rPr lang="en-US" smtClean="0"/>
-              <a:t>7/26/2021</a:t>
+              <a:t>7/30/2021</a:t>
             </a:fld>
             <a:endParaRPr lang="en-US"/>
           </a:p>
@@ -765,7 +766,7 @@
           <a:p>
             <a:fld id="{B1E5028E-09A8-4225-BF6F-265C8079DC33}" type="datetimeFigureOut">
               <a:rPr lang="en-US" smtClean="0"/>
-              <a:t>7/26/2021</a:t>
+              <a:t>7/30/2021</a:t>
             </a:fld>
             <a:endParaRPr lang="en-US"/>
           </a:p>
@@ -1011,7 +1012,7 @@
           <a:p>
             <a:fld id="{B1E5028E-09A8-4225-BF6F-265C8079DC33}" type="datetimeFigureOut">
               <a:rPr lang="en-US" smtClean="0"/>
-              <a:t>7/26/2021</a:t>
+              <a:t>7/30/2021</a:t>
             </a:fld>
             <a:endParaRPr lang="en-US"/>
           </a:p>
@@ -1243,7 +1244,7 @@
           <a:p>
             <a:fld id="{B1E5028E-09A8-4225-BF6F-265C8079DC33}" type="datetimeFigureOut">
               <a:rPr lang="en-US" smtClean="0"/>
-              <a:t>7/26/2021</a:t>
+              <a:t>7/30/2021</a:t>
             </a:fld>
             <a:endParaRPr lang="en-US"/>
           </a:p>
@@ -1610,7 +1611,7 @@
           <a:p>
             <a:fld id="{B1E5028E-09A8-4225-BF6F-265C8079DC33}" type="datetimeFigureOut">
               <a:rPr lang="en-US" smtClean="0"/>
-              <a:t>7/26/2021</a:t>
+              <a:t>7/30/2021</a:t>
             </a:fld>
             <a:endParaRPr lang="en-US"/>
           </a:p>
@@ -1728,7 +1729,7 @@
           <a:p>
             <a:fld id="{B1E5028E-09A8-4225-BF6F-265C8079DC33}" type="datetimeFigureOut">
               <a:rPr lang="en-US" smtClean="0"/>
-              <a:t>7/26/2021</a:t>
+              <a:t>7/30/2021</a:t>
             </a:fld>
             <a:endParaRPr lang="en-US"/>
           </a:p>
@@ -1823,7 +1824,7 @@
           <a:p>
             <a:fld id="{B1E5028E-09A8-4225-BF6F-265C8079DC33}" type="datetimeFigureOut">
               <a:rPr lang="en-US" smtClean="0"/>
-              <a:t>7/26/2021</a:t>
+              <a:t>7/30/2021</a:t>
             </a:fld>
             <a:endParaRPr lang="en-US"/>
           </a:p>
@@ -2100,7 +2101,7 @@
           <a:p>
             <a:fld id="{B1E5028E-09A8-4225-BF6F-265C8079DC33}" type="datetimeFigureOut">
               <a:rPr lang="en-US" smtClean="0"/>
-              <a:t>7/26/2021</a:t>
+              <a:t>7/30/2021</a:t>
             </a:fld>
             <a:endParaRPr lang="en-US"/>
           </a:p>
@@ -2353,7 +2354,7 @@
           <a:p>
             <a:fld id="{B1E5028E-09A8-4225-BF6F-265C8079DC33}" type="datetimeFigureOut">
               <a:rPr lang="en-US" smtClean="0"/>
-              <a:t>7/26/2021</a:t>
+              <a:t>7/30/2021</a:t>
             </a:fld>
             <a:endParaRPr lang="en-US"/>
           </a:p>
@@ -2566,7 +2567,7 @@
           <a:p>
             <a:fld id="{B1E5028E-09A8-4225-BF6F-265C8079DC33}" type="datetimeFigureOut">
               <a:rPr lang="en-US" smtClean="0"/>
-              <a:t>7/26/2021</a:t>
+              <a:t>7/30/2021</a:t>
             </a:fld>
             <a:endParaRPr lang="en-US"/>
           </a:p>
@@ -3056,7 +3057,7 @@
           <a:blip r:embed="rId2">
             <a:extLst>
               <a:ext uri="{96DAC541-7B7A-43D3-8B79-37D633B846F1}">
-                <asvg:svgBlip xmlns="" xmlns:asvg="http://schemas.microsoft.com/office/drawing/2016/SVG/main" r:embed="rId3"/>
+                <asvg:svgBlip xmlns:asvg="http://schemas.microsoft.com/office/drawing/2016/SVG/main" xmlns="" r:embed="rId3"/>
               </a:ext>
             </a:extLst>
           </a:blip>
@@ -3173,7 +3174,7 @@
           <a:blip r:embed="rId4">
             <a:extLst>
               <a:ext uri="{96DAC541-7B7A-43D3-8B79-37D633B846F1}">
-                <asvg:svgBlip xmlns="" xmlns:asvg="http://schemas.microsoft.com/office/drawing/2016/SVG/main" r:embed="rId7"/>
+                <asvg:svgBlip xmlns:asvg="http://schemas.microsoft.com/office/drawing/2016/SVG/main" xmlns="" r:embed="rId7"/>
               </a:ext>
             </a:extLst>
           </a:blip>
@@ -3290,7 +3291,7 @@
           <a:blip r:embed="rId8">
             <a:extLst>
               <a:ext uri="{96DAC541-7B7A-43D3-8B79-37D633B846F1}">
-                <asvg:svgBlip xmlns="" xmlns:asvg="http://schemas.microsoft.com/office/drawing/2016/SVG/main" r:embed="rId9"/>
+                <asvg:svgBlip xmlns:asvg="http://schemas.microsoft.com/office/drawing/2016/SVG/main" xmlns="" r:embed="rId9"/>
               </a:ext>
             </a:extLst>
           </a:blip>
@@ -3449,7 +3450,7 @@
           <a:blip r:embed="rId10">
             <a:extLst>
               <a:ext uri="{96DAC541-7B7A-43D3-8B79-37D633B846F1}">
-                <asvg:svgBlip xmlns="" xmlns:asvg="http://schemas.microsoft.com/office/drawing/2016/SVG/main" r:embed="rId11"/>
+                <asvg:svgBlip xmlns:asvg="http://schemas.microsoft.com/office/drawing/2016/SVG/main" xmlns="" r:embed="rId11"/>
               </a:ext>
             </a:extLst>
           </a:blip>
@@ -3485,7 +3486,7 @@
           <a:blip r:embed="rId12">
             <a:extLst>
               <a:ext uri="{96DAC541-7B7A-43D3-8B79-37D633B846F1}">
-                <asvg:svgBlip xmlns="" xmlns:asvg="http://schemas.microsoft.com/office/drawing/2016/SVG/main" r:embed="rId13"/>
+                <asvg:svgBlip xmlns:asvg="http://schemas.microsoft.com/office/drawing/2016/SVG/main" xmlns="" r:embed="rId13"/>
               </a:ext>
             </a:extLst>
           </a:blip>
@@ -3601,7 +3602,7 @@
           <a:blip r:embed="rId14">
             <a:extLst>
               <a:ext uri="{96DAC541-7B7A-43D3-8B79-37D633B846F1}">
-                <asvg:svgBlip xmlns="" xmlns:asvg="http://schemas.microsoft.com/office/drawing/2016/SVG/main" r:embed="rId17"/>
+                <asvg:svgBlip xmlns:asvg="http://schemas.microsoft.com/office/drawing/2016/SVG/main" xmlns="" r:embed="rId17"/>
               </a:ext>
             </a:extLst>
           </a:blip>
@@ -3637,7 +3638,7 @@
           <a:blip r:embed="rId12">
             <a:extLst>
               <a:ext uri="{96DAC541-7B7A-43D3-8B79-37D633B846F1}">
-                <asvg:svgBlip xmlns="" xmlns:asvg="http://schemas.microsoft.com/office/drawing/2016/SVG/main" r:embed="rId13"/>
+                <asvg:svgBlip xmlns:asvg="http://schemas.microsoft.com/office/drawing/2016/SVG/main" xmlns="" r:embed="rId13"/>
               </a:ext>
             </a:extLst>
           </a:blip>
@@ -3799,7 +3800,7 @@
           <a:blip r:embed="rId4">
             <a:extLst>
               <a:ext uri="{96DAC541-7B7A-43D3-8B79-37D633B846F1}">
-                <asvg:svgBlip xmlns="" xmlns:asvg="http://schemas.microsoft.com/office/drawing/2016/SVG/main" r:embed="rId7"/>
+                <asvg:svgBlip xmlns:asvg="http://schemas.microsoft.com/office/drawing/2016/SVG/main" xmlns="" r:embed="rId7"/>
               </a:ext>
             </a:extLst>
           </a:blip>
@@ -3916,7 +3917,7 @@
           <a:blip r:embed="rId8">
             <a:extLst>
               <a:ext uri="{96DAC541-7B7A-43D3-8B79-37D633B846F1}">
-                <asvg:svgBlip xmlns="" xmlns:asvg="http://schemas.microsoft.com/office/drawing/2016/SVG/main" r:embed="rId9"/>
+                <asvg:svgBlip xmlns:asvg="http://schemas.microsoft.com/office/drawing/2016/SVG/main" xmlns="" r:embed="rId9"/>
               </a:ext>
             </a:extLst>
           </a:blip>
@@ -4035,7 +4036,7 @@
           <a:blip r:embed="rId14">
             <a:extLst>
               <a:ext uri="{96DAC541-7B7A-43D3-8B79-37D633B846F1}">
-                <asvg:svgBlip xmlns="" xmlns:asvg="http://schemas.microsoft.com/office/drawing/2016/SVG/main" r:embed="rId17"/>
+                <asvg:svgBlip xmlns:asvg="http://schemas.microsoft.com/office/drawing/2016/SVG/main" xmlns="" r:embed="rId17"/>
               </a:ext>
             </a:extLst>
           </a:blip>
@@ -4071,7 +4072,7 @@
           <a:blip r:embed="rId12">
             <a:extLst>
               <a:ext uri="{96DAC541-7B7A-43D3-8B79-37D633B846F1}">
-                <asvg:svgBlip xmlns="" xmlns:asvg="http://schemas.microsoft.com/office/drawing/2016/SVG/main" r:embed="rId13"/>
+                <asvg:svgBlip xmlns:asvg="http://schemas.microsoft.com/office/drawing/2016/SVG/main" xmlns="" r:embed="rId13"/>
               </a:ext>
             </a:extLst>
           </a:blip>
@@ -4161,7 +4162,7 @@
                 </a14:imgProps>
               </a:ext>
               <a:ext uri="{96DAC541-7B7A-43D3-8B79-37D633B846F1}">
-                <asvg:svgBlip xmlns="" xmlns:asvg="http://schemas.microsoft.com/office/drawing/2016/SVG/main" r:embed="rId32"/>
+                <asvg:svgBlip xmlns:asvg="http://schemas.microsoft.com/office/drawing/2016/SVG/main" xmlns="" r:embed="rId32"/>
               </a:ext>
             </a:extLst>
           </a:blip>
@@ -4943,7 +4944,7 @@
           <a:blip r:embed="rId12">
             <a:extLst>
               <a:ext uri="{96DAC541-7B7A-43D3-8B79-37D633B846F1}">
-                <asvg:svgBlip xmlns="" xmlns:asvg="http://schemas.microsoft.com/office/drawing/2016/SVG/main" r:embed="rId13"/>
+                <asvg:svgBlip xmlns:asvg="http://schemas.microsoft.com/office/drawing/2016/SVG/main" xmlns="" r:embed="rId13"/>
               </a:ext>
             </a:extLst>
           </a:blip>
@@ -5024,7 +5025,7 @@
           <a:blip r:embed="rId12">
             <a:extLst>
               <a:ext uri="{96DAC541-7B7A-43D3-8B79-37D633B846F1}">
-                <asvg:svgBlip xmlns="" xmlns:asvg="http://schemas.microsoft.com/office/drawing/2016/SVG/main" r:embed="rId13"/>
+                <asvg:svgBlip xmlns:asvg="http://schemas.microsoft.com/office/drawing/2016/SVG/main" xmlns="" r:embed="rId13"/>
               </a:ext>
             </a:extLst>
           </a:blip>
@@ -5341,7 +5342,7 @@
           <a:blip r:embed="rId2">
             <a:extLst>
               <a:ext uri="{96DAC541-7B7A-43D3-8B79-37D633B846F1}">
-                <asvg:svgBlip xmlns="" xmlns:asvg="http://schemas.microsoft.com/office/drawing/2016/SVG/main" r:embed="rId3"/>
+                <asvg:svgBlip xmlns:asvg="http://schemas.microsoft.com/office/drawing/2016/SVG/main" xmlns="" r:embed="rId3"/>
               </a:ext>
             </a:extLst>
           </a:blip>
@@ -5458,7 +5459,7 @@
           <a:blip r:embed="rId4">
             <a:extLst>
               <a:ext uri="{96DAC541-7B7A-43D3-8B79-37D633B846F1}">
-                <asvg:svgBlip xmlns="" xmlns:asvg="http://schemas.microsoft.com/office/drawing/2016/SVG/main" r:embed="rId7"/>
+                <asvg:svgBlip xmlns:asvg="http://schemas.microsoft.com/office/drawing/2016/SVG/main" xmlns="" r:embed="rId7"/>
               </a:ext>
             </a:extLst>
           </a:blip>
@@ -5575,7 +5576,7 @@
           <a:blip r:embed="rId8">
             <a:extLst>
               <a:ext uri="{96DAC541-7B7A-43D3-8B79-37D633B846F1}">
-                <asvg:svgBlip xmlns="" xmlns:asvg="http://schemas.microsoft.com/office/drawing/2016/SVG/main" r:embed="rId9"/>
+                <asvg:svgBlip xmlns:asvg="http://schemas.microsoft.com/office/drawing/2016/SVG/main" xmlns="" r:embed="rId9"/>
               </a:ext>
             </a:extLst>
           </a:blip>
@@ -5734,7 +5735,7 @@
           <a:blip r:embed="rId10">
             <a:extLst>
               <a:ext uri="{96DAC541-7B7A-43D3-8B79-37D633B846F1}">
-                <asvg:svgBlip xmlns="" xmlns:asvg="http://schemas.microsoft.com/office/drawing/2016/SVG/main" r:embed="rId11"/>
+                <asvg:svgBlip xmlns:asvg="http://schemas.microsoft.com/office/drawing/2016/SVG/main" xmlns="" r:embed="rId11"/>
               </a:ext>
             </a:extLst>
           </a:blip>
@@ -5770,7 +5771,7 @@
           <a:blip r:embed="rId12">
             <a:extLst>
               <a:ext uri="{96DAC541-7B7A-43D3-8B79-37D633B846F1}">
-                <asvg:svgBlip xmlns="" xmlns:asvg="http://schemas.microsoft.com/office/drawing/2016/SVG/main" r:embed="rId13"/>
+                <asvg:svgBlip xmlns:asvg="http://schemas.microsoft.com/office/drawing/2016/SVG/main" xmlns="" r:embed="rId13"/>
               </a:ext>
             </a:extLst>
           </a:blip>
@@ -5886,7 +5887,7 @@
           <a:blip r:embed="rId14">
             <a:extLst>
               <a:ext uri="{96DAC541-7B7A-43D3-8B79-37D633B846F1}">
-                <asvg:svgBlip xmlns="" xmlns:asvg="http://schemas.microsoft.com/office/drawing/2016/SVG/main" r:embed="rId17"/>
+                <asvg:svgBlip xmlns:asvg="http://schemas.microsoft.com/office/drawing/2016/SVG/main" xmlns="" r:embed="rId17"/>
               </a:ext>
             </a:extLst>
           </a:blip>
@@ -5922,7 +5923,7 @@
           <a:blip r:embed="rId12">
             <a:extLst>
               <a:ext uri="{96DAC541-7B7A-43D3-8B79-37D633B846F1}">
-                <asvg:svgBlip xmlns="" xmlns:asvg="http://schemas.microsoft.com/office/drawing/2016/SVG/main" r:embed="rId13"/>
+                <asvg:svgBlip xmlns:asvg="http://schemas.microsoft.com/office/drawing/2016/SVG/main" xmlns="" r:embed="rId13"/>
               </a:ext>
             </a:extLst>
           </a:blip>
@@ -6084,7 +6085,7 @@
           <a:blip r:embed="rId4">
             <a:extLst>
               <a:ext uri="{96DAC541-7B7A-43D3-8B79-37D633B846F1}">
-                <asvg:svgBlip xmlns="" xmlns:asvg="http://schemas.microsoft.com/office/drawing/2016/SVG/main" r:embed="rId7"/>
+                <asvg:svgBlip xmlns:asvg="http://schemas.microsoft.com/office/drawing/2016/SVG/main" xmlns="" r:embed="rId7"/>
               </a:ext>
             </a:extLst>
           </a:blip>
@@ -6201,7 +6202,7 @@
           <a:blip r:embed="rId8">
             <a:extLst>
               <a:ext uri="{96DAC541-7B7A-43D3-8B79-37D633B846F1}">
-                <asvg:svgBlip xmlns="" xmlns:asvg="http://schemas.microsoft.com/office/drawing/2016/SVG/main" r:embed="rId9"/>
+                <asvg:svgBlip xmlns:asvg="http://schemas.microsoft.com/office/drawing/2016/SVG/main" xmlns="" r:embed="rId9"/>
               </a:ext>
             </a:extLst>
           </a:blip>
@@ -6320,7 +6321,7 @@
           <a:blip r:embed="rId14">
             <a:extLst>
               <a:ext uri="{96DAC541-7B7A-43D3-8B79-37D633B846F1}">
-                <asvg:svgBlip xmlns="" xmlns:asvg="http://schemas.microsoft.com/office/drawing/2016/SVG/main" r:embed="rId17"/>
+                <asvg:svgBlip xmlns:asvg="http://schemas.microsoft.com/office/drawing/2016/SVG/main" xmlns="" r:embed="rId17"/>
               </a:ext>
             </a:extLst>
           </a:blip>
@@ -6356,7 +6357,7 @@
           <a:blip r:embed="rId12">
             <a:extLst>
               <a:ext uri="{96DAC541-7B7A-43D3-8B79-37D633B846F1}">
-                <asvg:svgBlip xmlns="" xmlns:asvg="http://schemas.microsoft.com/office/drawing/2016/SVG/main" r:embed="rId13"/>
+                <asvg:svgBlip xmlns:asvg="http://schemas.microsoft.com/office/drawing/2016/SVG/main" xmlns="" r:embed="rId13"/>
               </a:ext>
             </a:extLst>
           </a:blip>
@@ -6446,7 +6447,7 @@
                 </a14:imgProps>
               </a:ext>
               <a:ext uri="{96DAC541-7B7A-43D3-8B79-37D633B846F1}">
-                <asvg:svgBlip xmlns="" xmlns:asvg="http://schemas.microsoft.com/office/drawing/2016/SVG/main" r:embed="rId32"/>
+                <asvg:svgBlip xmlns:asvg="http://schemas.microsoft.com/office/drawing/2016/SVG/main" xmlns="" r:embed="rId32"/>
               </a:ext>
             </a:extLst>
           </a:blip>
@@ -7228,7 +7229,7 @@
           <a:blip r:embed="rId12">
             <a:extLst>
               <a:ext uri="{96DAC541-7B7A-43D3-8B79-37D633B846F1}">
-                <asvg:svgBlip xmlns="" xmlns:asvg="http://schemas.microsoft.com/office/drawing/2016/SVG/main" r:embed="rId13"/>
+                <asvg:svgBlip xmlns:asvg="http://schemas.microsoft.com/office/drawing/2016/SVG/main" xmlns="" r:embed="rId13"/>
               </a:ext>
             </a:extLst>
           </a:blip>
@@ -7281,15 +7282,88 @@
                 <a:ea typeface="Amazon Ember" panose="020B0603020204020204" pitchFamily="34" charset="0"/>
                 <a:cs typeface="Arial" panose="020B0604020202020204" pitchFamily="34" charset="0"/>
               </a:rPr>
-              <a:t>SQL </a:t>
-            </a:r>
+              <a:t>SQL Server node with SIOS DataKeeper</a:t>
+            </a:r>
+            <a:endParaRPr lang="en-US" sz="1200" dirty="0">
+              <a:latin typeface="Arial" panose="020B0604020202020204" pitchFamily="34" charset="0"/>
+              <a:ea typeface="Amazon Ember" panose="020B0603020204020204" pitchFamily="34" charset="0"/>
+              <a:cs typeface="Arial" panose="020B0604020202020204" pitchFamily="34" charset="0"/>
+            </a:endParaRPr>
+          </a:p>
+        </p:txBody>
+      </p:sp>
+      <p:pic>
+        <p:nvPicPr>
+          <p:cNvPr id="45" name="Graphic 135">
+            <a:extLst>
+              <a:ext uri="{FF2B5EF4-FFF2-40B4-BE49-F238E27FC236}">
+                <a16:creationId xmlns:a16="http://schemas.microsoft.com/office/drawing/2014/main" id="{C19987B1-DB3A-1640-994D-BCB81FCC1AE4}"/>
+              </a:ext>
+            </a:extLst>
+          </p:cNvPr>
+          <p:cNvPicPr>
+            <a:picLocks noChangeAspect="1"/>
+          </p:cNvPicPr>
+          <p:nvPr/>
+        </p:nvPicPr>
+        <p:blipFill>
+          <a:blip r:embed="rId12">
+            <a:extLst>
+              <a:ext uri="{96DAC541-7B7A-43D3-8B79-37D633B846F1}">
+                <asvg:svgBlip xmlns:asvg="http://schemas.microsoft.com/office/drawing/2016/SVG/main" xmlns="" r:embed="rId13"/>
+              </a:ext>
+            </a:extLst>
+          </a:blip>
+          <a:stretch>
+            <a:fillRect/>
+          </a:stretch>
+        </p:blipFill>
+        <p:spPr>
+          <a:xfrm>
+            <a:off x="6084302" y="4114800"/>
+            <a:ext cx="469900" cy="469900"/>
+          </a:xfrm>
+          <a:prstGeom prst="rect">
+            <a:avLst/>
+          </a:prstGeom>
+        </p:spPr>
+      </p:pic>
+      <p:sp>
+        <p:nvSpPr>
+          <p:cNvPr id="48" name="TextBox 47">
+            <a:extLst>
+              <a:ext uri="{FF2B5EF4-FFF2-40B4-BE49-F238E27FC236}">
+                <a16:creationId xmlns:a16="http://schemas.microsoft.com/office/drawing/2014/main" id="{F90C1CC4-DFE6-0445-BD1C-DB610E1A07F5}"/>
+              </a:ext>
+            </a:extLst>
+          </p:cNvPr>
+          <p:cNvSpPr txBox="1"/>
+          <p:nvPr/>
+        </p:nvSpPr>
+        <p:spPr>
+          <a:xfrm>
+            <a:off x="5573295" y="4580773"/>
+            <a:ext cx="1513305" cy="646331"/>
+          </a:xfrm>
+          <a:prstGeom prst="rect">
+            <a:avLst/>
+          </a:prstGeom>
+          <a:noFill/>
+        </p:spPr>
+        <p:txBody>
+          <a:bodyPr wrap="square" rtlCol="0">
+            <a:spAutoFit/>
+          </a:bodyPr>
+          <a:lstStyle/>
+          <a:p>
+            <a:pPr algn="ctr"/>
             <a:r>
               <a:rPr lang="en-US" sz="1200" dirty="0" smtClean="0">
                 <a:latin typeface="Arial" panose="020B0604020202020204" pitchFamily="34" charset="0"/>
                 <a:ea typeface="Amazon Ember" panose="020B0603020204020204" pitchFamily="34" charset="0"/>
                 <a:cs typeface="Arial" panose="020B0604020202020204" pitchFamily="34" charset="0"/>
               </a:rPr>
-              <a:t>Server node with SIOS DataKeeper</a:t>
+              <a:t>SQL Server node with SIOS DataKeeper</a:t>
             </a:r>
             <a:endParaRPr lang="en-US" sz="1200" dirty="0">
               <a:latin typeface="Arial" panose="020B0604020202020204" pitchFamily="34" charset="0"/>
@@ -7299,90 +7373,140 @@
           </a:p>
         </p:txBody>
       </p:sp>
-      <p:pic>
-        <p:nvPicPr>
-          <p:cNvPr id="45" name="Graphic 135">
-            <a:extLst>
-              <a:ext uri="{FF2B5EF4-FFF2-40B4-BE49-F238E27FC236}">
-                <a16:creationId xmlns:a16="http://schemas.microsoft.com/office/drawing/2014/main" id="{C19987B1-DB3A-1640-994D-BCB81FCC1AE4}"/>
-              </a:ext>
-            </a:extLst>
-          </p:cNvPr>
-          <p:cNvPicPr>
-            <a:picLocks noChangeAspect="1"/>
-          </p:cNvPicPr>
-          <p:nvPr/>
-        </p:nvPicPr>
-        <p:blipFill>
-          <a:blip r:embed="rId12">
-            <a:extLst>
-              <a:ext uri="{96DAC541-7B7A-43D3-8B79-37D633B846F1}">
-                <asvg:svgBlip xmlns="" xmlns:asvg="http://schemas.microsoft.com/office/drawing/2016/SVG/main" r:embed="rId13"/>
-              </a:ext>
-            </a:extLst>
-          </a:blip>
-          <a:stretch>
-            <a:fillRect/>
-          </a:stretch>
-        </p:blipFill>
-        <p:spPr>
-          <a:xfrm>
-            <a:off x="6084302" y="4114800"/>
-            <a:ext cx="469900" cy="469900"/>
-          </a:xfrm>
-          <a:prstGeom prst="rect">
-            <a:avLst/>
-          </a:prstGeom>
-        </p:spPr>
-      </p:pic>
-      <p:sp>
-        <p:nvSpPr>
-          <p:cNvPr id="48" name="TextBox 47">
-            <a:extLst>
-              <a:ext uri="{FF2B5EF4-FFF2-40B4-BE49-F238E27FC236}">
-                <a16:creationId xmlns:a16="http://schemas.microsoft.com/office/drawing/2014/main" id="{F90C1CC4-DFE6-0445-BD1C-DB610E1A07F5}"/>
-              </a:ext>
-            </a:extLst>
-          </p:cNvPr>
-          <p:cNvSpPr txBox="1"/>
-          <p:nvPr/>
-        </p:nvSpPr>
-        <p:spPr>
-          <a:xfrm>
-            <a:off x="5573295" y="4580773"/>
-            <a:ext cx="1513305" cy="646331"/>
+      <p:sp>
+        <p:nvSpPr>
+          <p:cNvPr id="38" name="Rectangle 37">
+            <a:extLst>
+              <a:ext uri="{FF2B5EF4-FFF2-40B4-BE49-F238E27FC236}">
+                <a16:creationId xmlns:a16="http://schemas.microsoft.com/office/drawing/2014/main" id="{FFA89DF7-D079-0947-8E29-4EEA4975DBBD}"/>
+              </a:ext>
+            </a:extLst>
+          </p:cNvPr>
+          <p:cNvSpPr/>
+          <p:nvPr/>
+        </p:nvSpPr>
+        <p:spPr>
+          <a:xfrm>
+            <a:off x="2977148" y="4072529"/>
+            <a:ext cx="3962400" cy="1216827"/>
           </a:xfrm>
           <a:prstGeom prst="rect">
             <a:avLst/>
           </a:prstGeom>
           <a:noFill/>
-        </p:spPr>
-        <p:txBody>
-          <a:bodyPr wrap="square" rtlCol="0">
-            <a:spAutoFit/>
-          </a:bodyPr>
+          <a:ln w="12700">
+            <a:solidFill>
+              <a:srgbClr val="5A6B86"/>
+            </a:solidFill>
+            <a:prstDash val="dash"/>
+          </a:ln>
+        </p:spPr>
+        <p:style>
+          <a:lnRef idx="2">
+            <a:schemeClr val="accent1">
+              <a:shade val="50000"/>
+            </a:schemeClr>
+          </a:lnRef>
+          <a:fillRef idx="1">
+            <a:schemeClr val="accent1"/>
+          </a:fillRef>
+          <a:effectRef idx="0">
+            <a:schemeClr val="accent1"/>
+          </a:effectRef>
+          <a:fontRef idx="minor">
+            <a:schemeClr val="lt1"/>
+          </a:fontRef>
+        </p:style>
+        <p:txBody>
+          <a:bodyPr lIns="91440" tIns="91440" rIns="91440"/>
           <a:lstStyle/>
           <a:p>
-            <a:pPr algn="ctr"/>
+            <a:pPr algn="ctr" eaLnBrk="1" fontAlgn="auto" hangingPunct="1">
+              <a:spcBef>
+                <a:spcPts val="0"/>
+              </a:spcBef>
+              <a:spcAft>
+                <a:spcPts val="0"/>
+              </a:spcAft>
+              <a:defRPr/>
+            </a:pPr>
             <a:r>
               <a:rPr lang="en-US" sz="1200" dirty="0" smtClean="0">
+                <a:solidFill>
+                  <a:srgbClr val="5A6B86"/>
+                </a:solidFill>
                 <a:latin typeface="Arial" panose="020B0604020202020204" pitchFamily="34" charset="0"/>
-                <a:ea typeface="Amazon Ember" panose="020B0603020204020204" pitchFamily="34" charset="0"/>
                 <a:cs typeface="Arial" panose="020B0604020202020204" pitchFamily="34" charset="0"/>
               </a:rPr>
-              <a:t>SQL </a:t>
+              <a:t>Failover </a:t>
             </a:r>
             <a:r>
               <a:rPr lang="en-US" sz="1200" dirty="0" smtClean="0">
+                <a:solidFill>
+                  <a:srgbClr val="5A6B86"/>
+                </a:solidFill>
                 <a:latin typeface="Arial" panose="020B0604020202020204" pitchFamily="34" charset="0"/>
-                <a:ea typeface="Amazon Ember" panose="020B0603020204020204" pitchFamily="34" charset="0"/>
                 <a:cs typeface="Arial" panose="020B0604020202020204" pitchFamily="34" charset="0"/>
               </a:rPr>
-              <a:t>Server node with SIOS DataKeeper</a:t>
+              <a:t>cluster </a:t>
+            </a:r>
+            <a:r>
+              <a:rPr lang="en-US" sz="1200" dirty="0" smtClean="0">
+                <a:solidFill>
+                  <a:srgbClr val="5A6B86"/>
+                </a:solidFill>
+                <a:latin typeface="Arial" panose="020B0604020202020204" pitchFamily="34" charset="0"/>
+                <a:cs typeface="Arial" panose="020B0604020202020204" pitchFamily="34" charset="0"/>
+              </a:rPr>
+              <a:t>and</a:t>
+            </a:r>
+          </a:p>
+          <a:p>
+            <a:pPr algn="ctr" eaLnBrk="1" fontAlgn="auto" hangingPunct="1">
+              <a:spcBef>
+                <a:spcPts val="0"/>
+              </a:spcBef>
+              <a:spcAft>
+                <a:spcPts val="0"/>
+              </a:spcAft>
+              <a:defRPr/>
+            </a:pPr>
+            <a:r>
+              <a:rPr lang="en-US" sz="1200" dirty="0" smtClean="0">
+                <a:solidFill>
+                  <a:srgbClr val="5A6B86"/>
+                </a:solidFill>
+                <a:latin typeface="Arial" panose="020B0604020202020204" pitchFamily="34" charset="0"/>
+                <a:cs typeface="Arial" panose="020B0604020202020204" pitchFamily="34" charset="0"/>
+              </a:rPr>
+              <a:t>SIOS DataKeeper</a:t>
+            </a:r>
+          </a:p>
+          <a:p>
+            <a:pPr algn="ctr" eaLnBrk="1" fontAlgn="auto" hangingPunct="1">
+              <a:spcBef>
+                <a:spcPts val="0"/>
+              </a:spcBef>
+              <a:spcAft>
+                <a:spcPts val="0"/>
+              </a:spcAft>
+              <a:defRPr/>
+            </a:pPr>
+            <a:r>
+              <a:rPr lang="en-US" sz="1200" dirty="0" smtClean="0">
+                <a:solidFill>
+                  <a:srgbClr val="5A6B86"/>
+                </a:solidFill>
+                <a:latin typeface="Arial" panose="020B0604020202020204" pitchFamily="34" charset="0"/>
+                <a:cs typeface="Arial" panose="020B0604020202020204" pitchFamily="34" charset="0"/>
+              </a:rPr>
+              <a:t>replication</a:t>
             </a:r>
             <a:endParaRPr lang="en-US" sz="1200" dirty="0">
+              <a:solidFill>
+                <a:srgbClr val="5A6B86"/>
+              </a:solidFill>
               <a:latin typeface="Arial" panose="020B0604020202020204" pitchFamily="34" charset="0"/>
-              <a:ea typeface="Amazon Ember" panose="020B0603020204020204" pitchFamily="34" charset="0"/>
               <a:cs typeface="Arial" panose="020B0604020202020204" pitchFamily="34" charset="0"/>
             </a:endParaRPr>
           </a:p>
@@ -7503,7 +7627,7 @@
           <a:blip r:embed="rId2">
             <a:extLst>
               <a:ext uri="{96DAC541-7B7A-43D3-8B79-37D633B846F1}">
-                <asvg:svgBlip xmlns="" xmlns:asvg="http://schemas.microsoft.com/office/drawing/2016/SVG/main" r:embed="rId3"/>
+                <asvg:svgBlip xmlns:asvg="http://schemas.microsoft.com/office/drawing/2016/SVG/main" xmlns="" r:embed="rId3"/>
               </a:ext>
             </a:extLst>
           </a:blip>
@@ -7620,7 +7744,7 @@
           <a:blip r:embed="rId4">
             <a:extLst>
               <a:ext uri="{96DAC541-7B7A-43D3-8B79-37D633B846F1}">
-                <asvg:svgBlip xmlns="" xmlns:asvg="http://schemas.microsoft.com/office/drawing/2016/SVG/main" r:embed="rId7"/>
+                <asvg:svgBlip xmlns:asvg="http://schemas.microsoft.com/office/drawing/2016/SVG/main" xmlns="" r:embed="rId7"/>
               </a:ext>
             </a:extLst>
           </a:blip>
@@ -7737,7 +7861,7 @@
           <a:blip r:embed="rId8">
             <a:extLst>
               <a:ext uri="{96DAC541-7B7A-43D3-8B79-37D633B846F1}">
-                <asvg:svgBlip xmlns="" xmlns:asvg="http://schemas.microsoft.com/office/drawing/2016/SVG/main" r:embed="rId9"/>
+                <asvg:svgBlip xmlns:asvg="http://schemas.microsoft.com/office/drawing/2016/SVG/main" xmlns="" r:embed="rId9"/>
               </a:ext>
             </a:extLst>
           </a:blip>
@@ -7896,7 +8020,7 @@
           <a:blip r:embed="rId10">
             <a:extLst>
               <a:ext uri="{96DAC541-7B7A-43D3-8B79-37D633B846F1}">
-                <asvg:svgBlip xmlns="" xmlns:asvg="http://schemas.microsoft.com/office/drawing/2016/SVG/main" r:embed="rId11"/>
+                <asvg:svgBlip xmlns:asvg="http://schemas.microsoft.com/office/drawing/2016/SVG/main" xmlns="" r:embed="rId11"/>
               </a:ext>
             </a:extLst>
           </a:blip>
@@ -7932,7 +8056,7 @@
           <a:blip r:embed="rId12">
             <a:extLst>
               <a:ext uri="{96DAC541-7B7A-43D3-8B79-37D633B846F1}">
-                <asvg:svgBlip xmlns="" xmlns:asvg="http://schemas.microsoft.com/office/drawing/2016/SVG/main" r:embed="rId13"/>
+                <asvg:svgBlip xmlns:asvg="http://schemas.microsoft.com/office/drawing/2016/SVG/main" xmlns="" r:embed="rId13"/>
               </a:ext>
             </a:extLst>
           </a:blip>
@@ -8048,7 +8172,7 @@
           <a:blip r:embed="rId14">
             <a:extLst>
               <a:ext uri="{96DAC541-7B7A-43D3-8B79-37D633B846F1}">
-                <asvg:svgBlip xmlns="" xmlns:asvg="http://schemas.microsoft.com/office/drawing/2016/SVG/main" r:embed="rId17"/>
+                <asvg:svgBlip xmlns:asvg="http://schemas.microsoft.com/office/drawing/2016/SVG/main" xmlns="" r:embed="rId17"/>
               </a:ext>
             </a:extLst>
           </a:blip>
@@ -8084,7 +8208,7 @@
           <a:blip r:embed="rId12">
             <a:extLst>
               <a:ext uri="{96DAC541-7B7A-43D3-8B79-37D633B846F1}">
-                <asvg:svgBlip xmlns="" xmlns:asvg="http://schemas.microsoft.com/office/drawing/2016/SVG/main" r:embed="rId13"/>
+                <asvg:svgBlip xmlns:asvg="http://schemas.microsoft.com/office/drawing/2016/SVG/main" xmlns="" r:embed="rId13"/>
               </a:ext>
             </a:extLst>
           </a:blip>
@@ -8734,7 +8858,7 @@
         <p:spPr>
           <a:xfrm>
             <a:off x="1447801" y="932962"/>
-            <a:ext cx="2743200" cy="4553438"/>
+            <a:ext cx="2743200" cy="4547234"/>
           </a:xfrm>
           <a:prstGeom prst="rect">
             <a:avLst/>
@@ -8824,7 +8948,7 @@
           <a:blip r:embed="rId12">
             <a:extLst>
               <a:ext uri="{96DAC541-7B7A-43D3-8B79-37D633B846F1}">
-                <asvg:svgBlip xmlns="" xmlns:asvg="http://schemas.microsoft.com/office/drawing/2016/SVG/main" r:embed="rId13"/>
+                <asvg:svgBlip xmlns:asvg="http://schemas.microsoft.com/office/drawing/2016/SVG/main" xmlns="" r:embed="rId13"/>
               </a:ext>
             </a:extLst>
           </a:blip>
@@ -8877,15 +9001,7 @@
                 <a:ea typeface="Amazon Ember" panose="020B0603020204020204" pitchFamily="34" charset="0"/>
                 <a:cs typeface="Arial" panose="020B0604020202020204" pitchFamily="34" charset="0"/>
               </a:rPr>
-              <a:t>SQL </a:t>
-            </a:r>
-            <a:r>
-              <a:rPr lang="en-US" sz="1200" dirty="0" smtClean="0">
-                <a:latin typeface="Arial" panose="020B0604020202020204" pitchFamily="34" charset="0"/>
-                <a:ea typeface="Amazon Ember" panose="020B0603020204020204" pitchFamily="34" charset="0"/>
-                <a:cs typeface="Arial" panose="020B0604020202020204" pitchFamily="34" charset="0"/>
-              </a:rPr>
-              <a:t>Server node with </a:t>
+              <a:t>SQL Server node with </a:t>
             </a:r>
           </a:p>
           <a:p>
@@ -9005,7 +9121,7 @@
           <a:blip r:embed="rId4">
             <a:extLst>
               <a:ext uri="{96DAC541-7B7A-43D3-8B79-37D633B846F1}">
-                <asvg:svgBlip xmlns="" xmlns:asvg="http://schemas.microsoft.com/office/drawing/2016/SVG/main" r:embed="rId7"/>
+                <asvg:svgBlip xmlns:asvg="http://schemas.microsoft.com/office/drawing/2016/SVG/main" xmlns="" r:embed="rId7"/>
               </a:ext>
             </a:extLst>
           </a:blip>
@@ -9122,7 +9238,7 @@
           <a:blip r:embed="rId8">
             <a:extLst>
               <a:ext uri="{96DAC541-7B7A-43D3-8B79-37D633B846F1}">
-                <asvg:svgBlip xmlns="" xmlns:asvg="http://schemas.microsoft.com/office/drawing/2016/SVG/main" r:embed="rId9"/>
+                <asvg:svgBlip xmlns:asvg="http://schemas.microsoft.com/office/drawing/2016/SVG/main" xmlns="" r:embed="rId9"/>
               </a:ext>
             </a:extLst>
           </a:blip>
@@ -9241,7 +9357,7 @@
           <a:blip r:embed="rId14">
             <a:extLst>
               <a:ext uri="{96DAC541-7B7A-43D3-8B79-37D633B846F1}">
-                <asvg:svgBlip xmlns="" xmlns:asvg="http://schemas.microsoft.com/office/drawing/2016/SVG/main" r:embed="rId17"/>
+                <asvg:svgBlip xmlns:asvg="http://schemas.microsoft.com/office/drawing/2016/SVG/main" xmlns="" r:embed="rId17"/>
               </a:ext>
             </a:extLst>
           </a:blip>
@@ -9277,7 +9393,7 @@
           <a:blip r:embed="rId12">
             <a:extLst>
               <a:ext uri="{96DAC541-7B7A-43D3-8B79-37D633B846F1}">
-                <asvg:svgBlip xmlns="" xmlns:asvg="http://schemas.microsoft.com/office/drawing/2016/SVG/main" r:embed="rId13"/>
+                <asvg:svgBlip xmlns:asvg="http://schemas.microsoft.com/office/drawing/2016/SVG/main" xmlns="" r:embed="rId13"/>
               </a:ext>
             </a:extLst>
           </a:blip>
@@ -9358,7 +9474,7 @@
           <a:blip r:embed="rId12">
             <a:extLst>
               <a:ext uri="{96DAC541-7B7A-43D3-8B79-37D633B846F1}">
-                <asvg:svgBlip xmlns="" xmlns:asvg="http://schemas.microsoft.com/office/drawing/2016/SVG/main" r:embed="rId13"/>
+                <asvg:svgBlip xmlns:asvg="http://schemas.microsoft.com/office/drawing/2016/SVG/main" xmlns="" r:embed="rId13"/>
               </a:ext>
             </a:extLst>
           </a:blip>
@@ -9411,15 +9527,7 @@
                 <a:ea typeface="Amazon Ember" panose="020B0603020204020204" pitchFamily="34" charset="0"/>
                 <a:cs typeface="Arial" panose="020B0604020202020204" pitchFamily="34" charset="0"/>
               </a:rPr>
-              <a:t>SQL </a:t>
-            </a:r>
-            <a:r>
-              <a:rPr lang="en-US" sz="1200" dirty="0" smtClean="0">
-                <a:latin typeface="Arial" panose="020B0604020202020204" pitchFamily="34" charset="0"/>
-                <a:ea typeface="Amazon Ember" panose="020B0603020204020204" pitchFamily="34" charset="0"/>
-                <a:cs typeface="Arial" panose="020B0604020202020204" pitchFamily="34" charset="0"/>
-              </a:rPr>
-              <a:t>Server node with </a:t>
+              <a:t>SQL Server node with </a:t>
             </a:r>
           </a:p>
           <a:p>
@@ -9458,7 +9566,7 @@
           <a:blip r:embed="rId12">
             <a:extLst>
               <a:ext uri="{96DAC541-7B7A-43D3-8B79-37D633B846F1}">
-                <asvg:svgBlip xmlns="" xmlns:asvg="http://schemas.microsoft.com/office/drawing/2016/SVG/main" r:embed="rId13"/>
+                <asvg:svgBlip xmlns:asvg="http://schemas.microsoft.com/office/drawing/2016/SVG/main" xmlns="" r:embed="rId13"/>
               </a:ext>
             </a:extLst>
           </a:blip>
@@ -9551,17 +9659,7 @@
                 <a:latin typeface="Arial" panose="020B0604020202020204" pitchFamily="34" charset="0"/>
                 <a:cs typeface="Arial" panose="020B0604020202020204" pitchFamily="34" charset="0"/>
               </a:rPr>
-              <a:t>Zone </a:t>
-            </a:r>
-            <a:r>
-              <a:rPr lang="en-US" sz="1200" dirty="0" smtClean="0">
-                <a:solidFill>
-                  <a:srgbClr val="5B9CD5"/>
-                </a:solidFill>
-                <a:latin typeface="Arial" panose="020B0604020202020204" pitchFamily="34" charset="0"/>
-                <a:cs typeface="Arial" panose="020B0604020202020204" pitchFamily="34" charset="0"/>
-              </a:rPr>
-              <a:t>2</a:t>
+              <a:t>Zone 2</a:t>
             </a:r>
             <a:endParaRPr lang="en-US" sz="1200" dirty="0">
               <a:solidFill>
@@ -9577,6 +9675,2319 @@
     <p:extLst>
       <p:ext uri="{BB962C8B-B14F-4D97-AF65-F5344CB8AC3E}">
         <p14:creationId xmlns:p14="http://schemas.microsoft.com/office/powerpoint/2010/main" val="3241857173"/>
+      </p:ext>
+    </p:extLst>
+  </p:cSld>
+  <p:clrMapOvr>
+    <a:masterClrMapping/>
+  </p:clrMapOvr>
+</p:sld>
+</file>
+
+<file path=ppt/slides/slide4.xml><?xml version="1.0" encoding="utf-8"?>
+<p:sld xmlns:a="http://schemas.openxmlformats.org/drawingml/2006/main" xmlns:r="http://schemas.openxmlformats.org/officeDocument/2006/relationships" xmlns:p="http://schemas.openxmlformats.org/presentationml/2006/main">
+  <p:cSld>
+    <p:spTree>
+      <p:nvGrpSpPr>
+        <p:cNvPr id="1" name=""/>
+        <p:cNvGrpSpPr/>
+        <p:nvPr/>
+      </p:nvGrpSpPr>
+      <p:grpSpPr>
+        <a:xfrm>
+          <a:off x="0" y="0"/>
+          <a:ext cx="0" cy="0"/>
+          <a:chOff x="0" y="0"/>
+          <a:chExt cx="0" cy="0"/>
+        </a:xfrm>
+      </p:grpSpPr>
+      <p:sp>
+        <p:nvSpPr>
+          <p:cNvPr id="4" name="Rectangle 3">
+            <a:extLst>
+              <a:ext uri="{FF2B5EF4-FFF2-40B4-BE49-F238E27FC236}">
+                <a16:creationId xmlns:a16="http://schemas.microsoft.com/office/drawing/2014/main" id="{CE7F7081-419C-2E4F-A999-2923C4338FC0}"/>
+              </a:ext>
+            </a:extLst>
+          </p:cNvPr>
+          <p:cNvSpPr/>
+          <p:nvPr/>
+        </p:nvSpPr>
+        <p:spPr>
+          <a:xfrm>
+            <a:off x="848378" y="457200"/>
+            <a:ext cx="9438622" cy="5257800"/>
+          </a:xfrm>
+          <a:prstGeom prst="rect">
+            <a:avLst/>
+          </a:prstGeom>
+          <a:noFill/>
+          <a:ln w="12700">
+            <a:solidFill>
+              <a:schemeClr val="tx1"/>
+            </a:solidFill>
+          </a:ln>
+        </p:spPr>
+        <p:style>
+          <a:lnRef idx="2">
+            <a:schemeClr val="accent1">
+              <a:shade val="50000"/>
+            </a:schemeClr>
+          </a:lnRef>
+          <a:fillRef idx="1">
+            <a:schemeClr val="accent1"/>
+          </a:fillRef>
+          <a:effectRef idx="0">
+            <a:schemeClr val="accent1"/>
+          </a:effectRef>
+          <a:fontRef idx="minor">
+            <a:schemeClr val="lt1"/>
+          </a:fontRef>
+        </p:style>
+        <p:txBody>
+          <a:bodyPr rot="0" spcFirstLastPara="0" vertOverflow="overflow" horzOverflow="overflow" vert="horz" wrap="square" lIns="457200" tIns="91440" rIns="91440" bIns="45720" numCol="1" spcCol="0" rtlCol="0" fromWordArt="0" anchor="t" anchorCtr="0" forceAA="0" compatLnSpc="1">
+            <a:prstTxWarp prst="textNoShape">
+              <a:avLst/>
+            </a:prstTxWarp>
+            <a:noAutofit/>
+          </a:bodyPr>
+          <a:lstStyle/>
+          <a:p>
+            <a:pPr algn="l"/>
+            <a:r>
+              <a:rPr lang="en-US" sz="1200" dirty="0">
+                <a:solidFill>
+                  <a:sysClr val="windowText" lastClr="000000"/>
+                </a:solidFill>
+                <a:latin typeface="Arial" panose="020B0604020202020204" pitchFamily="34" charset="0"/>
+                <a:ea typeface="Amazon Ember" panose="020B0603020204020204" pitchFamily="34" charset="0"/>
+                <a:cs typeface="Arial" panose="020B0604020202020204" pitchFamily="34" charset="0"/>
+              </a:rPr>
+              <a:t>AWS Cloud</a:t>
+            </a:r>
+          </a:p>
+        </p:txBody>
+      </p:sp>
+      <p:pic>
+        <p:nvPicPr>
+          <p:cNvPr id="5" name="Graphic 11">
+            <a:extLst>
+              <a:ext uri="{FF2B5EF4-FFF2-40B4-BE49-F238E27FC236}">
+                <a16:creationId xmlns:a16="http://schemas.microsoft.com/office/drawing/2014/main" id="{CE52C9D7-11B0-9E41-AB16-2C9849C3ECBE}"/>
+              </a:ext>
+            </a:extLst>
+          </p:cNvPr>
+          <p:cNvPicPr>
+            <a:picLocks noChangeAspect="1"/>
+          </p:cNvPicPr>
+          <p:nvPr/>
+        </p:nvPicPr>
+        <p:blipFill>
+          <a:blip r:embed="rId2">
+            <a:extLst>
+              <a:ext uri="{96DAC541-7B7A-43D3-8B79-37D633B846F1}">
+                <asvg:svgBlip xmlns:asvg="http://schemas.microsoft.com/office/drawing/2016/SVG/main" xmlns="" r:embed="rId3"/>
+              </a:ext>
+            </a:extLst>
+          </a:blip>
+          <a:stretch>
+            <a:fillRect/>
+          </a:stretch>
+        </p:blipFill>
+        <p:spPr>
+          <a:xfrm>
+            <a:off x="848378" y="457200"/>
+            <a:ext cx="330200" cy="330200"/>
+          </a:xfrm>
+          <a:prstGeom prst="rect">
+            <a:avLst/>
+          </a:prstGeom>
+        </p:spPr>
+      </p:pic>
+      <p:sp>
+        <p:nvSpPr>
+          <p:cNvPr id="6" name="Rectangle 5">
+            <a:extLst>
+              <a:ext uri="{FF2B5EF4-FFF2-40B4-BE49-F238E27FC236}">
+                <a16:creationId xmlns:a16="http://schemas.microsoft.com/office/drawing/2014/main" id="{E25F190B-F12E-614B-827A-566AC09E9D97}"/>
+              </a:ext>
+            </a:extLst>
+          </p:cNvPr>
+          <p:cNvSpPr/>
+          <p:nvPr/>
+        </p:nvSpPr>
+        <p:spPr>
+          <a:xfrm>
+            <a:off x="1583496" y="1600200"/>
+            <a:ext cx="2471811" cy="1447800"/>
+          </a:xfrm>
+          <a:prstGeom prst="rect">
+            <a:avLst/>
+          </a:prstGeom>
+          <a:solidFill>
+            <a:srgbClr val="1D8900">
+              <a:alpha val="9804"/>
+            </a:srgbClr>
+          </a:solidFill>
+          <a:ln w="12700">
+            <a:noFill/>
+            <a:prstDash val="dash"/>
+          </a:ln>
+        </p:spPr>
+        <p:style>
+          <a:lnRef idx="2">
+            <a:schemeClr val="accent1">
+              <a:shade val="50000"/>
+            </a:schemeClr>
+          </a:lnRef>
+          <a:fillRef idx="1">
+            <a:schemeClr val="accent1"/>
+          </a:fillRef>
+          <a:effectRef idx="0">
+            <a:schemeClr val="accent1"/>
+          </a:effectRef>
+          <a:fontRef idx="minor">
+            <a:schemeClr val="lt1"/>
+          </a:fontRef>
+        </p:style>
+        <p:txBody>
+          <a:bodyPr rot="0" spcFirstLastPara="0" vertOverflow="overflow" horzOverflow="overflow" vert="horz" wrap="square" lIns="338328" tIns="45720" rIns="91440" bIns="45720" numCol="1" spcCol="0" rtlCol="0" fromWordArt="0" anchor="t" anchorCtr="0" forceAA="0" compatLnSpc="1">
+            <a:prstTxWarp prst="textNoShape">
+              <a:avLst/>
+            </a:prstTxWarp>
+            <a:noAutofit/>
+          </a:bodyPr>
+          <a:lstStyle/>
+          <a:p>
+            <a:pPr algn="l"/>
+            <a:r>
+              <a:rPr lang="en-US" sz="1200" dirty="0">
+                <a:solidFill>
+                  <a:schemeClr val="accent6"/>
+                </a:solidFill>
+                <a:latin typeface="Arial" panose="020B0604020202020204" pitchFamily="34" charset="0"/>
+                <a:ea typeface="Amazon Ember" panose="020B0603020204020204" pitchFamily="34" charset="0"/>
+                <a:cs typeface="Arial" panose="020B0604020202020204" pitchFamily="34" charset="0"/>
+              </a:rPr>
+              <a:t>Public subnet</a:t>
+            </a:r>
+          </a:p>
+          <a:p>
+            <a:pPr algn="l"/>
+            <a:endParaRPr lang="en-US" sz="1200" dirty="0">
+              <a:solidFill>
+                <a:schemeClr val="accent5"/>
+              </a:solidFill>
+              <a:latin typeface="Arial" panose="020B0604020202020204" pitchFamily="34" charset="0"/>
+              <a:ea typeface="Amazon Ember" panose="020B0603020204020204" pitchFamily="34" charset="0"/>
+              <a:cs typeface="Arial" panose="020B0604020202020204" pitchFamily="34" charset="0"/>
+            </a:endParaRPr>
+          </a:p>
+        </p:txBody>
+      </p:sp>
+      <p:pic>
+        <p:nvPicPr>
+          <p:cNvPr id="7" name="Graphic 10">
+            <a:extLst>
+              <a:ext uri="{FF2B5EF4-FFF2-40B4-BE49-F238E27FC236}">
+                <a16:creationId xmlns:a16="http://schemas.microsoft.com/office/drawing/2014/main" id="{89B99B74-19F0-0B4B-85E3-A09DF2519E46}"/>
+              </a:ext>
+            </a:extLst>
+          </p:cNvPr>
+          <p:cNvPicPr>
+            <a:picLocks noChangeAspect="1"/>
+          </p:cNvPicPr>
+          <p:nvPr/>
+        </p:nvPicPr>
+        <p:blipFill>
+          <a:blip r:embed="rId4">
+            <a:extLst>
+              <a:ext uri="{96DAC541-7B7A-43D3-8B79-37D633B846F1}">
+                <asvg:svgBlip xmlns:asvg="http://schemas.microsoft.com/office/drawing/2016/SVG/main" xmlns="" r:embed="rId7"/>
+              </a:ext>
+            </a:extLst>
+          </a:blip>
+          <a:stretch>
+            <a:fillRect/>
+          </a:stretch>
+        </p:blipFill>
+        <p:spPr>
+          <a:xfrm>
+            <a:off x="1584816" y="1600200"/>
+            <a:ext cx="274320" cy="274320"/>
+          </a:xfrm>
+          <a:prstGeom prst="rect">
+            <a:avLst/>
+          </a:prstGeom>
+        </p:spPr>
+      </p:pic>
+      <p:sp>
+        <p:nvSpPr>
+          <p:cNvPr id="8" name="Rectangle 7">
+            <a:extLst>
+              <a:ext uri="{FF2B5EF4-FFF2-40B4-BE49-F238E27FC236}">
+                <a16:creationId xmlns:a16="http://schemas.microsoft.com/office/drawing/2014/main" id="{A85485B4-AA18-C048-B92A-A9A0F4372B98}"/>
+              </a:ext>
+            </a:extLst>
+          </p:cNvPr>
+          <p:cNvSpPr/>
+          <p:nvPr/>
+        </p:nvSpPr>
+        <p:spPr>
+          <a:xfrm>
+            <a:off x="1584961" y="3124200"/>
+            <a:ext cx="2468880" cy="2286000"/>
+          </a:xfrm>
+          <a:prstGeom prst="rect">
+            <a:avLst/>
+          </a:prstGeom>
+          <a:solidFill>
+            <a:srgbClr val="007CBC">
+              <a:alpha val="9804"/>
+            </a:srgbClr>
+          </a:solidFill>
+          <a:ln w="12700">
+            <a:noFill/>
+            <a:prstDash val="dash"/>
+          </a:ln>
+        </p:spPr>
+        <p:style>
+          <a:lnRef idx="2">
+            <a:schemeClr val="accent1">
+              <a:shade val="50000"/>
+            </a:schemeClr>
+          </a:lnRef>
+          <a:fillRef idx="1">
+            <a:schemeClr val="accent1"/>
+          </a:fillRef>
+          <a:effectRef idx="0">
+            <a:schemeClr val="accent1"/>
+          </a:effectRef>
+          <a:fontRef idx="minor">
+            <a:schemeClr val="lt1"/>
+          </a:fontRef>
+        </p:style>
+        <p:txBody>
+          <a:bodyPr rot="0" spcFirstLastPara="0" vertOverflow="overflow" horzOverflow="overflow" vert="horz" wrap="square" lIns="338328" tIns="45720" rIns="91440" bIns="45720" numCol="1" spcCol="0" rtlCol="0" fromWordArt="0" anchor="t" anchorCtr="0" forceAA="0" compatLnSpc="1">
+            <a:prstTxWarp prst="textNoShape">
+              <a:avLst/>
+            </a:prstTxWarp>
+            <a:noAutofit/>
+          </a:bodyPr>
+          <a:lstStyle/>
+          <a:p>
+            <a:pPr algn="l"/>
+            <a:r>
+              <a:rPr lang="en-US" sz="1200" dirty="0">
+                <a:solidFill>
+                  <a:schemeClr val="accent1"/>
+                </a:solidFill>
+                <a:latin typeface="Arial" panose="020B0604020202020204" pitchFamily="34" charset="0"/>
+                <a:ea typeface="Amazon Ember" panose="020B0603020204020204" pitchFamily="34" charset="0"/>
+                <a:cs typeface="Arial" panose="020B0604020202020204" pitchFamily="34" charset="0"/>
+              </a:rPr>
+              <a:t>Private subnet</a:t>
+            </a:r>
+          </a:p>
+          <a:p>
+            <a:pPr algn="l"/>
+            <a:endParaRPr lang="en-US" sz="1200" dirty="0">
+              <a:solidFill>
+                <a:schemeClr val="accent3"/>
+              </a:solidFill>
+              <a:latin typeface="Arial" panose="020B0604020202020204" pitchFamily="34" charset="0"/>
+              <a:ea typeface="Amazon Ember" panose="020B0603020204020204" pitchFamily="34" charset="0"/>
+              <a:cs typeface="Arial" panose="020B0604020202020204" pitchFamily="34" charset="0"/>
+            </a:endParaRPr>
+          </a:p>
+        </p:txBody>
+      </p:sp>
+      <p:pic>
+        <p:nvPicPr>
+          <p:cNvPr id="9" name="Graphic 13">
+            <a:extLst>
+              <a:ext uri="{FF2B5EF4-FFF2-40B4-BE49-F238E27FC236}">
+                <a16:creationId xmlns:a16="http://schemas.microsoft.com/office/drawing/2014/main" id="{3BD31095-C7B2-C24A-9990-6F9E14956A7B}"/>
+              </a:ext>
+            </a:extLst>
+          </p:cNvPr>
+          <p:cNvPicPr>
+            <a:picLocks noChangeAspect="1"/>
+          </p:cNvPicPr>
+          <p:nvPr/>
+        </p:nvPicPr>
+        <p:blipFill>
+          <a:blip r:embed="rId8">
+            <a:extLst>
+              <a:ext uri="{96DAC541-7B7A-43D3-8B79-37D633B846F1}">
+                <asvg:svgBlip xmlns:asvg="http://schemas.microsoft.com/office/drawing/2016/SVG/main" xmlns="" r:embed="rId9"/>
+              </a:ext>
+            </a:extLst>
+          </a:blip>
+          <a:stretch>
+            <a:fillRect/>
+          </a:stretch>
+        </p:blipFill>
+        <p:spPr>
+          <a:xfrm>
+            <a:off x="1584816" y="3129760"/>
+            <a:ext cx="274320" cy="274320"/>
+          </a:xfrm>
+          <a:prstGeom prst="rect">
+            <a:avLst/>
+          </a:prstGeom>
+        </p:spPr>
+      </p:pic>
+      <p:sp>
+        <p:nvSpPr>
+          <p:cNvPr id="10" name="Rectangle 9">
+            <a:extLst>
+              <a:ext uri="{FF2B5EF4-FFF2-40B4-BE49-F238E27FC236}">
+                <a16:creationId xmlns:a16="http://schemas.microsoft.com/office/drawing/2014/main" id="{25B2706C-95D8-A94F-9EC8-6497FA7FB136}"/>
+              </a:ext>
+            </a:extLst>
+          </p:cNvPr>
+          <p:cNvSpPr/>
+          <p:nvPr/>
+        </p:nvSpPr>
+        <p:spPr>
+          <a:xfrm>
+            <a:off x="2825531" y="1942075"/>
+            <a:ext cx="4167693" cy="978466"/>
+          </a:xfrm>
+          <a:prstGeom prst="rect">
+            <a:avLst/>
+          </a:prstGeom>
+          <a:noFill/>
+          <a:ln w="12700">
+            <a:solidFill>
+              <a:srgbClr val="D86613"/>
+            </a:solidFill>
+            <a:prstDash val="dash"/>
+          </a:ln>
+        </p:spPr>
+        <p:style>
+          <a:lnRef idx="2">
+            <a:schemeClr val="accent1">
+              <a:shade val="50000"/>
+            </a:schemeClr>
+          </a:lnRef>
+          <a:fillRef idx="1">
+            <a:schemeClr val="accent1"/>
+          </a:fillRef>
+          <a:effectRef idx="0">
+            <a:schemeClr val="accent1"/>
+          </a:effectRef>
+          <a:fontRef idx="minor">
+            <a:schemeClr val="lt1"/>
+          </a:fontRef>
+        </p:style>
+        <p:txBody>
+          <a:bodyPr rot="0" spcFirstLastPara="0" vertOverflow="overflow" horzOverflow="overflow" vert="horz" wrap="square" lIns="91440" tIns="91440" rIns="91440" bIns="45720" numCol="1" spcCol="0" rtlCol="0" fromWordArt="0" anchor="t" anchorCtr="0" forceAA="0" compatLnSpc="1">
+            <a:prstTxWarp prst="textNoShape">
+              <a:avLst/>
+            </a:prstTxWarp>
+            <a:noAutofit/>
+          </a:bodyPr>
+          <a:lstStyle/>
+          <a:p>
+            <a:pPr algn="ctr"/>
+            <a:endParaRPr lang="en-US" sz="1200" dirty="0">
+              <a:solidFill>
+                <a:srgbClr val="D86613"/>
+              </a:solidFill>
+              <a:latin typeface="Arial" panose="020B0604020202020204" pitchFamily="34" charset="0"/>
+              <a:ea typeface="Amazon Ember" panose="020B0603020204020204" pitchFamily="34" charset="0"/>
+              <a:cs typeface="Arial" panose="020B0604020202020204" pitchFamily="34" charset="0"/>
+            </a:endParaRPr>
+          </a:p>
+          <a:p>
+            <a:pPr algn="ctr"/>
+            <a:endParaRPr lang="en-US" sz="1200" dirty="0">
+              <a:solidFill>
+                <a:srgbClr val="D86613"/>
+              </a:solidFill>
+              <a:latin typeface="Arial" panose="020B0604020202020204" pitchFamily="34" charset="0"/>
+              <a:ea typeface="Amazon Ember" panose="020B0603020204020204" pitchFamily="34" charset="0"/>
+              <a:cs typeface="Arial" panose="020B0604020202020204" pitchFamily="34" charset="0"/>
+            </a:endParaRPr>
+          </a:p>
+          <a:p>
+            <a:pPr algn="ctr"/>
+            <a:r>
+              <a:rPr lang="en-US" sz="1200" dirty="0">
+                <a:solidFill>
+                  <a:srgbClr val="D86613"/>
+                </a:solidFill>
+                <a:latin typeface="Arial" panose="020B0604020202020204" pitchFamily="34" charset="0"/>
+                <a:ea typeface="Amazon Ember" panose="020B0603020204020204" pitchFamily="34" charset="0"/>
+                <a:cs typeface="Arial" panose="020B0604020202020204" pitchFamily="34" charset="0"/>
+              </a:rPr>
+              <a:t>Auto </a:t>
+            </a:r>
+            <a:r>
+              <a:rPr lang="en-US" sz="1200" dirty="0" smtClean="0">
+                <a:solidFill>
+                  <a:srgbClr val="D86613"/>
+                </a:solidFill>
+                <a:latin typeface="Arial" panose="020B0604020202020204" pitchFamily="34" charset="0"/>
+                <a:ea typeface="Amazon Ember" panose="020B0603020204020204" pitchFamily="34" charset="0"/>
+                <a:cs typeface="Arial" panose="020B0604020202020204" pitchFamily="34" charset="0"/>
+              </a:rPr>
+              <a:t>Scaling</a:t>
+            </a:r>
+          </a:p>
+          <a:p>
+            <a:pPr algn="ctr"/>
+            <a:r>
+              <a:rPr lang="en-US" sz="1200" dirty="0" smtClean="0">
+                <a:solidFill>
+                  <a:srgbClr val="D86613"/>
+                </a:solidFill>
+                <a:latin typeface="Arial" panose="020B0604020202020204" pitchFamily="34" charset="0"/>
+                <a:ea typeface="Amazon Ember" panose="020B0603020204020204" pitchFamily="34" charset="0"/>
+                <a:cs typeface="Arial" panose="020B0604020202020204" pitchFamily="34" charset="0"/>
+              </a:rPr>
+              <a:t>group</a:t>
+            </a:r>
+            <a:endParaRPr lang="en-US" sz="1200" dirty="0">
+              <a:solidFill>
+                <a:srgbClr val="D86613"/>
+              </a:solidFill>
+              <a:latin typeface="Arial" panose="020B0604020202020204" pitchFamily="34" charset="0"/>
+              <a:ea typeface="Amazon Ember" panose="020B0603020204020204" pitchFamily="34" charset="0"/>
+              <a:cs typeface="Arial" panose="020B0604020202020204" pitchFamily="34" charset="0"/>
+            </a:endParaRPr>
+          </a:p>
+        </p:txBody>
+      </p:sp>
+      <p:pic>
+        <p:nvPicPr>
+          <p:cNvPr id="11" name="Graphic 3">
+            <a:extLst>
+              <a:ext uri="{FF2B5EF4-FFF2-40B4-BE49-F238E27FC236}">
+                <a16:creationId xmlns:a16="http://schemas.microsoft.com/office/drawing/2014/main" id="{D7A7873E-A1CC-804E-816C-DC0FF152D82D}"/>
+              </a:ext>
+            </a:extLst>
+          </p:cNvPr>
+          <p:cNvPicPr>
+            <a:picLocks noChangeAspect="1"/>
+          </p:cNvPicPr>
+          <p:nvPr/>
+        </p:nvPicPr>
+        <p:blipFill>
+          <a:blip r:embed="rId10">
+            <a:extLst>
+              <a:ext uri="{96DAC541-7B7A-43D3-8B79-37D633B846F1}">
+                <asvg:svgBlip xmlns:asvg="http://schemas.microsoft.com/office/drawing/2016/SVG/main" xmlns="" r:embed="rId11"/>
+              </a:ext>
+            </a:extLst>
+          </a:blip>
+          <a:stretch>
+            <a:fillRect/>
+          </a:stretch>
+        </p:blipFill>
+        <p:spPr>
+          <a:xfrm>
+            <a:off x="4758078" y="1935264"/>
+            <a:ext cx="330200" cy="330200"/>
+          </a:xfrm>
+          <a:prstGeom prst="rect">
+            <a:avLst/>
+          </a:prstGeom>
+        </p:spPr>
+      </p:pic>
+      <p:pic>
+        <p:nvPicPr>
+          <p:cNvPr id="12" name="Graphic 135">
+            <a:extLst>
+              <a:ext uri="{FF2B5EF4-FFF2-40B4-BE49-F238E27FC236}">
+                <a16:creationId xmlns:a16="http://schemas.microsoft.com/office/drawing/2014/main" id="{C19987B1-DB3A-1640-994D-BCB81FCC1AE4}"/>
+              </a:ext>
+            </a:extLst>
+          </p:cNvPr>
+          <p:cNvPicPr>
+            <a:picLocks noChangeAspect="1"/>
+          </p:cNvPicPr>
+          <p:nvPr/>
+        </p:nvPicPr>
+        <p:blipFill>
+          <a:blip r:embed="rId12">
+            <a:extLst>
+              <a:ext uri="{96DAC541-7B7A-43D3-8B79-37D633B846F1}">
+                <asvg:svgBlip xmlns:asvg="http://schemas.microsoft.com/office/drawing/2016/SVG/main" xmlns="" r:embed="rId13"/>
+              </a:ext>
+            </a:extLst>
+          </a:blip>
+          <a:stretch>
+            <a:fillRect/>
+          </a:stretch>
+        </p:blipFill>
+        <p:spPr>
+          <a:xfrm>
+            <a:off x="3123197" y="2064381"/>
+            <a:ext cx="469900" cy="469900"/>
+          </a:xfrm>
+          <a:prstGeom prst="rect">
+            <a:avLst/>
+          </a:prstGeom>
+        </p:spPr>
+      </p:pic>
+      <p:sp>
+        <p:nvSpPr>
+          <p:cNvPr id="13" name="TextBox 12">
+            <a:extLst>
+              <a:ext uri="{FF2B5EF4-FFF2-40B4-BE49-F238E27FC236}">
+                <a16:creationId xmlns:a16="http://schemas.microsoft.com/office/drawing/2014/main" id="{F90C1CC4-DFE6-0445-BD1C-DB610E1A07F5}"/>
+              </a:ext>
+            </a:extLst>
+          </p:cNvPr>
+          <p:cNvSpPr txBox="1"/>
+          <p:nvPr/>
+        </p:nvSpPr>
+        <p:spPr>
+          <a:xfrm>
+            <a:off x="2601495" y="2540217"/>
+            <a:ext cx="1513305" cy="276999"/>
+          </a:xfrm>
+          <a:prstGeom prst="rect">
+            <a:avLst/>
+          </a:prstGeom>
+          <a:noFill/>
+        </p:spPr>
+        <p:txBody>
+          <a:bodyPr wrap="square" rtlCol="0">
+            <a:spAutoFit/>
+          </a:bodyPr>
+          <a:lstStyle/>
+          <a:p>
+            <a:pPr algn="ctr"/>
+            <a:r>
+              <a:rPr lang="en-US" sz="1200" dirty="0">
+                <a:latin typeface="Arial" panose="020B0604020202020204" pitchFamily="34" charset="0"/>
+                <a:ea typeface="Amazon Ember" panose="020B0603020204020204" pitchFamily="34" charset="0"/>
+                <a:cs typeface="Arial" panose="020B0604020202020204" pitchFamily="34" charset="0"/>
+              </a:rPr>
+              <a:t>RD Gateway</a:t>
+            </a:r>
+          </a:p>
+        </p:txBody>
+      </p:sp>
+      <p:sp>
+        <p:nvSpPr>
+          <p:cNvPr id="14" name="TextBox 13">
+            <a:extLst>
+              <a:ext uri="{FF2B5EF4-FFF2-40B4-BE49-F238E27FC236}">
+                <a16:creationId xmlns:a16="http://schemas.microsoft.com/office/drawing/2014/main" id="{517096B6-EF64-C245-A3E7-BEEF81BDCB9C}"/>
+              </a:ext>
+            </a:extLst>
+          </p:cNvPr>
+          <p:cNvSpPr txBox="1"/>
+          <p:nvPr/>
+        </p:nvSpPr>
+        <p:spPr>
+          <a:xfrm>
+            <a:off x="1665020" y="2542641"/>
+            <a:ext cx="1236442" cy="276999"/>
+          </a:xfrm>
+          <a:prstGeom prst="rect">
+            <a:avLst/>
+          </a:prstGeom>
+          <a:noFill/>
+        </p:spPr>
+        <p:txBody>
+          <a:bodyPr wrap="square" rtlCol="0">
+            <a:spAutoFit/>
+          </a:bodyPr>
+          <a:lstStyle/>
+          <a:p>
+            <a:pPr algn="ctr"/>
+            <a:r>
+              <a:rPr lang="en-US" sz="1200" dirty="0">
+                <a:latin typeface="Arial" panose="020B0604020202020204" pitchFamily="34" charset="0"/>
+                <a:ea typeface="Amazon Ember" panose="020B0603020204020204" pitchFamily="34" charset="0"/>
+                <a:cs typeface="Arial" panose="020B0604020202020204" pitchFamily="34" charset="0"/>
+              </a:rPr>
+              <a:t>NAT gateway</a:t>
+            </a:r>
+          </a:p>
+        </p:txBody>
+      </p:sp>
+      <p:pic>
+        <p:nvPicPr>
+          <p:cNvPr id="15" name="Graphic 40">
+            <a:extLst>
+              <a:ext uri="{FF2B5EF4-FFF2-40B4-BE49-F238E27FC236}">
+                <a16:creationId xmlns:a16="http://schemas.microsoft.com/office/drawing/2014/main" id="{C322592C-EAB9-0640-95A5-D8FF5B8E5FE6}"/>
+              </a:ext>
+            </a:extLst>
+          </p:cNvPr>
+          <p:cNvPicPr>
+            <a:picLocks noChangeAspect="1"/>
+          </p:cNvPicPr>
+          <p:nvPr/>
+        </p:nvPicPr>
+        <p:blipFill>
+          <a:blip r:embed="rId14">
+            <a:extLst>
+              <a:ext uri="{96DAC541-7B7A-43D3-8B79-37D633B846F1}">
+                <asvg:svgBlip xmlns:asvg="http://schemas.microsoft.com/office/drawing/2016/SVG/main" xmlns="" r:embed="rId17"/>
+              </a:ext>
+            </a:extLst>
+          </a:blip>
+          <a:stretch>
+            <a:fillRect/>
+          </a:stretch>
+        </p:blipFill>
+        <p:spPr>
+          <a:xfrm>
+            <a:off x="2048291" y="2064381"/>
+            <a:ext cx="469900" cy="469900"/>
+          </a:xfrm>
+          <a:prstGeom prst="rect">
+            <a:avLst/>
+          </a:prstGeom>
+        </p:spPr>
+      </p:pic>
+      <p:pic>
+        <p:nvPicPr>
+          <p:cNvPr id="16" name="Graphic 135">
+            <a:extLst>
+              <a:ext uri="{FF2B5EF4-FFF2-40B4-BE49-F238E27FC236}">
+                <a16:creationId xmlns:a16="http://schemas.microsoft.com/office/drawing/2014/main" id="{C19987B1-DB3A-1640-994D-BCB81FCC1AE4}"/>
+              </a:ext>
+            </a:extLst>
+          </p:cNvPr>
+          <p:cNvPicPr>
+            <a:picLocks noChangeAspect="1"/>
+          </p:cNvPicPr>
+          <p:nvPr/>
+        </p:nvPicPr>
+        <p:blipFill>
+          <a:blip r:embed="rId12">
+            <a:extLst>
+              <a:ext uri="{96DAC541-7B7A-43D3-8B79-37D633B846F1}">
+                <asvg:svgBlip xmlns:asvg="http://schemas.microsoft.com/office/drawing/2016/SVG/main" xmlns="" r:embed="rId13"/>
+              </a:ext>
+            </a:extLst>
+          </a:blip>
+          <a:stretch>
+            <a:fillRect/>
+          </a:stretch>
+        </p:blipFill>
+        <p:spPr>
+          <a:xfrm>
+            <a:off x="3112502" y="3429631"/>
+            <a:ext cx="469900" cy="469900"/>
+          </a:xfrm>
+          <a:prstGeom prst="rect">
+            <a:avLst/>
+          </a:prstGeom>
+        </p:spPr>
+      </p:pic>
+      <p:sp>
+        <p:nvSpPr>
+          <p:cNvPr id="17" name="TextBox 16">
+            <a:extLst>
+              <a:ext uri="{FF2B5EF4-FFF2-40B4-BE49-F238E27FC236}">
+                <a16:creationId xmlns:a16="http://schemas.microsoft.com/office/drawing/2014/main" id="{F90C1CC4-DFE6-0445-BD1C-DB610E1A07F5}"/>
+              </a:ext>
+            </a:extLst>
+          </p:cNvPr>
+          <p:cNvSpPr txBox="1"/>
+          <p:nvPr/>
+        </p:nvSpPr>
+        <p:spPr>
+          <a:xfrm>
+            <a:off x="2590800" y="3862138"/>
+            <a:ext cx="1513305" cy="276999"/>
+          </a:xfrm>
+          <a:prstGeom prst="rect">
+            <a:avLst/>
+          </a:prstGeom>
+          <a:noFill/>
+        </p:spPr>
+        <p:txBody>
+          <a:bodyPr wrap="square" rtlCol="0">
+            <a:spAutoFit/>
+          </a:bodyPr>
+          <a:lstStyle/>
+          <a:p>
+            <a:pPr algn="ctr"/>
+            <a:r>
+              <a:rPr lang="en-US" sz="1200" dirty="0" smtClean="0">
+                <a:latin typeface="Arial" panose="020B0604020202020204" pitchFamily="34" charset="0"/>
+                <a:ea typeface="Amazon Ember" panose="020B0603020204020204" pitchFamily="34" charset="0"/>
+                <a:cs typeface="Arial" panose="020B0604020202020204" pitchFamily="34" charset="0"/>
+              </a:rPr>
+              <a:t>Domain controller</a:t>
+            </a:r>
+            <a:endParaRPr lang="en-US" sz="1200" dirty="0">
+              <a:latin typeface="Arial" panose="020B0604020202020204" pitchFamily="34" charset="0"/>
+              <a:ea typeface="Amazon Ember" panose="020B0603020204020204" pitchFamily="34" charset="0"/>
+              <a:cs typeface="Arial" panose="020B0604020202020204" pitchFamily="34" charset="0"/>
+            </a:endParaRPr>
+          </a:p>
+        </p:txBody>
+      </p:sp>
+      <p:grpSp>
+        <p:nvGrpSpPr>
+          <p:cNvPr id="2" name="Group 1"/>
+          <p:cNvGrpSpPr/>
+          <p:nvPr/>
+        </p:nvGrpSpPr>
+        <p:grpSpPr>
+          <a:xfrm>
+            <a:off x="8242277" y="1600200"/>
+            <a:ext cx="2297380" cy="2351559"/>
+            <a:chOff x="7788965" y="1975995"/>
+            <a:chExt cx="2297380" cy="2351559"/>
+          </a:xfrm>
+        </p:grpSpPr>
+        <p:pic>
+          <p:nvPicPr>
+            <p:cNvPr id="28" name="Graphic 17">
+              <a:extLst>
+                <a:ext uri="{FF2B5EF4-FFF2-40B4-BE49-F238E27FC236}">
+                  <a16:creationId xmlns:a16="http://schemas.microsoft.com/office/drawing/2014/main" id="{633BC3DF-5160-6843-B872-94C5C92E5BF4}"/>
+                </a:ext>
+              </a:extLst>
+            </p:cNvPr>
+            <p:cNvPicPr>
+              <a:picLocks noChangeAspect="1" noChangeArrowheads="1"/>
+            </p:cNvPicPr>
+            <p:nvPr/>
+          </p:nvPicPr>
+          <p:blipFill>
+            <a:blip r:embed="rId18" cstate="print">
+              <a:extLst>
+                <a:ext uri="{28A0092B-C50C-407E-A947-70E740481C1C}">
+                  <a14:useLocalDpi xmlns:a14="http://schemas.microsoft.com/office/drawing/2010/main" val="0"/>
+                </a:ext>
+              </a:extLst>
+            </a:blip>
+            <a:srcRect/>
+            <a:stretch>
+              <a:fillRect/>
+            </a:stretch>
+          </p:blipFill>
+          <p:spPr bwMode="auto">
+            <a:xfrm>
+              <a:off x="8546202" y="1975995"/>
+              <a:ext cx="762000" cy="762000"/>
+            </a:xfrm>
+            <a:prstGeom prst="rect">
+              <a:avLst/>
+            </a:prstGeom>
+            <a:noFill/>
+            <a:ln>
+              <a:noFill/>
+            </a:ln>
+            <a:extLst>
+              <a:ext uri="{909E8E84-426E-40DD-AFC4-6F175D3DCCD1}">
+                <a14:hiddenFill xmlns:a14="http://schemas.microsoft.com/office/drawing/2010/main">
+                  <a:solidFill>
+                    <a:srgbClr val="FFFFFF"/>
+                  </a:solidFill>
+                </a14:hiddenFill>
+              </a:ext>
+              <a:ext uri="{91240B29-F687-4F45-9708-019B960494DF}">
+                <a14:hiddenLine xmlns:a14="http://schemas.microsoft.com/office/drawing/2010/main" w="9525">
+                  <a:solidFill>
+                    <a:srgbClr val="000000"/>
+                  </a:solidFill>
+                  <a:miter lim="800000"/>
+                  <a:headEnd/>
+                  <a:tailEnd/>
+                </a14:hiddenLine>
+              </a:ext>
+            </a:extLst>
+          </p:spPr>
+        </p:pic>
+        <p:sp>
+          <p:nvSpPr>
+            <p:cNvPr id="29" name="TextBox 11">
+              <a:extLst>
+                <a:ext uri="{FF2B5EF4-FFF2-40B4-BE49-F238E27FC236}">
+                  <a16:creationId xmlns:a16="http://schemas.microsoft.com/office/drawing/2014/main" id="{BBEC601B-D650-7947-9D7F-6579E2990B06}"/>
+                </a:ext>
+              </a:extLst>
+            </p:cNvPr>
+            <p:cNvSpPr txBox="1">
+              <a:spLocks noChangeArrowheads="1"/>
+            </p:cNvSpPr>
+            <p:nvPr/>
+          </p:nvSpPr>
+          <p:spPr bwMode="auto">
+            <a:xfrm>
+              <a:off x="7788965" y="2737995"/>
+              <a:ext cx="2292350" cy="276999"/>
+            </a:xfrm>
+            <a:prstGeom prst="rect">
+              <a:avLst/>
+            </a:prstGeom>
+            <a:noFill/>
+            <a:ln>
+              <a:noFill/>
+            </a:ln>
+            <a:extLst>
+              <a:ext uri="{909E8E84-426E-40DD-AFC4-6F175D3DCCD1}">
+                <a14:hiddenFill xmlns:a14="http://schemas.microsoft.com/office/drawing/2010/main">
+                  <a:solidFill>
+                    <a:srgbClr val="FFFFFF"/>
+                  </a:solidFill>
+                </a14:hiddenFill>
+              </a:ext>
+              <a:ext uri="{91240B29-F687-4F45-9708-019B960494DF}">
+                <a14:hiddenLine xmlns:a14="http://schemas.microsoft.com/office/drawing/2010/main" w="9525">
+                  <a:solidFill>
+                    <a:srgbClr val="000000"/>
+                  </a:solidFill>
+                  <a:miter lim="800000"/>
+                  <a:headEnd/>
+                  <a:tailEnd/>
+                </a14:hiddenLine>
+              </a:ext>
+            </a:extLst>
+          </p:spPr>
+          <p:txBody>
+            <a:bodyPr>
+              <a:spAutoFit/>
+            </a:bodyPr>
+            <a:lstStyle>
+              <a:lvl1pPr>
+                <a:defRPr>
+                  <a:solidFill>
+                    <a:schemeClr val="tx1"/>
+                  </a:solidFill>
+                  <a:latin typeface="Calibri" panose="020F0502020204030204" pitchFamily="34" charset="0"/>
+                </a:defRPr>
+              </a:lvl1pPr>
+              <a:lvl2pPr marL="742950" indent="-285750">
+                <a:defRPr>
+                  <a:solidFill>
+                    <a:schemeClr val="tx1"/>
+                  </a:solidFill>
+                  <a:latin typeface="Calibri" panose="020F0502020204030204" pitchFamily="34" charset="0"/>
+                </a:defRPr>
+              </a:lvl2pPr>
+              <a:lvl3pPr marL="1143000" indent="-228600">
+                <a:defRPr>
+                  <a:solidFill>
+                    <a:schemeClr val="tx1"/>
+                  </a:solidFill>
+                  <a:latin typeface="Calibri" panose="020F0502020204030204" pitchFamily="34" charset="0"/>
+                </a:defRPr>
+              </a:lvl3pPr>
+              <a:lvl4pPr marL="1600200" indent="-228600">
+                <a:defRPr>
+                  <a:solidFill>
+                    <a:schemeClr val="tx1"/>
+                  </a:solidFill>
+                  <a:latin typeface="Calibri" panose="020F0502020204030204" pitchFamily="34" charset="0"/>
+                </a:defRPr>
+              </a:lvl4pPr>
+              <a:lvl5pPr marL="2057400" indent="-228600">
+                <a:defRPr>
+                  <a:solidFill>
+                    <a:schemeClr val="tx1"/>
+                  </a:solidFill>
+                  <a:latin typeface="Calibri" panose="020F0502020204030204" pitchFamily="34" charset="0"/>
+                </a:defRPr>
+              </a:lvl5pPr>
+              <a:lvl6pPr marL="2514600" indent="-228600" eaLnBrk="0" fontAlgn="base" hangingPunct="0">
+                <a:spcBef>
+                  <a:spcPct val="0"/>
+                </a:spcBef>
+                <a:spcAft>
+                  <a:spcPct val="0"/>
+                </a:spcAft>
+                <a:defRPr>
+                  <a:solidFill>
+                    <a:schemeClr val="tx1"/>
+                  </a:solidFill>
+                  <a:latin typeface="Calibri" panose="020F0502020204030204" pitchFamily="34" charset="0"/>
+                </a:defRPr>
+              </a:lvl6pPr>
+              <a:lvl7pPr marL="2971800" indent="-228600" eaLnBrk="0" fontAlgn="base" hangingPunct="0">
+                <a:spcBef>
+                  <a:spcPct val="0"/>
+                </a:spcBef>
+                <a:spcAft>
+                  <a:spcPct val="0"/>
+                </a:spcAft>
+                <a:defRPr>
+                  <a:solidFill>
+                    <a:schemeClr val="tx1"/>
+                  </a:solidFill>
+                  <a:latin typeface="Calibri" panose="020F0502020204030204" pitchFamily="34" charset="0"/>
+                </a:defRPr>
+              </a:lvl7pPr>
+              <a:lvl8pPr marL="3429000" indent="-228600" eaLnBrk="0" fontAlgn="base" hangingPunct="0">
+                <a:spcBef>
+                  <a:spcPct val="0"/>
+                </a:spcBef>
+                <a:spcAft>
+                  <a:spcPct val="0"/>
+                </a:spcAft>
+                <a:defRPr>
+                  <a:solidFill>
+                    <a:schemeClr val="tx1"/>
+                  </a:solidFill>
+                  <a:latin typeface="Calibri" panose="020F0502020204030204" pitchFamily="34" charset="0"/>
+                </a:defRPr>
+              </a:lvl8pPr>
+              <a:lvl9pPr marL="3886200" indent="-228600" eaLnBrk="0" fontAlgn="base" hangingPunct="0">
+                <a:spcBef>
+                  <a:spcPct val="0"/>
+                </a:spcBef>
+                <a:spcAft>
+                  <a:spcPct val="0"/>
+                </a:spcAft>
+                <a:defRPr>
+                  <a:solidFill>
+                    <a:schemeClr val="tx1"/>
+                  </a:solidFill>
+                  <a:latin typeface="Calibri" panose="020F0502020204030204" pitchFamily="34" charset="0"/>
+                </a:defRPr>
+              </a:lvl9pPr>
+            </a:lstStyle>
+            <a:p>
+              <a:pPr algn="ctr" eaLnBrk="1" hangingPunct="1"/>
+              <a:r>
+                <a:rPr lang="en-US" altLang="en-US" sz="1200" dirty="0">
+                  <a:latin typeface="Arial" panose="020B0604020202020204" pitchFamily="34" charset="0"/>
+                  <a:ea typeface="Amazon Ember" panose="020B0603020204020204" pitchFamily="34" charset="0"/>
+                  <a:cs typeface="Arial" panose="020B0604020202020204" pitchFamily="34" charset="0"/>
+                </a:rPr>
+                <a:t>AWS Secrets Manager</a:t>
+              </a:r>
+            </a:p>
+          </p:txBody>
+        </p:sp>
+        <p:pic>
+          <p:nvPicPr>
+            <p:cNvPr id="30" name="Graphic 15">
+              <a:extLst>
+                <a:ext uri="{FF2B5EF4-FFF2-40B4-BE49-F238E27FC236}">
+                  <a16:creationId xmlns:a16="http://schemas.microsoft.com/office/drawing/2014/main" id="{3A010F8A-DF9B-CA43-8D41-3A122544E272}"/>
+                </a:ext>
+              </a:extLst>
+            </p:cNvPr>
+            <p:cNvPicPr>
+              <a:picLocks noChangeAspect="1" noChangeArrowheads="1"/>
+            </p:cNvPicPr>
+            <p:nvPr/>
+          </p:nvPicPr>
+          <p:blipFill>
+            <a:blip r:embed="rId19" cstate="print">
+              <a:extLst>
+                <a:ext uri="{28A0092B-C50C-407E-A947-70E740481C1C}">
+                  <a14:useLocalDpi xmlns:a14="http://schemas.microsoft.com/office/drawing/2010/main" val="0"/>
+                </a:ext>
+              </a:extLst>
+            </a:blip>
+            <a:srcRect/>
+            <a:stretch>
+              <a:fillRect/>
+            </a:stretch>
+          </p:blipFill>
+          <p:spPr bwMode="auto">
+            <a:xfrm>
+              <a:off x="8552820" y="3297362"/>
+              <a:ext cx="762000" cy="762000"/>
+            </a:xfrm>
+            <a:prstGeom prst="rect">
+              <a:avLst/>
+            </a:prstGeom>
+            <a:noFill/>
+            <a:ln>
+              <a:noFill/>
+            </a:ln>
+            <a:extLst>
+              <a:ext uri="{909E8E84-426E-40DD-AFC4-6F175D3DCCD1}">
+                <a14:hiddenFill xmlns:a14="http://schemas.microsoft.com/office/drawing/2010/main">
+                  <a:solidFill>
+                    <a:srgbClr val="FFFFFF"/>
+                  </a:solidFill>
+                </a14:hiddenFill>
+              </a:ext>
+              <a:ext uri="{91240B29-F687-4F45-9708-019B960494DF}">
+                <a14:hiddenLine xmlns:a14="http://schemas.microsoft.com/office/drawing/2010/main" w="9525">
+                  <a:solidFill>
+                    <a:srgbClr val="000000"/>
+                  </a:solidFill>
+                  <a:miter lim="800000"/>
+                  <a:headEnd/>
+                  <a:tailEnd/>
+                </a14:hiddenLine>
+              </a:ext>
+            </a:extLst>
+          </p:spPr>
+        </p:pic>
+        <p:sp>
+          <p:nvSpPr>
+            <p:cNvPr id="31" name="TextBox 11">
+              <a:extLst>
+                <a:ext uri="{FF2B5EF4-FFF2-40B4-BE49-F238E27FC236}">
+                  <a16:creationId xmlns:a16="http://schemas.microsoft.com/office/drawing/2014/main" id="{EE7EF599-CC93-1843-94CE-F010641A8D23}"/>
+                </a:ext>
+              </a:extLst>
+            </p:cNvPr>
+            <p:cNvSpPr txBox="1">
+              <a:spLocks noChangeArrowheads="1"/>
+            </p:cNvSpPr>
+            <p:nvPr/>
+          </p:nvSpPr>
+          <p:spPr bwMode="auto">
+            <a:xfrm>
+              <a:off x="7793995" y="4050555"/>
+              <a:ext cx="2292350" cy="276999"/>
+            </a:xfrm>
+            <a:prstGeom prst="rect">
+              <a:avLst/>
+            </a:prstGeom>
+            <a:noFill/>
+            <a:ln>
+              <a:noFill/>
+            </a:ln>
+            <a:extLst>
+              <a:ext uri="{909E8E84-426E-40DD-AFC4-6F175D3DCCD1}">
+                <a14:hiddenFill xmlns:a14="http://schemas.microsoft.com/office/drawing/2010/main">
+                  <a:solidFill>
+                    <a:srgbClr val="FFFFFF"/>
+                  </a:solidFill>
+                </a14:hiddenFill>
+              </a:ext>
+              <a:ext uri="{91240B29-F687-4F45-9708-019B960494DF}">
+                <a14:hiddenLine xmlns:a14="http://schemas.microsoft.com/office/drawing/2010/main" w="9525">
+                  <a:solidFill>
+                    <a:srgbClr val="000000"/>
+                  </a:solidFill>
+                  <a:miter lim="800000"/>
+                  <a:headEnd/>
+                  <a:tailEnd/>
+                </a14:hiddenLine>
+              </a:ext>
+            </a:extLst>
+          </p:spPr>
+          <p:txBody>
+            <a:bodyPr>
+              <a:spAutoFit/>
+            </a:bodyPr>
+            <a:lstStyle>
+              <a:lvl1pPr>
+                <a:defRPr>
+                  <a:solidFill>
+                    <a:schemeClr val="tx1"/>
+                  </a:solidFill>
+                  <a:latin typeface="Calibri" panose="020F0502020204030204" pitchFamily="34" charset="0"/>
+                </a:defRPr>
+              </a:lvl1pPr>
+              <a:lvl2pPr marL="742950" indent="-285750">
+                <a:defRPr>
+                  <a:solidFill>
+                    <a:schemeClr val="tx1"/>
+                  </a:solidFill>
+                  <a:latin typeface="Calibri" panose="020F0502020204030204" pitchFamily="34" charset="0"/>
+                </a:defRPr>
+              </a:lvl2pPr>
+              <a:lvl3pPr marL="1143000" indent="-228600">
+                <a:defRPr>
+                  <a:solidFill>
+                    <a:schemeClr val="tx1"/>
+                  </a:solidFill>
+                  <a:latin typeface="Calibri" panose="020F0502020204030204" pitchFamily="34" charset="0"/>
+                </a:defRPr>
+              </a:lvl3pPr>
+              <a:lvl4pPr marL="1600200" indent="-228600">
+                <a:defRPr>
+                  <a:solidFill>
+                    <a:schemeClr val="tx1"/>
+                  </a:solidFill>
+                  <a:latin typeface="Calibri" panose="020F0502020204030204" pitchFamily="34" charset="0"/>
+                </a:defRPr>
+              </a:lvl4pPr>
+              <a:lvl5pPr marL="2057400" indent="-228600">
+                <a:defRPr>
+                  <a:solidFill>
+                    <a:schemeClr val="tx1"/>
+                  </a:solidFill>
+                  <a:latin typeface="Calibri" panose="020F0502020204030204" pitchFamily="34" charset="0"/>
+                </a:defRPr>
+              </a:lvl5pPr>
+              <a:lvl6pPr marL="2514600" indent="-228600" eaLnBrk="0" fontAlgn="base" hangingPunct="0">
+                <a:spcBef>
+                  <a:spcPct val="0"/>
+                </a:spcBef>
+                <a:spcAft>
+                  <a:spcPct val="0"/>
+                </a:spcAft>
+                <a:defRPr>
+                  <a:solidFill>
+                    <a:schemeClr val="tx1"/>
+                  </a:solidFill>
+                  <a:latin typeface="Calibri" panose="020F0502020204030204" pitchFamily="34" charset="0"/>
+                </a:defRPr>
+              </a:lvl6pPr>
+              <a:lvl7pPr marL="2971800" indent="-228600" eaLnBrk="0" fontAlgn="base" hangingPunct="0">
+                <a:spcBef>
+                  <a:spcPct val="0"/>
+                </a:spcBef>
+                <a:spcAft>
+                  <a:spcPct val="0"/>
+                </a:spcAft>
+                <a:defRPr>
+                  <a:solidFill>
+                    <a:schemeClr val="tx1"/>
+                  </a:solidFill>
+                  <a:latin typeface="Calibri" panose="020F0502020204030204" pitchFamily="34" charset="0"/>
+                </a:defRPr>
+              </a:lvl7pPr>
+              <a:lvl8pPr marL="3429000" indent="-228600" eaLnBrk="0" fontAlgn="base" hangingPunct="0">
+                <a:spcBef>
+                  <a:spcPct val="0"/>
+                </a:spcBef>
+                <a:spcAft>
+                  <a:spcPct val="0"/>
+                </a:spcAft>
+                <a:defRPr>
+                  <a:solidFill>
+                    <a:schemeClr val="tx1"/>
+                  </a:solidFill>
+                  <a:latin typeface="Calibri" panose="020F0502020204030204" pitchFamily="34" charset="0"/>
+                </a:defRPr>
+              </a:lvl8pPr>
+              <a:lvl9pPr marL="3886200" indent="-228600" eaLnBrk="0" fontAlgn="base" hangingPunct="0">
+                <a:spcBef>
+                  <a:spcPct val="0"/>
+                </a:spcBef>
+                <a:spcAft>
+                  <a:spcPct val="0"/>
+                </a:spcAft>
+                <a:defRPr>
+                  <a:solidFill>
+                    <a:schemeClr val="tx1"/>
+                  </a:solidFill>
+                  <a:latin typeface="Calibri" panose="020F0502020204030204" pitchFamily="34" charset="0"/>
+                </a:defRPr>
+              </a:lvl9pPr>
+            </a:lstStyle>
+            <a:p>
+              <a:pPr algn="ctr" eaLnBrk="1" hangingPunct="1"/>
+              <a:r>
+                <a:rPr lang="en-US" altLang="en-US" sz="1200" dirty="0">
+                  <a:latin typeface="Arial" panose="020B0604020202020204" pitchFamily="34" charset="0"/>
+                  <a:ea typeface="Amazon Ember" panose="020B0603020204020204" pitchFamily="34" charset="0"/>
+                  <a:cs typeface="Arial" panose="020B0604020202020204" pitchFamily="34" charset="0"/>
+                </a:rPr>
+                <a:t>AWS Systems Manager</a:t>
+              </a:r>
+            </a:p>
+          </p:txBody>
+        </p:sp>
+      </p:grpSp>
+      <p:sp>
+        <p:nvSpPr>
+          <p:cNvPr id="39" name="Rectangle 38">
+            <a:extLst>
+              <a:ext uri="{FF2B5EF4-FFF2-40B4-BE49-F238E27FC236}">
+                <a16:creationId xmlns:a16="http://schemas.microsoft.com/office/drawing/2014/main" id="{34D72B91-09F3-9A42-B66A-106F01CCE8B4}"/>
+              </a:ext>
+            </a:extLst>
+          </p:cNvPr>
+          <p:cNvSpPr/>
+          <p:nvPr/>
+        </p:nvSpPr>
+        <p:spPr>
+          <a:xfrm>
+            <a:off x="1044620" y="1214882"/>
+            <a:ext cx="7489780" cy="4265314"/>
+          </a:xfrm>
+          <a:prstGeom prst="rect">
+            <a:avLst/>
+          </a:prstGeom>
+          <a:noFill/>
+          <a:ln w="12700">
+            <a:solidFill>
+              <a:srgbClr val="1E8900"/>
+            </a:solidFill>
+          </a:ln>
+        </p:spPr>
+        <p:style>
+          <a:lnRef idx="2">
+            <a:schemeClr val="accent1">
+              <a:shade val="50000"/>
+            </a:schemeClr>
+          </a:lnRef>
+          <a:fillRef idx="1">
+            <a:schemeClr val="accent1"/>
+          </a:fillRef>
+          <a:effectRef idx="0">
+            <a:schemeClr val="accent1"/>
+          </a:effectRef>
+          <a:fontRef idx="minor">
+            <a:schemeClr val="lt1"/>
+          </a:fontRef>
+        </p:style>
+        <p:txBody>
+          <a:bodyPr lIns="457200" tIns="91440"/>
+          <a:lstStyle/>
+          <a:p>
+            <a:pPr eaLnBrk="1" fontAlgn="auto" hangingPunct="1">
+              <a:spcBef>
+                <a:spcPts val="0"/>
+              </a:spcBef>
+              <a:spcAft>
+                <a:spcPts val="0"/>
+              </a:spcAft>
+              <a:defRPr/>
+            </a:pPr>
+            <a:r>
+              <a:rPr lang="en-US" sz="1200" dirty="0">
+                <a:ln w="0"/>
+                <a:solidFill>
+                  <a:srgbClr val="1E8900"/>
+                </a:solidFill>
+                <a:latin typeface="Arial" panose="020B0604020202020204" pitchFamily="34" charset="0"/>
+                <a:cs typeface="Arial" panose="020B0604020202020204" pitchFamily="34" charset="0"/>
+              </a:rPr>
+              <a:t>VPC</a:t>
+            </a:r>
+          </a:p>
+        </p:txBody>
+      </p:sp>
+      <p:pic>
+        <p:nvPicPr>
+          <p:cNvPr id="40" name="Graphic 28">
+            <a:extLst>
+              <a:ext uri="{FF2B5EF4-FFF2-40B4-BE49-F238E27FC236}">
+                <a16:creationId xmlns:a16="http://schemas.microsoft.com/office/drawing/2014/main" id="{88C69878-A4A8-CE45-B624-0223CB16619E}"/>
+              </a:ext>
+            </a:extLst>
+          </p:cNvPr>
+          <p:cNvPicPr>
+            <a:picLocks noChangeAspect="1" noChangeArrowheads="1"/>
+          </p:cNvPicPr>
+          <p:nvPr/>
+        </p:nvPicPr>
+        <p:blipFill>
+          <a:blip r:embed="rId20" cstate="print">
+            <a:extLst>
+              <a:ext uri="{28A0092B-C50C-407E-A947-70E740481C1C}">
+                <a14:useLocalDpi xmlns:a14="http://schemas.microsoft.com/office/drawing/2010/main" val="0"/>
+              </a:ext>
+            </a:extLst>
+          </a:blip>
+          <a:srcRect/>
+          <a:stretch>
+            <a:fillRect/>
+          </a:stretch>
+        </p:blipFill>
+        <p:spPr bwMode="auto">
+          <a:xfrm>
+            <a:off x="1044620" y="1214882"/>
+            <a:ext cx="330200" cy="330200"/>
+          </a:xfrm>
+          <a:prstGeom prst="rect">
+            <a:avLst/>
+          </a:prstGeom>
+          <a:noFill/>
+          <a:ln>
+            <a:noFill/>
+          </a:ln>
+          <a:extLst>
+            <a:ext uri="{909E8E84-426E-40DD-AFC4-6F175D3DCCD1}">
+              <a14:hiddenFill xmlns:a14="http://schemas.microsoft.com/office/drawing/2010/main">
+                <a:solidFill>
+                  <a:srgbClr val="FFFFFF"/>
+                </a:solidFill>
+              </a14:hiddenFill>
+            </a:ext>
+            <a:ext uri="{91240B29-F687-4F45-9708-019B960494DF}">
+              <a14:hiddenLine xmlns:a14="http://schemas.microsoft.com/office/drawing/2010/main" w="9525">
+                <a:solidFill>
+                  <a:srgbClr val="000000"/>
+                </a:solidFill>
+                <a:miter lim="800000"/>
+                <a:headEnd/>
+                <a:tailEnd/>
+              </a14:hiddenLine>
+            </a:ext>
+          </a:extLst>
+        </p:spPr>
+      </p:pic>
+      <p:sp>
+        <p:nvSpPr>
+          <p:cNvPr id="41" name="Rectangle 40">
+            <a:extLst>
+              <a:ext uri="{FF2B5EF4-FFF2-40B4-BE49-F238E27FC236}">
+                <a16:creationId xmlns:a16="http://schemas.microsoft.com/office/drawing/2014/main" id="{D246DAA1-0260-E449-8CA2-92FF0101149D}"/>
+              </a:ext>
+            </a:extLst>
+          </p:cNvPr>
+          <p:cNvSpPr/>
+          <p:nvPr/>
+        </p:nvSpPr>
+        <p:spPr>
+          <a:xfrm>
+            <a:off x="1447801" y="863600"/>
+            <a:ext cx="2743200" cy="4736592"/>
+          </a:xfrm>
+          <a:prstGeom prst="rect">
+            <a:avLst/>
+          </a:prstGeom>
+          <a:noFill/>
+          <a:ln w="12700">
+            <a:solidFill>
+              <a:srgbClr val="5B9CD5"/>
+            </a:solidFill>
+            <a:prstDash val="dash"/>
+          </a:ln>
+        </p:spPr>
+        <p:style>
+          <a:lnRef idx="2">
+            <a:schemeClr val="accent1">
+              <a:shade val="50000"/>
+            </a:schemeClr>
+          </a:lnRef>
+          <a:fillRef idx="1">
+            <a:schemeClr val="accent1"/>
+          </a:fillRef>
+          <a:effectRef idx="0">
+            <a:schemeClr val="accent1"/>
+          </a:effectRef>
+          <a:fontRef idx="minor">
+            <a:schemeClr val="lt1"/>
+          </a:fontRef>
+        </p:style>
+        <p:txBody>
+          <a:bodyPr tIns="91440"/>
+          <a:lstStyle/>
+          <a:p>
+            <a:pPr algn="ctr" eaLnBrk="1" fontAlgn="auto" hangingPunct="1">
+              <a:spcBef>
+                <a:spcPts val="0"/>
+              </a:spcBef>
+              <a:spcAft>
+                <a:spcPts val="0"/>
+              </a:spcAft>
+              <a:defRPr/>
+            </a:pPr>
+            <a:r>
+              <a:rPr lang="en-US" sz="1200">
+                <a:solidFill>
+                  <a:srgbClr val="5B9CD5"/>
+                </a:solidFill>
+                <a:latin typeface="Arial" panose="020B0604020202020204" pitchFamily="34" charset="0"/>
+                <a:cs typeface="Arial" panose="020B0604020202020204" pitchFamily="34" charset="0"/>
+              </a:rPr>
+              <a:t>Availability </a:t>
+            </a:r>
+            <a:r>
+              <a:rPr lang="en-US" sz="1200" smtClean="0">
+                <a:solidFill>
+                  <a:srgbClr val="5B9CD5"/>
+                </a:solidFill>
+                <a:latin typeface="Arial" panose="020B0604020202020204" pitchFamily="34" charset="0"/>
+                <a:cs typeface="Arial" panose="020B0604020202020204" pitchFamily="34" charset="0"/>
+              </a:rPr>
+              <a:t>Zone 1</a:t>
+            </a:r>
+            <a:endParaRPr lang="en-US" sz="1200" dirty="0">
+              <a:solidFill>
+                <a:srgbClr val="5B9CD5"/>
+              </a:solidFill>
+              <a:latin typeface="Arial" panose="020B0604020202020204" pitchFamily="34" charset="0"/>
+              <a:cs typeface="Arial" panose="020B0604020202020204" pitchFamily="34" charset="0"/>
+            </a:endParaRPr>
+          </a:p>
+        </p:txBody>
+      </p:sp>
+      <p:pic>
+        <p:nvPicPr>
+          <p:cNvPr id="43" name="Graphic 135">
+            <a:extLst>
+              <a:ext uri="{FF2B5EF4-FFF2-40B4-BE49-F238E27FC236}">
+                <a16:creationId xmlns:a16="http://schemas.microsoft.com/office/drawing/2014/main" id="{C19987B1-DB3A-1640-994D-BCB81FCC1AE4}"/>
+              </a:ext>
+            </a:extLst>
+          </p:cNvPr>
+          <p:cNvPicPr>
+            <a:picLocks noChangeAspect="1"/>
+          </p:cNvPicPr>
+          <p:nvPr/>
+        </p:nvPicPr>
+        <p:blipFill>
+          <a:blip r:embed="rId12">
+            <a:extLst>
+              <a:ext uri="{96DAC541-7B7A-43D3-8B79-37D633B846F1}">
+                <asvg:svgBlip xmlns:asvg="http://schemas.microsoft.com/office/drawing/2016/SVG/main" xmlns="" r:embed="rId13"/>
+              </a:ext>
+            </a:extLst>
+          </a:blip>
+          <a:stretch>
+            <a:fillRect/>
+          </a:stretch>
+        </p:blipFill>
+        <p:spPr>
+          <a:xfrm>
+            <a:off x="3112502" y="4191631"/>
+            <a:ext cx="469900" cy="469900"/>
+          </a:xfrm>
+          <a:prstGeom prst="rect">
+            <a:avLst/>
+          </a:prstGeom>
+        </p:spPr>
+      </p:pic>
+      <p:sp>
+        <p:nvSpPr>
+          <p:cNvPr id="44" name="TextBox 43">
+            <a:extLst>
+              <a:ext uri="{FF2B5EF4-FFF2-40B4-BE49-F238E27FC236}">
+                <a16:creationId xmlns:a16="http://schemas.microsoft.com/office/drawing/2014/main" id="{F90C1CC4-DFE6-0445-BD1C-DB610E1A07F5}"/>
+              </a:ext>
+            </a:extLst>
+          </p:cNvPr>
+          <p:cNvSpPr txBox="1"/>
+          <p:nvPr/>
+        </p:nvSpPr>
+        <p:spPr>
+          <a:xfrm>
+            <a:off x="2590800" y="4624138"/>
+            <a:ext cx="1513305" cy="646331"/>
+          </a:xfrm>
+          <a:prstGeom prst="rect">
+            <a:avLst/>
+          </a:prstGeom>
+          <a:noFill/>
+        </p:spPr>
+        <p:txBody>
+          <a:bodyPr wrap="square" rtlCol="0">
+            <a:spAutoFit/>
+          </a:bodyPr>
+          <a:lstStyle/>
+          <a:p>
+            <a:pPr algn="ctr"/>
+            <a:r>
+              <a:rPr lang="en-US" sz="1200" dirty="0" smtClean="0">
+                <a:latin typeface="Arial" panose="020B0604020202020204" pitchFamily="34" charset="0"/>
+                <a:ea typeface="Amazon Ember" panose="020B0603020204020204" pitchFamily="34" charset="0"/>
+                <a:cs typeface="Arial" panose="020B0604020202020204" pitchFamily="34" charset="0"/>
+              </a:rPr>
+              <a:t>SQL Server node with </a:t>
+            </a:r>
+          </a:p>
+          <a:p>
+            <a:pPr algn="ctr"/>
+            <a:r>
+              <a:rPr lang="en-US" sz="1200" dirty="0" smtClean="0">
+                <a:latin typeface="Arial" panose="020B0604020202020204" pitchFamily="34" charset="0"/>
+                <a:ea typeface="Amazon Ember" panose="020B0603020204020204" pitchFamily="34" charset="0"/>
+                <a:cs typeface="Arial" panose="020B0604020202020204" pitchFamily="34" charset="0"/>
+              </a:rPr>
+              <a:t>SIOS DataKeeper</a:t>
+            </a:r>
+            <a:endParaRPr lang="en-US" sz="1200" dirty="0">
+              <a:latin typeface="Arial" panose="020B0604020202020204" pitchFamily="34" charset="0"/>
+              <a:ea typeface="Amazon Ember" panose="020B0603020204020204" pitchFamily="34" charset="0"/>
+              <a:cs typeface="Arial" panose="020B0604020202020204" pitchFamily="34" charset="0"/>
+            </a:endParaRPr>
+          </a:p>
+        </p:txBody>
+      </p:sp>
+      <p:sp>
+        <p:nvSpPr>
+          <p:cNvPr id="18" name="Rectangle 17">
+            <a:extLst>
+              <a:ext uri="{FF2B5EF4-FFF2-40B4-BE49-F238E27FC236}">
+                <a16:creationId xmlns:a16="http://schemas.microsoft.com/office/drawing/2014/main" id="{E25F190B-F12E-614B-827A-566AC09E9D97}"/>
+              </a:ext>
+            </a:extLst>
+          </p:cNvPr>
+          <p:cNvSpPr/>
+          <p:nvPr/>
+        </p:nvSpPr>
+        <p:spPr>
+          <a:xfrm>
+            <a:off x="5773633" y="1602559"/>
+            <a:ext cx="2468880" cy="1447800"/>
+          </a:xfrm>
+          <a:prstGeom prst="rect">
+            <a:avLst/>
+          </a:prstGeom>
+          <a:solidFill>
+            <a:srgbClr val="1D8900">
+              <a:alpha val="9804"/>
+            </a:srgbClr>
+          </a:solidFill>
+          <a:ln w="12700">
+            <a:noFill/>
+            <a:prstDash val="dash"/>
+          </a:ln>
+        </p:spPr>
+        <p:style>
+          <a:lnRef idx="2">
+            <a:schemeClr val="accent1">
+              <a:shade val="50000"/>
+            </a:schemeClr>
+          </a:lnRef>
+          <a:fillRef idx="1">
+            <a:schemeClr val="accent1"/>
+          </a:fillRef>
+          <a:effectRef idx="0">
+            <a:schemeClr val="accent1"/>
+          </a:effectRef>
+          <a:fontRef idx="minor">
+            <a:schemeClr val="lt1"/>
+          </a:fontRef>
+        </p:style>
+        <p:txBody>
+          <a:bodyPr rot="0" spcFirstLastPara="0" vertOverflow="overflow" horzOverflow="overflow" vert="horz" wrap="square" lIns="338328" tIns="45720" rIns="91440" bIns="45720" numCol="1" spcCol="0" rtlCol="0" fromWordArt="0" anchor="t" anchorCtr="0" forceAA="0" compatLnSpc="1">
+            <a:prstTxWarp prst="textNoShape">
+              <a:avLst/>
+            </a:prstTxWarp>
+            <a:noAutofit/>
+          </a:bodyPr>
+          <a:lstStyle/>
+          <a:p>
+            <a:pPr algn="l"/>
+            <a:r>
+              <a:rPr lang="en-US" sz="1200" dirty="0">
+                <a:solidFill>
+                  <a:schemeClr val="accent6"/>
+                </a:solidFill>
+                <a:latin typeface="Arial" panose="020B0604020202020204" pitchFamily="34" charset="0"/>
+                <a:ea typeface="Amazon Ember" panose="020B0603020204020204" pitchFamily="34" charset="0"/>
+                <a:cs typeface="Arial" panose="020B0604020202020204" pitchFamily="34" charset="0"/>
+              </a:rPr>
+              <a:t>Public subnet</a:t>
+            </a:r>
+          </a:p>
+          <a:p>
+            <a:pPr algn="l"/>
+            <a:endParaRPr lang="en-US" sz="1200" dirty="0">
+              <a:solidFill>
+                <a:schemeClr val="accent5"/>
+              </a:solidFill>
+              <a:latin typeface="Arial" panose="020B0604020202020204" pitchFamily="34" charset="0"/>
+              <a:ea typeface="Amazon Ember" panose="020B0603020204020204" pitchFamily="34" charset="0"/>
+              <a:cs typeface="Arial" panose="020B0604020202020204" pitchFamily="34" charset="0"/>
+            </a:endParaRPr>
+          </a:p>
+        </p:txBody>
+      </p:sp>
+      <p:pic>
+        <p:nvPicPr>
+          <p:cNvPr id="19" name="Graphic 10">
+            <a:extLst>
+              <a:ext uri="{FF2B5EF4-FFF2-40B4-BE49-F238E27FC236}">
+                <a16:creationId xmlns:a16="http://schemas.microsoft.com/office/drawing/2014/main" id="{89B99B74-19F0-0B4B-85E3-A09DF2519E46}"/>
+              </a:ext>
+            </a:extLst>
+          </p:cNvPr>
+          <p:cNvPicPr>
+            <a:picLocks noChangeAspect="1"/>
+          </p:cNvPicPr>
+          <p:nvPr/>
+        </p:nvPicPr>
+        <p:blipFill>
+          <a:blip r:embed="rId4">
+            <a:extLst>
+              <a:ext uri="{96DAC541-7B7A-43D3-8B79-37D633B846F1}">
+                <asvg:svgBlip xmlns:asvg="http://schemas.microsoft.com/office/drawing/2016/SVG/main" xmlns="" r:embed="rId7"/>
+              </a:ext>
+            </a:extLst>
+          </a:blip>
+          <a:stretch>
+            <a:fillRect/>
+          </a:stretch>
+        </p:blipFill>
+        <p:spPr>
+          <a:xfrm>
+            <a:off x="5775100" y="1600200"/>
+            <a:ext cx="274320" cy="274320"/>
+          </a:xfrm>
+          <a:prstGeom prst="rect">
+            <a:avLst/>
+          </a:prstGeom>
+        </p:spPr>
+      </p:pic>
+      <p:sp>
+        <p:nvSpPr>
+          <p:cNvPr id="20" name="Rectangle 19">
+            <a:extLst>
+              <a:ext uri="{FF2B5EF4-FFF2-40B4-BE49-F238E27FC236}">
+                <a16:creationId xmlns:a16="http://schemas.microsoft.com/office/drawing/2014/main" id="{A85485B4-AA18-C048-B92A-A9A0F4372B98}"/>
+              </a:ext>
+            </a:extLst>
+          </p:cNvPr>
+          <p:cNvSpPr/>
+          <p:nvPr/>
+        </p:nvSpPr>
+        <p:spPr>
+          <a:xfrm>
+            <a:off x="5773633" y="3150005"/>
+            <a:ext cx="2468880" cy="2267006"/>
+          </a:xfrm>
+          <a:prstGeom prst="rect">
+            <a:avLst/>
+          </a:prstGeom>
+          <a:solidFill>
+            <a:srgbClr val="007CBC">
+              <a:alpha val="9804"/>
+            </a:srgbClr>
+          </a:solidFill>
+          <a:ln w="12700">
+            <a:noFill/>
+            <a:prstDash val="dash"/>
+          </a:ln>
+        </p:spPr>
+        <p:style>
+          <a:lnRef idx="2">
+            <a:schemeClr val="accent1">
+              <a:shade val="50000"/>
+            </a:schemeClr>
+          </a:lnRef>
+          <a:fillRef idx="1">
+            <a:schemeClr val="accent1"/>
+          </a:fillRef>
+          <a:effectRef idx="0">
+            <a:schemeClr val="accent1"/>
+          </a:effectRef>
+          <a:fontRef idx="minor">
+            <a:schemeClr val="lt1"/>
+          </a:fontRef>
+        </p:style>
+        <p:txBody>
+          <a:bodyPr rot="0" spcFirstLastPara="0" vertOverflow="overflow" horzOverflow="overflow" vert="horz" wrap="square" lIns="338328" tIns="45720" rIns="91440" bIns="45720" numCol="1" spcCol="0" rtlCol="0" fromWordArt="0" anchor="t" anchorCtr="0" forceAA="0" compatLnSpc="1">
+            <a:prstTxWarp prst="textNoShape">
+              <a:avLst/>
+            </a:prstTxWarp>
+            <a:noAutofit/>
+          </a:bodyPr>
+          <a:lstStyle/>
+          <a:p>
+            <a:pPr algn="l"/>
+            <a:r>
+              <a:rPr lang="en-US" sz="1200" dirty="0">
+                <a:solidFill>
+                  <a:schemeClr val="accent1"/>
+                </a:solidFill>
+                <a:latin typeface="Arial" panose="020B0604020202020204" pitchFamily="34" charset="0"/>
+                <a:ea typeface="Amazon Ember" panose="020B0603020204020204" pitchFamily="34" charset="0"/>
+                <a:cs typeface="Arial" panose="020B0604020202020204" pitchFamily="34" charset="0"/>
+              </a:rPr>
+              <a:t>Private subnet</a:t>
+            </a:r>
+          </a:p>
+          <a:p>
+            <a:pPr algn="l"/>
+            <a:endParaRPr lang="en-US" sz="1200" dirty="0">
+              <a:solidFill>
+                <a:schemeClr val="accent3"/>
+              </a:solidFill>
+              <a:latin typeface="Arial" panose="020B0604020202020204" pitchFamily="34" charset="0"/>
+              <a:ea typeface="Amazon Ember" panose="020B0603020204020204" pitchFamily="34" charset="0"/>
+              <a:cs typeface="Arial" panose="020B0604020202020204" pitchFamily="34" charset="0"/>
+            </a:endParaRPr>
+          </a:p>
+        </p:txBody>
+      </p:sp>
+      <p:pic>
+        <p:nvPicPr>
+          <p:cNvPr id="21" name="Graphic 13">
+            <a:extLst>
+              <a:ext uri="{FF2B5EF4-FFF2-40B4-BE49-F238E27FC236}">
+                <a16:creationId xmlns:a16="http://schemas.microsoft.com/office/drawing/2014/main" id="{3BD31095-C7B2-C24A-9990-6F9E14956A7B}"/>
+              </a:ext>
+            </a:extLst>
+          </p:cNvPr>
+          <p:cNvPicPr>
+            <a:picLocks noChangeAspect="1"/>
+          </p:cNvPicPr>
+          <p:nvPr/>
+        </p:nvPicPr>
+        <p:blipFill>
+          <a:blip r:embed="rId8">
+            <a:extLst>
+              <a:ext uri="{96DAC541-7B7A-43D3-8B79-37D633B846F1}">
+                <asvg:svgBlip xmlns:asvg="http://schemas.microsoft.com/office/drawing/2016/SVG/main" xmlns="" r:embed="rId9"/>
+              </a:ext>
+            </a:extLst>
+          </a:blip>
+          <a:stretch>
+            <a:fillRect/>
+          </a:stretch>
+        </p:blipFill>
+        <p:spPr>
+          <a:xfrm>
+            <a:off x="5772169" y="3150005"/>
+            <a:ext cx="274320" cy="274320"/>
+          </a:xfrm>
+          <a:prstGeom prst="rect">
+            <a:avLst/>
+          </a:prstGeom>
+        </p:spPr>
+      </p:pic>
+      <p:sp>
+        <p:nvSpPr>
+          <p:cNvPr id="22" name="TextBox 21">
+            <a:extLst>
+              <a:ext uri="{FF2B5EF4-FFF2-40B4-BE49-F238E27FC236}">
+                <a16:creationId xmlns:a16="http://schemas.microsoft.com/office/drawing/2014/main" id="{F90C1CC4-DFE6-0445-BD1C-DB610E1A07F5}"/>
+              </a:ext>
+            </a:extLst>
+          </p:cNvPr>
+          <p:cNvSpPr txBox="1"/>
+          <p:nvPr/>
+        </p:nvSpPr>
+        <p:spPr>
+          <a:xfrm>
+            <a:off x="5697824" y="2542576"/>
+            <a:ext cx="1513305" cy="276999"/>
+          </a:xfrm>
+          <a:prstGeom prst="rect">
+            <a:avLst/>
+          </a:prstGeom>
+          <a:noFill/>
+          <a:effectLst>
+            <a:softEdge rad="0"/>
+          </a:effectLst>
+        </p:spPr>
+        <p:txBody>
+          <a:bodyPr wrap="square" rtlCol="0">
+            <a:spAutoFit/>
+          </a:bodyPr>
+          <a:lstStyle/>
+          <a:p>
+            <a:pPr algn="ctr"/>
+            <a:r>
+              <a:rPr lang="en-US" sz="1200" dirty="0">
+                <a:latin typeface="Arial" panose="020B0604020202020204" pitchFamily="34" charset="0"/>
+                <a:ea typeface="Amazon Ember" panose="020B0603020204020204" pitchFamily="34" charset="0"/>
+                <a:cs typeface="Arial" panose="020B0604020202020204" pitchFamily="34" charset="0"/>
+              </a:rPr>
+              <a:t>RD Gateway</a:t>
+            </a:r>
+          </a:p>
+        </p:txBody>
+      </p:sp>
+      <p:sp>
+        <p:nvSpPr>
+          <p:cNvPr id="23" name="TextBox 22">
+            <a:extLst>
+              <a:ext uri="{FF2B5EF4-FFF2-40B4-BE49-F238E27FC236}">
+                <a16:creationId xmlns:a16="http://schemas.microsoft.com/office/drawing/2014/main" id="{517096B6-EF64-C245-A3E7-BEEF81BDCB9C}"/>
+              </a:ext>
+            </a:extLst>
+          </p:cNvPr>
+          <p:cNvSpPr txBox="1"/>
+          <p:nvPr/>
+        </p:nvSpPr>
+        <p:spPr>
+          <a:xfrm>
+            <a:off x="6993224" y="2545000"/>
+            <a:ext cx="1236442" cy="276999"/>
+          </a:xfrm>
+          <a:prstGeom prst="rect">
+            <a:avLst/>
+          </a:prstGeom>
+          <a:noFill/>
+        </p:spPr>
+        <p:txBody>
+          <a:bodyPr wrap="square" rtlCol="0">
+            <a:spAutoFit/>
+          </a:bodyPr>
+          <a:lstStyle/>
+          <a:p>
+            <a:pPr algn="ctr"/>
+            <a:r>
+              <a:rPr lang="en-US" sz="1200" dirty="0">
+                <a:latin typeface="Arial" panose="020B0604020202020204" pitchFamily="34" charset="0"/>
+                <a:ea typeface="Amazon Ember" panose="020B0603020204020204" pitchFamily="34" charset="0"/>
+                <a:cs typeface="Arial" panose="020B0604020202020204" pitchFamily="34" charset="0"/>
+              </a:rPr>
+              <a:t>NAT gateway</a:t>
+            </a:r>
+          </a:p>
+        </p:txBody>
+      </p:sp>
+      <p:pic>
+        <p:nvPicPr>
+          <p:cNvPr id="24" name="Graphic 40">
+            <a:extLst>
+              <a:ext uri="{FF2B5EF4-FFF2-40B4-BE49-F238E27FC236}">
+                <a16:creationId xmlns:a16="http://schemas.microsoft.com/office/drawing/2014/main" id="{C322592C-EAB9-0640-95A5-D8FF5B8E5FE6}"/>
+              </a:ext>
+            </a:extLst>
+          </p:cNvPr>
+          <p:cNvPicPr>
+            <a:picLocks noChangeAspect="1"/>
+          </p:cNvPicPr>
+          <p:nvPr/>
+        </p:nvPicPr>
+        <p:blipFill>
+          <a:blip r:embed="rId14">
+            <a:extLst>
+              <a:ext uri="{96DAC541-7B7A-43D3-8B79-37D633B846F1}">
+                <asvg:svgBlip xmlns:asvg="http://schemas.microsoft.com/office/drawing/2016/SVG/main" xmlns="" r:embed="rId17"/>
+              </a:ext>
+            </a:extLst>
+          </a:blip>
+          <a:stretch>
+            <a:fillRect/>
+          </a:stretch>
+        </p:blipFill>
+        <p:spPr>
+          <a:xfrm>
+            <a:off x="7376495" y="2090186"/>
+            <a:ext cx="469900" cy="469900"/>
+          </a:xfrm>
+          <a:prstGeom prst="rect">
+            <a:avLst/>
+          </a:prstGeom>
+        </p:spPr>
+      </p:pic>
+      <p:pic>
+        <p:nvPicPr>
+          <p:cNvPr id="25" name="Graphic 135">
+            <a:extLst>
+              <a:ext uri="{FF2B5EF4-FFF2-40B4-BE49-F238E27FC236}">
+                <a16:creationId xmlns:a16="http://schemas.microsoft.com/office/drawing/2014/main" id="{C19987B1-DB3A-1640-994D-BCB81FCC1AE4}"/>
+              </a:ext>
+            </a:extLst>
+          </p:cNvPr>
+          <p:cNvPicPr>
+            <a:picLocks noChangeAspect="1"/>
+          </p:cNvPicPr>
+          <p:nvPr/>
+        </p:nvPicPr>
+        <p:blipFill>
+          <a:blip r:embed="rId12">
+            <a:extLst>
+              <a:ext uri="{96DAC541-7B7A-43D3-8B79-37D633B846F1}">
+                <asvg:svgBlip xmlns:asvg="http://schemas.microsoft.com/office/drawing/2016/SVG/main" xmlns="" r:embed="rId13"/>
+              </a:ext>
+            </a:extLst>
+          </a:blip>
+          <a:stretch>
+            <a:fillRect/>
+          </a:stretch>
+        </p:blipFill>
+        <p:spPr>
+          <a:xfrm>
+            <a:off x="6219526" y="3429631"/>
+            <a:ext cx="469900" cy="469900"/>
+          </a:xfrm>
+          <a:prstGeom prst="rect">
+            <a:avLst/>
+          </a:prstGeom>
+        </p:spPr>
+      </p:pic>
+      <p:sp>
+        <p:nvSpPr>
+          <p:cNvPr id="26" name="TextBox 25">
+            <a:extLst>
+              <a:ext uri="{FF2B5EF4-FFF2-40B4-BE49-F238E27FC236}">
+                <a16:creationId xmlns:a16="http://schemas.microsoft.com/office/drawing/2014/main" id="{F90C1CC4-DFE6-0445-BD1C-DB610E1A07F5}"/>
+              </a:ext>
+            </a:extLst>
+          </p:cNvPr>
+          <p:cNvSpPr txBox="1"/>
+          <p:nvPr/>
+        </p:nvSpPr>
+        <p:spPr>
+          <a:xfrm>
+            <a:off x="5697824" y="3862138"/>
+            <a:ext cx="1513305" cy="276999"/>
+          </a:xfrm>
+          <a:prstGeom prst="rect">
+            <a:avLst/>
+          </a:prstGeom>
+          <a:noFill/>
+        </p:spPr>
+        <p:txBody>
+          <a:bodyPr wrap="square" rtlCol="0">
+            <a:spAutoFit/>
+          </a:bodyPr>
+          <a:lstStyle/>
+          <a:p>
+            <a:pPr algn="ctr"/>
+            <a:r>
+              <a:rPr lang="en-US" sz="1200" dirty="0" smtClean="0">
+                <a:latin typeface="Arial" panose="020B0604020202020204" pitchFamily="34" charset="0"/>
+                <a:ea typeface="Amazon Ember" panose="020B0603020204020204" pitchFamily="34" charset="0"/>
+                <a:cs typeface="Arial" panose="020B0604020202020204" pitchFamily="34" charset="0"/>
+              </a:rPr>
+              <a:t>Domain controller</a:t>
+            </a:r>
+            <a:endParaRPr lang="en-US" sz="1200" dirty="0">
+              <a:latin typeface="Arial" panose="020B0604020202020204" pitchFamily="34" charset="0"/>
+              <a:ea typeface="Amazon Ember" panose="020B0603020204020204" pitchFamily="34" charset="0"/>
+              <a:cs typeface="Arial" panose="020B0604020202020204" pitchFamily="34" charset="0"/>
+            </a:endParaRPr>
+          </a:p>
+        </p:txBody>
+      </p:sp>
+      <p:pic>
+        <p:nvPicPr>
+          <p:cNvPr id="45" name="Graphic 135">
+            <a:extLst>
+              <a:ext uri="{FF2B5EF4-FFF2-40B4-BE49-F238E27FC236}">
+                <a16:creationId xmlns:a16="http://schemas.microsoft.com/office/drawing/2014/main" id="{C19987B1-DB3A-1640-994D-BCB81FCC1AE4}"/>
+              </a:ext>
+            </a:extLst>
+          </p:cNvPr>
+          <p:cNvPicPr>
+            <a:picLocks noChangeAspect="1"/>
+          </p:cNvPicPr>
+          <p:nvPr/>
+        </p:nvPicPr>
+        <p:blipFill>
+          <a:blip r:embed="rId12">
+            <a:extLst>
+              <a:ext uri="{96DAC541-7B7A-43D3-8B79-37D633B846F1}">
+                <asvg:svgBlip xmlns:asvg="http://schemas.microsoft.com/office/drawing/2016/SVG/main" xmlns="" r:embed="rId13"/>
+              </a:ext>
+            </a:extLst>
+          </a:blip>
+          <a:stretch>
+            <a:fillRect/>
+          </a:stretch>
+        </p:blipFill>
+        <p:spPr>
+          <a:xfrm>
+            <a:off x="6219526" y="4191631"/>
+            <a:ext cx="469900" cy="469900"/>
+          </a:xfrm>
+          <a:prstGeom prst="rect">
+            <a:avLst/>
+          </a:prstGeom>
+        </p:spPr>
+      </p:pic>
+      <p:sp>
+        <p:nvSpPr>
+          <p:cNvPr id="48" name="TextBox 47">
+            <a:extLst>
+              <a:ext uri="{FF2B5EF4-FFF2-40B4-BE49-F238E27FC236}">
+                <a16:creationId xmlns:a16="http://schemas.microsoft.com/office/drawing/2014/main" id="{F90C1CC4-DFE6-0445-BD1C-DB610E1A07F5}"/>
+              </a:ext>
+            </a:extLst>
+          </p:cNvPr>
+          <p:cNvSpPr txBox="1"/>
+          <p:nvPr/>
+        </p:nvSpPr>
+        <p:spPr>
+          <a:xfrm>
+            <a:off x="5708519" y="4624138"/>
+            <a:ext cx="1513305" cy="646331"/>
+          </a:xfrm>
+          <a:prstGeom prst="rect">
+            <a:avLst/>
+          </a:prstGeom>
+          <a:noFill/>
+        </p:spPr>
+        <p:txBody>
+          <a:bodyPr wrap="square" rtlCol="0">
+            <a:spAutoFit/>
+          </a:bodyPr>
+          <a:lstStyle/>
+          <a:p>
+            <a:pPr algn="ctr"/>
+            <a:r>
+              <a:rPr lang="en-US" sz="1200" dirty="0" smtClean="0">
+                <a:latin typeface="Arial" panose="020B0604020202020204" pitchFamily="34" charset="0"/>
+                <a:ea typeface="Amazon Ember" panose="020B0603020204020204" pitchFamily="34" charset="0"/>
+                <a:cs typeface="Arial" panose="020B0604020202020204" pitchFamily="34" charset="0"/>
+              </a:rPr>
+              <a:t>SQL Server node with </a:t>
+            </a:r>
+          </a:p>
+          <a:p>
+            <a:pPr algn="ctr"/>
+            <a:r>
+              <a:rPr lang="en-US" sz="1200" dirty="0" smtClean="0">
+                <a:latin typeface="Arial" panose="020B0604020202020204" pitchFamily="34" charset="0"/>
+                <a:ea typeface="Amazon Ember" panose="020B0603020204020204" pitchFamily="34" charset="0"/>
+                <a:cs typeface="Arial" panose="020B0604020202020204" pitchFamily="34" charset="0"/>
+              </a:rPr>
+              <a:t>SIOS DataKeeper</a:t>
+            </a:r>
+            <a:endParaRPr lang="en-US" sz="1200" dirty="0">
+              <a:latin typeface="Arial" panose="020B0604020202020204" pitchFamily="34" charset="0"/>
+              <a:ea typeface="Amazon Ember" panose="020B0603020204020204" pitchFamily="34" charset="0"/>
+              <a:cs typeface="Arial" panose="020B0604020202020204" pitchFamily="34" charset="0"/>
+            </a:endParaRPr>
+          </a:p>
+        </p:txBody>
+      </p:sp>
+      <p:pic>
+        <p:nvPicPr>
+          <p:cNvPr id="46" name="Graphic 135">
+            <a:extLst>
+              <a:ext uri="{FF2B5EF4-FFF2-40B4-BE49-F238E27FC236}">
+                <a16:creationId xmlns:a16="http://schemas.microsoft.com/office/drawing/2014/main" id="{C19987B1-DB3A-1640-994D-BCB81FCC1AE4}"/>
+              </a:ext>
+            </a:extLst>
+          </p:cNvPr>
+          <p:cNvPicPr>
+            <a:picLocks noChangeAspect="1"/>
+          </p:cNvPicPr>
+          <p:nvPr/>
+        </p:nvPicPr>
+        <p:blipFill>
+          <a:blip r:embed="rId12">
+            <a:extLst>
+              <a:ext uri="{96DAC541-7B7A-43D3-8B79-37D633B846F1}">
+                <asvg:svgBlip xmlns:asvg="http://schemas.microsoft.com/office/drawing/2016/SVG/main" xmlns="" r:embed="rId13"/>
+              </a:ext>
+            </a:extLst>
+          </a:blip>
+          <a:stretch>
+            <a:fillRect/>
+          </a:stretch>
+        </p:blipFill>
+        <p:spPr>
+          <a:xfrm>
+            <a:off x="6215984" y="2090186"/>
+            <a:ext cx="469900" cy="469900"/>
+          </a:xfrm>
+          <a:prstGeom prst="rect">
+            <a:avLst/>
+          </a:prstGeom>
+        </p:spPr>
+      </p:pic>
+      <p:sp>
+        <p:nvSpPr>
+          <p:cNvPr id="55" name="Rectangle 54">
+            <a:extLst>
+              <a:ext uri="{FF2B5EF4-FFF2-40B4-BE49-F238E27FC236}">
+                <a16:creationId xmlns:a16="http://schemas.microsoft.com/office/drawing/2014/main" id="{D246DAA1-0260-E449-8CA2-92FF0101149D}"/>
+              </a:ext>
+            </a:extLst>
+          </p:cNvPr>
+          <p:cNvSpPr/>
+          <p:nvPr/>
+        </p:nvSpPr>
+        <p:spPr>
+          <a:xfrm>
+            <a:off x="5638800" y="863600"/>
+            <a:ext cx="2743200" cy="4736592"/>
+          </a:xfrm>
+          <a:prstGeom prst="rect">
+            <a:avLst/>
+          </a:prstGeom>
+          <a:noFill/>
+          <a:ln w="12700">
+            <a:solidFill>
+              <a:srgbClr val="5B9CD5"/>
+            </a:solidFill>
+            <a:prstDash val="dash"/>
+          </a:ln>
+        </p:spPr>
+        <p:style>
+          <a:lnRef idx="2">
+            <a:schemeClr val="accent1">
+              <a:shade val="50000"/>
+            </a:schemeClr>
+          </a:lnRef>
+          <a:fillRef idx="1">
+            <a:schemeClr val="accent1"/>
+          </a:fillRef>
+          <a:effectRef idx="0">
+            <a:schemeClr val="accent1"/>
+          </a:effectRef>
+          <a:fontRef idx="minor">
+            <a:schemeClr val="lt1"/>
+          </a:fontRef>
+        </p:style>
+        <p:txBody>
+          <a:bodyPr tIns="91440"/>
+          <a:lstStyle/>
+          <a:p>
+            <a:pPr algn="ctr" eaLnBrk="1" fontAlgn="auto" hangingPunct="1">
+              <a:spcBef>
+                <a:spcPts val="0"/>
+              </a:spcBef>
+              <a:spcAft>
+                <a:spcPts val="0"/>
+              </a:spcAft>
+              <a:defRPr/>
+            </a:pPr>
+            <a:r>
+              <a:rPr lang="en-US" sz="1200" dirty="0">
+                <a:solidFill>
+                  <a:srgbClr val="5B9CD5"/>
+                </a:solidFill>
+                <a:latin typeface="Arial" panose="020B0604020202020204" pitchFamily="34" charset="0"/>
+                <a:cs typeface="Arial" panose="020B0604020202020204" pitchFamily="34" charset="0"/>
+              </a:rPr>
+              <a:t>Availability </a:t>
+            </a:r>
+            <a:r>
+              <a:rPr lang="en-US" sz="1200" dirty="0" smtClean="0">
+                <a:solidFill>
+                  <a:srgbClr val="5B9CD5"/>
+                </a:solidFill>
+                <a:latin typeface="Arial" panose="020B0604020202020204" pitchFamily="34" charset="0"/>
+                <a:cs typeface="Arial" panose="020B0604020202020204" pitchFamily="34" charset="0"/>
+              </a:rPr>
+              <a:t>Zone 2</a:t>
+            </a:r>
+            <a:endParaRPr lang="en-US" sz="1200" dirty="0">
+              <a:solidFill>
+                <a:srgbClr val="5B9CD5"/>
+              </a:solidFill>
+              <a:latin typeface="Arial" panose="020B0604020202020204" pitchFamily="34" charset="0"/>
+              <a:cs typeface="Arial" panose="020B0604020202020204" pitchFamily="34" charset="0"/>
+            </a:endParaRPr>
+          </a:p>
+        </p:txBody>
+      </p:sp>
+      <p:sp>
+        <p:nvSpPr>
+          <p:cNvPr id="42" name="Rectangle 41">
+            <a:extLst>
+              <a:ext uri="{FF2B5EF4-FFF2-40B4-BE49-F238E27FC236}">
+                <a16:creationId xmlns:a16="http://schemas.microsoft.com/office/drawing/2014/main" id="{FFA89DF7-D079-0947-8E29-4EEA4975DBBD}"/>
+              </a:ext>
+            </a:extLst>
+          </p:cNvPr>
+          <p:cNvSpPr/>
+          <p:nvPr/>
+        </p:nvSpPr>
+        <p:spPr>
+          <a:xfrm>
+            <a:off x="2667000" y="4117173"/>
+            <a:ext cx="4474398" cy="1216827"/>
+          </a:xfrm>
+          <a:prstGeom prst="rect">
+            <a:avLst/>
+          </a:prstGeom>
+          <a:noFill/>
+          <a:ln w="12700">
+            <a:solidFill>
+              <a:srgbClr val="5A6B86"/>
+            </a:solidFill>
+            <a:prstDash val="dash"/>
+          </a:ln>
+        </p:spPr>
+        <p:style>
+          <a:lnRef idx="2">
+            <a:schemeClr val="accent1">
+              <a:shade val="50000"/>
+            </a:schemeClr>
+          </a:lnRef>
+          <a:fillRef idx="1">
+            <a:schemeClr val="accent1"/>
+          </a:fillRef>
+          <a:effectRef idx="0">
+            <a:schemeClr val="accent1"/>
+          </a:effectRef>
+          <a:fontRef idx="minor">
+            <a:schemeClr val="lt1"/>
+          </a:fontRef>
+        </p:style>
+        <p:txBody>
+          <a:bodyPr lIns="91440" tIns="91440" rIns="91440"/>
+          <a:lstStyle/>
+          <a:p>
+            <a:pPr algn="ctr" eaLnBrk="1" fontAlgn="auto" hangingPunct="1">
+              <a:spcBef>
+                <a:spcPts val="0"/>
+              </a:spcBef>
+              <a:spcAft>
+                <a:spcPts val="0"/>
+              </a:spcAft>
+              <a:defRPr/>
+            </a:pPr>
+            <a:r>
+              <a:rPr lang="en-US" sz="1200" dirty="0" smtClean="0">
+                <a:solidFill>
+                  <a:srgbClr val="5A6B86"/>
+                </a:solidFill>
+                <a:latin typeface="Arial" panose="020B0604020202020204" pitchFamily="34" charset="0"/>
+                <a:cs typeface="Arial" panose="020B0604020202020204" pitchFamily="34" charset="0"/>
+              </a:rPr>
+              <a:t>Failover </a:t>
+            </a:r>
+            <a:r>
+              <a:rPr lang="en-US" sz="1200" dirty="0" smtClean="0">
+                <a:solidFill>
+                  <a:srgbClr val="5A6B86"/>
+                </a:solidFill>
+                <a:latin typeface="Arial" panose="020B0604020202020204" pitchFamily="34" charset="0"/>
+                <a:cs typeface="Arial" panose="020B0604020202020204" pitchFamily="34" charset="0"/>
+              </a:rPr>
+              <a:t>cluster </a:t>
+            </a:r>
+            <a:r>
+              <a:rPr lang="en-US" sz="1200" dirty="0" smtClean="0">
+                <a:solidFill>
+                  <a:srgbClr val="5A6B86"/>
+                </a:solidFill>
+                <a:latin typeface="Arial" panose="020B0604020202020204" pitchFamily="34" charset="0"/>
+                <a:cs typeface="Arial" panose="020B0604020202020204" pitchFamily="34" charset="0"/>
+              </a:rPr>
+              <a:t>and</a:t>
+            </a:r>
+          </a:p>
+          <a:p>
+            <a:pPr algn="ctr" eaLnBrk="1" fontAlgn="auto" hangingPunct="1">
+              <a:spcBef>
+                <a:spcPts val="0"/>
+              </a:spcBef>
+              <a:spcAft>
+                <a:spcPts val="0"/>
+              </a:spcAft>
+              <a:defRPr/>
+            </a:pPr>
+            <a:r>
+              <a:rPr lang="en-US" sz="1200" dirty="0" smtClean="0">
+                <a:solidFill>
+                  <a:srgbClr val="5A6B86"/>
+                </a:solidFill>
+                <a:latin typeface="Arial" panose="020B0604020202020204" pitchFamily="34" charset="0"/>
+                <a:cs typeface="Arial" panose="020B0604020202020204" pitchFamily="34" charset="0"/>
+              </a:rPr>
+              <a:t>SIOS DataKeeper</a:t>
+            </a:r>
+          </a:p>
+          <a:p>
+            <a:pPr algn="ctr" eaLnBrk="1" fontAlgn="auto" hangingPunct="1">
+              <a:spcBef>
+                <a:spcPts val="0"/>
+              </a:spcBef>
+              <a:spcAft>
+                <a:spcPts val="0"/>
+              </a:spcAft>
+              <a:defRPr/>
+            </a:pPr>
+            <a:r>
+              <a:rPr lang="en-US" sz="1200" dirty="0" smtClean="0">
+                <a:solidFill>
+                  <a:srgbClr val="5A6B86"/>
+                </a:solidFill>
+                <a:latin typeface="Arial" panose="020B0604020202020204" pitchFamily="34" charset="0"/>
+                <a:cs typeface="Arial" panose="020B0604020202020204" pitchFamily="34" charset="0"/>
+              </a:rPr>
+              <a:t>replication</a:t>
+            </a:r>
+            <a:endParaRPr lang="en-US" sz="1200" dirty="0">
+              <a:solidFill>
+                <a:srgbClr val="5A6B86"/>
+              </a:solidFill>
+              <a:latin typeface="Arial" panose="020B0604020202020204" pitchFamily="34" charset="0"/>
+              <a:cs typeface="Arial" panose="020B0604020202020204" pitchFamily="34" charset="0"/>
+            </a:endParaRPr>
+          </a:p>
+        </p:txBody>
+      </p:sp>
+    </p:spTree>
+    <p:extLst>
+      <p:ext uri="{BB962C8B-B14F-4D97-AF65-F5344CB8AC3E}">
+        <p14:creationId xmlns:p14="http://schemas.microsoft.com/office/powerpoint/2010/main" val="1109498201"/>
       </p:ext>
     </p:extLst>
   </p:cSld>

</xml_diff>